<commit_message>
Added animations, visuals and content to presentation
</commit_message>
<xml_diff>
--- a/Game Proposal.pptx
+++ b/Game Proposal.pptx
@@ -673,7 +673,7 @@
             <a:fld id="{5923F103-BC34-4FE4-A40E-EDDEECFDA5D0}" type="datetimeFigureOut">
               <a:rPr lang="en-US" dirty="0"/>
               <a:pPr/>
-              <a:t>9/14/2019</a:t>
+              <a:t>9/15/2019</a:t>
             </a:fld>
             <a:endParaRPr lang="en-US" dirty="0"/>
           </a:p>
@@ -1757,7 +1757,7 @@
           <a:p>
             <a:fld id="{923A1CC3-2375-41D4-9E03-427CAF2A4C1A}" type="datetimeFigureOut">
               <a:rPr lang="en-US" dirty="0"/>
-              <a:t>9/14/2019</a:t>
+              <a:t>9/15/2019</a:t>
             </a:fld>
             <a:endParaRPr lang="en-US" dirty="0"/>
           </a:p>
@@ -2733,7 +2733,7 @@
           <a:p>
             <a:fld id="{AFF16868-8199-4C2C-A5B1-63AEE139F88E}" type="datetimeFigureOut">
               <a:rPr lang="en-US" dirty="0"/>
-              <a:t>9/14/2019</a:t>
+              <a:t>9/15/2019</a:t>
             </a:fld>
             <a:endParaRPr lang="en-US" dirty="0"/>
           </a:p>
@@ -3863,7 +3863,7 @@
           <a:p>
             <a:fld id="{AAD9FF7F-6988-44CC-821B-644E70CD2F73}" type="datetimeFigureOut">
               <a:rPr lang="en-US" dirty="0"/>
-              <a:t>9/14/2019</a:t>
+              <a:t>9/15/2019</a:t>
             </a:fld>
             <a:endParaRPr lang="en-US" dirty="0"/>
           </a:p>
@@ -4892,7 +4892,7 @@
           <a:p>
             <a:fld id="{5C12C299-16B2-4475-990D-751901EACC14}" type="datetimeFigureOut">
               <a:rPr lang="en-US" dirty="0"/>
-              <a:t>9/14/2019</a:t>
+              <a:t>9/15/2019</a:t>
             </a:fld>
             <a:endParaRPr lang="en-US" dirty="0"/>
           </a:p>
@@ -5548,7 +5548,7 @@
           <a:p>
             <a:fld id="{9FE86839-B9D8-4651-8783-F325ECE74E65}" type="datetimeFigureOut">
               <a:rPr lang="en-US" dirty="0"/>
-              <a:t>9/14/2019</a:t>
+              <a:t>9/15/2019</a:t>
             </a:fld>
             <a:endParaRPr lang="en-US" dirty="0"/>
           </a:p>
@@ -6405,7 +6405,7 @@
           <a:p>
             <a:fld id="{FD484F64-32F6-45C5-931F-ADC1662401D0}" type="datetimeFigureOut">
               <a:rPr lang="en-US" dirty="0"/>
-              <a:t>9/14/2019</a:t>
+              <a:t>9/15/2019</a:t>
             </a:fld>
             <a:endParaRPr lang="en-US" dirty="0"/>
           </a:p>
@@ -6591,7 +6591,7 @@
           <a:p>
             <a:fld id="{53086D93-FCAC-47E0-A2EE-787E62CA814C}" type="datetimeFigureOut">
               <a:rPr lang="en-US" dirty="0"/>
-              <a:t>9/14/2019</a:t>
+              <a:t>9/15/2019</a:t>
             </a:fld>
             <a:endParaRPr lang="en-US" dirty="0"/>
           </a:p>
@@ -7559,7 +7559,7 @@
           <a:p>
             <a:fld id="{CDA879A6-0FD0-4734-A311-86BFCA472E6E}" type="datetimeFigureOut">
               <a:rPr lang="en-US" dirty="0"/>
-              <a:t>9/14/2019</a:t>
+              <a:t>9/15/2019</a:t>
             </a:fld>
             <a:endParaRPr lang="en-US" dirty="0"/>
           </a:p>
@@ -7766,7 +7766,7 @@
           <a:p>
             <a:fld id="{19C9CA7B-DFD4-44B5-8C60-D14B8CD1FB59}" type="datetimeFigureOut">
               <a:rPr lang="en-US" dirty="0"/>
-              <a:t>9/14/2019</a:t>
+              <a:t>9/15/2019</a:t>
             </a:fld>
             <a:endParaRPr lang="en-US" dirty="0"/>
           </a:p>
@@ -8796,7 +8796,7 @@
           <a:p>
             <a:fld id="{F34E6425-0181-43F2-84FC-787E803FD2F8}" type="datetimeFigureOut">
               <a:rPr lang="en-US" dirty="0"/>
-              <a:t>9/14/2019</a:t>
+              <a:t>9/15/2019</a:t>
             </a:fld>
             <a:endParaRPr lang="en-US" dirty="0"/>
           </a:p>
@@ -9064,7 +9064,7 @@
           <a:p>
             <a:fld id="{3BDB8791-F1B0-41E7-B7FD-A781E65C4266}" type="datetimeFigureOut">
               <a:rPr lang="en-US" dirty="0"/>
-              <a:t>9/14/2019</a:t>
+              <a:t>9/15/2019</a:t>
             </a:fld>
             <a:endParaRPr lang="en-US" dirty="0"/>
           </a:p>
@@ -9470,7 +9470,7 @@
           <a:p>
             <a:fld id="{5FDD63B2-E120-4ED8-B27B-C685F510A5FE}" type="datetimeFigureOut">
               <a:rPr lang="en-US" dirty="0"/>
-              <a:t>9/14/2019</a:t>
+              <a:t>9/15/2019</a:t>
             </a:fld>
             <a:endParaRPr lang="en-US" dirty="0"/>
           </a:p>
@@ -9593,7 +9593,7 @@
           <a:p>
             <a:fld id="{7AA18ACC-A947-437B-A130-35BD54FDF1E9}" type="datetimeFigureOut">
               <a:rPr lang="en-US" dirty="0"/>
-              <a:t>9/14/2019</a:t>
+              <a:t>9/15/2019</a:t>
             </a:fld>
             <a:endParaRPr lang="en-US" dirty="0"/>
           </a:p>
@@ -9684,7 +9684,7 @@
           <a:p>
             <a:fld id="{7C8D7E02-BCB8-4D50-A234-369438C08659}" type="datetimeFigureOut">
               <a:rPr lang="en-US" dirty="0"/>
-              <a:t>9/14/2019</a:t>
+              <a:t>9/15/2019</a:t>
             </a:fld>
             <a:endParaRPr lang="en-US" dirty="0"/>
           </a:p>
@@ -10761,7 +10761,7 @@
           <a:p>
             <a:fld id="{76E86A4C-8E40-4F87-A4F0-01A0687C5742}" type="datetimeFigureOut">
               <a:rPr lang="en-US" dirty="0"/>
-              <a:t>9/14/2019</a:t>
+              <a:t>9/15/2019</a:t>
             </a:fld>
             <a:endParaRPr lang="en-US" dirty="0"/>
           </a:p>
@@ -11865,7 +11865,7 @@
           <a:p>
             <a:fld id="{35E72C73-2D91-4E12-BA25-F0AA0C03599B}" type="datetimeFigureOut">
               <a:rPr lang="en-US" dirty="0"/>
-              <a:t>9/14/2019</a:t>
+              <a:t>9/15/2019</a:t>
             </a:fld>
             <a:endParaRPr lang="en-US" dirty="0"/>
           </a:p>
@@ -12858,7 +12858,7 @@
           <a:p>
             <a:fld id="{2BE451C3-0FF4-47C4-B829-773ADF60F88C}" type="datetimeFigureOut">
               <a:rPr lang="en-US" dirty="0"/>
-              <a:t>9/14/2019</a:t>
+              <a:t>9/15/2019</a:t>
             </a:fld>
             <a:endParaRPr lang="en-US" dirty="0"/>
           </a:p>
@@ -13416,39 +13416,10 @@
       </p:grpSpPr>
       <p:sp>
         <p:nvSpPr>
-          <p:cNvPr id="2" name="Title 1">
-            <a:extLst>
-              <a:ext uri="{FF2B5EF4-FFF2-40B4-BE49-F238E27FC236}">
-                <a16:creationId xmlns:a16="http://schemas.microsoft.com/office/drawing/2014/main" id="{A453E73E-BCCE-4635-9E38-B1D8878050BE}"/>
-              </a:ext>
-            </a:extLst>
-          </p:cNvPr>
-          <p:cNvSpPr>
-            <a:spLocks noGrp="1"/>
-          </p:cNvSpPr>
-          <p:nvPr>
-            <p:ph type="ctrTitle"/>
-          </p:nvPr>
-        </p:nvSpPr>
-        <p:spPr/>
-        <p:txBody>
-          <a:bodyPr/>
-          <a:lstStyle/>
-          <a:p>
-            <a:r>
-              <a:rPr lang="en-US" dirty="0" err="1"/>
-              <a:t>smroW</a:t>
-            </a:r>
-            <a:endParaRPr lang="en-US" dirty="0"/>
-          </a:p>
-        </p:txBody>
-      </p:sp>
-      <p:sp>
-        <p:nvSpPr>
           <p:cNvPr id="3" name="Subtitle 2">
             <a:extLst>
               <a:ext uri="{FF2B5EF4-FFF2-40B4-BE49-F238E27FC236}">
-                <a16:creationId xmlns:a16="http://schemas.microsoft.com/office/drawing/2014/main" id="{914CA8F9-AB28-48F0-950C-D69A19E69925}"/>
+                <a16:creationId xmlns:a16="http://schemas.microsoft.com/office/drawing/2014/main" xmlns="" id="{914CA8F9-AB28-48F0-950C-D69A19E69925}"/>
               </a:ext>
             </a:extLst>
           </p:cNvPr>
@@ -13461,18 +13432,24 @@
         </p:nvSpPr>
         <p:spPr>
           <a:xfrm>
-            <a:off x="1154955" y="4777379"/>
-            <a:ext cx="8825658" cy="933609"/>
+            <a:off x="1154955" y="4402183"/>
+            <a:ext cx="4370634" cy="1854905"/>
           </a:xfrm>
         </p:spPr>
         <p:txBody>
           <a:bodyPr>
-            <a:normAutofit fontScale="85000" lnSpcReduction="20000"/>
+            <a:normAutofit/>
           </a:bodyPr>
           <a:lstStyle/>
           <a:p>
             <a:r>
-              <a:rPr lang="en-US" dirty="0"/>
+              <a:rPr lang="en-US" dirty="0" smtClean="0"/>
+              <a:t>By:</a:t>
+            </a:r>
+          </a:p>
+          <a:p>
+            <a:r>
+              <a:rPr lang="en-US" dirty="0" smtClean="0"/>
               <a:t>Alex </a:t>
             </a:r>
             <a:r>
@@ -13495,6 +13472,392 @@
           </a:p>
         </p:txBody>
       </p:sp>
+      <p:sp>
+        <p:nvSpPr>
+          <p:cNvPr id="4" name="Rectangle 3"/>
+          <p:cNvSpPr/>
+          <p:nvPr/>
+        </p:nvSpPr>
+        <p:spPr>
+          <a:xfrm>
+            <a:off x="4509935" y="2494918"/>
+            <a:ext cx="2460931" cy="923330"/>
+          </a:xfrm>
+          <a:prstGeom prst="rect">
+            <a:avLst/>
+          </a:prstGeom>
+          <a:noFill/>
+        </p:spPr>
+        <p:txBody>
+          <a:bodyPr wrap="none" lIns="91440" tIns="45720" rIns="91440" bIns="45720">
+            <a:spAutoFit/>
+          </a:bodyPr>
+          <a:lstStyle/>
+          <a:p>
+            <a:pPr algn="ctr"/>
+            <a:r>
+              <a:rPr lang="en-US" sz="5400" b="1" dirty="0" smtClean="0">
+                <a:ln w="13462">
+                  <a:solidFill>
+                    <a:schemeClr val="tx1"/>
+                  </a:solidFill>
+                  <a:prstDash val="solid"/>
+                </a:ln>
+                <a:solidFill>
+                  <a:srgbClr val="FFC000"/>
+                </a:solidFill>
+                <a:effectLst>
+                  <a:outerShdw blurRad="60007" dist="310007" dir="7680000" sy="30000" kx="1300200" algn="ctr" rotWithShape="0">
+                    <a:prstClr val="black">
+                      <a:alpha val="32000"/>
+                    </a:prstClr>
+                  </a:outerShdw>
+                </a:effectLst>
+              </a:rPr>
+              <a:t>Worms</a:t>
+            </a:r>
+            <a:endParaRPr lang="en-US" sz="5400" b="1" dirty="0">
+              <a:ln w="13462">
+                <a:solidFill>
+                  <a:schemeClr val="tx1"/>
+                </a:solidFill>
+                <a:prstDash val="solid"/>
+              </a:ln>
+              <a:solidFill>
+                <a:srgbClr val="FFC000"/>
+              </a:solidFill>
+              <a:effectLst>
+                <a:outerShdw blurRad="60007" dist="310007" dir="7680000" sy="30000" kx="1300200" algn="ctr" rotWithShape="0">
+                  <a:prstClr val="black">
+                    <a:alpha val="32000"/>
+                  </a:prstClr>
+                </a:outerShdw>
+              </a:effectLst>
+            </a:endParaRPr>
+          </a:p>
+        </p:txBody>
+      </p:sp>
+      <p:sp>
+        <p:nvSpPr>
+          <p:cNvPr id="7" name="Rectangle 6"/>
+          <p:cNvSpPr/>
+          <p:nvPr/>
+        </p:nvSpPr>
+        <p:spPr>
+          <a:xfrm>
+            <a:off x="4525965" y="2494918"/>
+            <a:ext cx="2428870" cy="923330"/>
+          </a:xfrm>
+          <a:prstGeom prst="rect">
+            <a:avLst/>
+          </a:prstGeom>
+          <a:noFill/>
+        </p:spPr>
+        <p:txBody>
+          <a:bodyPr wrap="none" lIns="91440" tIns="45720" rIns="91440" bIns="45720">
+            <a:spAutoFit/>
+          </a:bodyPr>
+          <a:lstStyle/>
+          <a:p>
+            <a:pPr algn="ctr"/>
+            <a:r>
+              <a:rPr lang="en-US" sz="5400" b="1" dirty="0" err="1" smtClean="0">
+                <a:ln w="13462">
+                  <a:solidFill>
+                    <a:schemeClr val="tx1"/>
+                  </a:solidFill>
+                  <a:prstDash val="solid"/>
+                </a:ln>
+                <a:solidFill>
+                  <a:srgbClr val="FFC000"/>
+                </a:solidFill>
+                <a:effectLst>
+                  <a:outerShdw blurRad="60007" dist="310007" dir="7680000" sy="30000" kx="1300200" algn="ctr" rotWithShape="0">
+                    <a:prstClr val="black">
+                      <a:alpha val="32000"/>
+                    </a:prstClr>
+                  </a:outerShdw>
+                </a:effectLst>
+              </a:rPr>
+              <a:t>smroW</a:t>
+            </a:r>
+            <a:endParaRPr lang="en-US" sz="5400" b="1" dirty="0">
+              <a:ln w="13462">
+                <a:solidFill>
+                  <a:schemeClr val="tx1"/>
+                </a:solidFill>
+                <a:prstDash val="solid"/>
+              </a:ln>
+              <a:solidFill>
+                <a:srgbClr val="FFC000"/>
+              </a:solidFill>
+              <a:effectLst>
+                <a:outerShdw blurRad="60007" dist="310007" dir="7680000" sy="30000" kx="1300200" algn="ctr" rotWithShape="0">
+                  <a:prstClr val="black">
+                    <a:alpha val="32000"/>
+                  </a:prstClr>
+                </a:outerShdw>
+              </a:effectLst>
+            </a:endParaRPr>
+          </a:p>
+        </p:txBody>
+      </p:sp>
+      <p:sp>
+        <p:nvSpPr>
+          <p:cNvPr id="8" name="Rectangle 7"/>
+          <p:cNvSpPr/>
+          <p:nvPr/>
+        </p:nvSpPr>
+        <p:spPr>
+          <a:xfrm>
+            <a:off x="522514" y="740592"/>
+            <a:ext cx="11181806" cy="1754326"/>
+          </a:xfrm>
+          <a:prstGeom prst="rect">
+            <a:avLst/>
+          </a:prstGeom>
+          <a:noFill/>
+        </p:spPr>
+        <p:txBody>
+          <a:bodyPr wrap="square" lIns="91440" tIns="45720" rIns="91440" bIns="45720">
+            <a:spAutoFit/>
+          </a:bodyPr>
+          <a:lstStyle/>
+          <a:p>
+            <a:pPr algn="ctr"/>
+            <a:r>
+              <a:rPr lang="en-US" sz="5400" b="1" spc="50" dirty="0" smtClean="0">
+                <a:ln w="0"/>
+                <a:solidFill>
+                  <a:schemeClr val="bg2"/>
+                </a:solidFill>
+                <a:effectLst>
+                  <a:innerShdw blurRad="63500" dist="50800" dir="13500000">
+                    <a:srgbClr val="000000">
+                      <a:alpha val="50000"/>
+                    </a:srgbClr>
+                  </a:innerShdw>
+                </a:effectLst>
+              </a:rPr>
+              <a:t>We present you the </a:t>
+            </a:r>
+          </a:p>
+          <a:p>
+            <a:pPr algn="ctr"/>
+            <a:r>
+              <a:rPr lang="en-US" sz="5400" b="1" spc="50" dirty="0" smtClean="0">
+                <a:ln w="0"/>
+                <a:solidFill>
+                  <a:schemeClr val="bg2"/>
+                </a:solidFill>
+                <a:effectLst>
+                  <a:innerShdw blurRad="63500" dist="50800" dir="13500000">
+                    <a:srgbClr val="000000">
+                      <a:alpha val="50000"/>
+                    </a:srgbClr>
+                  </a:innerShdw>
+                </a:effectLst>
+              </a:rPr>
+              <a:t>New-Never-Before-Seen-Game</a:t>
+            </a:r>
+            <a:endParaRPr lang="en-US" sz="5400" b="1" cap="none" spc="50" dirty="0">
+              <a:ln w="0"/>
+              <a:solidFill>
+                <a:schemeClr val="bg2"/>
+              </a:solidFill>
+              <a:effectLst>
+                <a:innerShdw blurRad="63500" dist="50800" dir="13500000">
+                  <a:srgbClr val="000000">
+                    <a:alpha val="50000"/>
+                  </a:srgbClr>
+                </a:innerShdw>
+              </a:effectLst>
+            </a:endParaRPr>
+          </a:p>
+        </p:txBody>
+      </p:sp>
+      <p:pic>
+        <p:nvPicPr>
+          <p:cNvPr id="10" name="Picture 9">
+            <a:extLst>
+              <a:ext uri="{FF2B5EF4-FFF2-40B4-BE49-F238E27FC236}">
+                <a16:creationId xmlns:a16="http://schemas.microsoft.com/office/drawing/2014/main" xmlns="" id="{8067D712-B97B-489F-93C0-EFC22B0553A6}"/>
+              </a:ext>
+            </a:extLst>
+          </p:cNvPr>
+          <p:cNvPicPr>
+            <a:picLocks noChangeAspect="1"/>
+          </p:cNvPicPr>
+          <p:nvPr/>
+        </p:nvPicPr>
+        <p:blipFill rotWithShape="1">
+          <a:blip r:embed="rId2"/>
+          <a:srcRect r="32041"/>
+          <a:stretch/>
+        </p:blipFill>
+        <p:spPr>
+          <a:xfrm>
+            <a:off x="2281685" y="2369738"/>
+            <a:ext cx="2473199" cy="1799569"/>
+          </a:xfrm>
+          <a:prstGeom prst="rect">
+            <a:avLst/>
+          </a:prstGeom>
+        </p:spPr>
+      </p:pic>
+      <p:pic>
+        <p:nvPicPr>
+          <p:cNvPr id="1028" name="Picture 4" descr="Related image"/>
+          <p:cNvPicPr>
+            <a:picLocks noChangeAspect="1" noChangeArrowheads="1"/>
+          </p:cNvPicPr>
+          <p:nvPr/>
+        </p:nvPicPr>
+        <p:blipFill>
+          <a:blip r:embed="rId3">
+            <a:clrChange>
+              <a:clrFrom>
+                <a:srgbClr val="F7F7FF"/>
+              </a:clrFrom>
+              <a:clrTo>
+                <a:srgbClr val="F7F7FF">
+                  <a:alpha val="0"/>
+                </a:srgbClr>
+              </a:clrTo>
+            </a:clrChange>
+            <a:extLst>
+              <a:ext uri="{28A0092B-C50C-407E-A947-70E740481C1C}">
+                <a14:useLocalDpi xmlns:a14="http://schemas.microsoft.com/office/drawing/2010/main" val="0"/>
+              </a:ext>
+            </a:extLst>
+          </a:blip>
+          <a:srcRect/>
+          <a:stretch>
+            <a:fillRect/>
+          </a:stretch>
+        </p:blipFill>
+        <p:spPr bwMode="auto">
+          <a:xfrm>
+            <a:off x="7902848" y="4402183"/>
+            <a:ext cx="3393979" cy="1586267"/>
+          </a:xfrm>
+          <a:prstGeom prst="rect">
+            <a:avLst/>
+          </a:prstGeom>
+          <a:noFill/>
+          <a:extLst>
+            <a:ext uri="{909E8E84-426E-40DD-AFC4-6F175D3DCCD1}">
+              <a14:hiddenFill xmlns:a14="http://schemas.microsoft.com/office/drawing/2010/main">
+                <a:solidFill>
+                  <a:srgbClr val="FFFFFF"/>
+                </a:solidFill>
+              </a14:hiddenFill>
+            </a:ext>
+          </a:extLst>
+        </p:spPr>
+      </p:pic>
+      <p:grpSp>
+        <p:nvGrpSpPr>
+          <p:cNvPr id="9" name="Group 8"/>
+          <p:cNvGrpSpPr/>
+          <p:nvPr/>
+        </p:nvGrpSpPr>
+        <p:grpSpPr>
+          <a:xfrm>
+            <a:off x="8242300" y="4237083"/>
+            <a:ext cx="2844915" cy="1231184"/>
+            <a:chOff x="8242300" y="4237083"/>
+            <a:chExt cx="2844915" cy="1231184"/>
+          </a:xfrm>
+        </p:grpSpPr>
+        <p:pic>
+          <p:nvPicPr>
+            <p:cNvPr id="13" name="Picture 12">
+              <a:extLst>
+                <a:ext uri="{FF2B5EF4-FFF2-40B4-BE49-F238E27FC236}">
+                  <a16:creationId xmlns:a16="http://schemas.microsoft.com/office/drawing/2014/main" xmlns="" id="{8067D712-B97B-489F-93C0-EFC22B0553A6}"/>
+                </a:ext>
+              </a:extLst>
+            </p:cNvPr>
+            <p:cNvPicPr>
+              <a:picLocks noChangeAspect="1"/>
+            </p:cNvPicPr>
+            <p:nvPr/>
+          </p:nvPicPr>
+          <p:blipFill rotWithShape="1">
+            <a:blip r:embed="rId2"/>
+            <a:srcRect r="32041"/>
+            <a:stretch/>
+          </p:blipFill>
+          <p:spPr>
+            <a:xfrm rot="1676086" flipH="1">
+              <a:off x="9538344" y="4341265"/>
+              <a:ext cx="1548871" cy="1127002"/>
+            </a:xfrm>
+            <a:prstGeom prst="rect">
+              <a:avLst/>
+            </a:prstGeom>
+          </p:spPr>
+        </p:pic>
+        <p:pic>
+          <p:nvPicPr>
+            <p:cNvPr id="12" name="Picture 11">
+              <a:extLst>
+                <a:ext uri="{FF2B5EF4-FFF2-40B4-BE49-F238E27FC236}">
+                  <a16:creationId xmlns:a16="http://schemas.microsoft.com/office/drawing/2014/main" xmlns="" id="{8067D712-B97B-489F-93C0-EFC22B0553A6}"/>
+                </a:ext>
+              </a:extLst>
+            </p:cNvPr>
+            <p:cNvPicPr>
+              <a:picLocks noChangeAspect="1"/>
+            </p:cNvPicPr>
+            <p:nvPr/>
+          </p:nvPicPr>
+          <p:blipFill rotWithShape="1">
+            <a:blip r:embed="rId2"/>
+            <a:srcRect r="32041"/>
+            <a:stretch/>
+          </p:blipFill>
+          <p:spPr>
+            <a:xfrm flipH="1">
+              <a:off x="8242300" y="4237083"/>
+              <a:ext cx="1675036" cy="1218803"/>
+            </a:xfrm>
+            <a:prstGeom prst="rect">
+              <a:avLst/>
+            </a:prstGeom>
+          </p:spPr>
+        </p:pic>
+      </p:grpSp>
+      <p:pic>
+        <p:nvPicPr>
+          <p:cNvPr id="15" name="Picture 14">
+            <a:extLst>
+              <a:ext uri="{FF2B5EF4-FFF2-40B4-BE49-F238E27FC236}">
+                <a16:creationId xmlns:a16="http://schemas.microsoft.com/office/drawing/2014/main" xmlns="" id="{8067D712-B97B-489F-93C0-EFC22B0553A6}"/>
+              </a:ext>
+            </a:extLst>
+          </p:cNvPr>
+          <p:cNvPicPr>
+            <a:picLocks noChangeAspect="1"/>
+          </p:cNvPicPr>
+          <p:nvPr/>
+        </p:nvPicPr>
+        <p:blipFill rotWithShape="1">
+          <a:blip r:embed="rId2"/>
+          <a:srcRect r="32041"/>
+          <a:stretch/>
+        </p:blipFill>
+        <p:spPr>
+          <a:xfrm flipH="1">
+            <a:off x="6700005" y="2369737"/>
+            <a:ext cx="2473199" cy="1799569"/>
+          </a:xfrm>
+          <a:prstGeom prst="rect">
+            <a:avLst/>
+          </a:prstGeom>
+        </p:spPr>
+      </p:pic>
     </p:spTree>
     <p:extLst>
       <p:ext uri="{BB962C8B-B14F-4D97-AF65-F5344CB8AC3E}">
@@ -13505,6 +13868,637 @@
   <p:clrMapOvr>
     <a:masterClrMapping/>
   </p:clrMapOvr>
+  <p:timing>
+    <p:tnLst>
+      <p:par>
+        <p:cTn id="1" dur="indefinite" restart="never" nodeType="tmRoot">
+          <p:childTnLst>
+            <p:seq concurrent="1" nextAc="seek">
+              <p:cTn id="2" dur="indefinite" nodeType="mainSeq">
+                <p:childTnLst>
+                  <p:par>
+                    <p:cTn id="3" fill="hold">
+                      <p:stCondLst>
+                        <p:cond delay="indefinite"/>
+                      </p:stCondLst>
+                      <p:childTnLst>
+                        <p:par>
+                          <p:cTn id="4" fill="hold">
+                            <p:stCondLst>
+                              <p:cond delay="0"/>
+                            </p:stCondLst>
+                            <p:childTnLst>
+                              <p:par>
+                                <p:cTn id="5" presetID="45" presetClass="exit" presetSubtype="0" fill="hold" grpId="0" nodeType="clickEffect">
+                                  <p:stCondLst>
+                                    <p:cond delay="0"/>
+                                  </p:stCondLst>
+                                  <p:childTnLst>
+                                    <p:animEffect transition="out" filter="fade">
+                                      <p:cBhvr>
+                                        <p:cTn id="6" dur="1000"/>
+                                        <p:tgtEl>
+                                          <p:spTgt spid="4"/>
+                                        </p:tgtEl>
+                                      </p:cBhvr>
+                                    </p:animEffect>
+                                    <p:anim calcmode="lin" valueType="num">
+                                      <p:cBhvr>
+                                        <p:cTn id="7" dur="1000"/>
+                                        <p:tgtEl>
+                                          <p:spTgt spid="4"/>
+                                        </p:tgtEl>
+                                        <p:attrNameLst>
+                                          <p:attrName>ppt_w</p:attrName>
+                                        </p:attrNameLst>
+                                      </p:cBhvr>
+                                      <p:tavLst>
+                                        <p:tav tm="0">
+                                          <p:val>
+                                            <p:strVal val="ppt_w"/>
+                                          </p:val>
+                                        </p:tav>
+                                        <p:tav tm="5000">
+                                          <p:val>
+                                            <p:strVal val="0.92*ppt_w"/>
+                                          </p:val>
+                                        </p:tav>
+                                        <p:tav tm="10000">
+                                          <p:val>
+                                            <p:strVal val="0.71*ppt_w"/>
+                                          </p:val>
+                                        </p:tav>
+                                        <p:tav tm="15000">
+                                          <p:val>
+                                            <p:strVal val="0.38*ppt_w"/>
+                                          </p:val>
+                                        </p:tav>
+                                        <p:tav tm="20000">
+                                          <p:val>
+                                            <p:fltVal val="0"/>
+                                          </p:val>
+                                        </p:tav>
+                                        <p:tav tm="25000">
+                                          <p:val>
+                                            <p:strVal val="-0.38*ppt_w"/>
+                                          </p:val>
+                                        </p:tav>
+                                        <p:tav tm="30000">
+                                          <p:val>
+                                            <p:strVal val="-0.71*ppt_w"/>
+                                          </p:val>
+                                        </p:tav>
+                                        <p:tav tm="35000">
+                                          <p:val>
+                                            <p:strVal val="-0.92*ppt_w"/>
+                                          </p:val>
+                                        </p:tav>
+                                        <p:tav tm="40000">
+                                          <p:val>
+                                            <p:strVal val="-ppt_w"/>
+                                          </p:val>
+                                        </p:tav>
+                                        <p:tav tm="45000">
+                                          <p:val>
+                                            <p:strVal val="-0.92*ppt_w"/>
+                                          </p:val>
+                                        </p:tav>
+                                        <p:tav tm="50000">
+                                          <p:val>
+                                            <p:strVal val="-0.71*ppt_w"/>
+                                          </p:val>
+                                        </p:tav>
+                                        <p:tav tm="55000">
+                                          <p:val>
+                                            <p:strVal val="-0.38*ppt_w"/>
+                                          </p:val>
+                                        </p:tav>
+                                        <p:tav tm="60000">
+                                          <p:val>
+                                            <p:fltVal val="0"/>
+                                          </p:val>
+                                        </p:tav>
+                                        <p:tav tm="65000">
+                                          <p:val>
+                                            <p:strVal val="0.38*ppt_w"/>
+                                          </p:val>
+                                        </p:tav>
+                                        <p:tav tm="70000">
+                                          <p:val>
+                                            <p:strVal val="0.71*ppt_w"/>
+                                          </p:val>
+                                        </p:tav>
+                                        <p:tav tm="75000">
+                                          <p:val>
+                                            <p:strVal val="0.92*ppt_w"/>
+                                          </p:val>
+                                        </p:tav>
+                                        <p:tav tm="80000">
+                                          <p:val>
+                                            <p:strVal val="ppt_w"/>
+                                          </p:val>
+                                        </p:tav>
+                                        <p:tav tm="85000">
+                                          <p:val>
+                                            <p:strVal val="0.92*ppt_w"/>
+                                          </p:val>
+                                        </p:tav>
+                                        <p:tav tm="90000">
+                                          <p:val>
+                                            <p:strVal val="0.71*ppt_w"/>
+                                          </p:val>
+                                        </p:tav>
+                                        <p:tav tm="95000">
+                                          <p:val>
+                                            <p:strVal val="0.38*ppt_w"/>
+                                          </p:val>
+                                        </p:tav>
+                                        <p:tav tm="100000">
+                                          <p:val>
+                                            <p:fltVal val="0"/>
+                                          </p:val>
+                                        </p:tav>
+                                      </p:tavLst>
+                                    </p:anim>
+                                    <p:anim calcmode="lin" valueType="num">
+                                      <p:cBhvr>
+                                        <p:cTn id="8" dur="1000"/>
+                                        <p:tgtEl>
+                                          <p:spTgt spid="4"/>
+                                        </p:tgtEl>
+                                        <p:attrNameLst>
+                                          <p:attrName>ppt_h</p:attrName>
+                                        </p:attrNameLst>
+                                      </p:cBhvr>
+                                      <p:tavLst>
+                                        <p:tav tm="0">
+                                          <p:val>
+                                            <p:strVal val="ppt_h"/>
+                                          </p:val>
+                                        </p:tav>
+                                        <p:tav tm="100000">
+                                          <p:val>
+                                            <p:strVal val="ppt_h"/>
+                                          </p:val>
+                                        </p:tav>
+                                      </p:tavLst>
+                                    </p:anim>
+                                    <p:set>
+                                      <p:cBhvr>
+                                        <p:cTn id="9" dur="1" fill="hold">
+                                          <p:stCondLst>
+                                            <p:cond delay="999"/>
+                                          </p:stCondLst>
+                                        </p:cTn>
+                                        <p:tgtEl>
+                                          <p:spTgt spid="4"/>
+                                        </p:tgtEl>
+                                        <p:attrNameLst>
+                                          <p:attrName>style.visibility</p:attrName>
+                                        </p:attrNameLst>
+                                      </p:cBhvr>
+                                      <p:to>
+                                        <p:strVal val="hidden"/>
+                                      </p:to>
+                                    </p:set>
+                                  </p:childTnLst>
+                                </p:cTn>
+                              </p:par>
+                            </p:childTnLst>
+                          </p:cTn>
+                        </p:par>
+                        <p:par>
+                          <p:cTn id="10" fill="hold">
+                            <p:stCondLst>
+                              <p:cond delay="1000"/>
+                            </p:stCondLst>
+                            <p:childTnLst>
+                              <p:par>
+                                <p:cTn id="11" presetID="45" presetClass="entr" presetSubtype="0" fill="hold" grpId="0" nodeType="afterEffect">
+                                  <p:stCondLst>
+                                    <p:cond delay="0"/>
+                                  </p:stCondLst>
+                                  <p:childTnLst>
+                                    <p:set>
+                                      <p:cBhvr>
+                                        <p:cTn id="12" dur="1" fill="hold">
+                                          <p:stCondLst>
+                                            <p:cond delay="0"/>
+                                          </p:stCondLst>
+                                        </p:cTn>
+                                        <p:tgtEl>
+                                          <p:spTgt spid="7"/>
+                                        </p:tgtEl>
+                                        <p:attrNameLst>
+                                          <p:attrName>style.visibility</p:attrName>
+                                        </p:attrNameLst>
+                                      </p:cBhvr>
+                                      <p:to>
+                                        <p:strVal val="visible"/>
+                                      </p:to>
+                                    </p:set>
+                                    <p:animEffect transition="in" filter="fade">
+                                      <p:cBhvr>
+                                        <p:cTn id="13" dur="1000"/>
+                                        <p:tgtEl>
+                                          <p:spTgt spid="7"/>
+                                        </p:tgtEl>
+                                      </p:cBhvr>
+                                    </p:animEffect>
+                                    <p:anim calcmode="lin" valueType="num">
+                                      <p:cBhvr>
+                                        <p:cTn id="14" dur="1000" fill="hold"/>
+                                        <p:tgtEl>
+                                          <p:spTgt spid="7"/>
+                                        </p:tgtEl>
+                                        <p:attrNameLst>
+                                          <p:attrName>ppt_w</p:attrName>
+                                        </p:attrNameLst>
+                                      </p:cBhvr>
+                                      <p:tavLst>
+                                        <p:tav tm="0" fmla="#ppt_w*sin(2.5*pi*$)">
+                                          <p:val>
+                                            <p:fltVal val="0"/>
+                                          </p:val>
+                                        </p:tav>
+                                        <p:tav tm="100000">
+                                          <p:val>
+                                            <p:fltVal val="1"/>
+                                          </p:val>
+                                        </p:tav>
+                                      </p:tavLst>
+                                    </p:anim>
+                                    <p:anim calcmode="lin" valueType="num">
+                                      <p:cBhvr>
+                                        <p:cTn id="15" dur="1000" fill="hold"/>
+                                        <p:tgtEl>
+                                          <p:spTgt spid="7"/>
+                                        </p:tgtEl>
+                                        <p:attrNameLst>
+                                          <p:attrName>ppt_h</p:attrName>
+                                        </p:attrNameLst>
+                                      </p:cBhvr>
+                                      <p:tavLst>
+                                        <p:tav tm="0">
+                                          <p:val>
+                                            <p:strVal val="#ppt_h"/>
+                                          </p:val>
+                                        </p:tav>
+                                        <p:tav tm="100000">
+                                          <p:val>
+                                            <p:strVal val="#ppt_h"/>
+                                          </p:val>
+                                        </p:tav>
+                                      </p:tavLst>
+                                    </p:anim>
+                                  </p:childTnLst>
+                                </p:cTn>
+                              </p:par>
+                              <p:par>
+                                <p:cTn id="16" presetID="23" presetClass="entr" presetSubtype="16" fill="hold" nodeType="withEffect">
+                                  <p:stCondLst>
+                                    <p:cond delay="500"/>
+                                  </p:stCondLst>
+                                  <p:childTnLst>
+                                    <p:set>
+                                      <p:cBhvr>
+                                        <p:cTn id="17" dur="1" fill="hold">
+                                          <p:stCondLst>
+                                            <p:cond delay="0"/>
+                                          </p:stCondLst>
+                                        </p:cTn>
+                                        <p:tgtEl>
+                                          <p:spTgt spid="15"/>
+                                        </p:tgtEl>
+                                        <p:attrNameLst>
+                                          <p:attrName>style.visibility</p:attrName>
+                                        </p:attrNameLst>
+                                      </p:cBhvr>
+                                      <p:to>
+                                        <p:strVal val="visible"/>
+                                      </p:to>
+                                    </p:set>
+                                    <p:anim calcmode="lin" valueType="num">
+                                      <p:cBhvr>
+                                        <p:cTn id="18" dur="500" fill="hold"/>
+                                        <p:tgtEl>
+                                          <p:spTgt spid="15"/>
+                                        </p:tgtEl>
+                                        <p:attrNameLst>
+                                          <p:attrName>ppt_w</p:attrName>
+                                        </p:attrNameLst>
+                                      </p:cBhvr>
+                                      <p:tavLst>
+                                        <p:tav tm="0">
+                                          <p:val>
+                                            <p:fltVal val="0"/>
+                                          </p:val>
+                                        </p:tav>
+                                        <p:tav tm="100000">
+                                          <p:val>
+                                            <p:strVal val="#ppt_w"/>
+                                          </p:val>
+                                        </p:tav>
+                                      </p:tavLst>
+                                    </p:anim>
+                                    <p:anim calcmode="lin" valueType="num">
+                                      <p:cBhvr>
+                                        <p:cTn id="19" dur="500" fill="hold"/>
+                                        <p:tgtEl>
+                                          <p:spTgt spid="15"/>
+                                        </p:tgtEl>
+                                        <p:attrNameLst>
+                                          <p:attrName>ppt_h</p:attrName>
+                                        </p:attrNameLst>
+                                      </p:cBhvr>
+                                      <p:tavLst>
+                                        <p:tav tm="0">
+                                          <p:val>
+                                            <p:fltVal val="0"/>
+                                          </p:val>
+                                        </p:tav>
+                                        <p:tav tm="100000">
+                                          <p:val>
+                                            <p:strVal val="#ppt_h"/>
+                                          </p:val>
+                                        </p:tav>
+                                      </p:tavLst>
+                                    </p:anim>
+                                  </p:childTnLst>
+                                </p:cTn>
+                              </p:par>
+                              <p:par>
+                                <p:cTn id="20" presetID="23" presetClass="entr" presetSubtype="16" fill="hold" nodeType="withEffect">
+                                  <p:stCondLst>
+                                    <p:cond delay="500"/>
+                                  </p:stCondLst>
+                                  <p:childTnLst>
+                                    <p:set>
+                                      <p:cBhvr>
+                                        <p:cTn id="21" dur="1" fill="hold">
+                                          <p:stCondLst>
+                                            <p:cond delay="0"/>
+                                          </p:stCondLst>
+                                        </p:cTn>
+                                        <p:tgtEl>
+                                          <p:spTgt spid="10"/>
+                                        </p:tgtEl>
+                                        <p:attrNameLst>
+                                          <p:attrName>style.visibility</p:attrName>
+                                        </p:attrNameLst>
+                                      </p:cBhvr>
+                                      <p:to>
+                                        <p:strVal val="visible"/>
+                                      </p:to>
+                                    </p:set>
+                                    <p:anim calcmode="lin" valueType="num">
+                                      <p:cBhvr>
+                                        <p:cTn id="22" dur="500" fill="hold"/>
+                                        <p:tgtEl>
+                                          <p:spTgt spid="10"/>
+                                        </p:tgtEl>
+                                        <p:attrNameLst>
+                                          <p:attrName>ppt_w</p:attrName>
+                                        </p:attrNameLst>
+                                      </p:cBhvr>
+                                      <p:tavLst>
+                                        <p:tav tm="0">
+                                          <p:val>
+                                            <p:fltVal val="0"/>
+                                          </p:val>
+                                        </p:tav>
+                                        <p:tav tm="100000">
+                                          <p:val>
+                                            <p:strVal val="#ppt_w"/>
+                                          </p:val>
+                                        </p:tav>
+                                      </p:tavLst>
+                                    </p:anim>
+                                    <p:anim calcmode="lin" valueType="num">
+                                      <p:cBhvr>
+                                        <p:cTn id="23" dur="500" fill="hold"/>
+                                        <p:tgtEl>
+                                          <p:spTgt spid="10"/>
+                                        </p:tgtEl>
+                                        <p:attrNameLst>
+                                          <p:attrName>ppt_h</p:attrName>
+                                        </p:attrNameLst>
+                                      </p:cBhvr>
+                                      <p:tavLst>
+                                        <p:tav tm="0">
+                                          <p:val>
+                                            <p:fltVal val="0"/>
+                                          </p:val>
+                                        </p:tav>
+                                        <p:tav tm="100000">
+                                          <p:val>
+                                            <p:strVal val="#ppt_h"/>
+                                          </p:val>
+                                        </p:tav>
+                                      </p:tavLst>
+                                    </p:anim>
+                                  </p:childTnLst>
+                                </p:cTn>
+                              </p:par>
+                            </p:childTnLst>
+                          </p:cTn>
+                        </p:par>
+                        <p:par>
+                          <p:cTn id="24" fill="hold">
+                            <p:stCondLst>
+                              <p:cond delay="2000"/>
+                            </p:stCondLst>
+                            <p:childTnLst>
+                              <p:par>
+                                <p:cTn id="25" presetID="30" presetClass="entr" presetSubtype="0" fill="hold" nodeType="afterEffect">
+                                  <p:stCondLst>
+                                    <p:cond delay="0"/>
+                                  </p:stCondLst>
+                                  <p:childTnLst>
+                                    <p:set>
+                                      <p:cBhvr>
+                                        <p:cTn id="26" dur="1" fill="hold">
+                                          <p:stCondLst>
+                                            <p:cond delay="0"/>
+                                          </p:stCondLst>
+                                        </p:cTn>
+                                        <p:tgtEl>
+                                          <p:spTgt spid="9"/>
+                                        </p:tgtEl>
+                                        <p:attrNameLst>
+                                          <p:attrName>style.visibility</p:attrName>
+                                        </p:attrNameLst>
+                                      </p:cBhvr>
+                                      <p:to>
+                                        <p:strVal val="visible"/>
+                                      </p:to>
+                                    </p:set>
+                                    <p:animEffect transition="in" filter="fade">
+                                      <p:cBhvr>
+                                        <p:cTn id="27" dur="800" decel="100000"/>
+                                        <p:tgtEl>
+                                          <p:spTgt spid="9"/>
+                                        </p:tgtEl>
+                                      </p:cBhvr>
+                                    </p:animEffect>
+                                    <p:anim calcmode="lin" valueType="num">
+                                      <p:cBhvr>
+                                        <p:cTn id="28" dur="800" decel="100000" fill="hold"/>
+                                        <p:tgtEl>
+                                          <p:spTgt spid="9"/>
+                                        </p:tgtEl>
+                                        <p:attrNameLst>
+                                          <p:attrName>style.rotation</p:attrName>
+                                        </p:attrNameLst>
+                                      </p:cBhvr>
+                                      <p:tavLst>
+                                        <p:tav tm="0">
+                                          <p:val>
+                                            <p:fltVal val="-90"/>
+                                          </p:val>
+                                        </p:tav>
+                                        <p:tav tm="100000">
+                                          <p:val>
+                                            <p:fltVal val="0"/>
+                                          </p:val>
+                                        </p:tav>
+                                      </p:tavLst>
+                                    </p:anim>
+                                    <p:anim calcmode="lin" valueType="num">
+                                      <p:cBhvr>
+                                        <p:cTn id="29" dur="800" decel="100000" fill="hold"/>
+                                        <p:tgtEl>
+                                          <p:spTgt spid="9"/>
+                                        </p:tgtEl>
+                                        <p:attrNameLst>
+                                          <p:attrName>ppt_x</p:attrName>
+                                        </p:attrNameLst>
+                                      </p:cBhvr>
+                                      <p:tavLst>
+                                        <p:tav tm="0">
+                                          <p:val>
+                                            <p:strVal val="#ppt_x+0.4"/>
+                                          </p:val>
+                                        </p:tav>
+                                        <p:tav tm="100000">
+                                          <p:val>
+                                            <p:strVal val="#ppt_x-0.05"/>
+                                          </p:val>
+                                        </p:tav>
+                                      </p:tavLst>
+                                    </p:anim>
+                                    <p:anim calcmode="lin" valueType="num">
+                                      <p:cBhvr>
+                                        <p:cTn id="30" dur="800" decel="100000" fill="hold"/>
+                                        <p:tgtEl>
+                                          <p:spTgt spid="9"/>
+                                        </p:tgtEl>
+                                        <p:attrNameLst>
+                                          <p:attrName>ppt_y</p:attrName>
+                                        </p:attrNameLst>
+                                      </p:cBhvr>
+                                      <p:tavLst>
+                                        <p:tav tm="0">
+                                          <p:val>
+                                            <p:strVal val="#ppt_y-0.4"/>
+                                          </p:val>
+                                        </p:tav>
+                                        <p:tav tm="100000">
+                                          <p:val>
+                                            <p:strVal val="#ppt_y+0.1"/>
+                                          </p:val>
+                                        </p:tav>
+                                      </p:tavLst>
+                                    </p:anim>
+                                    <p:anim calcmode="lin" valueType="num">
+                                      <p:cBhvr>
+                                        <p:cTn id="31" dur="200" accel="100000" fill="hold">
+                                          <p:stCondLst>
+                                            <p:cond delay="800"/>
+                                          </p:stCondLst>
+                                        </p:cTn>
+                                        <p:tgtEl>
+                                          <p:spTgt spid="9"/>
+                                        </p:tgtEl>
+                                        <p:attrNameLst>
+                                          <p:attrName>ppt_x</p:attrName>
+                                        </p:attrNameLst>
+                                      </p:cBhvr>
+                                      <p:tavLst>
+                                        <p:tav tm="0">
+                                          <p:val>
+                                            <p:strVal val="#ppt_x-0.05"/>
+                                          </p:val>
+                                        </p:tav>
+                                        <p:tav tm="100000">
+                                          <p:val>
+                                            <p:strVal val="#ppt_x"/>
+                                          </p:val>
+                                        </p:tav>
+                                      </p:tavLst>
+                                    </p:anim>
+                                    <p:anim calcmode="lin" valueType="num">
+                                      <p:cBhvr>
+                                        <p:cTn id="32" dur="200" accel="100000" fill="hold">
+                                          <p:stCondLst>
+                                            <p:cond delay="800"/>
+                                          </p:stCondLst>
+                                        </p:cTn>
+                                        <p:tgtEl>
+                                          <p:spTgt spid="9"/>
+                                        </p:tgtEl>
+                                        <p:attrNameLst>
+                                          <p:attrName>ppt_y</p:attrName>
+                                        </p:attrNameLst>
+                                      </p:cBhvr>
+                                      <p:tavLst>
+                                        <p:tav tm="0">
+                                          <p:val>
+                                            <p:strVal val="#ppt_y+0.1"/>
+                                          </p:val>
+                                        </p:tav>
+                                        <p:tav tm="100000">
+                                          <p:val>
+                                            <p:strVal val="#ppt_y"/>
+                                          </p:val>
+                                        </p:tav>
+                                      </p:tavLst>
+                                    </p:anim>
+                                  </p:childTnLst>
+                                </p:cTn>
+                              </p:par>
+                            </p:childTnLst>
+                          </p:cTn>
+                        </p:par>
+                      </p:childTnLst>
+                    </p:cTn>
+                  </p:par>
+                </p:childTnLst>
+              </p:cTn>
+              <p:prevCondLst>
+                <p:cond evt="onPrev" delay="0">
+                  <p:tgtEl>
+                    <p:sldTgt/>
+                  </p:tgtEl>
+                </p:cond>
+              </p:prevCondLst>
+              <p:nextCondLst>
+                <p:cond evt="onNext" delay="0">
+                  <p:tgtEl>
+                    <p:sldTgt/>
+                  </p:tgtEl>
+                </p:cond>
+              </p:nextCondLst>
+            </p:seq>
+          </p:childTnLst>
+        </p:cTn>
+      </p:par>
+    </p:tnLst>
+    <p:bldLst>
+      <p:bldP spid="4" grpId="0"/>
+      <p:bldP spid="7" grpId="0"/>
+    </p:bldLst>
+  </p:timing>
 </p:sld>
 </file>
 
@@ -13530,7 +14524,7 @@
           <p:cNvPr id="2" name="Title 1">
             <a:extLst>
               <a:ext uri="{FF2B5EF4-FFF2-40B4-BE49-F238E27FC236}">
-                <a16:creationId xmlns:a16="http://schemas.microsoft.com/office/drawing/2014/main" id="{D2B0F909-E5CE-4CB4-8C58-BC8C430B76D1}"/>
+                <a16:creationId xmlns:a16="http://schemas.microsoft.com/office/drawing/2014/main" xmlns="" id="{D2B0F909-E5CE-4CB4-8C58-BC8C430B76D1}"/>
               </a:ext>
             </a:extLst>
           </p:cNvPr>
@@ -13558,7 +14552,7 @@
           <p:cNvPr id="3" name="Content Placeholder 2">
             <a:extLst>
               <a:ext uri="{FF2B5EF4-FFF2-40B4-BE49-F238E27FC236}">
-                <a16:creationId xmlns:a16="http://schemas.microsoft.com/office/drawing/2014/main" id="{0300719D-D58F-4A74-8619-1C8960E52570}"/>
+                <a16:creationId xmlns:a16="http://schemas.microsoft.com/office/drawing/2014/main" xmlns="" id="{0300719D-D58F-4A74-8619-1C8960E52570}"/>
               </a:ext>
             </a:extLst>
           </p:cNvPr>
@@ -13569,7 +14563,12 @@
             <p:ph idx="1"/>
           </p:nvPr>
         </p:nvSpPr>
-        <p:spPr/>
+        <p:spPr>
+          <a:xfrm>
+            <a:off x="427325" y="2332965"/>
+            <a:ext cx="6887876" cy="2056155"/>
+          </a:xfrm>
+        </p:spPr>
         <p:txBody>
           <a:bodyPr/>
           <a:lstStyle/>
@@ -13600,7 +14599,7 @@
           </a:p>
           <a:p>
             <a:r>
-              <a:rPr lang="en-US"/>
+              <a:rPr lang="en-US" dirty="0"/>
               <a:t>Special weapons</a:t>
             </a:r>
           </a:p>
@@ -13608,7 +14607,7 @@
             <a:pPr marL="0" indent="0">
               <a:buNone/>
             </a:pPr>
-            <a:endParaRPr lang="en-US"/>
+            <a:endParaRPr lang="en-US" dirty="0"/>
           </a:p>
           <a:p>
             <a:endParaRPr lang="en-US" dirty="0"/>
@@ -13618,6 +14617,168 @@
           </a:p>
         </p:txBody>
       </p:sp>
+      <p:pic>
+        <p:nvPicPr>
+          <p:cNvPr id="2050" name="Picture 2" descr="Image result for worms armageddon"/>
+          <p:cNvPicPr>
+            <a:picLocks noChangeAspect="1" noChangeArrowheads="1"/>
+          </p:cNvPicPr>
+          <p:nvPr/>
+        </p:nvPicPr>
+        <p:blipFill rotWithShape="1">
+          <a:blip r:embed="rId2">
+            <a:extLst>
+              <a:ext uri="{28A0092B-C50C-407E-A947-70E740481C1C}">
+                <a14:useLocalDpi xmlns:a14="http://schemas.microsoft.com/office/drawing/2010/main" val="0"/>
+              </a:ext>
+            </a:extLst>
+          </a:blip>
+          <a:srcRect l="15690" r="15917"/>
+          <a:stretch/>
+        </p:blipFill>
+        <p:spPr bwMode="auto">
+          <a:xfrm>
+            <a:off x="5343298" y="3881223"/>
+            <a:ext cx="3291251" cy="2949841"/>
+          </a:xfrm>
+          <a:prstGeom prst="rect">
+            <a:avLst/>
+          </a:prstGeom>
+          <a:noFill/>
+          <a:extLst>
+            <a:ext uri="{909E8E84-426E-40DD-AFC4-6F175D3DCCD1}">
+              <a14:hiddenFill xmlns:a14="http://schemas.microsoft.com/office/drawing/2010/main">
+                <a:solidFill>
+                  <a:srgbClr val="FFFFFF"/>
+                </a:solidFill>
+              </a14:hiddenFill>
+            </a:ext>
+          </a:extLst>
+        </p:spPr>
+      </p:pic>
+      <p:pic>
+        <p:nvPicPr>
+          <p:cNvPr id="2052" name="Picture 4" descr="Image result for mario breaking a block"/>
+          <p:cNvPicPr>
+            <a:picLocks noChangeAspect="1" noChangeArrowheads="1"/>
+          </p:cNvPicPr>
+          <p:nvPr/>
+        </p:nvPicPr>
+        <p:blipFill>
+          <a:blip r:embed="rId3">
+            <a:extLst>
+              <a:ext uri="{28A0092B-C50C-407E-A947-70E740481C1C}">
+                <a14:useLocalDpi xmlns:a14="http://schemas.microsoft.com/office/drawing/2010/main" val="0"/>
+              </a:ext>
+            </a:extLst>
+          </a:blip>
+          <a:srcRect/>
+          <a:stretch>
+            <a:fillRect/>
+          </a:stretch>
+        </p:blipFill>
+        <p:spPr bwMode="auto">
+          <a:xfrm>
+            <a:off x="7019164" y="872337"/>
+            <a:ext cx="1615385" cy="2153847"/>
+          </a:xfrm>
+          <a:prstGeom prst="rect">
+            <a:avLst/>
+          </a:prstGeom>
+          <a:noFill/>
+          <a:extLst>
+            <a:ext uri="{909E8E84-426E-40DD-AFC4-6F175D3DCCD1}">
+              <a14:hiddenFill xmlns:a14="http://schemas.microsoft.com/office/drawing/2010/main">
+                <a:solidFill>
+                  <a:srgbClr val="FFFFFF"/>
+                </a:solidFill>
+              </a14:hiddenFill>
+            </a:ext>
+          </a:extLst>
+        </p:spPr>
+      </p:pic>
+      <p:pic>
+        <p:nvPicPr>
+          <p:cNvPr id="2056" name="Picture 8" descr="Image result for worms special weapons"/>
+          <p:cNvPicPr>
+            <a:picLocks noChangeAspect="1" noChangeArrowheads="1"/>
+          </p:cNvPicPr>
+          <p:nvPr/>
+        </p:nvPicPr>
+        <p:blipFill>
+          <a:blip r:embed="rId4">
+            <a:extLst>
+              <a:ext uri="{28A0092B-C50C-407E-A947-70E740481C1C}">
+                <a14:useLocalDpi xmlns:a14="http://schemas.microsoft.com/office/drawing/2010/main" val="0"/>
+              </a:ext>
+            </a:extLst>
+          </a:blip>
+          <a:srcRect/>
+          <a:stretch>
+            <a:fillRect/>
+          </a:stretch>
+        </p:blipFill>
+        <p:spPr bwMode="auto">
+          <a:xfrm>
+            <a:off x="8952396" y="384626"/>
+            <a:ext cx="3008937" cy="6352200"/>
+          </a:xfrm>
+          <a:prstGeom prst="rect">
+            <a:avLst/>
+          </a:prstGeom>
+          <a:noFill/>
+          <a:extLst>
+            <a:ext uri="{909E8E84-426E-40DD-AFC4-6F175D3DCCD1}">
+              <a14:hiddenFill xmlns:a14="http://schemas.microsoft.com/office/drawing/2010/main">
+                <a:solidFill>
+                  <a:srgbClr val="FFFFFF"/>
+                </a:solidFill>
+              </a14:hiddenFill>
+            </a:ext>
+          </a:extLst>
+        </p:spPr>
+      </p:pic>
+      <p:pic>
+        <p:nvPicPr>
+          <p:cNvPr id="10" name="Picture 2" descr="Image result for worms armageddon"/>
+          <p:cNvPicPr>
+            <a:picLocks noChangeAspect="1" noChangeArrowheads="1"/>
+          </p:cNvPicPr>
+          <p:nvPr/>
+        </p:nvPicPr>
+        <p:blipFill>
+          <a:blip r:embed="rId5">
+            <a:extLst>
+              <a:ext uri="{28A0092B-C50C-407E-A947-70E740481C1C}">
+                <a14:useLocalDpi xmlns:a14="http://schemas.microsoft.com/office/drawing/2010/main" val="0"/>
+              </a:ext>
+            </a:extLst>
+          </a:blip>
+          <a:srcRect/>
+          <a:stretch>
+            <a:fillRect/>
+          </a:stretch>
+        </p:blipFill>
+        <p:spPr bwMode="auto">
+          <a:xfrm>
+            <a:off x="579060" y="4335955"/>
+            <a:ext cx="4240771" cy="2495109"/>
+          </a:xfrm>
+          <a:prstGeom prst="rect">
+            <a:avLst/>
+          </a:prstGeom>
+          <a:noFill/>
+          <a:extLst>
+            <a:ext uri="{909E8E84-426E-40DD-AFC4-6F175D3DCCD1}">
+              <a14:hiddenFill xmlns:a14="http://schemas.microsoft.com/office/drawing/2010/main">
+                <a:solidFill>
+                  <a:srgbClr val="FFFFFF"/>
+                </a:solidFill>
+              </a14:hiddenFill>
+            </a:ext>
+          </a:extLst>
+        </p:spPr>
+      </p:pic>
     </p:spTree>
     <p:extLst>
       <p:ext uri="{BB962C8B-B14F-4D97-AF65-F5344CB8AC3E}">
@@ -13628,6 +14789,13 @@
   <p:clrMapOvr>
     <a:masterClrMapping/>
   </p:clrMapOvr>
+  <p:timing>
+    <p:tnLst>
+      <p:par>
+        <p:cTn id="1" dur="indefinite" restart="never" nodeType="tmRoot"/>
+      </p:par>
+    </p:tnLst>
+  </p:timing>
 </p:sld>
 </file>
 
@@ -13653,7 +14821,7 @@
           <p:cNvPr id="2" name="Title 1">
             <a:extLst>
               <a:ext uri="{FF2B5EF4-FFF2-40B4-BE49-F238E27FC236}">
-                <a16:creationId xmlns:a16="http://schemas.microsoft.com/office/drawing/2014/main" id="{E9D18468-CB11-4B2D-9D6D-1B642E1694B4}"/>
+                <a16:creationId xmlns:a16="http://schemas.microsoft.com/office/drawing/2014/main" xmlns="" id="{E9D18468-CB11-4B2D-9D6D-1B642E1694B4}"/>
               </a:ext>
             </a:extLst>
           </p:cNvPr>
@@ -13681,7 +14849,7 @@
           <p:cNvPr id="3" name="Content Placeholder 2">
             <a:extLst>
               <a:ext uri="{FF2B5EF4-FFF2-40B4-BE49-F238E27FC236}">
-                <a16:creationId xmlns:a16="http://schemas.microsoft.com/office/drawing/2014/main" id="{D59B887A-DC95-4BCC-9350-FB77637E1024}"/>
+                <a16:creationId xmlns:a16="http://schemas.microsoft.com/office/drawing/2014/main" xmlns="" id="{D59B887A-DC95-4BCC-9350-FB77637E1024}"/>
               </a:ext>
             </a:extLst>
           </p:cNvPr>
@@ -13692,9 +14860,16 @@
             <p:ph idx="1"/>
           </p:nvPr>
         </p:nvSpPr>
-        <p:spPr/>
+        <p:spPr>
+          <a:xfrm>
+            <a:off x="370003" y="2048980"/>
+            <a:ext cx="6094932" cy="3078843"/>
+          </a:xfrm>
+        </p:spPr>
         <p:txBody>
-          <a:bodyPr/>
+          <a:bodyPr>
+            <a:normAutofit/>
+          </a:bodyPr>
           <a:lstStyle/>
           <a:p>
             <a:r>
@@ -13705,15 +14880,35 @@
           <a:p>
             <a:pPr lvl="1"/>
             <a:r>
+              <a:rPr lang="en-US" dirty="0" smtClean="0"/>
+              <a:t>Better than Game Maker</a:t>
+            </a:r>
+            <a:r>
+              <a:rPr lang="en-US" dirty="0" smtClean="0"/>
+              <a:t> </a:t>
+            </a:r>
+            <a:r>
               <a:rPr lang="en-US" dirty="0"/>
-              <a:t>Best 2D game engine</a:t>
+              <a:t>and </a:t>
+            </a:r>
+            <a:r>
+              <a:rPr lang="en-US" dirty="0" smtClean="0"/>
+              <a:t>Unreal </a:t>
+            </a:r>
+            <a:r>
+              <a:rPr lang="en-US" dirty="0" smtClean="0"/>
+              <a:t>for 2D games (From what we know)</a:t>
             </a:r>
           </a:p>
           <a:p>
             <a:pPr lvl="1"/>
             <a:r>
+              <a:rPr lang="en-US" dirty="0" smtClean="0"/>
+              <a:t>Prior </a:t>
+            </a:r>
+            <a:r>
               <a:rPr lang="en-US" dirty="0"/>
-              <a:t>Prior experience</a:t>
+              <a:t>experience</a:t>
             </a:r>
           </a:p>
           <a:p>
@@ -13733,11 +14928,183 @@
             <a:pPr lvl="1"/>
             <a:r>
               <a:rPr lang="en-US" dirty="0"/>
-              <a:t>Turn-based system allows multiplayers with one computer</a:t>
+              <a:t>Turn-based system allows </a:t>
+            </a:r>
+            <a:r>
+              <a:rPr lang="en-US" dirty="0" smtClean="0"/>
+              <a:t>multiplayer </a:t>
+            </a:r>
+            <a:r>
+              <a:rPr lang="en-US" dirty="0"/>
+              <a:t>with one computer</a:t>
             </a:r>
           </a:p>
         </p:txBody>
       </p:sp>
+      <p:pic>
+        <p:nvPicPr>
+          <p:cNvPr id="3074" name="Picture 2" descr="Image result for unity"/>
+          <p:cNvPicPr>
+            <a:picLocks noChangeAspect="1" noChangeArrowheads="1"/>
+          </p:cNvPicPr>
+          <p:nvPr/>
+        </p:nvPicPr>
+        <p:blipFill>
+          <a:blip r:embed="rId2">
+            <a:extLst>
+              <a:ext uri="{28A0092B-C50C-407E-A947-70E740481C1C}">
+                <a14:useLocalDpi xmlns:a14="http://schemas.microsoft.com/office/drawing/2010/main" val="0"/>
+              </a:ext>
+            </a:extLst>
+          </a:blip>
+          <a:srcRect/>
+          <a:stretch>
+            <a:fillRect/>
+          </a:stretch>
+        </p:blipFill>
+        <p:spPr bwMode="auto">
+          <a:xfrm>
+            <a:off x="6086112" y="605320"/>
+            <a:ext cx="4049812" cy="1471432"/>
+          </a:xfrm>
+          <a:prstGeom prst="rect">
+            <a:avLst/>
+          </a:prstGeom>
+          <a:noFill/>
+          <a:extLst>
+            <a:ext uri="{909E8E84-426E-40DD-AFC4-6F175D3DCCD1}">
+              <a14:hiddenFill xmlns:a14="http://schemas.microsoft.com/office/drawing/2010/main">
+                <a:solidFill>
+                  <a:srgbClr val="FFFFFF"/>
+                </a:solidFill>
+              </a14:hiddenFill>
+            </a:ext>
+          </a:extLst>
+        </p:spPr>
+      </p:pic>
+      <p:pic>
+        <p:nvPicPr>
+          <p:cNvPr id="3078" name="Picture 6" descr="Related image"/>
+          <p:cNvPicPr>
+            <a:picLocks noChangeAspect="1" noChangeArrowheads="1"/>
+          </p:cNvPicPr>
+          <p:nvPr/>
+        </p:nvPicPr>
+        <p:blipFill>
+          <a:blip r:embed="rId3">
+            <a:extLst>
+              <a:ext uri="{28A0092B-C50C-407E-A947-70E740481C1C}">
+                <a14:useLocalDpi xmlns:a14="http://schemas.microsoft.com/office/drawing/2010/main" val="0"/>
+              </a:ext>
+            </a:extLst>
+          </a:blip>
+          <a:srcRect/>
+          <a:stretch>
+            <a:fillRect/>
+          </a:stretch>
+        </p:blipFill>
+        <p:spPr bwMode="auto">
+          <a:xfrm>
+            <a:off x="6856821" y="2337586"/>
+            <a:ext cx="5024118" cy="1674706"/>
+          </a:xfrm>
+          <a:prstGeom prst="rect">
+            <a:avLst/>
+          </a:prstGeom>
+          <a:noFill/>
+          <a:extLst>
+            <a:ext uri="{909E8E84-426E-40DD-AFC4-6F175D3DCCD1}">
+              <a14:hiddenFill xmlns:a14="http://schemas.microsoft.com/office/drawing/2010/main">
+                <a:solidFill>
+                  <a:srgbClr val="FFFFFF"/>
+                </a:solidFill>
+              </a14:hiddenFill>
+            </a:ext>
+          </a:extLst>
+        </p:spPr>
+      </p:pic>
+      <p:pic>
+        <p:nvPicPr>
+          <p:cNvPr id="3080" name="Picture 8" descr="Image result for shellshock live"/>
+          <p:cNvPicPr>
+            <a:picLocks noChangeAspect="1" noChangeArrowheads="1"/>
+          </p:cNvPicPr>
+          <p:nvPr/>
+        </p:nvPicPr>
+        <p:blipFill>
+          <a:blip r:embed="rId4">
+            <a:extLst>
+              <a:ext uri="{28A0092B-C50C-407E-A947-70E740481C1C}">
+                <a14:useLocalDpi xmlns:a14="http://schemas.microsoft.com/office/drawing/2010/main" val="0"/>
+              </a:ext>
+            </a:extLst>
+          </a:blip>
+          <a:srcRect/>
+          <a:stretch>
+            <a:fillRect/>
+          </a:stretch>
+        </p:blipFill>
+        <p:spPr bwMode="auto">
+          <a:xfrm>
+            <a:off x="7146620" y="4103067"/>
+            <a:ext cx="4642878" cy="2611619"/>
+          </a:xfrm>
+          <a:prstGeom prst="rect">
+            <a:avLst/>
+          </a:prstGeom>
+          <a:noFill/>
+          <a:extLst>
+            <a:ext uri="{909E8E84-426E-40DD-AFC4-6F175D3DCCD1}">
+              <a14:hiddenFill xmlns:a14="http://schemas.microsoft.com/office/drawing/2010/main">
+                <a:solidFill>
+                  <a:srgbClr val="FFFFFF"/>
+                </a:solidFill>
+              </a14:hiddenFill>
+            </a:ext>
+          </a:extLst>
+        </p:spPr>
+      </p:pic>
+      <p:pic>
+        <p:nvPicPr>
+          <p:cNvPr id="3082" name="Picture 10" descr="Related image"/>
+          <p:cNvPicPr>
+            <a:picLocks noChangeAspect="1" noChangeArrowheads="1"/>
+          </p:cNvPicPr>
+          <p:nvPr/>
+        </p:nvPicPr>
+        <p:blipFill>
+          <a:blip r:embed="rId5">
+            <a:extLst>
+              <a:ext uri="{28A0092B-C50C-407E-A947-70E740481C1C}">
+                <a14:useLocalDpi xmlns:a14="http://schemas.microsoft.com/office/drawing/2010/main" val="0"/>
+              </a:ext>
+            </a:extLst>
+          </a:blip>
+          <a:srcRect/>
+          <a:stretch>
+            <a:fillRect/>
+          </a:stretch>
+        </p:blipFill>
+        <p:spPr bwMode="auto">
+          <a:xfrm>
+            <a:off x="3026248" y="4716653"/>
+            <a:ext cx="3686882" cy="2049907"/>
+          </a:xfrm>
+          <a:prstGeom prst="rect">
+            <a:avLst/>
+          </a:prstGeom>
+          <a:noFill/>
+          <a:extLst>
+            <a:ext uri="{909E8E84-426E-40DD-AFC4-6F175D3DCCD1}">
+              <a14:hiddenFill xmlns:a14="http://schemas.microsoft.com/office/drawing/2010/main">
+                <a:solidFill>
+                  <a:srgbClr val="FFFFFF"/>
+                </a:solidFill>
+              </a14:hiddenFill>
+            </a:ext>
+          </a:extLst>
+        </p:spPr>
+      </p:pic>
     </p:spTree>
     <p:extLst>
       <p:ext uri="{BB962C8B-B14F-4D97-AF65-F5344CB8AC3E}">
@@ -13748,6 +15115,13 @@
   <p:clrMapOvr>
     <a:masterClrMapping/>
   </p:clrMapOvr>
+  <p:timing>
+    <p:tnLst>
+      <p:par>
+        <p:cTn id="1" dur="indefinite" restart="never" nodeType="tmRoot"/>
+      </p:par>
+    </p:tnLst>
+  </p:timing>
 </p:sld>
 </file>
 
@@ -13773,7 +15147,7 @@
           <p:cNvPr id="2" name="Title 1">
             <a:extLst>
               <a:ext uri="{FF2B5EF4-FFF2-40B4-BE49-F238E27FC236}">
-                <a16:creationId xmlns:a16="http://schemas.microsoft.com/office/drawing/2014/main" id="{3DE13417-B8E6-422F-8639-04E2769F8A6D}"/>
+                <a16:creationId xmlns:a16="http://schemas.microsoft.com/office/drawing/2014/main" xmlns="" id="{3DE13417-B8E6-422F-8639-04E2769F8A6D}"/>
               </a:ext>
             </a:extLst>
           </p:cNvPr>
@@ -13801,7 +15175,7 @@
           <p:cNvPr id="5" name="Picture 4">
             <a:extLst>
               <a:ext uri="{FF2B5EF4-FFF2-40B4-BE49-F238E27FC236}">
-                <a16:creationId xmlns:a16="http://schemas.microsoft.com/office/drawing/2014/main" id="{8067D712-B97B-489F-93C0-EFC22B0553A6}"/>
+                <a16:creationId xmlns:a16="http://schemas.microsoft.com/office/drawing/2014/main" xmlns="" id="{8067D712-B97B-489F-93C0-EFC22B0553A6}"/>
               </a:ext>
             </a:extLst>
           </p:cNvPr>
@@ -13831,7 +15205,7 @@
           <p:cNvPr id="7" name="Picture 6">
             <a:extLst>
               <a:ext uri="{FF2B5EF4-FFF2-40B4-BE49-F238E27FC236}">
-                <a16:creationId xmlns:a16="http://schemas.microsoft.com/office/drawing/2014/main" id="{026A2582-6A77-4153-BB9B-3EC74BB93E7D}"/>
+                <a16:creationId xmlns:a16="http://schemas.microsoft.com/office/drawing/2014/main" xmlns="" id="{026A2582-6A77-4153-BB9B-3EC74BB93E7D}"/>
               </a:ext>
             </a:extLst>
           </p:cNvPr>
@@ -13861,7 +15235,7 @@
           <p:cNvPr id="9" name="Picture 8">
             <a:extLst>
               <a:ext uri="{FF2B5EF4-FFF2-40B4-BE49-F238E27FC236}">
-                <a16:creationId xmlns:a16="http://schemas.microsoft.com/office/drawing/2014/main" id="{33F112C0-14E2-4CD6-8449-BB2951BED5BF}"/>
+                <a16:creationId xmlns:a16="http://schemas.microsoft.com/office/drawing/2014/main" xmlns="" id="{33F112C0-14E2-4CD6-8449-BB2951BED5BF}"/>
               </a:ext>
             </a:extLst>
           </p:cNvPr>
@@ -13878,8 +15252,8 @@
         </p:blipFill>
         <p:spPr>
           <a:xfrm>
-            <a:off x="5994431" y="2374900"/>
-            <a:ext cx="1213041" cy="1124282"/>
+            <a:off x="9018879" y="2518590"/>
+            <a:ext cx="2511497" cy="2327729"/>
           </a:xfrm>
           <a:prstGeom prst="rect">
             <a:avLst/>
@@ -13891,7 +15265,7 @@
           <p:cNvPr id="11" name="Picture 10">
             <a:extLst>
               <a:ext uri="{FF2B5EF4-FFF2-40B4-BE49-F238E27FC236}">
-                <a16:creationId xmlns:a16="http://schemas.microsoft.com/office/drawing/2014/main" id="{CEACD9B8-E7FB-46B8-A18E-7F721410B1E9}"/>
+                <a16:creationId xmlns:a16="http://schemas.microsoft.com/office/drawing/2014/main" xmlns="" id="{CEACD9B8-E7FB-46B8-A18E-7F721410B1E9}"/>
               </a:ext>
             </a:extLst>
           </p:cNvPr>
@@ -13908,7 +15282,7 @@
         </p:blipFill>
         <p:spPr>
           <a:xfrm>
-            <a:off x="7928851" y="2332952"/>
+            <a:off x="7034106" y="3765282"/>
             <a:ext cx="1213042" cy="1213042"/>
           </a:xfrm>
           <a:prstGeom prst="rect">
@@ -13921,7 +15295,7 @@
           <p:cNvPr id="13" name="Picture 12">
             <a:extLst>
               <a:ext uri="{FF2B5EF4-FFF2-40B4-BE49-F238E27FC236}">
-                <a16:creationId xmlns:a16="http://schemas.microsoft.com/office/drawing/2014/main" id="{45CC8908-9D73-4461-822C-F0C115BBE235}"/>
+                <a16:creationId xmlns:a16="http://schemas.microsoft.com/office/drawing/2014/main" xmlns="" id="{45CC8908-9D73-4461-822C-F0C115BBE235}"/>
               </a:ext>
             </a:extLst>
           </p:cNvPr>
@@ -13951,7 +15325,7 @@
           <p:cNvPr id="15" name="Picture 14">
             <a:extLst>
               <a:ext uri="{FF2B5EF4-FFF2-40B4-BE49-F238E27FC236}">
-                <a16:creationId xmlns:a16="http://schemas.microsoft.com/office/drawing/2014/main" id="{589681FA-DEB7-4C04-BAB4-02F56E0F277F}"/>
+                <a16:creationId xmlns:a16="http://schemas.microsoft.com/office/drawing/2014/main" xmlns="" id="{589681FA-DEB7-4C04-BAB4-02F56E0F277F}"/>
               </a:ext>
             </a:extLst>
           </p:cNvPr>
@@ -13981,7 +15355,7 @@
           <p:cNvPr id="17" name="Picture 16">
             <a:extLst>
               <a:ext uri="{FF2B5EF4-FFF2-40B4-BE49-F238E27FC236}">
-                <a16:creationId xmlns:a16="http://schemas.microsoft.com/office/drawing/2014/main" id="{E94E230E-F199-41EF-B507-DC115AC422AE}"/>
+                <a16:creationId xmlns:a16="http://schemas.microsoft.com/office/drawing/2014/main" xmlns="" id="{E94E230E-F199-41EF-B507-DC115AC422AE}"/>
               </a:ext>
             </a:extLst>
           </p:cNvPr>
@@ -14011,7 +15385,7 @@
           <p:cNvPr id="19" name="Picture 18">
             <a:extLst>
               <a:ext uri="{FF2B5EF4-FFF2-40B4-BE49-F238E27FC236}">
-                <a16:creationId xmlns:a16="http://schemas.microsoft.com/office/drawing/2014/main" id="{C66040D3-C438-44CE-864A-169281B5AFD2}"/>
+                <a16:creationId xmlns:a16="http://schemas.microsoft.com/office/drawing/2014/main" xmlns="" id="{C66040D3-C438-44CE-864A-169281B5AFD2}"/>
               </a:ext>
             </a:extLst>
           </p:cNvPr>
@@ -14041,7 +15415,7 @@
           <p:cNvPr id="21" name="Picture 20">
             <a:extLst>
               <a:ext uri="{FF2B5EF4-FFF2-40B4-BE49-F238E27FC236}">
-                <a16:creationId xmlns:a16="http://schemas.microsoft.com/office/drawing/2014/main" id="{60567597-D747-4B34-946B-760B67E3D2FF}"/>
+                <a16:creationId xmlns:a16="http://schemas.microsoft.com/office/drawing/2014/main" xmlns="" id="{60567597-D747-4B34-946B-760B67E3D2FF}"/>
               </a:ext>
             </a:extLst>
           </p:cNvPr>
@@ -14071,7 +15445,7 @@
           <p:cNvPr id="23" name="Picture 22">
             <a:extLst>
               <a:ext uri="{FF2B5EF4-FFF2-40B4-BE49-F238E27FC236}">
-                <a16:creationId xmlns:a16="http://schemas.microsoft.com/office/drawing/2014/main" id="{1B7C9E95-71B4-43EE-B83D-5F7E9E73714C}"/>
+                <a16:creationId xmlns:a16="http://schemas.microsoft.com/office/drawing/2014/main" xmlns="" id="{1B7C9E95-71B4-43EE-B83D-5F7E9E73714C}"/>
               </a:ext>
             </a:extLst>
           </p:cNvPr>
@@ -14101,7 +15475,7 @@
           <p:cNvPr id="25" name="Picture 24">
             <a:extLst>
               <a:ext uri="{FF2B5EF4-FFF2-40B4-BE49-F238E27FC236}">
-                <a16:creationId xmlns:a16="http://schemas.microsoft.com/office/drawing/2014/main" id="{ADF1F428-F2EE-46F4-AF5A-6A0195A20E4D}"/>
+                <a16:creationId xmlns:a16="http://schemas.microsoft.com/office/drawing/2014/main" xmlns="" id="{ADF1F428-F2EE-46F4-AF5A-6A0195A20E4D}"/>
               </a:ext>
             </a:extLst>
           </p:cNvPr>
@@ -14131,7 +15505,7 @@
           <p:cNvPr id="27" name="Picture 26">
             <a:extLst>
               <a:ext uri="{FF2B5EF4-FFF2-40B4-BE49-F238E27FC236}">
-                <a16:creationId xmlns:a16="http://schemas.microsoft.com/office/drawing/2014/main" id="{8F64133C-CE9A-481C-95C2-139E708B9B72}"/>
+                <a16:creationId xmlns:a16="http://schemas.microsoft.com/office/drawing/2014/main" xmlns="" id="{8F64133C-CE9A-481C-95C2-139E708B9B72}"/>
               </a:ext>
             </a:extLst>
           </p:cNvPr>
@@ -14156,6 +15530,280 @@
           </a:prstGeom>
         </p:spPr>
       </p:pic>
+      <p:pic>
+        <p:nvPicPr>
+          <p:cNvPr id="3" name="Picture 2"/>
+          <p:cNvPicPr>
+            <a:picLocks noChangeAspect="1"/>
+          </p:cNvPicPr>
+          <p:nvPr/>
+        </p:nvPicPr>
+        <p:blipFill>
+          <a:blip r:embed="rId14">
+            <a:extLst>
+              <a:ext uri="{28A0092B-C50C-407E-A947-70E740481C1C}">
+                <a14:useLocalDpi xmlns:a14="http://schemas.microsoft.com/office/drawing/2010/main" val="0"/>
+              </a:ext>
+            </a:extLst>
+          </a:blip>
+          <a:stretch>
+            <a:fillRect/>
+          </a:stretch>
+        </p:blipFill>
+        <p:spPr>
+          <a:xfrm>
+            <a:off x="4179297" y="4562722"/>
+            <a:ext cx="2847975" cy="619125"/>
+          </a:xfrm>
+          <a:prstGeom prst="rect">
+            <a:avLst/>
+          </a:prstGeom>
+        </p:spPr>
+      </p:pic>
+      <p:pic>
+        <p:nvPicPr>
+          <p:cNvPr id="4" name="Picture 3"/>
+          <p:cNvPicPr>
+            <a:picLocks noChangeAspect="1"/>
+          </p:cNvPicPr>
+          <p:nvPr/>
+        </p:nvPicPr>
+        <p:blipFill>
+          <a:blip r:embed="rId15">
+            <a:extLst>
+              <a:ext uri="{28A0092B-C50C-407E-A947-70E740481C1C}">
+                <a14:useLocalDpi xmlns:a14="http://schemas.microsoft.com/office/drawing/2010/main" val="0"/>
+              </a:ext>
+            </a:extLst>
+          </a:blip>
+          <a:stretch>
+            <a:fillRect/>
+          </a:stretch>
+        </p:blipFill>
+        <p:spPr>
+          <a:xfrm>
+            <a:off x="6070160" y="2441801"/>
+            <a:ext cx="2466975" cy="923925"/>
+          </a:xfrm>
+          <a:prstGeom prst="rect">
+            <a:avLst/>
+          </a:prstGeom>
+        </p:spPr>
+      </p:pic>
+      <p:pic>
+        <p:nvPicPr>
+          <p:cNvPr id="6" name="Picture 5"/>
+          <p:cNvPicPr>
+            <a:picLocks noChangeAspect="1"/>
+          </p:cNvPicPr>
+          <p:nvPr/>
+        </p:nvPicPr>
+        <p:blipFill>
+          <a:blip r:embed="rId16">
+            <a:extLst>
+              <a:ext uri="{28A0092B-C50C-407E-A947-70E740481C1C}">
+                <a14:useLocalDpi xmlns:a14="http://schemas.microsoft.com/office/drawing/2010/main" val="0"/>
+              </a:ext>
+            </a:extLst>
+          </a:blip>
+          <a:stretch>
+            <a:fillRect/>
+          </a:stretch>
+        </p:blipFill>
+        <p:spPr>
+          <a:xfrm>
+            <a:off x="2581237" y="4004668"/>
+            <a:ext cx="1924050" cy="828675"/>
+          </a:xfrm>
+          <a:prstGeom prst="rect">
+            <a:avLst/>
+          </a:prstGeom>
+        </p:spPr>
+      </p:pic>
+      <p:pic>
+        <p:nvPicPr>
+          <p:cNvPr id="8" name="Picture 7"/>
+          <p:cNvPicPr>
+            <a:picLocks noChangeAspect="1"/>
+          </p:cNvPicPr>
+          <p:nvPr/>
+        </p:nvPicPr>
+        <p:blipFill>
+          <a:blip r:embed="rId17">
+            <a:extLst>
+              <a:ext uri="{28A0092B-C50C-407E-A947-70E740481C1C}">
+                <a14:useLocalDpi xmlns:a14="http://schemas.microsoft.com/office/drawing/2010/main" val="0"/>
+              </a:ext>
+            </a:extLst>
+          </a:blip>
+          <a:stretch>
+            <a:fillRect/>
+          </a:stretch>
+        </p:blipFill>
+        <p:spPr>
+          <a:xfrm>
+            <a:off x="5300926" y="3520142"/>
+            <a:ext cx="884386" cy="909124"/>
+          </a:xfrm>
+          <a:prstGeom prst="rect">
+            <a:avLst/>
+          </a:prstGeom>
+        </p:spPr>
+      </p:pic>
+      <p:pic>
+        <p:nvPicPr>
+          <p:cNvPr id="10" name="Picture 9"/>
+          <p:cNvPicPr>
+            <a:picLocks noChangeAspect="1"/>
+          </p:cNvPicPr>
+          <p:nvPr/>
+        </p:nvPicPr>
+        <p:blipFill>
+          <a:blip r:embed="rId18">
+            <a:extLst>
+              <a:ext uri="{28A0092B-C50C-407E-A947-70E740481C1C}">
+                <a14:useLocalDpi xmlns:a14="http://schemas.microsoft.com/office/drawing/2010/main" val="0"/>
+              </a:ext>
+            </a:extLst>
+          </a:blip>
+          <a:stretch>
+            <a:fillRect/>
+          </a:stretch>
+        </p:blipFill>
+        <p:spPr>
+          <a:xfrm>
+            <a:off x="1087815" y="4094337"/>
+            <a:ext cx="1276350" cy="1000125"/>
+          </a:xfrm>
+          <a:prstGeom prst="rect">
+            <a:avLst/>
+          </a:prstGeom>
+        </p:spPr>
+      </p:pic>
+      <p:pic>
+        <p:nvPicPr>
+          <p:cNvPr id="22" name="Picture 21" descr="Related image"/>
+          <p:cNvPicPr>
+            <a:picLocks noChangeAspect="1" noChangeArrowheads="1"/>
+          </p:cNvPicPr>
+          <p:nvPr/>
+        </p:nvPicPr>
+        <p:blipFill>
+          <a:blip r:embed="rId19">
+            <a:clrChange>
+              <a:clrFrom>
+                <a:srgbClr val="F7F7FF"/>
+              </a:clrFrom>
+              <a:clrTo>
+                <a:srgbClr val="F7F7FF">
+                  <a:alpha val="0"/>
+                </a:srgbClr>
+              </a:clrTo>
+            </a:clrChange>
+            <a:extLst>
+              <a:ext uri="{28A0092B-C50C-407E-A947-70E740481C1C}">
+                <a14:useLocalDpi xmlns:a14="http://schemas.microsoft.com/office/drawing/2010/main" val="0"/>
+              </a:ext>
+            </a:extLst>
+          </a:blip>
+          <a:srcRect/>
+          <a:stretch>
+            <a:fillRect/>
+          </a:stretch>
+        </p:blipFill>
+        <p:spPr bwMode="auto">
+          <a:xfrm>
+            <a:off x="6402572" y="765681"/>
+            <a:ext cx="3393979" cy="1586267"/>
+          </a:xfrm>
+          <a:prstGeom prst="rect">
+            <a:avLst/>
+          </a:prstGeom>
+          <a:noFill/>
+          <a:extLst>
+            <a:ext uri="{909E8E84-426E-40DD-AFC4-6F175D3DCCD1}">
+              <a14:hiddenFill xmlns:a14="http://schemas.microsoft.com/office/drawing/2010/main">
+                <a:solidFill>
+                  <a:srgbClr val="FFFFFF"/>
+                </a:solidFill>
+              </a14:hiddenFill>
+            </a:ext>
+          </a:extLst>
+        </p:spPr>
+      </p:pic>
+      <p:grpSp>
+        <p:nvGrpSpPr>
+          <p:cNvPr id="24" name="Group 23"/>
+          <p:cNvGrpSpPr/>
+          <p:nvPr/>
+        </p:nvGrpSpPr>
+        <p:grpSpPr>
+          <a:xfrm>
+            <a:off x="6742024" y="600581"/>
+            <a:ext cx="2844915" cy="1231184"/>
+            <a:chOff x="8242300" y="4237083"/>
+            <a:chExt cx="2844915" cy="1231184"/>
+          </a:xfrm>
+        </p:grpSpPr>
+        <p:pic>
+          <p:nvPicPr>
+            <p:cNvPr id="26" name="Picture 25">
+              <a:extLst>
+                <a:ext uri="{FF2B5EF4-FFF2-40B4-BE49-F238E27FC236}">
+                  <a16:creationId xmlns:a16="http://schemas.microsoft.com/office/drawing/2014/main" xmlns="" id="{8067D712-B97B-489F-93C0-EFC22B0553A6}"/>
+                </a:ext>
+              </a:extLst>
+            </p:cNvPr>
+            <p:cNvPicPr>
+              <a:picLocks noChangeAspect="1"/>
+            </p:cNvPicPr>
+            <p:nvPr/>
+          </p:nvPicPr>
+          <p:blipFill rotWithShape="1">
+            <a:blip r:embed="rId2"/>
+            <a:srcRect r="32041"/>
+            <a:stretch/>
+          </p:blipFill>
+          <p:spPr>
+            <a:xfrm rot="1676086" flipH="1">
+              <a:off x="9538344" y="4341265"/>
+              <a:ext cx="1548871" cy="1127002"/>
+            </a:xfrm>
+            <a:prstGeom prst="rect">
+              <a:avLst/>
+            </a:prstGeom>
+          </p:spPr>
+        </p:pic>
+        <p:pic>
+          <p:nvPicPr>
+            <p:cNvPr id="28" name="Picture 27">
+              <a:extLst>
+                <a:ext uri="{FF2B5EF4-FFF2-40B4-BE49-F238E27FC236}">
+                  <a16:creationId xmlns:a16="http://schemas.microsoft.com/office/drawing/2014/main" xmlns="" id="{8067D712-B97B-489F-93C0-EFC22B0553A6}"/>
+                </a:ext>
+              </a:extLst>
+            </p:cNvPr>
+            <p:cNvPicPr>
+              <a:picLocks noChangeAspect="1"/>
+            </p:cNvPicPr>
+            <p:nvPr/>
+          </p:nvPicPr>
+          <p:blipFill rotWithShape="1">
+            <a:blip r:embed="rId2"/>
+            <a:srcRect r="32041"/>
+            <a:stretch/>
+          </p:blipFill>
+          <p:spPr>
+            <a:xfrm flipH="1">
+              <a:off x="8242300" y="4237083"/>
+              <a:ext cx="1675036" cy="1218803"/>
+            </a:xfrm>
+            <a:prstGeom prst="rect">
+              <a:avLst/>
+            </a:prstGeom>
+          </p:spPr>
+        </p:pic>
+      </p:grpSp>
     </p:spTree>
     <p:extLst>
       <p:ext uri="{BB962C8B-B14F-4D97-AF65-F5344CB8AC3E}">
@@ -14166,6 +15814,215 @@
   <p:clrMapOvr>
     <a:masterClrMapping/>
   </p:clrMapOvr>
+  <p:timing>
+    <p:tnLst>
+      <p:par>
+        <p:cTn id="1" dur="indefinite" restart="never" nodeType="tmRoot">
+          <p:childTnLst>
+            <p:seq concurrent="1" nextAc="seek">
+              <p:cTn id="2" dur="indefinite" nodeType="mainSeq">
+                <p:childTnLst>
+                  <p:par>
+                    <p:cTn id="3" fill="hold">
+                      <p:stCondLst>
+                        <p:cond delay="indefinite"/>
+                        <p:cond evt="onBegin" delay="0">
+                          <p:tn val="2"/>
+                        </p:cond>
+                      </p:stCondLst>
+                      <p:childTnLst>
+                        <p:par>
+                          <p:cTn id="4" fill="hold">
+                            <p:stCondLst>
+                              <p:cond delay="0"/>
+                            </p:stCondLst>
+                            <p:childTnLst>
+                              <p:par>
+                                <p:cTn id="5" presetID="30" presetClass="entr" presetSubtype="0" fill="hold" nodeType="withEffect">
+                                  <p:stCondLst>
+                                    <p:cond delay="0"/>
+                                  </p:stCondLst>
+                                  <p:childTnLst>
+                                    <p:set>
+                                      <p:cBhvr>
+                                        <p:cTn id="6" dur="1" fill="hold">
+                                          <p:stCondLst>
+                                            <p:cond delay="0"/>
+                                          </p:stCondLst>
+                                        </p:cTn>
+                                        <p:tgtEl>
+                                          <p:spTgt spid="24"/>
+                                        </p:tgtEl>
+                                        <p:attrNameLst>
+                                          <p:attrName>style.visibility</p:attrName>
+                                        </p:attrNameLst>
+                                      </p:cBhvr>
+                                      <p:to>
+                                        <p:strVal val="visible"/>
+                                      </p:to>
+                                    </p:set>
+                                    <p:animEffect transition="in" filter="fade">
+                                      <p:cBhvr>
+                                        <p:cTn id="7" dur="800" decel="100000"/>
+                                        <p:tgtEl>
+                                          <p:spTgt spid="24"/>
+                                        </p:tgtEl>
+                                      </p:cBhvr>
+                                    </p:animEffect>
+                                    <p:anim calcmode="lin" valueType="num">
+                                      <p:cBhvr>
+                                        <p:cTn id="8" dur="800" decel="100000" fill="hold"/>
+                                        <p:tgtEl>
+                                          <p:spTgt spid="24"/>
+                                        </p:tgtEl>
+                                        <p:attrNameLst>
+                                          <p:attrName>style.rotation</p:attrName>
+                                        </p:attrNameLst>
+                                      </p:cBhvr>
+                                      <p:tavLst>
+                                        <p:tav tm="0">
+                                          <p:val>
+                                            <p:fltVal val="-90"/>
+                                          </p:val>
+                                        </p:tav>
+                                        <p:tav tm="100000">
+                                          <p:val>
+                                            <p:fltVal val="0"/>
+                                          </p:val>
+                                        </p:tav>
+                                      </p:tavLst>
+                                    </p:anim>
+                                    <p:anim calcmode="lin" valueType="num">
+                                      <p:cBhvr>
+                                        <p:cTn id="9" dur="800" decel="100000" fill="hold"/>
+                                        <p:tgtEl>
+                                          <p:spTgt spid="24"/>
+                                        </p:tgtEl>
+                                        <p:attrNameLst>
+                                          <p:attrName>ppt_x</p:attrName>
+                                        </p:attrNameLst>
+                                      </p:cBhvr>
+                                      <p:tavLst>
+                                        <p:tav tm="0">
+                                          <p:val>
+                                            <p:strVal val="#ppt_x+0.4"/>
+                                          </p:val>
+                                        </p:tav>
+                                        <p:tav tm="100000">
+                                          <p:val>
+                                            <p:strVal val="#ppt_x-0.05"/>
+                                          </p:val>
+                                        </p:tav>
+                                      </p:tavLst>
+                                    </p:anim>
+                                    <p:anim calcmode="lin" valueType="num">
+                                      <p:cBhvr>
+                                        <p:cTn id="10" dur="800" decel="100000" fill="hold"/>
+                                        <p:tgtEl>
+                                          <p:spTgt spid="24"/>
+                                        </p:tgtEl>
+                                        <p:attrNameLst>
+                                          <p:attrName>ppt_y</p:attrName>
+                                        </p:attrNameLst>
+                                      </p:cBhvr>
+                                      <p:tavLst>
+                                        <p:tav tm="0">
+                                          <p:val>
+                                            <p:strVal val="#ppt_y-0.4"/>
+                                          </p:val>
+                                        </p:tav>
+                                        <p:tav tm="100000">
+                                          <p:val>
+                                            <p:strVal val="#ppt_y+0.1"/>
+                                          </p:val>
+                                        </p:tav>
+                                      </p:tavLst>
+                                    </p:anim>
+                                    <p:anim calcmode="lin" valueType="num">
+                                      <p:cBhvr>
+                                        <p:cTn id="11" dur="200" accel="100000" fill="hold">
+                                          <p:stCondLst>
+                                            <p:cond delay="800"/>
+                                          </p:stCondLst>
+                                        </p:cTn>
+                                        <p:tgtEl>
+                                          <p:spTgt spid="24"/>
+                                        </p:tgtEl>
+                                        <p:attrNameLst>
+                                          <p:attrName>ppt_x</p:attrName>
+                                        </p:attrNameLst>
+                                      </p:cBhvr>
+                                      <p:tavLst>
+                                        <p:tav tm="0">
+                                          <p:val>
+                                            <p:strVal val="#ppt_x-0.05"/>
+                                          </p:val>
+                                        </p:tav>
+                                        <p:tav tm="100000">
+                                          <p:val>
+                                            <p:strVal val="#ppt_x"/>
+                                          </p:val>
+                                        </p:tav>
+                                      </p:tavLst>
+                                    </p:anim>
+                                    <p:anim calcmode="lin" valueType="num">
+                                      <p:cBhvr>
+                                        <p:cTn id="12" dur="200" accel="100000" fill="hold">
+                                          <p:stCondLst>
+                                            <p:cond delay="800"/>
+                                          </p:stCondLst>
+                                        </p:cTn>
+                                        <p:tgtEl>
+                                          <p:spTgt spid="24"/>
+                                        </p:tgtEl>
+                                        <p:attrNameLst>
+                                          <p:attrName>ppt_y</p:attrName>
+                                        </p:attrNameLst>
+                                      </p:cBhvr>
+                                      <p:tavLst>
+                                        <p:tav tm="0">
+                                          <p:val>
+                                            <p:strVal val="#ppt_y+0.1"/>
+                                          </p:val>
+                                        </p:tav>
+                                        <p:tav tm="100000">
+                                          <p:val>
+                                            <p:strVal val="#ppt_y"/>
+                                          </p:val>
+                                        </p:tav>
+                                      </p:tavLst>
+                                    </p:anim>
+                                  </p:childTnLst>
+                                </p:cTn>
+                              </p:par>
+                            </p:childTnLst>
+                          </p:cTn>
+                        </p:par>
+                      </p:childTnLst>
+                    </p:cTn>
+                  </p:par>
+                </p:childTnLst>
+              </p:cTn>
+              <p:prevCondLst>
+                <p:cond evt="onPrev" delay="0">
+                  <p:tgtEl>
+                    <p:sldTgt/>
+                  </p:tgtEl>
+                </p:cond>
+              </p:prevCondLst>
+              <p:nextCondLst>
+                <p:cond evt="onNext" delay="0">
+                  <p:tgtEl>
+                    <p:sldTgt/>
+                  </p:tgtEl>
+                </p:cond>
+              </p:nextCondLst>
+            </p:seq>
+          </p:childTnLst>
+        </p:cTn>
+      </p:par>
+    </p:tnLst>
+  </p:timing>
 </p:sld>
 </file>
 
@@ -14191,7 +16048,7 @@
           <p:cNvPr id="2" name="Title 1">
             <a:extLst>
               <a:ext uri="{FF2B5EF4-FFF2-40B4-BE49-F238E27FC236}">
-                <a16:creationId xmlns:a16="http://schemas.microsoft.com/office/drawing/2014/main" id="{12D1FF5C-A6EC-43C4-888C-1C82EB251BCE}"/>
+                <a16:creationId xmlns:a16="http://schemas.microsoft.com/office/drawing/2014/main" xmlns="" id="{12D1FF5C-A6EC-43C4-888C-1C82EB251BCE}"/>
               </a:ext>
             </a:extLst>
           </p:cNvPr>
@@ -14219,7 +16076,7 @@
           <p:cNvPr id="3" name="Content Placeholder 2">
             <a:extLst>
               <a:ext uri="{FF2B5EF4-FFF2-40B4-BE49-F238E27FC236}">
-                <a16:creationId xmlns:a16="http://schemas.microsoft.com/office/drawing/2014/main" id="{0FFCC8F6-6F9B-479C-87E8-54647A608F93}"/>
+                <a16:creationId xmlns:a16="http://schemas.microsoft.com/office/drawing/2014/main" xmlns="" id="{0FFCC8F6-6F9B-479C-87E8-54647A608F93}"/>
               </a:ext>
             </a:extLst>
           </p:cNvPr>
@@ -14235,10 +16092,160 @@
           <a:bodyPr/>
           <a:lstStyle/>
           <a:p>
-            <a:endParaRPr lang="en-US"/>
+            <a:r>
+              <a:rPr lang="en-US" dirty="0" smtClean="0"/>
+              <a:t>We plan on finding fitting audio for the ambient, shooting, movement, menu, explosions, etc.</a:t>
+            </a:r>
+          </a:p>
+          <a:p>
+            <a:r>
+              <a:rPr lang="en-US" dirty="0" smtClean="0"/>
+              <a:t>If we can’t find existing sounds effects we will make it.</a:t>
+            </a:r>
+          </a:p>
+          <a:p>
+            <a:r>
+              <a:rPr lang="en-US" dirty="0" smtClean="0"/>
+              <a:t>We don’t plan on making our own music.</a:t>
+            </a:r>
+            <a:endParaRPr lang="en-US" dirty="0"/>
           </a:p>
         </p:txBody>
       </p:sp>
+      <p:pic>
+        <p:nvPicPr>
+          <p:cNvPr id="4098" name="Picture 2" descr="Related image"/>
+          <p:cNvPicPr>
+            <a:picLocks noChangeAspect="1" noChangeArrowheads="1"/>
+          </p:cNvPicPr>
+          <p:nvPr/>
+        </p:nvPicPr>
+        <p:blipFill>
+          <a:blip r:embed="rId2">
+            <a:extLst>
+              <a:ext uri="{28A0092B-C50C-407E-A947-70E740481C1C}">
+                <a14:useLocalDpi xmlns:a14="http://schemas.microsoft.com/office/drawing/2010/main" val="0"/>
+              </a:ext>
+            </a:extLst>
+          </a:blip>
+          <a:srcRect/>
+          <a:stretch>
+            <a:fillRect/>
+          </a:stretch>
+        </p:blipFill>
+        <p:spPr bwMode="auto">
+          <a:xfrm>
+            <a:off x="8595359" y="3254376"/>
+            <a:ext cx="3344091" cy="3344091"/>
+          </a:xfrm>
+          <a:prstGeom prst="rect">
+            <a:avLst/>
+          </a:prstGeom>
+          <a:ln w="228600" cap="sq" cmpd="thickThin">
+            <a:solidFill>
+              <a:srgbClr val="000000"/>
+            </a:solidFill>
+            <a:prstDash val="solid"/>
+            <a:miter lim="800000"/>
+          </a:ln>
+          <a:effectLst>
+            <a:innerShdw blurRad="76200">
+              <a:srgbClr val="000000"/>
+            </a:innerShdw>
+          </a:effectLst>
+          <a:extLst>
+            <a:ext uri="{909E8E84-426E-40DD-AFC4-6F175D3DCCD1}">
+              <a14:hiddenFill xmlns:a14="http://schemas.microsoft.com/office/drawing/2010/main">
+                <a:solidFill>
+                  <a:srgbClr val="FFFFFF"/>
+                </a:solidFill>
+              </a14:hiddenFill>
+            </a:ext>
+          </a:extLst>
+        </p:spPr>
+      </p:pic>
+      <p:pic>
+        <p:nvPicPr>
+          <p:cNvPr id="4100" name="Picture 4" descr="Image result for pew pew"/>
+          <p:cNvPicPr>
+            <a:picLocks noChangeAspect="1" noChangeArrowheads="1"/>
+          </p:cNvPicPr>
+          <p:nvPr/>
+        </p:nvPicPr>
+        <p:blipFill>
+          <a:blip r:embed="rId3">
+            <a:extLst>
+              <a:ext uri="{28A0092B-C50C-407E-A947-70E740481C1C}">
+                <a14:useLocalDpi xmlns:a14="http://schemas.microsoft.com/office/drawing/2010/main" val="0"/>
+              </a:ext>
+            </a:extLst>
+          </a:blip>
+          <a:srcRect/>
+          <a:stretch>
+            <a:fillRect/>
+          </a:stretch>
+        </p:blipFill>
+        <p:spPr bwMode="auto">
+          <a:xfrm>
+            <a:off x="1022431" y="4140925"/>
+            <a:ext cx="2568484" cy="2568484"/>
+          </a:xfrm>
+          <a:prstGeom prst="rect">
+            <a:avLst/>
+          </a:prstGeom>
+          <a:noFill/>
+          <a:extLst>
+            <a:ext uri="{909E8E84-426E-40DD-AFC4-6F175D3DCCD1}">
+              <a14:hiddenFill xmlns:a14="http://schemas.microsoft.com/office/drawing/2010/main">
+                <a:solidFill>
+                  <a:srgbClr val="FFFFFF"/>
+                </a:solidFill>
+              </a14:hiddenFill>
+            </a:ext>
+          </a:extLst>
+        </p:spPr>
+      </p:pic>
+      <p:pic>
+        <p:nvPicPr>
+          <p:cNvPr id="4102" name="Picture 6" descr="Image result for sound effects"/>
+          <p:cNvPicPr>
+            <a:picLocks noChangeAspect="1" noChangeArrowheads="1"/>
+          </p:cNvPicPr>
+          <p:nvPr/>
+        </p:nvPicPr>
+        <p:blipFill>
+          <a:blip r:embed="rId4">
+            <a:extLst>
+              <a:ext uri="{28A0092B-C50C-407E-A947-70E740481C1C}">
+                <a14:useLocalDpi xmlns:a14="http://schemas.microsoft.com/office/drawing/2010/main" val="0"/>
+              </a:ext>
+            </a:extLst>
+          </a:blip>
+          <a:srcRect/>
+          <a:stretch>
+            <a:fillRect/>
+          </a:stretch>
+        </p:blipFill>
+        <p:spPr bwMode="auto">
+          <a:xfrm>
+            <a:off x="10437813" y="483324"/>
+            <a:ext cx="687660" cy="687660"/>
+          </a:xfrm>
+          <a:prstGeom prst="rect">
+            <a:avLst/>
+          </a:prstGeom>
+          <a:noFill/>
+          <a:extLst>
+            <a:ext uri="{909E8E84-426E-40DD-AFC4-6F175D3DCCD1}">
+              <a14:hiddenFill xmlns:a14="http://schemas.microsoft.com/office/drawing/2010/main">
+                <a:solidFill>
+                  <a:srgbClr val="FFFFFF"/>
+                </a:solidFill>
+              </a14:hiddenFill>
+            </a:ext>
+          </a:extLst>
+        </p:spPr>
+      </p:pic>
     </p:spTree>
     <p:extLst>
       <p:ext uri="{BB962C8B-B14F-4D97-AF65-F5344CB8AC3E}">
@@ -14249,6 +16256,13 @@
   <p:clrMapOvr>
     <a:masterClrMapping/>
   </p:clrMapOvr>
+  <p:timing>
+    <p:tnLst>
+      <p:par>
+        <p:cTn id="1" dur="indefinite" restart="never" nodeType="tmRoot"/>
+      </p:par>
+    </p:tnLst>
+  </p:timing>
 </p:sld>
 </file>
 
@@ -14274,7 +16288,7 @@
           <p:cNvPr id="2" name="Title 1">
             <a:extLst>
               <a:ext uri="{FF2B5EF4-FFF2-40B4-BE49-F238E27FC236}">
-                <a16:creationId xmlns:a16="http://schemas.microsoft.com/office/drawing/2014/main" id="{CC5FB789-2D70-40C1-BDF8-68823F6E859F}"/>
+                <a16:creationId xmlns:a16="http://schemas.microsoft.com/office/drawing/2014/main" xmlns="" id="{CC5FB789-2D70-40C1-BDF8-68823F6E859F}"/>
               </a:ext>
             </a:extLst>
           </p:cNvPr>
@@ -14302,7 +16316,7 @@
           <p:cNvPr id="3" name="Content Placeholder 2">
             <a:extLst>
               <a:ext uri="{FF2B5EF4-FFF2-40B4-BE49-F238E27FC236}">
-                <a16:creationId xmlns:a16="http://schemas.microsoft.com/office/drawing/2014/main" id="{626AE229-CC6B-48A7-87D8-C810B532D9F3}"/>
+                <a16:creationId xmlns:a16="http://schemas.microsoft.com/office/drawing/2014/main" xmlns="" id="{626AE229-CC6B-48A7-87D8-C810B532D9F3}"/>
               </a:ext>
             </a:extLst>
           </p:cNvPr>
@@ -14327,11 +16341,11 @@
             <a:pPr lvl="1"/>
             <a:r>
               <a:rPr lang="en-US" dirty="0"/>
-              <a:t>AI</a:t>
+              <a:t>AI, </a:t>
             </a:r>
             <a:r>
-              <a:rPr lang="en-US"/>
-              <a:t>, Menu</a:t>
+              <a:rPr lang="en-US" dirty="0" smtClean="0"/>
+              <a:t>Menu</a:t>
             </a:r>
             <a:endParaRPr lang="en-US" dirty="0"/>
           </a:p>
@@ -14345,8 +16359,13 @@
             <a:pPr lvl="1"/>
             <a:r>
               <a:rPr lang="en-US" dirty="0"/>
-              <a:t>Weapon Interactivity and Scripts, Gameplay </a:t>
+              <a:t>Weapon Interactivity and Scripts, </a:t>
             </a:r>
+            <a:r>
+              <a:rPr lang="en-US" dirty="0" smtClean="0"/>
+              <a:t>Gameplay, Destructible terrain</a:t>
+            </a:r>
+            <a:endParaRPr lang="en-US" dirty="0"/>
           </a:p>
           <a:p>
             <a:r>
@@ -14358,17 +16377,183 @@
             <a:pPr lvl="1"/>
             <a:r>
               <a:rPr lang="en-US" dirty="0"/>
-              <a:t>Map Creation, Environment Interaction</a:t>
+              <a:t>Map Creation, Environment </a:t>
             </a:r>
-          </a:p>
-          <a:p>
-            <a:pPr marL="0" indent="0">
-              <a:buNone/>
-            </a:pPr>
+            <a:r>
+              <a:rPr lang="en-US" dirty="0" smtClean="0"/>
+              <a:t>Interaction and hazards, Sound</a:t>
+            </a:r>
+            <a:endParaRPr lang="en-US" dirty="0"/>
+          </a:p>
+          <a:p>
+            <a:r>
+              <a:rPr lang="en-US" dirty="0" smtClean="0"/>
+              <a:t>All</a:t>
+            </a:r>
+          </a:p>
+          <a:p>
+            <a:pPr lvl="1"/>
+            <a:r>
+              <a:rPr lang="en-US" dirty="0" smtClean="0"/>
+              <a:t>Implementing Guns, AI, Game Manager, Art, testing and documentation</a:t>
+            </a:r>
             <a:endParaRPr lang="en-US" dirty="0"/>
           </a:p>
         </p:txBody>
       </p:sp>
+      <p:pic>
+        <p:nvPicPr>
+          <p:cNvPr id="4" name="Picture 3">
+            <a:extLst>
+              <a:ext uri="{FF2B5EF4-FFF2-40B4-BE49-F238E27FC236}">
+                <a16:creationId xmlns:a16="http://schemas.microsoft.com/office/drawing/2014/main" xmlns="" id="{8067D712-B97B-489F-93C0-EFC22B0553A6}"/>
+              </a:ext>
+            </a:extLst>
+          </p:cNvPr>
+          <p:cNvPicPr>
+            <a:picLocks noChangeAspect="1"/>
+          </p:cNvPicPr>
+          <p:nvPr/>
+        </p:nvPicPr>
+        <p:blipFill rotWithShape="1">
+          <a:blip r:embed="rId2"/>
+          <a:srcRect r="32041"/>
+          <a:stretch/>
+        </p:blipFill>
+        <p:spPr>
+          <a:xfrm flipH="1">
+            <a:off x="8895805" y="763649"/>
+            <a:ext cx="1548871" cy="1127002"/>
+          </a:xfrm>
+          <a:prstGeom prst="rect">
+            <a:avLst/>
+          </a:prstGeom>
+        </p:spPr>
+      </p:pic>
+      <p:pic>
+        <p:nvPicPr>
+          <p:cNvPr id="5" name="Picture 4" descr="Related image"/>
+          <p:cNvPicPr>
+            <a:picLocks noChangeAspect="1" noChangeArrowheads="1"/>
+          </p:cNvPicPr>
+          <p:nvPr/>
+        </p:nvPicPr>
+        <p:blipFill>
+          <a:blip r:embed="rId3">
+            <a:clrChange>
+              <a:clrFrom>
+                <a:srgbClr val="F7F7FF"/>
+              </a:clrFrom>
+              <a:clrTo>
+                <a:srgbClr val="F7F7FF">
+                  <a:alpha val="0"/>
+                </a:srgbClr>
+              </a:clrTo>
+            </a:clrChange>
+            <a:extLst>
+              <a:ext uri="{28A0092B-C50C-407E-A947-70E740481C1C}">
+                <a14:useLocalDpi xmlns:a14="http://schemas.microsoft.com/office/drawing/2010/main" val="0"/>
+              </a:ext>
+            </a:extLst>
+          </a:blip>
+          <a:srcRect/>
+          <a:stretch>
+            <a:fillRect/>
+          </a:stretch>
+        </p:blipFill>
+        <p:spPr bwMode="auto">
+          <a:xfrm>
+            <a:off x="8283623" y="2393481"/>
+            <a:ext cx="3393979" cy="1586267"/>
+          </a:xfrm>
+          <a:prstGeom prst="rect">
+            <a:avLst/>
+          </a:prstGeom>
+          <a:noFill/>
+          <a:extLst>
+            <a:ext uri="{909E8E84-426E-40DD-AFC4-6F175D3DCCD1}">
+              <a14:hiddenFill xmlns:a14="http://schemas.microsoft.com/office/drawing/2010/main">
+                <a:solidFill>
+                  <a:srgbClr val="FFFFFF"/>
+                </a:solidFill>
+              </a14:hiddenFill>
+            </a:ext>
+          </a:extLst>
+        </p:spPr>
+      </p:pic>
+      <p:grpSp>
+        <p:nvGrpSpPr>
+          <p:cNvPr id="6" name="Group 5"/>
+          <p:cNvGrpSpPr/>
+          <p:nvPr/>
+        </p:nvGrpSpPr>
+        <p:grpSpPr>
+          <a:xfrm>
+            <a:off x="8623075" y="2228381"/>
+            <a:ext cx="2844915" cy="1231184"/>
+            <a:chOff x="8242300" y="4237083"/>
+            <a:chExt cx="2844915" cy="1231184"/>
+          </a:xfrm>
+        </p:grpSpPr>
+        <p:pic>
+          <p:nvPicPr>
+            <p:cNvPr id="7" name="Picture 6">
+              <a:extLst>
+                <a:ext uri="{FF2B5EF4-FFF2-40B4-BE49-F238E27FC236}">
+                  <a16:creationId xmlns:a16="http://schemas.microsoft.com/office/drawing/2014/main" xmlns="" id="{8067D712-B97B-489F-93C0-EFC22B0553A6}"/>
+                </a:ext>
+              </a:extLst>
+            </p:cNvPr>
+            <p:cNvPicPr>
+              <a:picLocks noChangeAspect="1"/>
+            </p:cNvPicPr>
+            <p:nvPr/>
+          </p:nvPicPr>
+          <p:blipFill rotWithShape="1">
+            <a:blip r:embed="rId2"/>
+            <a:srcRect r="32041"/>
+            <a:stretch/>
+          </p:blipFill>
+          <p:spPr>
+            <a:xfrm rot="1676086" flipH="1">
+              <a:off x="9538344" y="4341265"/>
+              <a:ext cx="1548871" cy="1127002"/>
+            </a:xfrm>
+            <a:prstGeom prst="rect">
+              <a:avLst/>
+            </a:prstGeom>
+          </p:spPr>
+        </p:pic>
+        <p:pic>
+          <p:nvPicPr>
+            <p:cNvPr id="8" name="Picture 7">
+              <a:extLst>
+                <a:ext uri="{FF2B5EF4-FFF2-40B4-BE49-F238E27FC236}">
+                  <a16:creationId xmlns:a16="http://schemas.microsoft.com/office/drawing/2014/main" xmlns="" id="{8067D712-B97B-489F-93C0-EFC22B0553A6}"/>
+                </a:ext>
+              </a:extLst>
+            </p:cNvPr>
+            <p:cNvPicPr>
+              <a:picLocks noChangeAspect="1"/>
+            </p:cNvPicPr>
+            <p:nvPr/>
+          </p:nvPicPr>
+          <p:blipFill rotWithShape="1">
+            <a:blip r:embed="rId2"/>
+            <a:srcRect r="32041"/>
+            <a:stretch/>
+          </p:blipFill>
+          <p:spPr>
+            <a:xfrm flipH="1">
+              <a:off x="8242300" y="4237083"/>
+              <a:ext cx="1675036" cy="1218803"/>
+            </a:xfrm>
+            <a:prstGeom prst="rect">
+              <a:avLst/>
+            </a:prstGeom>
+          </p:spPr>
+        </p:pic>
+      </p:grpSp>
     </p:spTree>
     <p:extLst>
       <p:ext uri="{BB962C8B-B14F-4D97-AF65-F5344CB8AC3E}">
@@ -14379,6 +16564,130 @@
   <p:clrMapOvr>
     <a:masterClrMapping/>
   </p:clrMapOvr>
+  <p:timing>
+    <p:tnLst>
+      <p:par>
+        <p:cTn id="1" dur="indefinite" restart="never" nodeType="tmRoot">
+          <p:childTnLst>
+            <p:seq concurrent="1" nextAc="seek">
+              <p:cTn id="2" dur="indefinite" nodeType="mainSeq">
+                <p:childTnLst>
+                  <p:par>
+                    <p:cTn id="3" fill="hold">
+                      <p:stCondLst>
+                        <p:cond delay="indefinite"/>
+                        <p:cond evt="onBegin" delay="0">
+                          <p:tn val="2"/>
+                        </p:cond>
+                      </p:stCondLst>
+                      <p:childTnLst>
+                        <p:par>
+                          <p:cTn id="4" fill="hold">
+                            <p:stCondLst>
+                              <p:cond delay="0"/>
+                            </p:stCondLst>
+                            <p:childTnLst>
+                              <p:par>
+                                <p:cTn id="5" presetID="2" presetClass="entr" presetSubtype="4" fill="hold" nodeType="withEffect">
+                                  <p:stCondLst>
+                                    <p:cond delay="0"/>
+                                  </p:stCondLst>
+                                  <p:childTnLst>
+                                    <p:set>
+                                      <p:cBhvr>
+                                        <p:cTn id="6" dur="1" fill="hold">
+                                          <p:stCondLst>
+                                            <p:cond delay="0"/>
+                                          </p:stCondLst>
+                                        </p:cTn>
+                                        <p:tgtEl>
+                                          <p:spTgt spid="6"/>
+                                        </p:tgtEl>
+                                        <p:attrNameLst>
+                                          <p:attrName>style.visibility</p:attrName>
+                                        </p:attrNameLst>
+                                      </p:cBhvr>
+                                      <p:to>
+                                        <p:strVal val="visible"/>
+                                      </p:to>
+                                    </p:set>
+                                    <p:anim calcmode="lin" valueType="num">
+                                      <p:cBhvr additive="base">
+                                        <p:cTn id="7" dur="500" fill="hold"/>
+                                        <p:tgtEl>
+                                          <p:spTgt spid="6"/>
+                                        </p:tgtEl>
+                                        <p:attrNameLst>
+                                          <p:attrName>ppt_x</p:attrName>
+                                        </p:attrNameLst>
+                                      </p:cBhvr>
+                                      <p:tavLst>
+                                        <p:tav tm="0">
+                                          <p:val>
+                                            <p:strVal val="#ppt_x"/>
+                                          </p:val>
+                                        </p:tav>
+                                        <p:tav tm="100000">
+                                          <p:val>
+                                            <p:strVal val="#ppt_x"/>
+                                          </p:val>
+                                        </p:tav>
+                                      </p:tavLst>
+                                    </p:anim>
+                                    <p:anim calcmode="lin" valueType="num">
+                                      <p:cBhvr additive="base">
+                                        <p:cTn id="8" dur="500" fill="hold"/>
+                                        <p:tgtEl>
+                                          <p:spTgt spid="6"/>
+                                        </p:tgtEl>
+                                        <p:attrNameLst>
+                                          <p:attrName>ppt_y</p:attrName>
+                                        </p:attrNameLst>
+                                      </p:cBhvr>
+                                      <p:tavLst>
+                                        <p:tav tm="0">
+                                          <p:val>
+                                            <p:strVal val="1+#ppt_h/2"/>
+                                          </p:val>
+                                        </p:tav>
+                                        <p:tav tm="100000">
+                                          <p:val>
+                                            <p:strVal val="#ppt_y"/>
+                                          </p:val>
+                                        </p:tav>
+                                      </p:tavLst>
+                                    </p:anim>
+                                  </p:childTnLst>
+                                </p:cTn>
+                              </p:par>
+                            </p:childTnLst>
+                          </p:cTn>
+                        </p:par>
+                      </p:childTnLst>
+                    </p:cTn>
+                  </p:par>
+                </p:childTnLst>
+              </p:cTn>
+              <p:prevCondLst>
+                <p:cond evt="onPrev" delay="0">
+                  <p:tgtEl>
+                    <p:sldTgt/>
+                  </p:tgtEl>
+                </p:cond>
+              </p:prevCondLst>
+              <p:nextCondLst>
+                <p:cond evt="onNext" delay="0">
+                  <p:tgtEl>
+                    <p:sldTgt/>
+                  </p:tgtEl>
+                </p:cond>
+              </p:nextCondLst>
+            </p:seq>
+          </p:childTnLst>
+        </p:cTn>
+      </p:par>
+    </p:tnLst>
+  </p:timing>
 </p:sld>
 </file>
 
@@ -14404,7 +16713,7 @@
           <p:cNvPr id="2" name="Title 1">
             <a:extLst>
               <a:ext uri="{FF2B5EF4-FFF2-40B4-BE49-F238E27FC236}">
-                <a16:creationId xmlns:a16="http://schemas.microsoft.com/office/drawing/2014/main" id="{C035621B-C4F5-4759-8AC5-9B89D5BC90B4}"/>
+                <a16:creationId xmlns:a16="http://schemas.microsoft.com/office/drawing/2014/main" xmlns="" id="{C035621B-C4F5-4759-8AC5-9B89D5BC90B4}"/>
               </a:ext>
             </a:extLst>
           </p:cNvPr>
@@ -14432,7 +16741,7 @@
           <p:cNvPr id="3" name="Content Placeholder 2">
             <a:extLst>
               <a:ext uri="{FF2B5EF4-FFF2-40B4-BE49-F238E27FC236}">
-                <a16:creationId xmlns:a16="http://schemas.microsoft.com/office/drawing/2014/main" id="{C8BAD863-10CE-4457-937D-830D6E8EBA72}"/>
+                <a16:creationId xmlns:a16="http://schemas.microsoft.com/office/drawing/2014/main" xmlns="" id="{C8BAD863-10CE-4457-937D-830D6E8EBA72}"/>
               </a:ext>
             </a:extLst>
           </p:cNvPr>
@@ -14517,6 +16826,159 @@
           </a:p>
         </p:txBody>
       </p:sp>
+      <p:pic>
+        <p:nvPicPr>
+          <p:cNvPr id="5" name="Picture 4">
+            <a:extLst>
+              <a:ext uri="{FF2B5EF4-FFF2-40B4-BE49-F238E27FC236}">
+                <a16:creationId xmlns:a16="http://schemas.microsoft.com/office/drawing/2014/main" xmlns="" id="{8067D712-B97B-489F-93C0-EFC22B0553A6}"/>
+              </a:ext>
+            </a:extLst>
+          </p:cNvPr>
+          <p:cNvPicPr>
+            <a:picLocks noChangeAspect="1"/>
+          </p:cNvPicPr>
+          <p:nvPr/>
+        </p:nvPicPr>
+        <p:blipFill rotWithShape="1">
+          <a:blip r:embed="rId2"/>
+          <a:srcRect r="32041"/>
+          <a:stretch/>
+        </p:blipFill>
+        <p:spPr>
+          <a:xfrm flipH="1">
+            <a:off x="8895805" y="763649"/>
+            <a:ext cx="1548871" cy="1127002"/>
+          </a:xfrm>
+          <a:prstGeom prst="rect">
+            <a:avLst/>
+          </a:prstGeom>
+        </p:spPr>
+      </p:pic>
+      <p:pic>
+        <p:nvPicPr>
+          <p:cNvPr id="6" name="Picture 5" descr="Related image"/>
+          <p:cNvPicPr>
+            <a:picLocks noChangeAspect="1" noChangeArrowheads="1"/>
+          </p:cNvPicPr>
+          <p:nvPr/>
+        </p:nvPicPr>
+        <p:blipFill>
+          <a:blip r:embed="rId3">
+            <a:clrChange>
+              <a:clrFrom>
+                <a:srgbClr val="F7F7FF"/>
+              </a:clrFrom>
+              <a:clrTo>
+                <a:srgbClr val="F7F7FF">
+                  <a:alpha val="0"/>
+                </a:srgbClr>
+              </a:clrTo>
+            </a:clrChange>
+            <a:extLst>
+              <a:ext uri="{28A0092B-C50C-407E-A947-70E740481C1C}">
+                <a14:useLocalDpi xmlns:a14="http://schemas.microsoft.com/office/drawing/2010/main" val="0"/>
+              </a:ext>
+            </a:extLst>
+          </a:blip>
+          <a:srcRect/>
+          <a:stretch>
+            <a:fillRect/>
+          </a:stretch>
+        </p:blipFill>
+        <p:spPr bwMode="auto">
+          <a:xfrm>
+            <a:off x="8283623" y="2393481"/>
+            <a:ext cx="3393979" cy="1586267"/>
+          </a:xfrm>
+          <a:prstGeom prst="rect">
+            <a:avLst/>
+          </a:prstGeom>
+          <a:noFill/>
+          <a:extLst>
+            <a:ext uri="{909E8E84-426E-40DD-AFC4-6F175D3DCCD1}">
+              <a14:hiddenFill xmlns:a14="http://schemas.microsoft.com/office/drawing/2010/main">
+                <a:solidFill>
+                  <a:srgbClr val="FFFFFF"/>
+                </a:solidFill>
+              </a14:hiddenFill>
+            </a:ext>
+          </a:extLst>
+        </p:spPr>
+      </p:pic>
+      <p:grpSp>
+        <p:nvGrpSpPr>
+          <p:cNvPr id="7" name="Group 6"/>
+          <p:cNvGrpSpPr/>
+          <p:nvPr/>
+        </p:nvGrpSpPr>
+        <p:grpSpPr>
+          <a:xfrm>
+            <a:off x="8623075" y="2228381"/>
+            <a:ext cx="2844915" cy="1231184"/>
+            <a:chOff x="8242300" y="4237083"/>
+            <a:chExt cx="2844915" cy="1231184"/>
+          </a:xfrm>
+        </p:grpSpPr>
+        <p:pic>
+          <p:nvPicPr>
+            <p:cNvPr id="8" name="Picture 7">
+              <a:extLst>
+                <a:ext uri="{FF2B5EF4-FFF2-40B4-BE49-F238E27FC236}">
+                  <a16:creationId xmlns:a16="http://schemas.microsoft.com/office/drawing/2014/main" xmlns="" id="{8067D712-B97B-489F-93C0-EFC22B0553A6}"/>
+                </a:ext>
+              </a:extLst>
+            </p:cNvPr>
+            <p:cNvPicPr>
+              <a:picLocks noChangeAspect="1"/>
+            </p:cNvPicPr>
+            <p:nvPr/>
+          </p:nvPicPr>
+          <p:blipFill rotWithShape="1">
+            <a:blip r:embed="rId2"/>
+            <a:srcRect r="32041"/>
+            <a:stretch/>
+          </p:blipFill>
+          <p:spPr>
+            <a:xfrm rot="1676086" flipH="1">
+              <a:off x="9538344" y="4341265"/>
+              <a:ext cx="1548871" cy="1127002"/>
+            </a:xfrm>
+            <a:prstGeom prst="rect">
+              <a:avLst/>
+            </a:prstGeom>
+          </p:spPr>
+        </p:pic>
+        <p:pic>
+          <p:nvPicPr>
+            <p:cNvPr id="9" name="Picture 8">
+              <a:extLst>
+                <a:ext uri="{FF2B5EF4-FFF2-40B4-BE49-F238E27FC236}">
+                  <a16:creationId xmlns:a16="http://schemas.microsoft.com/office/drawing/2014/main" xmlns="" id="{8067D712-B97B-489F-93C0-EFC22B0553A6}"/>
+                </a:ext>
+              </a:extLst>
+            </p:cNvPr>
+            <p:cNvPicPr>
+              <a:picLocks noChangeAspect="1"/>
+            </p:cNvPicPr>
+            <p:nvPr/>
+          </p:nvPicPr>
+          <p:blipFill rotWithShape="1">
+            <a:blip r:embed="rId2"/>
+            <a:srcRect r="32041"/>
+            <a:stretch/>
+          </p:blipFill>
+          <p:spPr>
+            <a:xfrm flipH="1">
+              <a:off x="8242300" y="4237083"/>
+              <a:ext cx="1675036" cy="1218803"/>
+            </a:xfrm>
+            <a:prstGeom prst="rect">
+              <a:avLst/>
+            </a:prstGeom>
+          </p:spPr>
+        </p:pic>
+      </p:grpSp>
     </p:spTree>
     <p:extLst>
       <p:ext uri="{BB962C8B-B14F-4D97-AF65-F5344CB8AC3E}">
@@ -14527,6 +16989,13 @@
   <p:clrMapOvr>
     <a:masterClrMapping/>
   </p:clrMapOvr>
+  <p:timing>
+    <p:tnLst>
+      <p:par>
+        <p:cTn id="1" dur="indefinite" restart="never" nodeType="tmRoot"/>
+      </p:par>
+    </p:tnLst>
+  </p:timing>
 </p:sld>
 </file>
 
@@ -14552,7 +17021,7 @@
           <p:cNvPr id="2" name="Title 1">
             <a:extLst>
               <a:ext uri="{FF2B5EF4-FFF2-40B4-BE49-F238E27FC236}">
-                <a16:creationId xmlns:a16="http://schemas.microsoft.com/office/drawing/2014/main" id="{67752EBC-73CC-4169-B45A-8A02252D2F3F}"/>
+                <a16:creationId xmlns:a16="http://schemas.microsoft.com/office/drawing/2014/main" xmlns="" id="{67752EBC-73CC-4169-B45A-8A02252D2F3F}"/>
               </a:ext>
             </a:extLst>
           </p:cNvPr>
@@ -14580,7 +17049,7 @@
           <p:cNvPr id="3" name="Content Placeholder 2">
             <a:extLst>
               <a:ext uri="{FF2B5EF4-FFF2-40B4-BE49-F238E27FC236}">
-                <a16:creationId xmlns:a16="http://schemas.microsoft.com/office/drawing/2014/main" id="{DBC01853-D3C1-4CA3-AAF7-4DFE1BC9C83E}"/>
+                <a16:creationId xmlns:a16="http://schemas.microsoft.com/office/drawing/2014/main" xmlns="" id="{DBC01853-D3C1-4CA3-AAF7-4DFE1BC9C83E}"/>
               </a:ext>
             </a:extLst>
           </p:cNvPr>
@@ -14591,20 +17060,20 @@
             <p:ph idx="1"/>
           </p:nvPr>
         </p:nvSpPr>
-        <p:spPr/>
+        <p:spPr>
+          <a:xfrm>
+            <a:off x="1154954" y="2603500"/>
+            <a:ext cx="6813389" cy="3914866"/>
+          </a:xfrm>
+        </p:spPr>
         <p:txBody>
           <a:bodyPr/>
           <a:lstStyle/>
           <a:p>
             <a:r>
               <a:rPr lang="en-US" dirty="0"/>
-              <a:t>One complete map, </a:t>
+              <a:t>One complete map, with audio</a:t>
             </a:r>
-            <a:r>
-              <a:rPr lang="en-US"/>
-              <a:t>with audio</a:t>
-            </a:r>
-            <a:endParaRPr lang="en-US" dirty="0"/>
           </a:p>
           <a:p>
             <a:r>
@@ -14635,8 +17104,31 @@
             <a:pPr lvl="1"/>
             <a:r>
               <a:rPr lang="en-US" dirty="0"/>
-              <a:t>Gun, launcher, close range</a:t>
+              <a:t>Gun, launcher, close </a:t>
             </a:r>
+            <a:r>
+              <a:rPr lang="en-US" dirty="0" smtClean="0"/>
+              <a:t>range</a:t>
+            </a:r>
+          </a:p>
+          <a:p>
+            <a:r>
+              <a:rPr lang="en-US" dirty="0" smtClean="0"/>
+              <a:t>Destructible terrain</a:t>
+            </a:r>
+          </a:p>
+          <a:p>
+            <a:r>
+              <a:rPr lang="en-US" dirty="0" smtClean="0"/>
+              <a:t>Player Movement animations</a:t>
+            </a:r>
+          </a:p>
+          <a:p>
+            <a:r>
+              <a:rPr lang="en-US" dirty="0" smtClean="0"/>
+              <a:t>Explosion effects</a:t>
+            </a:r>
+            <a:endParaRPr lang="en-US" dirty="0"/>
           </a:p>
           <a:p>
             <a:pPr lvl="1"/>
@@ -14648,6 +17140,159 @@
           </a:p>
         </p:txBody>
       </p:sp>
+      <p:pic>
+        <p:nvPicPr>
+          <p:cNvPr id="4" name="Picture 3">
+            <a:extLst>
+              <a:ext uri="{FF2B5EF4-FFF2-40B4-BE49-F238E27FC236}">
+                <a16:creationId xmlns:a16="http://schemas.microsoft.com/office/drawing/2014/main" xmlns="" id="{8067D712-B97B-489F-93C0-EFC22B0553A6}"/>
+              </a:ext>
+            </a:extLst>
+          </p:cNvPr>
+          <p:cNvPicPr>
+            <a:picLocks noChangeAspect="1"/>
+          </p:cNvPicPr>
+          <p:nvPr/>
+        </p:nvPicPr>
+        <p:blipFill rotWithShape="1">
+          <a:blip r:embed="rId2"/>
+          <a:srcRect r="32041"/>
+          <a:stretch/>
+        </p:blipFill>
+        <p:spPr>
+          <a:xfrm flipH="1">
+            <a:off x="8895805" y="763649"/>
+            <a:ext cx="1548871" cy="1127002"/>
+          </a:xfrm>
+          <a:prstGeom prst="rect">
+            <a:avLst/>
+          </a:prstGeom>
+        </p:spPr>
+      </p:pic>
+      <p:pic>
+        <p:nvPicPr>
+          <p:cNvPr id="5" name="Picture 4" descr="Related image"/>
+          <p:cNvPicPr>
+            <a:picLocks noChangeAspect="1" noChangeArrowheads="1"/>
+          </p:cNvPicPr>
+          <p:nvPr/>
+        </p:nvPicPr>
+        <p:blipFill>
+          <a:blip r:embed="rId3">
+            <a:clrChange>
+              <a:clrFrom>
+                <a:srgbClr val="F7F7FF"/>
+              </a:clrFrom>
+              <a:clrTo>
+                <a:srgbClr val="F7F7FF">
+                  <a:alpha val="0"/>
+                </a:srgbClr>
+              </a:clrTo>
+            </a:clrChange>
+            <a:extLst>
+              <a:ext uri="{28A0092B-C50C-407E-A947-70E740481C1C}">
+                <a14:useLocalDpi xmlns:a14="http://schemas.microsoft.com/office/drawing/2010/main" val="0"/>
+              </a:ext>
+            </a:extLst>
+          </a:blip>
+          <a:srcRect/>
+          <a:stretch>
+            <a:fillRect/>
+          </a:stretch>
+        </p:blipFill>
+        <p:spPr bwMode="auto">
+          <a:xfrm>
+            <a:off x="8283623" y="2393481"/>
+            <a:ext cx="3393979" cy="1586267"/>
+          </a:xfrm>
+          <a:prstGeom prst="rect">
+            <a:avLst/>
+          </a:prstGeom>
+          <a:noFill/>
+          <a:extLst>
+            <a:ext uri="{909E8E84-426E-40DD-AFC4-6F175D3DCCD1}">
+              <a14:hiddenFill xmlns:a14="http://schemas.microsoft.com/office/drawing/2010/main">
+                <a:solidFill>
+                  <a:srgbClr val="FFFFFF"/>
+                </a:solidFill>
+              </a14:hiddenFill>
+            </a:ext>
+          </a:extLst>
+        </p:spPr>
+      </p:pic>
+      <p:grpSp>
+        <p:nvGrpSpPr>
+          <p:cNvPr id="6" name="Group 5"/>
+          <p:cNvGrpSpPr/>
+          <p:nvPr/>
+        </p:nvGrpSpPr>
+        <p:grpSpPr>
+          <a:xfrm>
+            <a:off x="8623075" y="2228381"/>
+            <a:ext cx="2844915" cy="1231184"/>
+            <a:chOff x="8242300" y="4237083"/>
+            <a:chExt cx="2844915" cy="1231184"/>
+          </a:xfrm>
+        </p:grpSpPr>
+        <p:pic>
+          <p:nvPicPr>
+            <p:cNvPr id="7" name="Picture 6">
+              <a:extLst>
+                <a:ext uri="{FF2B5EF4-FFF2-40B4-BE49-F238E27FC236}">
+                  <a16:creationId xmlns:a16="http://schemas.microsoft.com/office/drawing/2014/main" xmlns="" id="{8067D712-B97B-489F-93C0-EFC22B0553A6}"/>
+                </a:ext>
+              </a:extLst>
+            </p:cNvPr>
+            <p:cNvPicPr>
+              <a:picLocks noChangeAspect="1"/>
+            </p:cNvPicPr>
+            <p:nvPr/>
+          </p:nvPicPr>
+          <p:blipFill rotWithShape="1">
+            <a:blip r:embed="rId2"/>
+            <a:srcRect r="32041"/>
+            <a:stretch/>
+          </p:blipFill>
+          <p:spPr>
+            <a:xfrm rot="1676086" flipH="1">
+              <a:off x="9538344" y="4341265"/>
+              <a:ext cx="1548871" cy="1127002"/>
+            </a:xfrm>
+            <a:prstGeom prst="rect">
+              <a:avLst/>
+            </a:prstGeom>
+          </p:spPr>
+        </p:pic>
+        <p:pic>
+          <p:nvPicPr>
+            <p:cNvPr id="8" name="Picture 7">
+              <a:extLst>
+                <a:ext uri="{FF2B5EF4-FFF2-40B4-BE49-F238E27FC236}">
+                  <a16:creationId xmlns:a16="http://schemas.microsoft.com/office/drawing/2014/main" xmlns="" id="{8067D712-B97B-489F-93C0-EFC22B0553A6}"/>
+                </a:ext>
+              </a:extLst>
+            </p:cNvPr>
+            <p:cNvPicPr>
+              <a:picLocks noChangeAspect="1"/>
+            </p:cNvPicPr>
+            <p:nvPr/>
+          </p:nvPicPr>
+          <p:blipFill rotWithShape="1">
+            <a:blip r:embed="rId2"/>
+            <a:srcRect r="32041"/>
+            <a:stretch/>
+          </p:blipFill>
+          <p:spPr>
+            <a:xfrm flipH="1">
+              <a:off x="8242300" y="4237083"/>
+              <a:ext cx="1675036" cy="1218803"/>
+            </a:xfrm>
+            <a:prstGeom prst="rect">
+              <a:avLst/>
+            </a:prstGeom>
+          </p:spPr>
+        </p:pic>
+      </p:grpSp>
     </p:spTree>
     <p:extLst>
       <p:ext uri="{BB962C8B-B14F-4D97-AF65-F5344CB8AC3E}">
@@ -14658,6 +17303,13 @@
   <p:clrMapOvr>
     <a:masterClrMapping/>
   </p:clrMapOvr>
+  <p:timing>
+    <p:tnLst>
+      <p:par>
+        <p:cTn id="1" dur="indefinite" restart="never" nodeType="tmRoot"/>
+      </p:par>
+    </p:tnLst>
+  </p:timing>
 </p:sld>
 </file>
 
@@ -14707,10 +17359,10 @@
           <p:cNvPr id="8" name="Group 7">
             <a:extLst>
               <a:ext uri="{FF2B5EF4-FFF2-40B4-BE49-F238E27FC236}">
-                <a16:creationId xmlns:a16="http://schemas.microsoft.com/office/drawing/2014/main" id="{93E10248-AF0E-477D-B4D2-47C02CE4E353}"/>
+                <a16:creationId xmlns:a16="http://schemas.microsoft.com/office/drawing/2014/main" xmlns="" id="{93E10248-AF0E-477D-B4D2-47C02CE4E353}"/>
               </a:ext>
               <a:ext uri="{C183D7F6-B498-43B3-948B-1728B52AA6E4}">
-                <adec:decorative xmlns:adec="http://schemas.microsoft.com/office/drawing/2017/decorative" val="1"/>
+                <adec:decorative xmlns:adec="http://schemas.microsoft.com/office/drawing/2017/decorative" xmlns="" val="1"/>
               </a:ext>
             </a:extLst>
           </p:cNvPr>
@@ -14720,7 +17372,7 @@
           <p:nvPr>
             <p:extLst>
               <p:ext uri="{386F3935-93C4-4BCD-93E2-E3B085C9AB24}">
-                <p16:designElem xmlns:p16="http://schemas.microsoft.com/office/powerpoint/2015/main" val="1"/>
+                <p16:designElem xmlns:p16="http://schemas.microsoft.com/office/powerpoint/2015/main" xmlns="" val="1"/>
               </p:ext>
             </p:extLst>
           </p:nvPr>
@@ -14738,10 +17390,10 @@
             <p:cNvPr id="9" name="Rectangle 8">
               <a:extLst>
                 <a:ext uri="{FF2B5EF4-FFF2-40B4-BE49-F238E27FC236}">
-                  <a16:creationId xmlns:a16="http://schemas.microsoft.com/office/drawing/2014/main" id="{533010C2-2DA5-460F-A40C-5317F567A03E}"/>
+                  <a16:creationId xmlns:a16="http://schemas.microsoft.com/office/drawing/2014/main" xmlns="" id="{533010C2-2DA5-460F-A40C-5317F567A03E}"/>
                 </a:ext>
                 <a:ext uri="{C183D7F6-B498-43B3-948B-1728B52AA6E4}">
-                  <adec:decorative xmlns:adec="http://schemas.microsoft.com/office/drawing/2017/decorative" val="1"/>
+                  <adec:decorative xmlns:adec="http://schemas.microsoft.com/office/drawing/2017/decorative" xmlns="" val="1"/>
                 </a:ext>
               </a:extLst>
             </p:cNvPr>
@@ -14749,7 +17401,7 @@
             <p:nvPr>
               <p:extLst>
                 <p:ext uri="{386F3935-93C4-4BCD-93E2-E3B085C9AB24}">
-                  <p16:designElem xmlns:p16="http://schemas.microsoft.com/office/powerpoint/2015/main" val="1"/>
+                  <p16:designElem xmlns:p16="http://schemas.microsoft.com/office/powerpoint/2015/main" xmlns="" val="1"/>
                 </p:ext>
               </p:extLst>
             </p:nvPr>
@@ -14808,10 +17460,10 @@
             <p:cNvPr id="10" name="Freeform 5">
               <a:extLst>
                 <a:ext uri="{FF2B5EF4-FFF2-40B4-BE49-F238E27FC236}">
-                  <a16:creationId xmlns:a16="http://schemas.microsoft.com/office/drawing/2014/main" id="{17CB0634-F963-4EC9-A6F6-8EA46BD1F103}"/>
+                  <a16:creationId xmlns:a16="http://schemas.microsoft.com/office/drawing/2014/main" xmlns="" id="{17CB0634-F963-4EC9-A6F6-8EA46BD1F103}"/>
                 </a:ext>
                 <a:ext uri="{C183D7F6-B498-43B3-948B-1728B52AA6E4}">
-                  <adec:decorative xmlns:adec="http://schemas.microsoft.com/office/drawing/2017/decorative" val="1"/>
+                  <adec:decorative xmlns:adec="http://schemas.microsoft.com/office/drawing/2017/decorative" xmlns="" val="1"/>
                 </a:ext>
               </a:extLst>
             </p:cNvPr>
@@ -14821,7 +17473,7 @@
             <p:nvPr>
               <p:extLst>
                 <p:ext uri="{386F3935-93C4-4BCD-93E2-E3B085C9AB24}">
-                  <p16:designElem xmlns:p16="http://schemas.microsoft.com/office/powerpoint/2015/main" val="1"/>
+                  <p16:designElem xmlns:p16="http://schemas.microsoft.com/office/powerpoint/2015/main" xmlns="" val="1"/>
                 </p:ext>
               </p:extLst>
             </p:nvPr>
@@ -14888,10 +17540,10 @@
           <p:cNvPr id="12" name="Rectangle 11">
             <a:extLst>
               <a:ext uri="{FF2B5EF4-FFF2-40B4-BE49-F238E27FC236}">
-                <a16:creationId xmlns:a16="http://schemas.microsoft.com/office/drawing/2014/main" id="{73C0A186-7444-4460-9C37-532E7671E99E}"/>
+                <a16:creationId xmlns:a16="http://schemas.microsoft.com/office/drawing/2014/main" xmlns="" id="{73C0A186-7444-4460-9C37-532E7671E99E}"/>
               </a:ext>
               <a:ext uri="{C183D7F6-B498-43B3-948B-1728B52AA6E4}">
-                <adec:decorative xmlns:adec="http://schemas.microsoft.com/office/drawing/2017/decorative" val="1"/>
+                <adec:decorative xmlns:adec="http://schemas.microsoft.com/office/drawing/2017/decorative" xmlns="" val="1"/>
               </a:ext>
             </a:extLst>
           </p:cNvPr>
@@ -14901,7 +17553,7 @@
           <p:nvPr>
             <p:extLst>
               <p:ext uri="{386F3935-93C4-4BCD-93E2-E3B085C9AB24}">
-                <p16:designElem xmlns:p16="http://schemas.microsoft.com/office/powerpoint/2015/main" val="1"/>
+                <p16:designElem xmlns:p16="http://schemas.microsoft.com/office/powerpoint/2015/main" xmlns="" val="1"/>
               </p:ext>
             </p:extLst>
           </p:nvPr>
@@ -14941,10 +17593,10 @@
           <p:cNvPr id="14" name="Group 13">
             <a:extLst>
               <a:ext uri="{FF2B5EF4-FFF2-40B4-BE49-F238E27FC236}">
-                <a16:creationId xmlns:a16="http://schemas.microsoft.com/office/drawing/2014/main" id="{F1ECA4FE-7D2F-4576-B767-3A5F5ABFE90F}"/>
+                <a16:creationId xmlns:a16="http://schemas.microsoft.com/office/drawing/2014/main" xmlns="" id="{F1ECA4FE-7D2F-4576-B767-3A5F5ABFE90F}"/>
               </a:ext>
               <a:ext uri="{C183D7F6-B498-43B3-948B-1728B52AA6E4}">
-                <adec:decorative xmlns:adec="http://schemas.microsoft.com/office/drawing/2017/decorative" val="1"/>
+                <adec:decorative xmlns:adec="http://schemas.microsoft.com/office/drawing/2017/decorative" xmlns="" val="1"/>
               </a:ext>
             </a:extLst>
           </p:cNvPr>
@@ -14954,17 +17606,17 @@
           <p:nvPr>
             <p:extLst>
               <p:ext uri="{386F3935-93C4-4BCD-93E2-E3B085C9AB24}">
-                <p16:designElem xmlns:p16="http://schemas.microsoft.com/office/powerpoint/2015/main" val="1"/>
+                <p16:designElem xmlns:p16="http://schemas.microsoft.com/office/powerpoint/2015/main" xmlns="" val="1"/>
               </p:ext>
             </p:extLst>
           </p:nvPr>
         </p:nvGrpSpPr>
         <p:grpSpPr>
           <a:xfrm>
-            <a:off x="0" y="0"/>
-            <a:ext cx="12192000" cy="6858000"/>
-            <a:chOff x="0" y="0"/>
-            <a:chExt cx="12192000" cy="6858000"/>
+            <a:off x="0" y="-26126"/>
+            <a:ext cx="12192000" cy="6884126"/>
+            <a:chOff x="0" y="-26126"/>
+            <a:chExt cx="12192000" cy="6884126"/>
           </a:xfrm>
         </p:grpSpPr>
         <p:sp useBgFill="1">
@@ -14972,10 +17624,10 @@
             <p:cNvPr id="15" name="Rectangle 14">
               <a:extLst>
                 <a:ext uri="{FF2B5EF4-FFF2-40B4-BE49-F238E27FC236}">
-                  <a16:creationId xmlns:a16="http://schemas.microsoft.com/office/drawing/2014/main" id="{5969441E-5462-4859-86CD-1737FDE36046}"/>
+                  <a16:creationId xmlns:a16="http://schemas.microsoft.com/office/drawing/2014/main" xmlns="" id="{5969441E-5462-4859-86CD-1737FDE36046}"/>
                 </a:ext>
                 <a:ext uri="{C183D7F6-B498-43B3-948B-1728B52AA6E4}">
-                  <adec:decorative xmlns:adec="http://schemas.microsoft.com/office/drawing/2017/decorative" val="1"/>
+                  <adec:decorative xmlns:adec="http://schemas.microsoft.com/office/drawing/2017/decorative" xmlns="" val="1"/>
                 </a:ext>
               </a:extLst>
             </p:cNvPr>
@@ -14983,14 +17635,14 @@
             <p:nvPr>
               <p:extLst>
                 <p:ext uri="{386F3935-93C4-4BCD-93E2-E3B085C9AB24}">
-                  <p16:designElem xmlns:p16="http://schemas.microsoft.com/office/powerpoint/2015/main" val="1"/>
+                  <p16:designElem xmlns:p16="http://schemas.microsoft.com/office/powerpoint/2015/main" xmlns="" val="1"/>
                 </p:ext>
               </p:extLst>
             </p:nvPr>
           </p:nvSpPr>
           <p:spPr>
             <a:xfrm>
-              <a:off x="0" y="0"/>
+              <a:off x="0" y="-26126"/>
               <a:ext cx="12192000" cy="6858000"/>
             </a:xfrm>
             <a:prstGeom prst="rect">
@@ -15022,10 +17674,10 @@
             <p:cNvPr id="16" name="Freeform 5">
               <a:extLst>
                 <a:ext uri="{FF2B5EF4-FFF2-40B4-BE49-F238E27FC236}">
-                  <a16:creationId xmlns:a16="http://schemas.microsoft.com/office/drawing/2014/main" id="{596BD4B5-6833-40CC-96FE-EDC675634264}"/>
+                  <a16:creationId xmlns:a16="http://schemas.microsoft.com/office/drawing/2014/main" xmlns="" id="{596BD4B5-6833-40CC-96FE-EDC675634264}"/>
                 </a:ext>
                 <a:ext uri="{C183D7F6-B498-43B3-948B-1728B52AA6E4}">
-                  <adec:decorative xmlns:adec="http://schemas.microsoft.com/office/drawing/2017/decorative" val="1"/>
+                  <adec:decorative xmlns:adec="http://schemas.microsoft.com/office/drawing/2017/decorative" xmlns="" val="1"/>
                 </a:ext>
               </a:extLst>
             </p:cNvPr>
@@ -15035,7 +17687,7 @@
             <p:nvPr>
               <p:extLst>
                 <p:ext uri="{386F3935-93C4-4BCD-93E2-E3B085C9AB24}">
-                  <p16:designElem xmlns:p16="http://schemas.microsoft.com/office/powerpoint/2015/main" val="1"/>
+                  <p16:designElem xmlns:p16="http://schemas.microsoft.com/office/powerpoint/2015/main" xmlns="" val="1"/>
                 </p:ext>
               </p:extLst>
             </p:nvPr>
@@ -15102,7 +17754,7 @@
           <p:cNvPr id="2" name="Title 1">
             <a:extLst>
               <a:ext uri="{FF2B5EF4-FFF2-40B4-BE49-F238E27FC236}">
-                <a16:creationId xmlns:a16="http://schemas.microsoft.com/office/drawing/2014/main" id="{D0DEBAF0-9320-4AAA-ACC8-9C26D550CA87}"/>
+                <a16:creationId xmlns:a16="http://schemas.microsoft.com/office/drawing/2014/main" xmlns="" id="{D0DEBAF0-9320-4AAA-ACC8-9C26D550CA87}"/>
               </a:ext>
             </a:extLst>
           </p:cNvPr>
@@ -15142,10 +17794,10 @@
           <p:cNvPr id="18" name="Straight Connector 17">
             <a:extLst>
               <a:ext uri="{FF2B5EF4-FFF2-40B4-BE49-F238E27FC236}">
-                <a16:creationId xmlns:a16="http://schemas.microsoft.com/office/drawing/2014/main" id="{E81F53E2-F556-42FA-8D24-113839EE19F8}"/>
+                <a16:creationId xmlns:a16="http://schemas.microsoft.com/office/drawing/2014/main" xmlns="" id="{E81F53E2-F556-42FA-8D24-113839EE19F8}"/>
               </a:ext>
               <a:ext uri="{C183D7F6-B498-43B3-948B-1728B52AA6E4}">
-                <adec:decorative xmlns:adec="http://schemas.microsoft.com/office/drawing/2017/decorative" val="1"/>
+                <adec:decorative xmlns:adec="http://schemas.microsoft.com/office/drawing/2017/decorative" xmlns="" val="1"/>
               </a:ext>
             </a:extLst>
           </p:cNvPr>
@@ -15155,7 +17807,7 @@
           <p:nvPr>
             <p:extLst>
               <p:ext uri="{386F3935-93C4-4BCD-93E2-E3B085C9AB24}">
-                <p16:designElem xmlns:p16="http://schemas.microsoft.com/office/powerpoint/2015/main" val="1"/>
+                <p16:designElem xmlns:p16="http://schemas.microsoft.com/office/powerpoint/2015/main" xmlns="" val="1"/>
               </p:ext>
             </p:extLst>
           </p:nvPr>
@@ -15189,6 +17841,312 @@
           </a:fontRef>
         </p:style>
       </p:cxnSp>
+      <p:pic>
+        <p:nvPicPr>
+          <p:cNvPr id="11" name="Picture 10">
+            <a:extLst>
+              <a:ext uri="{FF2B5EF4-FFF2-40B4-BE49-F238E27FC236}">
+                <a16:creationId xmlns:a16="http://schemas.microsoft.com/office/drawing/2014/main" xmlns="" id="{8067D712-B97B-489F-93C0-EFC22B0553A6}"/>
+              </a:ext>
+            </a:extLst>
+          </p:cNvPr>
+          <p:cNvPicPr>
+            <a:picLocks noChangeAspect="1"/>
+          </p:cNvPicPr>
+          <p:nvPr/>
+        </p:nvPicPr>
+        <p:blipFill rotWithShape="1">
+          <a:blip r:embed="rId3"/>
+          <a:srcRect r="32041"/>
+          <a:stretch/>
+        </p:blipFill>
+        <p:spPr>
+          <a:xfrm>
+            <a:off x="8334103" y="2945150"/>
+            <a:ext cx="1548871" cy="1127002"/>
+          </a:xfrm>
+          <a:prstGeom prst="rect">
+            <a:avLst/>
+          </a:prstGeom>
+        </p:spPr>
+      </p:pic>
+      <p:pic>
+        <p:nvPicPr>
+          <p:cNvPr id="13" name="Picture 12">
+            <a:extLst>
+              <a:ext uri="{FF2B5EF4-FFF2-40B4-BE49-F238E27FC236}">
+                <a16:creationId xmlns:a16="http://schemas.microsoft.com/office/drawing/2014/main" xmlns="" id="{8067D712-B97B-489F-93C0-EFC22B0553A6}"/>
+              </a:ext>
+            </a:extLst>
+          </p:cNvPr>
+          <p:cNvPicPr>
+            <a:picLocks noChangeAspect="1"/>
+          </p:cNvPicPr>
+          <p:nvPr/>
+        </p:nvPicPr>
+        <p:blipFill rotWithShape="1">
+          <a:blip r:embed="rId3"/>
+          <a:srcRect r="32041"/>
+          <a:stretch/>
+        </p:blipFill>
+        <p:spPr>
+          <a:xfrm flipH="1">
+            <a:off x="2281350" y="2945150"/>
+            <a:ext cx="1548871" cy="1127002"/>
+          </a:xfrm>
+          <a:prstGeom prst="rect">
+            <a:avLst/>
+          </a:prstGeom>
+        </p:spPr>
+      </p:pic>
+      <p:pic>
+        <p:nvPicPr>
+          <p:cNvPr id="17" name="Picture 16" descr="Related image"/>
+          <p:cNvPicPr>
+            <a:picLocks noChangeAspect="1" noChangeArrowheads="1"/>
+          </p:cNvPicPr>
+          <p:nvPr/>
+        </p:nvPicPr>
+        <p:blipFill>
+          <a:blip r:embed="rId4">
+            <a:clrChange>
+              <a:clrFrom>
+                <a:srgbClr val="F7F7FF"/>
+              </a:clrFrom>
+              <a:clrTo>
+                <a:srgbClr val="F7F7FF">
+                  <a:alpha val="0"/>
+                </a:srgbClr>
+              </a:clrTo>
+            </a:clrChange>
+            <a:extLst>
+              <a:ext uri="{28A0092B-C50C-407E-A947-70E740481C1C}">
+                <a14:useLocalDpi xmlns:a14="http://schemas.microsoft.com/office/drawing/2010/main" val="0"/>
+              </a:ext>
+            </a:extLst>
+          </a:blip>
+          <a:srcRect/>
+          <a:stretch>
+            <a:fillRect/>
+          </a:stretch>
+        </p:blipFill>
+        <p:spPr bwMode="auto">
+          <a:xfrm>
+            <a:off x="6661223" y="4485219"/>
+            <a:ext cx="3393979" cy="1586267"/>
+          </a:xfrm>
+          <a:prstGeom prst="rect">
+            <a:avLst/>
+          </a:prstGeom>
+          <a:noFill/>
+          <a:extLst>
+            <a:ext uri="{909E8E84-426E-40DD-AFC4-6F175D3DCCD1}">
+              <a14:hiddenFill xmlns:a14="http://schemas.microsoft.com/office/drawing/2010/main">
+                <a:solidFill>
+                  <a:srgbClr val="FFFFFF"/>
+                </a:solidFill>
+              </a14:hiddenFill>
+            </a:ext>
+          </a:extLst>
+        </p:spPr>
+      </p:pic>
+      <p:grpSp>
+        <p:nvGrpSpPr>
+          <p:cNvPr id="19" name="Group 18"/>
+          <p:cNvGrpSpPr/>
+          <p:nvPr/>
+        </p:nvGrpSpPr>
+        <p:grpSpPr>
+          <a:xfrm>
+            <a:off x="7000675" y="4320119"/>
+            <a:ext cx="2844915" cy="1231184"/>
+            <a:chOff x="8242300" y="4237083"/>
+            <a:chExt cx="2844915" cy="1231184"/>
+          </a:xfrm>
+        </p:grpSpPr>
+        <p:pic>
+          <p:nvPicPr>
+            <p:cNvPr id="20" name="Picture 19">
+              <a:extLst>
+                <a:ext uri="{FF2B5EF4-FFF2-40B4-BE49-F238E27FC236}">
+                  <a16:creationId xmlns:a16="http://schemas.microsoft.com/office/drawing/2014/main" xmlns="" id="{8067D712-B97B-489F-93C0-EFC22B0553A6}"/>
+                </a:ext>
+              </a:extLst>
+            </p:cNvPr>
+            <p:cNvPicPr>
+              <a:picLocks noChangeAspect="1"/>
+            </p:cNvPicPr>
+            <p:nvPr/>
+          </p:nvPicPr>
+          <p:blipFill rotWithShape="1">
+            <a:blip r:embed="rId3"/>
+            <a:srcRect r="32041"/>
+            <a:stretch/>
+          </p:blipFill>
+          <p:spPr>
+            <a:xfrm rot="1676086" flipH="1">
+              <a:off x="9538344" y="4341265"/>
+              <a:ext cx="1548871" cy="1127002"/>
+            </a:xfrm>
+            <a:prstGeom prst="rect">
+              <a:avLst/>
+            </a:prstGeom>
+          </p:spPr>
+        </p:pic>
+        <p:pic>
+          <p:nvPicPr>
+            <p:cNvPr id="21" name="Picture 20">
+              <a:extLst>
+                <a:ext uri="{FF2B5EF4-FFF2-40B4-BE49-F238E27FC236}">
+                  <a16:creationId xmlns:a16="http://schemas.microsoft.com/office/drawing/2014/main" xmlns="" id="{8067D712-B97B-489F-93C0-EFC22B0553A6}"/>
+                </a:ext>
+              </a:extLst>
+            </p:cNvPr>
+            <p:cNvPicPr>
+              <a:picLocks noChangeAspect="1"/>
+            </p:cNvPicPr>
+            <p:nvPr/>
+          </p:nvPicPr>
+          <p:blipFill rotWithShape="1">
+            <a:blip r:embed="rId3"/>
+            <a:srcRect r="32041"/>
+            <a:stretch/>
+          </p:blipFill>
+          <p:spPr>
+            <a:xfrm flipH="1">
+              <a:off x="8242300" y="4237083"/>
+              <a:ext cx="1675036" cy="1218803"/>
+            </a:xfrm>
+            <a:prstGeom prst="rect">
+              <a:avLst/>
+            </a:prstGeom>
+          </p:spPr>
+        </p:pic>
+      </p:grpSp>
+      <p:pic>
+        <p:nvPicPr>
+          <p:cNvPr id="22" name="Picture 21" descr="Related image"/>
+          <p:cNvPicPr>
+            <a:picLocks noChangeAspect="1" noChangeArrowheads="1"/>
+          </p:cNvPicPr>
+          <p:nvPr/>
+        </p:nvPicPr>
+        <p:blipFill>
+          <a:blip r:embed="rId4">
+            <a:clrChange>
+              <a:clrFrom>
+                <a:srgbClr val="F7F7FF"/>
+              </a:clrFrom>
+              <a:clrTo>
+                <a:srgbClr val="F7F7FF">
+                  <a:alpha val="0"/>
+                </a:srgbClr>
+              </a:clrTo>
+            </a:clrChange>
+            <a:extLst>
+              <a:ext uri="{28A0092B-C50C-407E-A947-70E740481C1C}">
+                <a14:useLocalDpi xmlns:a14="http://schemas.microsoft.com/office/drawing/2010/main" val="0"/>
+              </a:ext>
+            </a:extLst>
+          </a:blip>
+          <a:srcRect/>
+          <a:stretch>
+            <a:fillRect/>
+          </a:stretch>
+        </p:blipFill>
+        <p:spPr bwMode="auto">
+          <a:xfrm flipH="1">
+            <a:off x="2133231" y="4576329"/>
+            <a:ext cx="3393979" cy="1586267"/>
+          </a:xfrm>
+          <a:prstGeom prst="rect">
+            <a:avLst/>
+          </a:prstGeom>
+          <a:noFill/>
+          <a:extLst>
+            <a:ext uri="{909E8E84-426E-40DD-AFC4-6F175D3DCCD1}">
+              <a14:hiddenFill xmlns:a14="http://schemas.microsoft.com/office/drawing/2010/main">
+                <a:solidFill>
+                  <a:srgbClr val="FFFFFF"/>
+                </a:solidFill>
+              </a14:hiddenFill>
+            </a:ext>
+          </a:extLst>
+        </p:spPr>
+      </p:pic>
+      <p:grpSp>
+        <p:nvGrpSpPr>
+          <p:cNvPr id="23" name="Group 22"/>
+          <p:cNvGrpSpPr/>
+          <p:nvPr/>
+        </p:nvGrpSpPr>
+        <p:grpSpPr>
+          <a:xfrm flipH="1">
+            <a:off x="2346170" y="4372210"/>
+            <a:ext cx="2844915" cy="1231184"/>
+            <a:chOff x="8242300" y="4237083"/>
+            <a:chExt cx="2844915" cy="1231184"/>
+          </a:xfrm>
+        </p:grpSpPr>
+        <p:pic>
+          <p:nvPicPr>
+            <p:cNvPr id="24" name="Picture 23">
+              <a:extLst>
+                <a:ext uri="{FF2B5EF4-FFF2-40B4-BE49-F238E27FC236}">
+                  <a16:creationId xmlns:a16="http://schemas.microsoft.com/office/drawing/2014/main" xmlns="" id="{8067D712-B97B-489F-93C0-EFC22B0553A6}"/>
+                </a:ext>
+              </a:extLst>
+            </p:cNvPr>
+            <p:cNvPicPr>
+              <a:picLocks noChangeAspect="1"/>
+            </p:cNvPicPr>
+            <p:nvPr/>
+          </p:nvPicPr>
+          <p:blipFill rotWithShape="1">
+            <a:blip r:embed="rId3"/>
+            <a:srcRect r="32041"/>
+            <a:stretch/>
+          </p:blipFill>
+          <p:spPr>
+            <a:xfrm rot="1676086" flipH="1">
+              <a:off x="9538344" y="4341265"/>
+              <a:ext cx="1548871" cy="1127002"/>
+            </a:xfrm>
+            <a:prstGeom prst="rect">
+              <a:avLst/>
+            </a:prstGeom>
+          </p:spPr>
+        </p:pic>
+        <p:pic>
+          <p:nvPicPr>
+            <p:cNvPr id="25" name="Picture 24">
+              <a:extLst>
+                <a:ext uri="{FF2B5EF4-FFF2-40B4-BE49-F238E27FC236}">
+                  <a16:creationId xmlns:a16="http://schemas.microsoft.com/office/drawing/2014/main" xmlns="" id="{8067D712-B97B-489F-93C0-EFC22B0553A6}"/>
+                </a:ext>
+              </a:extLst>
+            </p:cNvPr>
+            <p:cNvPicPr>
+              <a:picLocks noChangeAspect="1"/>
+            </p:cNvPicPr>
+            <p:nvPr/>
+          </p:nvPicPr>
+          <p:blipFill rotWithShape="1">
+            <a:blip r:embed="rId3"/>
+            <a:srcRect r="32041"/>
+            <a:stretch/>
+          </p:blipFill>
+          <p:spPr>
+            <a:xfrm flipH="1">
+              <a:off x="8242300" y="4237083"/>
+              <a:ext cx="1675036" cy="1218803"/>
+            </a:xfrm>
+            <a:prstGeom prst="rect">
+              <a:avLst/>
+            </a:prstGeom>
+          </p:spPr>
+        </p:pic>
+      </p:grpSp>
     </p:spTree>
     <p:extLst>
       <p:ext uri="{BB962C8B-B14F-4D97-AF65-F5344CB8AC3E}">
@@ -15199,6 +18157,203 @@
   <p:clrMapOvr>
     <a:overrideClrMapping bg1="dk1" tx1="lt1" bg2="dk2" tx2="lt2" accent1="accent1" accent2="accent2" accent3="accent3" accent4="accent4" accent5="accent5" accent6="accent6" hlink="hlink" folHlink="folHlink"/>
   </p:clrMapOvr>
+  <p:timing>
+    <p:tnLst>
+      <p:par>
+        <p:cTn id="1" dur="indefinite" restart="never" nodeType="tmRoot">
+          <p:childTnLst>
+            <p:seq concurrent="1" nextAc="seek">
+              <p:cTn id="2" dur="indefinite" nodeType="mainSeq">
+                <p:childTnLst>
+                  <p:par>
+                    <p:cTn id="3" fill="hold">
+                      <p:stCondLst>
+                        <p:cond delay="indefinite"/>
+                        <p:cond evt="onBegin" delay="0">
+                          <p:tn val="2"/>
+                        </p:cond>
+                      </p:stCondLst>
+                      <p:childTnLst>
+                        <p:par>
+                          <p:cTn id="4" fill="hold">
+                            <p:stCondLst>
+                              <p:cond delay="0"/>
+                            </p:stCondLst>
+                            <p:childTnLst>
+                              <p:par>
+                                <p:cTn id="5" presetID="2" presetClass="entr" presetSubtype="4" fill="hold" nodeType="withEffect">
+                                  <p:stCondLst>
+                                    <p:cond delay="0"/>
+                                  </p:stCondLst>
+                                  <p:childTnLst>
+                                    <p:set>
+                                      <p:cBhvr>
+                                        <p:cTn id="6" dur="1" fill="hold">
+                                          <p:stCondLst>
+                                            <p:cond delay="0"/>
+                                          </p:stCondLst>
+                                        </p:cTn>
+                                        <p:tgtEl>
+                                          <p:spTgt spid="19"/>
+                                        </p:tgtEl>
+                                        <p:attrNameLst>
+                                          <p:attrName>style.visibility</p:attrName>
+                                        </p:attrNameLst>
+                                      </p:cBhvr>
+                                      <p:to>
+                                        <p:strVal val="visible"/>
+                                      </p:to>
+                                    </p:set>
+                                    <p:anim calcmode="lin" valueType="num">
+                                      <p:cBhvr additive="base">
+                                        <p:cTn id="7" dur="500" fill="hold"/>
+                                        <p:tgtEl>
+                                          <p:spTgt spid="19"/>
+                                        </p:tgtEl>
+                                        <p:attrNameLst>
+                                          <p:attrName>ppt_x</p:attrName>
+                                        </p:attrNameLst>
+                                      </p:cBhvr>
+                                      <p:tavLst>
+                                        <p:tav tm="0">
+                                          <p:val>
+                                            <p:strVal val="#ppt_x"/>
+                                          </p:val>
+                                        </p:tav>
+                                        <p:tav tm="100000">
+                                          <p:val>
+                                            <p:strVal val="#ppt_x"/>
+                                          </p:val>
+                                        </p:tav>
+                                      </p:tavLst>
+                                    </p:anim>
+                                    <p:anim calcmode="lin" valueType="num">
+                                      <p:cBhvr additive="base">
+                                        <p:cTn id="8" dur="500" fill="hold"/>
+                                        <p:tgtEl>
+                                          <p:spTgt spid="19"/>
+                                        </p:tgtEl>
+                                        <p:attrNameLst>
+                                          <p:attrName>ppt_y</p:attrName>
+                                        </p:attrNameLst>
+                                      </p:cBhvr>
+                                      <p:tavLst>
+                                        <p:tav tm="0">
+                                          <p:val>
+                                            <p:strVal val="1+#ppt_h/2"/>
+                                          </p:val>
+                                        </p:tav>
+                                        <p:tav tm="100000">
+                                          <p:val>
+                                            <p:strVal val="#ppt_y"/>
+                                          </p:val>
+                                        </p:tav>
+                                      </p:tavLst>
+                                    </p:anim>
+                                  </p:childTnLst>
+                                </p:cTn>
+                              </p:par>
+                              <p:par>
+                                <p:cTn id="9" presetID="2" presetClass="entr" presetSubtype="4" fill="hold" nodeType="withEffect">
+                                  <p:stCondLst>
+                                    <p:cond delay="0"/>
+                                  </p:stCondLst>
+                                  <p:childTnLst>
+                                    <p:set>
+                                      <p:cBhvr>
+                                        <p:cTn id="10" dur="1" fill="hold">
+                                          <p:stCondLst>
+                                            <p:cond delay="0"/>
+                                          </p:stCondLst>
+                                        </p:cTn>
+                                        <p:tgtEl>
+                                          <p:spTgt spid="23"/>
+                                        </p:tgtEl>
+                                        <p:attrNameLst>
+                                          <p:attrName>style.visibility</p:attrName>
+                                        </p:attrNameLst>
+                                      </p:cBhvr>
+                                      <p:to>
+                                        <p:strVal val="visible"/>
+                                      </p:to>
+                                    </p:set>
+                                    <p:anim calcmode="lin" valueType="num">
+                                      <p:cBhvr additive="base">
+                                        <p:cTn id="11" dur="500" fill="hold"/>
+                                        <p:tgtEl>
+                                          <p:spTgt spid="23"/>
+                                        </p:tgtEl>
+                                        <p:attrNameLst>
+                                          <p:attrName>ppt_x</p:attrName>
+                                        </p:attrNameLst>
+                                      </p:cBhvr>
+                                      <p:tavLst>
+                                        <p:tav tm="0">
+                                          <p:val>
+                                            <p:strVal val="#ppt_x"/>
+                                          </p:val>
+                                        </p:tav>
+                                        <p:tav tm="100000">
+                                          <p:val>
+                                            <p:strVal val="#ppt_x"/>
+                                          </p:val>
+                                        </p:tav>
+                                      </p:tavLst>
+                                    </p:anim>
+                                    <p:anim calcmode="lin" valueType="num">
+                                      <p:cBhvr additive="base">
+                                        <p:cTn id="12" dur="500" fill="hold"/>
+                                        <p:tgtEl>
+                                          <p:spTgt spid="23"/>
+                                        </p:tgtEl>
+                                        <p:attrNameLst>
+                                          <p:attrName>ppt_y</p:attrName>
+                                        </p:attrNameLst>
+                                      </p:cBhvr>
+                                      <p:tavLst>
+                                        <p:tav tm="0">
+                                          <p:val>
+                                            <p:strVal val="1+#ppt_h/2"/>
+                                          </p:val>
+                                        </p:tav>
+                                        <p:tav tm="100000">
+                                          <p:val>
+                                            <p:strVal val="#ppt_y"/>
+                                          </p:val>
+                                        </p:tav>
+                                      </p:tavLst>
+                                    </p:anim>
+                                  </p:childTnLst>
+                                </p:cTn>
+                              </p:par>
+                            </p:childTnLst>
+                          </p:cTn>
+                        </p:par>
+                      </p:childTnLst>
+                    </p:cTn>
+                  </p:par>
+                </p:childTnLst>
+              </p:cTn>
+              <p:prevCondLst>
+                <p:cond evt="onPrev" delay="0">
+                  <p:tgtEl>
+                    <p:sldTgt/>
+                  </p:tgtEl>
+                </p:cond>
+              </p:prevCondLst>
+              <p:nextCondLst>
+                <p:cond evt="onNext" delay="0">
+                  <p:tgtEl>
+                    <p:sldTgt/>
+                  </p:tgtEl>
+                </p:cond>
+              </p:nextCondLst>
+            </p:seq>
+          </p:childTnLst>
+        </p:cTn>
+      </p:par>
+    </p:tnLst>
+  </p:timing>
 </p:sld>
 </file>
 
@@ -15467,21 +18622,6 @@
 </file>
 
 <file path=customXml/item1.xml><?xml version="1.0" encoding="utf-8"?>
-<p:properties xmlns:p="http://schemas.microsoft.com/office/2006/metadata/properties" xmlns:xsi="http://www.w3.org/2001/XMLSchema-instance" xmlns:pc="http://schemas.microsoft.com/office/infopath/2007/PartnerControls">
-  <documentManagement/>
-</p:properties>
-</file>
-
-<file path=customXml/item2.xml><?xml version="1.0" encoding="utf-8"?>
-<?mso-contentType ?>
-<FormTemplates xmlns="http://schemas.microsoft.com/sharepoint/v3/contenttype/forms">
-  <Display>DocumentLibraryForm</Display>
-  <Edit>DocumentLibraryForm</Edit>
-  <New>DocumentLibraryForm</New>
-</FormTemplates>
-</file>
-
-<file path=customXml/item3.xml><?xml version="1.0" encoding="utf-8"?>
 <ct:contentTypeSchema xmlns:ct="http://schemas.microsoft.com/office/2006/metadata/contentType" xmlns:ma="http://schemas.microsoft.com/office/2006/metadata/properties/metaAttributes" ct:_="" ma:_="" ma:contentTypeName="Document" ma:contentTypeID="0x010100DEF4AC995E12C049A50ADA15ED46708B" ma:contentTypeVersion="10" ma:contentTypeDescription="Create a new document." ma:contentTypeScope="" ma:versionID="e1e50748af6b146b5d32526844560075">
   <xsd:schema xmlns:xsd="http://www.w3.org/2001/XMLSchema" xmlns:xs="http://www.w3.org/2001/XMLSchema" xmlns:p="http://schemas.microsoft.com/office/2006/metadata/properties" xmlns:ns3="dfe49bc2-e275-45b8-b1dd-d32901820c2b" targetNamespace="http://schemas.microsoft.com/office/2006/metadata/properties" ma:root="true" ma:fieldsID="f62390b4dc920914b866ec1225863cbc" ns3:_="">
     <xsd:import namespace="dfe49bc2-e275-45b8-b1dd-d32901820c2b"/>
@@ -15665,31 +18805,22 @@
 </ct:contentTypeSchema>
 </file>
 
-<file path=customXml/itemProps1.xml><?xml version="1.0" encoding="utf-8"?>
-<ds:datastoreItem xmlns:ds="http://schemas.openxmlformats.org/officeDocument/2006/customXml" ds:itemID="{4EE20F03-7AA1-4C1B-8D33-0687331B4F14}">
-  <ds:schemaRefs>
-    <ds:schemaRef ds:uri="http://schemas.microsoft.com/office/infopath/2007/PartnerControls"/>
-    <ds:schemaRef ds:uri="dfe49bc2-e275-45b8-b1dd-d32901820c2b"/>
-    <ds:schemaRef ds:uri="http://purl.org/dc/elements/1.1/"/>
-    <ds:schemaRef ds:uri="http://schemas.microsoft.com/office/2006/documentManagement/types"/>
-    <ds:schemaRef ds:uri="http://purl.org/dc/terms/"/>
-    <ds:schemaRef ds:uri="http://schemas.openxmlformats.org/package/2006/metadata/core-properties"/>
-    <ds:schemaRef ds:uri="http://purl.org/dc/dcmitype/"/>
-    <ds:schemaRef ds:uri="http://schemas.microsoft.com/office/2006/metadata/properties"/>
-    <ds:schemaRef ds:uri="http://www.w3.org/XML/1998/namespace"/>
-  </ds:schemaRefs>
-</ds:datastoreItem>
+<file path=customXml/item2.xml><?xml version="1.0" encoding="utf-8"?>
+<?mso-contentType ?>
+<FormTemplates xmlns="http://schemas.microsoft.com/sharepoint/v3/contenttype/forms">
+  <Display>DocumentLibraryForm</Display>
+  <Edit>DocumentLibraryForm</Edit>
+  <New>DocumentLibraryForm</New>
+</FormTemplates>
 </file>
 
-<file path=customXml/itemProps2.xml><?xml version="1.0" encoding="utf-8"?>
-<ds:datastoreItem xmlns:ds="http://schemas.openxmlformats.org/officeDocument/2006/customXml" ds:itemID="{C7893EDB-12D9-41BB-AE21-8BFDCB986999}">
-  <ds:schemaRefs>
-    <ds:schemaRef ds:uri="http://schemas.microsoft.com/sharepoint/v3/contenttype/forms"/>
-  </ds:schemaRefs>
-</ds:datastoreItem>
+<file path=customXml/item3.xml><?xml version="1.0" encoding="utf-8"?>
+<p:properties xmlns:p="http://schemas.microsoft.com/office/2006/metadata/properties" xmlns:xsi="http://www.w3.org/2001/XMLSchema-instance" xmlns:pc="http://schemas.microsoft.com/office/infopath/2007/PartnerControls">
+  <documentManagement/>
+</p:properties>
 </file>
 
-<file path=customXml/itemProps3.xml><?xml version="1.0" encoding="utf-8"?>
+<file path=customXml/itemProps1.xml><?xml version="1.0" encoding="utf-8"?>
 <ds:datastoreItem xmlns:ds="http://schemas.openxmlformats.org/officeDocument/2006/customXml" ds:itemID="{08A5B023-9490-4F16-A587-A9EC60F27C16}">
   <ds:schemaRefs>
     <ds:schemaRef ds:uri="http://schemas.microsoft.com/office/2006/metadata/contentType"/>
@@ -15705,4 +18836,28 @@
     <ds:schemaRef ds:uri="http://schemas.microsoft.com/internal/obd"/>
   </ds:schemaRefs>
 </ds:datastoreItem>
+</file>
+
+<file path=customXml/itemProps2.xml><?xml version="1.0" encoding="utf-8"?>
+<ds:datastoreItem xmlns:ds="http://schemas.openxmlformats.org/officeDocument/2006/customXml" ds:itemID="{C7893EDB-12D9-41BB-AE21-8BFDCB986999}">
+  <ds:schemaRefs>
+    <ds:schemaRef ds:uri="http://schemas.microsoft.com/sharepoint/v3/contenttype/forms"/>
+  </ds:schemaRefs>
+</ds:datastoreItem>
+</file>
+
+<file path=customXml/itemProps3.xml><?xml version="1.0" encoding="utf-8"?>
+<ds:datastoreItem xmlns:ds="http://schemas.openxmlformats.org/officeDocument/2006/customXml" ds:itemID="{4EE20F03-7AA1-4C1B-8D33-0687331B4F14}">
+  <ds:schemaRefs>
+    <ds:schemaRef ds:uri="http://schemas.microsoft.com/office/infopath/2007/PartnerControls"/>
+    <ds:schemaRef ds:uri="dfe49bc2-e275-45b8-b1dd-d32901820c2b"/>
+    <ds:schemaRef ds:uri="http://purl.org/dc/elements/1.1/"/>
+    <ds:schemaRef ds:uri="http://schemas.microsoft.com/office/2006/documentManagement/types"/>
+    <ds:schemaRef ds:uri="http://purl.org/dc/terms/"/>
+    <ds:schemaRef ds:uri="http://schemas.openxmlformats.org/package/2006/metadata/core-properties"/>
+    <ds:schemaRef ds:uri="http://purl.org/dc/dcmitype/"/>
+    <ds:schemaRef ds:uri="http://schemas.microsoft.com/office/2006/metadata/properties"/>
+    <ds:schemaRef ds:uri="http://www.w3.org/XML/1998/namespace"/>
+  </ds:schemaRefs>
+</ds:datastoreItem>
 </file>
</xml_diff>

<commit_message>
Updates to Game Proposal slides
</commit_message>
<xml_diff>
--- a/Game Proposal.pptx
+++ b/Game Proposal.pptx
@@ -7,13 +7,14 @@
   <p:sldIdLst>
     <p:sldId id="256" r:id="rId5"/>
     <p:sldId id="266" r:id="rId6"/>
-    <p:sldId id="257" r:id="rId7"/>
-    <p:sldId id="259" r:id="rId8"/>
-    <p:sldId id="258" r:id="rId9"/>
-    <p:sldId id="260" r:id="rId10"/>
-    <p:sldId id="265" r:id="rId11"/>
-    <p:sldId id="261" r:id="rId12"/>
-    <p:sldId id="264" r:id="rId13"/>
+    <p:sldId id="268" r:id="rId7"/>
+    <p:sldId id="257" r:id="rId8"/>
+    <p:sldId id="259" r:id="rId9"/>
+    <p:sldId id="258" r:id="rId10"/>
+    <p:sldId id="260" r:id="rId11"/>
+    <p:sldId id="267" r:id="rId12"/>
+    <p:sldId id="269" r:id="rId13"/>
+    <p:sldId id="264" r:id="rId14"/>
   </p:sldIdLst>
   <p:sldSz cx="12192000" cy="6858000"/>
   <p:notesSz cx="6858000" cy="9144000"/>
@@ -673,7 +674,7 @@
             <a:fld id="{5923F103-BC34-4FE4-A40E-EDDEECFDA5D0}" type="datetimeFigureOut">
               <a:rPr lang="en-US" dirty="0"/>
               <a:pPr/>
-              <a:t>9/15/2019</a:t>
+              <a:t>9/16/2019</a:t>
             </a:fld>
             <a:endParaRPr lang="en-US" dirty="0"/>
           </a:p>
@@ -1757,7 +1758,7 @@
           <a:p>
             <a:fld id="{923A1CC3-2375-41D4-9E03-427CAF2A4C1A}" type="datetimeFigureOut">
               <a:rPr lang="en-US" dirty="0"/>
-              <a:t>9/15/2019</a:t>
+              <a:t>9/16/2019</a:t>
             </a:fld>
             <a:endParaRPr lang="en-US" dirty="0"/>
           </a:p>
@@ -2733,7 +2734,7 @@
           <a:p>
             <a:fld id="{AFF16868-8199-4C2C-A5B1-63AEE139F88E}" type="datetimeFigureOut">
               <a:rPr lang="en-US" dirty="0"/>
-              <a:t>9/15/2019</a:t>
+              <a:t>9/16/2019</a:t>
             </a:fld>
             <a:endParaRPr lang="en-US" dirty="0"/>
           </a:p>
@@ -3863,7 +3864,7 @@
           <a:p>
             <a:fld id="{AAD9FF7F-6988-44CC-821B-644E70CD2F73}" type="datetimeFigureOut">
               <a:rPr lang="en-US" dirty="0"/>
-              <a:t>9/15/2019</a:t>
+              <a:t>9/16/2019</a:t>
             </a:fld>
             <a:endParaRPr lang="en-US" dirty="0"/>
           </a:p>
@@ -4892,7 +4893,7 @@
           <a:p>
             <a:fld id="{5C12C299-16B2-4475-990D-751901EACC14}" type="datetimeFigureOut">
               <a:rPr lang="en-US" dirty="0"/>
-              <a:t>9/15/2019</a:t>
+              <a:t>9/16/2019</a:t>
             </a:fld>
             <a:endParaRPr lang="en-US" dirty="0"/>
           </a:p>
@@ -5548,7 +5549,7 @@
           <a:p>
             <a:fld id="{9FE86839-B9D8-4651-8783-F325ECE74E65}" type="datetimeFigureOut">
               <a:rPr lang="en-US" dirty="0"/>
-              <a:t>9/15/2019</a:t>
+              <a:t>9/16/2019</a:t>
             </a:fld>
             <a:endParaRPr lang="en-US" dirty="0"/>
           </a:p>
@@ -6405,7 +6406,7 @@
           <a:p>
             <a:fld id="{FD484F64-32F6-45C5-931F-ADC1662401D0}" type="datetimeFigureOut">
               <a:rPr lang="en-US" dirty="0"/>
-              <a:t>9/15/2019</a:t>
+              <a:t>9/16/2019</a:t>
             </a:fld>
             <a:endParaRPr lang="en-US" dirty="0"/>
           </a:p>
@@ -6591,7 +6592,7 @@
           <a:p>
             <a:fld id="{53086D93-FCAC-47E0-A2EE-787E62CA814C}" type="datetimeFigureOut">
               <a:rPr lang="en-US" dirty="0"/>
-              <a:t>9/15/2019</a:t>
+              <a:t>9/16/2019</a:t>
             </a:fld>
             <a:endParaRPr lang="en-US" dirty="0"/>
           </a:p>
@@ -7559,7 +7560,7 @@
           <a:p>
             <a:fld id="{CDA879A6-0FD0-4734-A311-86BFCA472E6E}" type="datetimeFigureOut">
               <a:rPr lang="en-US" dirty="0"/>
-              <a:t>9/15/2019</a:t>
+              <a:t>9/16/2019</a:t>
             </a:fld>
             <a:endParaRPr lang="en-US" dirty="0"/>
           </a:p>
@@ -7766,7 +7767,7 @@
           <a:p>
             <a:fld id="{19C9CA7B-DFD4-44B5-8C60-D14B8CD1FB59}" type="datetimeFigureOut">
               <a:rPr lang="en-US" dirty="0"/>
-              <a:t>9/15/2019</a:t>
+              <a:t>9/16/2019</a:t>
             </a:fld>
             <a:endParaRPr lang="en-US" dirty="0"/>
           </a:p>
@@ -8796,7 +8797,7 @@
           <a:p>
             <a:fld id="{F34E6425-0181-43F2-84FC-787E803FD2F8}" type="datetimeFigureOut">
               <a:rPr lang="en-US" dirty="0"/>
-              <a:t>9/15/2019</a:t>
+              <a:t>9/16/2019</a:t>
             </a:fld>
             <a:endParaRPr lang="en-US" dirty="0"/>
           </a:p>
@@ -9064,7 +9065,7 @@
           <a:p>
             <a:fld id="{3BDB8791-F1B0-41E7-B7FD-A781E65C4266}" type="datetimeFigureOut">
               <a:rPr lang="en-US" dirty="0"/>
-              <a:t>9/15/2019</a:t>
+              <a:t>9/16/2019</a:t>
             </a:fld>
             <a:endParaRPr lang="en-US" dirty="0"/>
           </a:p>
@@ -9470,7 +9471,7 @@
           <a:p>
             <a:fld id="{5FDD63B2-E120-4ED8-B27B-C685F510A5FE}" type="datetimeFigureOut">
               <a:rPr lang="en-US" dirty="0"/>
-              <a:t>9/15/2019</a:t>
+              <a:t>9/16/2019</a:t>
             </a:fld>
             <a:endParaRPr lang="en-US" dirty="0"/>
           </a:p>
@@ -9593,7 +9594,7 @@
           <a:p>
             <a:fld id="{7AA18ACC-A947-437B-A130-35BD54FDF1E9}" type="datetimeFigureOut">
               <a:rPr lang="en-US" dirty="0"/>
-              <a:t>9/15/2019</a:t>
+              <a:t>9/16/2019</a:t>
             </a:fld>
             <a:endParaRPr lang="en-US" dirty="0"/>
           </a:p>
@@ -9684,7 +9685,7 @@
           <a:p>
             <a:fld id="{7C8D7E02-BCB8-4D50-A234-369438C08659}" type="datetimeFigureOut">
               <a:rPr lang="en-US" dirty="0"/>
-              <a:t>9/15/2019</a:t>
+              <a:t>9/16/2019</a:t>
             </a:fld>
             <a:endParaRPr lang="en-US" dirty="0"/>
           </a:p>
@@ -10761,7 +10762,7 @@
           <a:p>
             <a:fld id="{76E86A4C-8E40-4F87-A4F0-01A0687C5742}" type="datetimeFigureOut">
               <a:rPr lang="en-US" dirty="0"/>
-              <a:t>9/15/2019</a:t>
+              <a:t>9/16/2019</a:t>
             </a:fld>
             <a:endParaRPr lang="en-US" dirty="0"/>
           </a:p>
@@ -11865,7 +11866,7 @@
           <a:p>
             <a:fld id="{35E72C73-2D91-4E12-BA25-F0AA0C03599B}" type="datetimeFigureOut">
               <a:rPr lang="en-US" dirty="0"/>
-              <a:t>9/15/2019</a:t>
+              <a:t>9/16/2019</a:t>
             </a:fld>
             <a:endParaRPr lang="en-US" dirty="0"/>
           </a:p>
@@ -12858,7 +12859,7 @@
           <a:p>
             <a:fld id="{2BE451C3-0FF4-47C4-B829-773ADF60F88C}" type="datetimeFigureOut">
               <a:rPr lang="en-US" dirty="0"/>
-              <a:t>9/15/2019</a:t>
+              <a:t>9/16/2019</a:t>
             </a:fld>
             <a:endParaRPr lang="en-US" dirty="0"/>
           </a:p>
@@ -13419,7 +13420,7 @@
           <p:cNvPr id="3" name="Subtitle 2">
             <a:extLst>
               <a:ext uri="{FF2B5EF4-FFF2-40B4-BE49-F238E27FC236}">
-                <a16:creationId xmlns="" xmlns:a16="http://schemas.microsoft.com/office/drawing/2014/main" id="{914CA8F9-AB28-48F0-950C-D69A19E69925}"/>
+                <a16:creationId xmlns:a16="http://schemas.microsoft.com/office/drawing/2014/main" id="{914CA8F9-AB28-48F0-950C-D69A19E69925}"/>
               </a:ext>
             </a:extLst>
           </p:cNvPr>
@@ -13443,18 +13444,18 @@
           <a:lstStyle/>
           <a:p>
             <a:r>
-              <a:rPr lang="en-US" dirty="0" smtClean="0"/>
+              <a:rPr lang="en-US" dirty="0"/>
               <a:t>By:</a:t>
             </a:r>
           </a:p>
           <a:p>
             <a:r>
-              <a:rPr lang="en-US" dirty="0" smtClean="0"/>
+              <a:rPr lang="en-US" dirty="0"/>
               <a:t>Alex </a:t>
             </a:r>
             <a:r>
               <a:rPr lang="en-US" dirty="0" err="1"/>
-              <a:t>ogillbee</a:t>
+              <a:t>ogilbee</a:t>
             </a:r>
             <a:endParaRPr lang="en-US" dirty="0"/>
           </a:p>
@@ -13480,7 +13481,7 @@
         </p:nvSpPr>
         <p:spPr>
           <a:xfrm>
-            <a:off x="4509935" y="2494918"/>
+            <a:off x="4875060" y="2571387"/>
             <a:ext cx="2460931" cy="923330"/>
           </a:xfrm>
           <a:prstGeom prst="rect">
@@ -13496,7 +13497,7 @@
           <a:p>
             <a:pPr algn="ctr"/>
             <a:r>
-              <a:rPr lang="en-US" sz="5400" b="1" dirty="0" smtClean="0">
+              <a:rPr lang="en-US" sz="5400" b="1" dirty="0">
                 <a:ln w="13462">
                   <a:solidFill>
                     <a:schemeClr val="tx1"/>
@@ -13516,24 +13517,6 @@
               </a:rPr>
               <a:t>Worms</a:t>
             </a:r>
-            <a:endParaRPr lang="en-US" sz="5400" b="1" dirty="0">
-              <a:ln w="13462">
-                <a:solidFill>
-                  <a:schemeClr val="tx1"/>
-                </a:solidFill>
-                <a:prstDash val="solid"/>
-              </a:ln>
-              <a:solidFill>
-                <a:srgbClr val="FFC000"/>
-              </a:solidFill>
-              <a:effectLst>
-                <a:outerShdw blurRad="60007" dist="310007" dir="7680000" sy="30000" kx="1300200" algn="ctr" rotWithShape="0">
-                  <a:prstClr val="black">
-                    <a:alpha val="32000"/>
-                  </a:prstClr>
-                </a:outerShdw>
-              </a:effectLst>
-            </a:endParaRPr>
           </a:p>
         </p:txBody>
       </p:sp>
@@ -13545,7 +13528,7 @@
         </p:nvSpPr>
         <p:spPr>
           <a:xfrm>
-            <a:off x="4525965" y="2494918"/>
+            <a:off x="4891090" y="2571387"/>
             <a:ext cx="2428870" cy="923330"/>
           </a:xfrm>
           <a:prstGeom prst="rect">
@@ -13561,7 +13544,7 @@
           <a:p>
             <a:pPr algn="ctr"/>
             <a:r>
-              <a:rPr lang="en-US" sz="5400" b="1" dirty="0" err="1" smtClean="0">
+              <a:rPr lang="en-US" sz="5400" b="1" dirty="0" err="1">
                 <a:ln w="13462">
                   <a:solidFill>
                     <a:schemeClr val="tx1"/>
@@ -13611,7 +13594,7 @@
         <p:spPr>
           <a:xfrm>
             <a:off x="522514" y="740592"/>
-            <a:ext cx="11181806" cy="1754326"/>
+            <a:ext cx="11181806" cy="923330"/>
           </a:xfrm>
           <a:prstGeom prst="rect">
             <a:avLst/>
@@ -13626,7 +13609,7 @@
           <a:p>
             <a:pPr algn="ctr"/>
             <a:r>
-              <a:rPr lang="en-US" sz="5400" b="1" spc="50" dirty="0" smtClean="0">
+              <a:rPr lang="en-US" sz="5400" b="1" cap="none" spc="50" dirty="0">
                 <a:ln w="0"/>
                 <a:solidFill>
                   <a:schemeClr val="bg2"/>
@@ -13639,40 +13622,8 @@
                   </a:innerShdw>
                 </a:effectLst>
               </a:rPr>
-              <a:t>We present you the </a:t>
+              <a:t>Team 4</a:t>
             </a:r>
-          </a:p>
-          <a:p>
-            <a:pPr algn="ctr"/>
-            <a:r>
-              <a:rPr lang="en-US" sz="5400" b="1" spc="50" dirty="0" smtClean="0">
-                <a:ln w="0"/>
-                <a:solidFill>
-                  <a:schemeClr val="bg2"/>
-                </a:solidFill>
-                <a:effectLst>
-                  <a:innerShdw blurRad="63500" dist="50800" dir="13500000">
-                    <a:srgbClr val="000000">
-                      <a:alpha val="50000"/>
-                    </a:srgbClr>
-                  </a:innerShdw>
-                </a:effectLst>
-              </a:rPr>
-              <a:t>New-Never-Before-Seen-Game:</a:t>
-            </a:r>
-            <a:endParaRPr lang="en-US" sz="5400" b="1" cap="none" spc="50" dirty="0">
-              <a:ln w="0"/>
-              <a:solidFill>
-                <a:schemeClr val="bg2"/>
-              </a:solidFill>
-              <a:effectLst>
-                <a:innerShdw blurRad="63500" dist="50800" dir="13500000">
-                  <a:srgbClr val="000000">
-                    <a:alpha val="50000"/>
-                  </a:srgbClr>
-                </a:innerShdw>
-              </a:effectLst>
-            </a:endParaRPr>
           </a:p>
         </p:txBody>
       </p:sp>
@@ -13681,7 +13632,7 @@
           <p:cNvPr id="10" name="Picture 9">
             <a:extLst>
               <a:ext uri="{FF2B5EF4-FFF2-40B4-BE49-F238E27FC236}">
-                <a16:creationId xmlns="" xmlns:a16="http://schemas.microsoft.com/office/drawing/2014/main" id="{8067D712-B97B-489F-93C0-EFC22B0553A6}"/>
+                <a16:creationId xmlns:a16="http://schemas.microsoft.com/office/drawing/2014/main" id="{8067D712-B97B-489F-93C0-EFC22B0553A6}"/>
               </a:ext>
             </a:extLst>
           </p:cNvPr>
@@ -13775,7 +13726,7 @@
             <p:cNvPr id="13" name="Picture 12">
               <a:extLst>
                 <a:ext uri="{FF2B5EF4-FFF2-40B4-BE49-F238E27FC236}">
-                  <a16:creationId xmlns="" xmlns:a16="http://schemas.microsoft.com/office/drawing/2014/main" id="{8067D712-B97B-489F-93C0-EFC22B0553A6}"/>
+                  <a16:creationId xmlns:a16="http://schemas.microsoft.com/office/drawing/2014/main" id="{8067D712-B97B-489F-93C0-EFC22B0553A6}"/>
                 </a:ext>
               </a:extLst>
             </p:cNvPr>
@@ -13804,7 +13755,7 @@
             <p:cNvPr id="12" name="Picture 11">
               <a:extLst>
                 <a:ext uri="{FF2B5EF4-FFF2-40B4-BE49-F238E27FC236}">
-                  <a16:creationId xmlns="" xmlns:a16="http://schemas.microsoft.com/office/drawing/2014/main" id="{8067D712-B97B-489F-93C0-EFC22B0553A6}"/>
+                  <a16:creationId xmlns:a16="http://schemas.microsoft.com/office/drawing/2014/main" id="{8067D712-B97B-489F-93C0-EFC22B0553A6}"/>
                 </a:ext>
               </a:extLst>
             </p:cNvPr>
@@ -13834,7 +13785,7 @@
           <p:cNvPr id="15" name="Picture 14">
             <a:extLst>
               <a:ext uri="{FF2B5EF4-FFF2-40B4-BE49-F238E27FC236}">
-                <a16:creationId xmlns="" xmlns:a16="http://schemas.microsoft.com/office/drawing/2014/main" id="{8067D712-B97B-489F-93C0-EFC22B0553A6}"/>
+                <a16:creationId xmlns:a16="http://schemas.microsoft.com/office/drawing/2014/main" id="{8067D712-B97B-489F-93C0-EFC22B0553A6}"/>
               </a:ext>
             </a:extLst>
           </p:cNvPr>
@@ -13850,7 +13801,7 @@
         </p:blipFill>
         <p:spPr>
           <a:xfrm flipH="1">
-            <a:off x="6700005" y="2369737"/>
+            <a:off x="7179985" y="2369737"/>
             <a:ext cx="2473199" cy="1799569"/>
           </a:xfrm>
           <a:prstGeom prst="rect">
@@ -14502,6 +14453,1050 @@
 </p:sld>
 </file>
 
+<file path=ppt/slides/slide10.xml><?xml version="1.0" encoding="utf-8"?>
+<p:sld xmlns:a="http://schemas.openxmlformats.org/drawingml/2006/main" xmlns:r="http://schemas.openxmlformats.org/officeDocument/2006/relationships" xmlns:p="http://schemas.openxmlformats.org/presentationml/2006/main">
+  <p:cSld>
+    <p:bg>
+      <p:bgPr>
+        <a:blipFill rotWithShape="1">
+          <a:blip r:embed="rId2">
+            <a:duotone>
+              <a:schemeClr val="bg2">
+                <a:shade val="69000"/>
+                <a:hueMod val="91000"/>
+                <a:satMod val="164000"/>
+                <a:lumMod val="74000"/>
+              </a:schemeClr>
+              <a:schemeClr val="bg2">
+                <a:hueMod val="124000"/>
+                <a:satMod val="140000"/>
+                <a:lumMod val="142000"/>
+              </a:schemeClr>
+            </a:duotone>
+            <a:extLst/>
+          </a:blip>
+          <a:stretch/>
+        </a:blipFill>
+        <a:effectLst/>
+      </p:bgPr>
+    </p:bg>
+    <p:spTree>
+      <p:nvGrpSpPr>
+        <p:cNvPr id="1" name=""/>
+        <p:cNvGrpSpPr/>
+        <p:nvPr/>
+      </p:nvGrpSpPr>
+      <p:grpSpPr>
+        <a:xfrm>
+          <a:off x="0" y="0"/>
+          <a:ext cx="0" cy="0"/>
+          <a:chOff x="0" y="0"/>
+          <a:chExt cx="0" cy="0"/>
+        </a:xfrm>
+      </p:grpSpPr>
+      <p:grpSp>
+        <p:nvGrpSpPr>
+          <p:cNvPr id="8" name="Group 7">
+            <a:extLst>
+              <a:ext uri="{FF2B5EF4-FFF2-40B4-BE49-F238E27FC236}">
+                <a16:creationId xmlns:a16="http://schemas.microsoft.com/office/drawing/2014/main" id="{93E10248-AF0E-477D-B4D2-47C02CE4E353}"/>
+              </a:ext>
+              <a:ext uri="{C183D7F6-B498-43B3-948B-1728B52AA6E4}">
+                <adec:decorative xmlns:adec="http://schemas.microsoft.com/office/drawing/2017/decorative" val="1"/>
+              </a:ext>
+            </a:extLst>
+          </p:cNvPr>
+          <p:cNvGrpSpPr>
+            <a:grpSpLocks noGrp="1" noUngrp="1" noRot="1" noChangeAspect="1" noMove="1" noResize="1"/>
+          </p:cNvGrpSpPr>
+          <p:nvPr>
+            <p:extLst>
+              <p:ext uri="{386F3935-93C4-4BCD-93E2-E3B085C9AB24}">
+                <p16:designElem xmlns:p16="http://schemas.microsoft.com/office/powerpoint/2015/main" val="1"/>
+              </p:ext>
+            </p:extLst>
+          </p:nvPr>
+        </p:nvGrpSpPr>
+        <p:grpSpPr>
+          <a:xfrm>
+            <a:off x="0" y="0"/>
+            <a:ext cx="12192000" cy="6858000"/>
+            <a:chOff x="0" y="0"/>
+            <a:chExt cx="12192000" cy="6858000"/>
+          </a:xfrm>
+        </p:grpSpPr>
+        <p:sp>
+          <p:nvSpPr>
+            <p:cNvPr id="9" name="Rectangle 8">
+              <a:extLst>
+                <a:ext uri="{FF2B5EF4-FFF2-40B4-BE49-F238E27FC236}">
+                  <a16:creationId xmlns:a16="http://schemas.microsoft.com/office/drawing/2014/main" id="{533010C2-2DA5-460F-A40C-5317F567A03E}"/>
+                </a:ext>
+                <a:ext uri="{C183D7F6-B498-43B3-948B-1728B52AA6E4}">
+                  <adec:decorative xmlns:adec="http://schemas.microsoft.com/office/drawing/2017/decorative" val="1"/>
+                </a:ext>
+              </a:extLst>
+            </p:cNvPr>
+            <p:cNvSpPr/>
+            <p:nvPr>
+              <p:extLst>
+                <p:ext uri="{386F3935-93C4-4BCD-93E2-E3B085C9AB24}">
+                  <p16:designElem xmlns:p16="http://schemas.microsoft.com/office/powerpoint/2015/main" val="1"/>
+                </p:ext>
+              </p:extLst>
+            </p:nvPr>
+          </p:nvSpPr>
+          <p:spPr>
+            <a:xfrm>
+              <a:off x="0" y="0"/>
+              <a:ext cx="12192000" cy="6858000"/>
+            </a:xfrm>
+            <a:prstGeom prst="rect">
+              <a:avLst/>
+            </a:prstGeom>
+            <a:blipFill>
+              <a:blip r:embed="rId2">
+                <a:duotone>
+                  <a:schemeClr val="dk2">
+                    <a:shade val="69000"/>
+                    <a:hueMod val="91000"/>
+                    <a:satMod val="164000"/>
+                    <a:lumMod val="74000"/>
+                  </a:schemeClr>
+                  <a:schemeClr val="dk2">
+                    <a:hueMod val="124000"/>
+                    <a:satMod val="140000"/>
+                    <a:lumMod val="142000"/>
+                  </a:schemeClr>
+                </a:duotone>
+              </a:blip>
+              <a:stretch>
+                <a:fillRect/>
+              </a:stretch>
+            </a:blipFill>
+            <a:ln>
+              <a:noFill/>
+            </a:ln>
+          </p:spPr>
+          <p:style>
+            <a:lnRef idx="2">
+              <a:schemeClr val="accent1">
+                <a:shade val="50000"/>
+              </a:schemeClr>
+            </a:lnRef>
+            <a:fillRef idx="1">
+              <a:schemeClr val="accent1"/>
+            </a:fillRef>
+            <a:effectRef idx="0">
+              <a:schemeClr val="accent1"/>
+            </a:effectRef>
+            <a:fontRef idx="minor">
+              <a:schemeClr val="lt1"/>
+            </a:fontRef>
+          </p:style>
+        </p:sp>
+        <p:sp>
+          <p:nvSpPr>
+            <p:cNvPr id="10" name="Freeform 5">
+              <a:extLst>
+                <a:ext uri="{FF2B5EF4-FFF2-40B4-BE49-F238E27FC236}">
+                  <a16:creationId xmlns:a16="http://schemas.microsoft.com/office/drawing/2014/main" id="{17CB0634-F963-4EC9-A6F6-8EA46BD1F103}"/>
+                </a:ext>
+                <a:ext uri="{C183D7F6-B498-43B3-948B-1728B52AA6E4}">
+                  <adec:decorative xmlns:adec="http://schemas.microsoft.com/office/drawing/2017/decorative" val="1"/>
+                </a:ext>
+              </a:extLst>
+            </p:cNvPr>
+            <p:cNvSpPr>
+              <a:spLocks noEditPoints="1"/>
+            </p:cNvSpPr>
+            <p:nvPr>
+              <p:extLst>
+                <p:ext uri="{386F3935-93C4-4BCD-93E2-E3B085C9AB24}">
+                  <p16:designElem xmlns:p16="http://schemas.microsoft.com/office/powerpoint/2015/main" val="1"/>
+                </p:ext>
+              </p:extLst>
+            </p:nvPr>
+          </p:nvSpPr>
+          <p:spPr bwMode="gray">
+            <a:xfrm>
+              <a:off x="0" y="1587"/>
+              <a:ext cx="12192000" cy="6856413"/>
+            </a:xfrm>
+            <a:custGeom>
+              <a:avLst/>
+              <a:gdLst/>
+              <a:ahLst/>
+              <a:cxnLst/>
+              <a:rect l="0" t="0" r="r" b="b"/>
+              <a:pathLst>
+                <a:path w="15356" h="8638">
+                  <a:moveTo>
+                    <a:pt x="0" y="0"/>
+                  </a:moveTo>
+                  <a:lnTo>
+                    <a:pt x="0" y="8638"/>
+                  </a:lnTo>
+                  <a:lnTo>
+                    <a:pt x="15356" y="8638"/>
+                  </a:lnTo>
+                  <a:lnTo>
+                    <a:pt x="15356" y="0"/>
+                  </a:lnTo>
+                  <a:lnTo>
+                    <a:pt x="0" y="0"/>
+                  </a:lnTo>
+                  <a:close/>
+                  <a:moveTo>
+                    <a:pt x="14748" y="8038"/>
+                  </a:moveTo>
+                  <a:lnTo>
+                    <a:pt x="600" y="8038"/>
+                  </a:lnTo>
+                  <a:lnTo>
+                    <a:pt x="600" y="592"/>
+                  </a:lnTo>
+                  <a:lnTo>
+                    <a:pt x="14748" y="592"/>
+                  </a:lnTo>
+                  <a:lnTo>
+                    <a:pt x="14748" y="8038"/>
+                  </a:lnTo>
+                  <a:close/>
+                </a:path>
+              </a:pathLst>
+            </a:custGeom>
+            <a:solidFill>
+              <a:schemeClr val="bg1"/>
+            </a:solidFill>
+            <a:ln>
+              <a:noFill/>
+            </a:ln>
+          </p:spPr>
+        </p:sp>
+      </p:grpSp>
+      <p:sp>
+        <p:nvSpPr>
+          <p:cNvPr id="12" name="Rectangle 11">
+            <a:extLst>
+              <a:ext uri="{FF2B5EF4-FFF2-40B4-BE49-F238E27FC236}">
+                <a16:creationId xmlns:a16="http://schemas.microsoft.com/office/drawing/2014/main" id="{73C0A186-7444-4460-9C37-532E7671E99E}"/>
+              </a:ext>
+              <a:ext uri="{C183D7F6-B498-43B3-948B-1728B52AA6E4}">
+                <adec:decorative xmlns:adec="http://schemas.microsoft.com/office/drawing/2017/decorative" val="1"/>
+              </a:ext>
+            </a:extLst>
+          </p:cNvPr>
+          <p:cNvSpPr>
+            <a:spLocks noGrp="1" noRot="1" noChangeAspect="1" noMove="1" noResize="1" noEditPoints="1" noAdjustHandles="1" noChangeArrowheads="1" noChangeShapeType="1" noTextEdit="1"/>
+          </p:cNvSpPr>
+          <p:nvPr>
+            <p:extLst>
+              <p:ext uri="{386F3935-93C4-4BCD-93E2-E3B085C9AB24}">
+                <p16:designElem xmlns:p16="http://schemas.microsoft.com/office/powerpoint/2015/main" val="1"/>
+              </p:ext>
+            </p:extLst>
+          </p:nvPr>
+        </p:nvSpPr>
+        <p:spPr>
+          <a:xfrm>
+            <a:off x="10437812" y="0"/>
+            <a:ext cx="685800" cy="1143000"/>
+          </a:xfrm>
+          <a:prstGeom prst="rect">
+            <a:avLst/>
+          </a:prstGeom>
+          <a:solidFill>
+            <a:schemeClr val="accent1"/>
+          </a:solidFill>
+          <a:ln>
+            <a:noFill/>
+          </a:ln>
+        </p:spPr>
+        <p:style>
+          <a:lnRef idx="1">
+            <a:schemeClr val="accent1"/>
+          </a:lnRef>
+          <a:fillRef idx="3">
+            <a:schemeClr val="accent1"/>
+          </a:fillRef>
+          <a:effectRef idx="2">
+            <a:schemeClr val="accent1"/>
+          </a:effectRef>
+          <a:fontRef idx="minor">
+            <a:schemeClr val="lt1"/>
+          </a:fontRef>
+        </p:style>
+      </p:sp>
+      <p:grpSp>
+        <p:nvGrpSpPr>
+          <p:cNvPr id="14" name="Group 13">
+            <a:extLst>
+              <a:ext uri="{FF2B5EF4-FFF2-40B4-BE49-F238E27FC236}">
+                <a16:creationId xmlns:a16="http://schemas.microsoft.com/office/drawing/2014/main" id="{F1ECA4FE-7D2F-4576-B767-3A5F5ABFE90F}"/>
+              </a:ext>
+              <a:ext uri="{C183D7F6-B498-43B3-948B-1728B52AA6E4}">
+                <adec:decorative xmlns:adec="http://schemas.microsoft.com/office/drawing/2017/decorative" val="1"/>
+              </a:ext>
+            </a:extLst>
+          </p:cNvPr>
+          <p:cNvGrpSpPr>
+            <a:grpSpLocks noGrp="1" noUngrp="1" noRot="1" noChangeAspect="1" noMove="1" noResize="1"/>
+          </p:cNvGrpSpPr>
+          <p:nvPr>
+            <p:extLst>
+              <p:ext uri="{386F3935-93C4-4BCD-93E2-E3B085C9AB24}">
+                <p16:designElem xmlns:p16="http://schemas.microsoft.com/office/powerpoint/2015/main" val="1"/>
+              </p:ext>
+            </p:extLst>
+          </p:nvPr>
+        </p:nvGrpSpPr>
+        <p:grpSpPr>
+          <a:xfrm>
+            <a:off x="0" y="-26126"/>
+            <a:ext cx="12192000" cy="6884126"/>
+            <a:chOff x="0" y="-26126"/>
+            <a:chExt cx="12192000" cy="6884126"/>
+          </a:xfrm>
+        </p:grpSpPr>
+        <p:sp useBgFill="1">
+          <p:nvSpPr>
+            <p:cNvPr id="15" name="Rectangle 14">
+              <a:extLst>
+                <a:ext uri="{FF2B5EF4-FFF2-40B4-BE49-F238E27FC236}">
+                  <a16:creationId xmlns:a16="http://schemas.microsoft.com/office/drawing/2014/main" id="{5969441E-5462-4859-86CD-1737FDE36046}"/>
+                </a:ext>
+                <a:ext uri="{C183D7F6-B498-43B3-948B-1728B52AA6E4}">
+                  <adec:decorative xmlns:adec="http://schemas.microsoft.com/office/drawing/2017/decorative" val="1"/>
+                </a:ext>
+              </a:extLst>
+            </p:cNvPr>
+            <p:cNvSpPr/>
+            <p:nvPr>
+              <p:extLst>
+                <p:ext uri="{386F3935-93C4-4BCD-93E2-E3B085C9AB24}">
+                  <p16:designElem xmlns:p16="http://schemas.microsoft.com/office/powerpoint/2015/main" val="1"/>
+                </p:ext>
+              </p:extLst>
+            </p:nvPr>
+          </p:nvSpPr>
+          <p:spPr>
+            <a:xfrm>
+              <a:off x="0" y="-26126"/>
+              <a:ext cx="12192000" cy="6858000"/>
+            </a:xfrm>
+            <a:prstGeom prst="rect">
+              <a:avLst/>
+            </a:prstGeom>
+            <a:ln>
+              <a:noFill/>
+            </a:ln>
+          </p:spPr>
+          <p:style>
+            <a:lnRef idx="2">
+              <a:schemeClr val="accent1">
+                <a:shade val="50000"/>
+              </a:schemeClr>
+            </a:lnRef>
+            <a:fillRef idx="1">
+              <a:schemeClr val="accent1"/>
+            </a:fillRef>
+            <a:effectRef idx="0">
+              <a:schemeClr val="accent1"/>
+            </a:effectRef>
+            <a:fontRef idx="minor">
+              <a:schemeClr val="lt1"/>
+            </a:fontRef>
+          </p:style>
+        </p:sp>
+        <p:sp>
+          <p:nvSpPr>
+            <p:cNvPr id="16" name="Freeform 5">
+              <a:extLst>
+                <a:ext uri="{FF2B5EF4-FFF2-40B4-BE49-F238E27FC236}">
+                  <a16:creationId xmlns:a16="http://schemas.microsoft.com/office/drawing/2014/main" id="{596BD4B5-6833-40CC-96FE-EDC675634264}"/>
+                </a:ext>
+                <a:ext uri="{C183D7F6-B498-43B3-948B-1728B52AA6E4}">
+                  <adec:decorative xmlns:adec="http://schemas.microsoft.com/office/drawing/2017/decorative" val="1"/>
+                </a:ext>
+              </a:extLst>
+            </p:cNvPr>
+            <p:cNvSpPr>
+              <a:spLocks noEditPoints="1"/>
+            </p:cNvSpPr>
+            <p:nvPr>
+              <p:extLst>
+                <p:ext uri="{386F3935-93C4-4BCD-93E2-E3B085C9AB24}">
+                  <p16:designElem xmlns:p16="http://schemas.microsoft.com/office/powerpoint/2015/main" val="1"/>
+                </p:ext>
+              </p:extLst>
+            </p:nvPr>
+          </p:nvSpPr>
+          <p:spPr bwMode="gray">
+            <a:xfrm>
+              <a:off x="0" y="1587"/>
+              <a:ext cx="12192000" cy="6856413"/>
+            </a:xfrm>
+            <a:custGeom>
+              <a:avLst/>
+              <a:gdLst/>
+              <a:ahLst/>
+              <a:cxnLst/>
+              <a:rect l="0" t="0" r="r" b="b"/>
+              <a:pathLst>
+                <a:path w="15356" h="8638">
+                  <a:moveTo>
+                    <a:pt x="0" y="0"/>
+                  </a:moveTo>
+                  <a:lnTo>
+                    <a:pt x="0" y="8638"/>
+                  </a:lnTo>
+                  <a:lnTo>
+                    <a:pt x="15356" y="8638"/>
+                  </a:lnTo>
+                  <a:lnTo>
+                    <a:pt x="15356" y="0"/>
+                  </a:lnTo>
+                  <a:lnTo>
+                    <a:pt x="0" y="0"/>
+                  </a:lnTo>
+                  <a:close/>
+                  <a:moveTo>
+                    <a:pt x="14748" y="8038"/>
+                  </a:moveTo>
+                  <a:lnTo>
+                    <a:pt x="600" y="8038"/>
+                  </a:lnTo>
+                  <a:lnTo>
+                    <a:pt x="600" y="592"/>
+                  </a:lnTo>
+                  <a:lnTo>
+                    <a:pt x="14748" y="592"/>
+                  </a:lnTo>
+                  <a:lnTo>
+                    <a:pt x="14748" y="8038"/>
+                  </a:lnTo>
+                  <a:close/>
+                </a:path>
+              </a:pathLst>
+            </a:custGeom>
+            <a:solidFill>
+              <a:srgbClr val="FFFFFF"/>
+            </a:solidFill>
+            <a:ln>
+              <a:noFill/>
+            </a:ln>
+          </p:spPr>
+        </p:sp>
+      </p:grpSp>
+      <p:sp>
+        <p:nvSpPr>
+          <p:cNvPr id="2" name="Title 1">
+            <a:extLst>
+              <a:ext uri="{FF2B5EF4-FFF2-40B4-BE49-F238E27FC236}">
+                <a16:creationId xmlns:a16="http://schemas.microsoft.com/office/drawing/2014/main" id="{D0DEBAF0-9320-4AAA-ACC8-9C26D550CA87}"/>
+              </a:ext>
+            </a:extLst>
+          </p:cNvPr>
+          <p:cNvSpPr>
+            <a:spLocks noGrp="1"/>
+          </p:cNvSpPr>
+          <p:nvPr>
+            <p:ph type="title"/>
+          </p:nvPr>
+        </p:nvSpPr>
+        <p:spPr>
+          <a:xfrm>
+            <a:off x="1683171" y="1169773"/>
+            <a:ext cx="8825658" cy="2870161"/>
+          </a:xfrm>
+        </p:spPr>
+        <p:txBody>
+          <a:bodyPr vert="horz" lIns="91440" tIns="45720" rIns="91440" bIns="45720" rtlCol="0" anchor="b">
+            <a:normAutofit/>
+          </a:bodyPr>
+          <a:lstStyle/>
+          <a:p>
+            <a:pPr algn="ctr"/>
+            <a:r>
+              <a:rPr lang="en-US" sz="5400">
+                <a:solidFill>
+                  <a:schemeClr val="tx1"/>
+                </a:solidFill>
+              </a:rPr>
+              <a:t>Questions?</a:t>
+            </a:r>
+          </a:p>
+        </p:txBody>
+      </p:sp>
+      <p:cxnSp>
+        <p:nvCxnSpPr>
+          <p:cNvPr id="18" name="Straight Connector 17">
+            <a:extLst>
+              <a:ext uri="{FF2B5EF4-FFF2-40B4-BE49-F238E27FC236}">
+                <a16:creationId xmlns:a16="http://schemas.microsoft.com/office/drawing/2014/main" id="{E81F53E2-F556-42FA-8D24-113839EE19F8}"/>
+              </a:ext>
+              <a:ext uri="{C183D7F6-B498-43B3-948B-1728B52AA6E4}">
+                <adec:decorative xmlns:adec="http://schemas.microsoft.com/office/drawing/2017/decorative" val="1"/>
+              </a:ext>
+            </a:extLst>
+          </p:cNvPr>
+          <p:cNvCxnSpPr>
+            <a:cxnSpLocks noGrp="1" noRot="1" noChangeAspect="1" noMove="1" noResize="1" noEditPoints="1" noAdjustHandles="1" noChangeArrowheads="1" noChangeShapeType="1"/>
+          </p:cNvCxnSpPr>
+          <p:nvPr>
+            <p:extLst>
+              <p:ext uri="{386F3935-93C4-4BCD-93E2-E3B085C9AB24}">
+                <p16:designElem xmlns:p16="http://schemas.microsoft.com/office/powerpoint/2015/main" val="1"/>
+              </p:ext>
+            </p:extLst>
+          </p:nvPr>
+        </p:nvCxnSpPr>
+        <p:spPr>
+          <a:xfrm>
+            <a:off x="5758249" y="4166888"/>
+            <a:ext cx="675502" cy="0"/>
+          </a:xfrm>
+          <a:prstGeom prst="line">
+            <a:avLst/>
+          </a:prstGeom>
+          <a:ln w="19050">
+            <a:solidFill>
+              <a:srgbClr val="FFFFFF"/>
+            </a:solidFill>
+          </a:ln>
+        </p:spPr>
+        <p:style>
+          <a:lnRef idx="1">
+            <a:schemeClr val="accent1"/>
+          </a:lnRef>
+          <a:fillRef idx="0">
+            <a:schemeClr val="accent1"/>
+          </a:fillRef>
+          <a:effectRef idx="0">
+            <a:schemeClr val="accent1"/>
+          </a:effectRef>
+          <a:fontRef idx="minor">
+            <a:schemeClr val="tx1"/>
+          </a:fontRef>
+        </p:style>
+      </p:cxnSp>
+      <p:pic>
+        <p:nvPicPr>
+          <p:cNvPr id="11" name="Picture 10">
+            <a:extLst>
+              <a:ext uri="{FF2B5EF4-FFF2-40B4-BE49-F238E27FC236}">
+                <a16:creationId xmlns:a16="http://schemas.microsoft.com/office/drawing/2014/main" id="{8067D712-B97B-489F-93C0-EFC22B0553A6}"/>
+              </a:ext>
+            </a:extLst>
+          </p:cNvPr>
+          <p:cNvPicPr>
+            <a:picLocks noChangeAspect="1"/>
+          </p:cNvPicPr>
+          <p:nvPr/>
+        </p:nvPicPr>
+        <p:blipFill rotWithShape="1">
+          <a:blip r:embed="rId3"/>
+          <a:srcRect r="32041"/>
+          <a:stretch/>
+        </p:blipFill>
+        <p:spPr>
+          <a:xfrm>
+            <a:off x="8334103" y="2945150"/>
+            <a:ext cx="1548871" cy="1127002"/>
+          </a:xfrm>
+          <a:prstGeom prst="rect">
+            <a:avLst/>
+          </a:prstGeom>
+        </p:spPr>
+      </p:pic>
+      <p:pic>
+        <p:nvPicPr>
+          <p:cNvPr id="13" name="Picture 12">
+            <a:extLst>
+              <a:ext uri="{FF2B5EF4-FFF2-40B4-BE49-F238E27FC236}">
+                <a16:creationId xmlns:a16="http://schemas.microsoft.com/office/drawing/2014/main" id="{8067D712-B97B-489F-93C0-EFC22B0553A6}"/>
+              </a:ext>
+            </a:extLst>
+          </p:cNvPr>
+          <p:cNvPicPr>
+            <a:picLocks noChangeAspect="1"/>
+          </p:cNvPicPr>
+          <p:nvPr/>
+        </p:nvPicPr>
+        <p:blipFill rotWithShape="1">
+          <a:blip r:embed="rId3"/>
+          <a:srcRect r="32041"/>
+          <a:stretch/>
+        </p:blipFill>
+        <p:spPr>
+          <a:xfrm flipH="1">
+            <a:off x="2281350" y="2945150"/>
+            <a:ext cx="1548871" cy="1127002"/>
+          </a:xfrm>
+          <a:prstGeom prst="rect">
+            <a:avLst/>
+          </a:prstGeom>
+        </p:spPr>
+      </p:pic>
+      <p:pic>
+        <p:nvPicPr>
+          <p:cNvPr id="17" name="Picture 16" descr="Related image"/>
+          <p:cNvPicPr>
+            <a:picLocks noChangeAspect="1" noChangeArrowheads="1"/>
+          </p:cNvPicPr>
+          <p:nvPr/>
+        </p:nvPicPr>
+        <p:blipFill>
+          <a:blip r:embed="rId4">
+            <a:clrChange>
+              <a:clrFrom>
+                <a:srgbClr val="F7F7FF"/>
+              </a:clrFrom>
+              <a:clrTo>
+                <a:srgbClr val="F7F7FF">
+                  <a:alpha val="0"/>
+                </a:srgbClr>
+              </a:clrTo>
+            </a:clrChange>
+            <a:extLst>
+              <a:ext uri="{28A0092B-C50C-407E-A947-70E740481C1C}">
+                <a14:useLocalDpi xmlns:a14="http://schemas.microsoft.com/office/drawing/2010/main" val="0"/>
+              </a:ext>
+            </a:extLst>
+          </a:blip>
+          <a:srcRect/>
+          <a:stretch>
+            <a:fillRect/>
+          </a:stretch>
+        </p:blipFill>
+        <p:spPr bwMode="auto">
+          <a:xfrm>
+            <a:off x="6661223" y="4485219"/>
+            <a:ext cx="3393979" cy="1586267"/>
+          </a:xfrm>
+          <a:prstGeom prst="rect">
+            <a:avLst/>
+          </a:prstGeom>
+          <a:noFill/>
+          <a:extLst>
+            <a:ext uri="{909E8E84-426E-40DD-AFC4-6F175D3DCCD1}">
+              <a14:hiddenFill xmlns:a14="http://schemas.microsoft.com/office/drawing/2010/main">
+                <a:solidFill>
+                  <a:srgbClr val="FFFFFF"/>
+                </a:solidFill>
+              </a14:hiddenFill>
+            </a:ext>
+          </a:extLst>
+        </p:spPr>
+      </p:pic>
+      <p:grpSp>
+        <p:nvGrpSpPr>
+          <p:cNvPr id="19" name="Group 18"/>
+          <p:cNvGrpSpPr/>
+          <p:nvPr/>
+        </p:nvGrpSpPr>
+        <p:grpSpPr>
+          <a:xfrm>
+            <a:off x="7000675" y="4320119"/>
+            <a:ext cx="2844915" cy="1231184"/>
+            <a:chOff x="8242300" y="4237083"/>
+            <a:chExt cx="2844915" cy="1231184"/>
+          </a:xfrm>
+        </p:grpSpPr>
+        <p:pic>
+          <p:nvPicPr>
+            <p:cNvPr id="20" name="Picture 19">
+              <a:extLst>
+                <a:ext uri="{FF2B5EF4-FFF2-40B4-BE49-F238E27FC236}">
+                  <a16:creationId xmlns:a16="http://schemas.microsoft.com/office/drawing/2014/main" id="{8067D712-B97B-489F-93C0-EFC22B0553A6}"/>
+                </a:ext>
+              </a:extLst>
+            </p:cNvPr>
+            <p:cNvPicPr>
+              <a:picLocks noChangeAspect="1"/>
+            </p:cNvPicPr>
+            <p:nvPr/>
+          </p:nvPicPr>
+          <p:blipFill rotWithShape="1">
+            <a:blip r:embed="rId3"/>
+            <a:srcRect r="32041"/>
+            <a:stretch/>
+          </p:blipFill>
+          <p:spPr>
+            <a:xfrm rot="1676086" flipH="1">
+              <a:off x="9538344" y="4341265"/>
+              <a:ext cx="1548871" cy="1127002"/>
+            </a:xfrm>
+            <a:prstGeom prst="rect">
+              <a:avLst/>
+            </a:prstGeom>
+          </p:spPr>
+        </p:pic>
+        <p:pic>
+          <p:nvPicPr>
+            <p:cNvPr id="21" name="Picture 20">
+              <a:extLst>
+                <a:ext uri="{FF2B5EF4-FFF2-40B4-BE49-F238E27FC236}">
+                  <a16:creationId xmlns:a16="http://schemas.microsoft.com/office/drawing/2014/main" id="{8067D712-B97B-489F-93C0-EFC22B0553A6}"/>
+                </a:ext>
+              </a:extLst>
+            </p:cNvPr>
+            <p:cNvPicPr>
+              <a:picLocks noChangeAspect="1"/>
+            </p:cNvPicPr>
+            <p:nvPr/>
+          </p:nvPicPr>
+          <p:blipFill rotWithShape="1">
+            <a:blip r:embed="rId3"/>
+            <a:srcRect r="32041"/>
+            <a:stretch/>
+          </p:blipFill>
+          <p:spPr>
+            <a:xfrm flipH="1">
+              <a:off x="8242300" y="4237083"/>
+              <a:ext cx="1675036" cy="1218803"/>
+            </a:xfrm>
+            <a:prstGeom prst="rect">
+              <a:avLst/>
+            </a:prstGeom>
+          </p:spPr>
+        </p:pic>
+      </p:grpSp>
+      <p:pic>
+        <p:nvPicPr>
+          <p:cNvPr id="22" name="Picture 21" descr="Related image"/>
+          <p:cNvPicPr>
+            <a:picLocks noChangeAspect="1" noChangeArrowheads="1"/>
+          </p:cNvPicPr>
+          <p:nvPr/>
+        </p:nvPicPr>
+        <p:blipFill>
+          <a:blip r:embed="rId4">
+            <a:clrChange>
+              <a:clrFrom>
+                <a:srgbClr val="F7F7FF"/>
+              </a:clrFrom>
+              <a:clrTo>
+                <a:srgbClr val="F7F7FF">
+                  <a:alpha val="0"/>
+                </a:srgbClr>
+              </a:clrTo>
+            </a:clrChange>
+            <a:extLst>
+              <a:ext uri="{28A0092B-C50C-407E-A947-70E740481C1C}">
+                <a14:useLocalDpi xmlns:a14="http://schemas.microsoft.com/office/drawing/2010/main" val="0"/>
+              </a:ext>
+            </a:extLst>
+          </a:blip>
+          <a:srcRect/>
+          <a:stretch>
+            <a:fillRect/>
+          </a:stretch>
+        </p:blipFill>
+        <p:spPr bwMode="auto">
+          <a:xfrm flipH="1">
+            <a:off x="2133231" y="4576329"/>
+            <a:ext cx="3393979" cy="1586267"/>
+          </a:xfrm>
+          <a:prstGeom prst="rect">
+            <a:avLst/>
+          </a:prstGeom>
+          <a:noFill/>
+          <a:extLst>
+            <a:ext uri="{909E8E84-426E-40DD-AFC4-6F175D3DCCD1}">
+              <a14:hiddenFill xmlns:a14="http://schemas.microsoft.com/office/drawing/2010/main">
+                <a:solidFill>
+                  <a:srgbClr val="FFFFFF"/>
+                </a:solidFill>
+              </a14:hiddenFill>
+            </a:ext>
+          </a:extLst>
+        </p:spPr>
+      </p:pic>
+      <p:grpSp>
+        <p:nvGrpSpPr>
+          <p:cNvPr id="23" name="Group 22"/>
+          <p:cNvGrpSpPr/>
+          <p:nvPr/>
+        </p:nvGrpSpPr>
+        <p:grpSpPr>
+          <a:xfrm flipH="1">
+            <a:off x="2346170" y="4372210"/>
+            <a:ext cx="2844915" cy="1231184"/>
+            <a:chOff x="8242300" y="4237083"/>
+            <a:chExt cx="2844915" cy="1231184"/>
+          </a:xfrm>
+        </p:grpSpPr>
+        <p:pic>
+          <p:nvPicPr>
+            <p:cNvPr id="24" name="Picture 23">
+              <a:extLst>
+                <a:ext uri="{FF2B5EF4-FFF2-40B4-BE49-F238E27FC236}">
+                  <a16:creationId xmlns:a16="http://schemas.microsoft.com/office/drawing/2014/main" id="{8067D712-B97B-489F-93C0-EFC22B0553A6}"/>
+                </a:ext>
+              </a:extLst>
+            </p:cNvPr>
+            <p:cNvPicPr>
+              <a:picLocks noChangeAspect="1"/>
+            </p:cNvPicPr>
+            <p:nvPr/>
+          </p:nvPicPr>
+          <p:blipFill rotWithShape="1">
+            <a:blip r:embed="rId3"/>
+            <a:srcRect r="32041"/>
+            <a:stretch/>
+          </p:blipFill>
+          <p:spPr>
+            <a:xfrm rot="1676086" flipH="1">
+              <a:off x="9538344" y="4341265"/>
+              <a:ext cx="1548871" cy="1127002"/>
+            </a:xfrm>
+            <a:prstGeom prst="rect">
+              <a:avLst/>
+            </a:prstGeom>
+          </p:spPr>
+        </p:pic>
+        <p:pic>
+          <p:nvPicPr>
+            <p:cNvPr id="25" name="Picture 24">
+              <a:extLst>
+                <a:ext uri="{FF2B5EF4-FFF2-40B4-BE49-F238E27FC236}">
+                  <a16:creationId xmlns:a16="http://schemas.microsoft.com/office/drawing/2014/main" id="{8067D712-B97B-489F-93C0-EFC22B0553A6}"/>
+                </a:ext>
+              </a:extLst>
+            </p:cNvPr>
+            <p:cNvPicPr>
+              <a:picLocks noChangeAspect="1"/>
+            </p:cNvPicPr>
+            <p:nvPr/>
+          </p:nvPicPr>
+          <p:blipFill rotWithShape="1">
+            <a:blip r:embed="rId3"/>
+            <a:srcRect r="32041"/>
+            <a:stretch/>
+          </p:blipFill>
+          <p:spPr>
+            <a:xfrm flipH="1">
+              <a:off x="8242300" y="4237083"/>
+              <a:ext cx="1675036" cy="1218803"/>
+            </a:xfrm>
+            <a:prstGeom prst="rect">
+              <a:avLst/>
+            </a:prstGeom>
+          </p:spPr>
+        </p:pic>
+      </p:grpSp>
+    </p:spTree>
+    <p:extLst>
+      <p:ext uri="{BB962C8B-B14F-4D97-AF65-F5344CB8AC3E}">
+        <p14:creationId xmlns:p14="http://schemas.microsoft.com/office/powerpoint/2010/main" val="1618732212"/>
+      </p:ext>
+    </p:extLst>
+  </p:cSld>
+  <p:clrMapOvr>
+    <a:overrideClrMapping bg1="dk1" tx1="lt1" bg2="dk2" tx2="lt2" accent1="accent1" accent2="accent2" accent3="accent3" accent4="accent4" accent5="accent5" accent6="accent6" hlink="hlink" folHlink="folHlink"/>
+  </p:clrMapOvr>
+  <p:timing>
+    <p:tnLst>
+      <p:par>
+        <p:cTn id="1" dur="indefinite" restart="never" nodeType="tmRoot">
+          <p:childTnLst>
+            <p:seq concurrent="1" nextAc="seek">
+              <p:cTn id="2" dur="indefinite" nodeType="mainSeq">
+                <p:childTnLst>
+                  <p:par>
+                    <p:cTn id="3" fill="hold">
+                      <p:stCondLst>
+                        <p:cond delay="indefinite"/>
+                        <p:cond evt="onBegin" delay="0">
+                          <p:tn val="2"/>
+                        </p:cond>
+                      </p:stCondLst>
+                      <p:childTnLst>
+                        <p:par>
+                          <p:cTn id="4" fill="hold">
+                            <p:stCondLst>
+                              <p:cond delay="0"/>
+                            </p:stCondLst>
+                            <p:childTnLst>
+                              <p:par>
+                                <p:cTn id="5" presetID="2" presetClass="entr" presetSubtype="4" fill="hold" nodeType="withEffect">
+                                  <p:stCondLst>
+                                    <p:cond delay="0"/>
+                                  </p:stCondLst>
+                                  <p:childTnLst>
+                                    <p:set>
+                                      <p:cBhvr>
+                                        <p:cTn id="6" dur="1" fill="hold">
+                                          <p:stCondLst>
+                                            <p:cond delay="0"/>
+                                          </p:stCondLst>
+                                        </p:cTn>
+                                        <p:tgtEl>
+                                          <p:spTgt spid="19"/>
+                                        </p:tgtEl>
+                                        <p:attrNameLst>
+                                          <p:attrName>style.visibility</p:attrName>
+                                        </p:attrNameLst>
+                                      </p:cBhvr>
+                                      <p:to>
+                                        <p:strVal val="visible"/>
+                                      </p:to>
+                                    </p:set>
+                                    <p:anim calcmode="lin" valueType="num">
+                                      <p:cBhvr additive="base">
+                                        <p:cTn id="7" dur="500" fill="hold"/>
+                                        <p:tgtEl>
+                                          <p:spTgt spid="19"/>
+                                        </p:tgtEl>
+                                        <p:attrNameLst>
+                                          <p:attrName>ppt_x</p:attrName>
+                                        </p:attrNameLst>
+                                      </p:cBhvr>
+                                      <p:tavLst>
+                                        <p:tav tm="0">
+                                          <p:val>
+                                            <p:strVal val="#ppt_x"/>
+                                          </p:val>
+                                        </p:tav>
+                                        <p:tav tm="100000">
+                                          <p:val>
+                                            <p:strVal val="#ppt_x"/>
+                                          </p:val>
+                                        </p:tav>
+                                      </p:tavLst>
+                                    </p:anim>
+                                    <p:anim calcmode="lin" valueType="num">
+                                      <p:cBhvr additive="base">
+                                        <p:cTn id="8" dur="500" fill="hold"/>
+                                        <p:tgtEl>
+                                          <p:spTgt spid="19"/>
+                                        </p:tgtEl>
+                                        <p:attrNameLst>
+                                          <p:attrName>ppt_y</p:attrName>
+                                        </p:attrNameLst>
+                                      </p:cBhvr>
+                                      <p:tavLst>
+                                        <p:tav tm="0">
+                                          <p:val>
+                                            <p:strVal val="1+#ppt_h/2"/>
+                                          </p:val>
+                                        </p:tav>
+                                        <p:tav tm="100000">
+                                          <p:val>
+                                            <p:strVal val="#ppt_y"/>
+                                          </p:val>
+                                        </p:tav>
+                                      </p:tavLst>
+                                    </p:anim>
+                                  </p:childTnLst>
+                                </p:cTn>
+                              </p:par>
+                              <p:par>
+                                <p:cTn id="9" presetID="2" presetClass="entr" presetSubtype="4" fill="hold" nodeType="withEffect">
+                                  <p:stCondLst>
+                                    <p:cond delay="0"/>
+                                  </p:stCondLst>
+                                  <p:childTnLst>
+                                    <p:set>
+                                      <p:cBhvr>
+                                        <p:cTn id="10" dur="1" fill="hold">
+                                          <p:stCondLst>
+                                            <p:cond delay="0"/>
+                                          </p:stCondLst>
+                                        </p:cTn>
+                                        <p:tgtEl>
+                                          <p:spTgt spid="23"/>
+                                        </p:tgtEl>
+                                        <p:attrNameLst>
+                                          <p:attrName>style.visibility</p:attrName>
+                                        </p:attrNameLst>
+                                      </p:cBhvr>
+                                      <p:to>
+                                        <p:strVal val="visible"/>
+                                      </p:to>
+                                    </p:set>
+                                    <p:anim calcmode="lin" valueType="num">
+                                      <p:cBhvr additive="base">
+                                        <p:cTn id="11" dur="500" fill="hold"/>
+                                        <p:tgtEl>
+                                          <p:spTgt spid="23"/>
+                                        </p:tgtEl>
+                                        <p:attrNameLst>
+                                          <p:attrName>ppt_x</p:attrName>
+                                        </p:attrNameLst>
+                                      </p:cBhvr>
+                                      <p:tavLst>
+                                        <p:tav tm="0">
+                                          <p:val>
+                                            <p:strVal val="#ppt_x"/>
+                                          </p:val>
+                                        </p:tav>
+                                        <p:tav tm="100000">
+                                          <p:val>
+                                            <p:strVal val="#ppt_x"/>
+                                          </p:val>
+                                        </p:tav>
+                                      </p:tavLst>
+                                    </p:anim>
+                                    <p:anim calcmode="lin" valueType="num">
+                                      <p:cBhvr additive="base">
+                                        <p:cTn id="12" dur="500" fill="hold"/>
+                                        <p:tgtEl>
+                                          <p:spTgt spid="23"/>
+                                        </p:tgtEl>
+                                        <p:attrNameLst>
+                                          <p:attrName>ppt_y</p:attrName>
+                                        </p:attrNameLst>
+                                      </p:cBhvr>
+                                      <p:tavLst>
+                                        <p:tav tm="0">
+                                          <p:val>
+                                            <p:strVal val="1+#ppt_h/2"/>
+                                          </p:val>
+                                        </p:tav>
+                                        <p:tav tm="100000">
+                                          <p:val>
+                                            <p:strVal val="#ppt_y"/>
+                                          </p:val>
+                                        </p:tav>
+                                      </p:tavLst>
+                                    </p:anim>
+                                  </p:childTnLst>
+                                </p:cTn>
+                              </p:par>
+                            </p:childTnLst>
+                          </p:cTn>
+                        </p:par>
+                      </p:childTnLst>
+                    </p:cTn>
+                  </p:par>
+                </p:childTnLst>
+              </p:cTn>
+              <p:prevCondLst>
+                <p:cond evt="onPrev" delay="0">
+                  <p:tgtEl>
+                    <p:sldTgt/>
+                  </p:tgtEl>
+                </p:cond>
+              </p:prevCondLst>
+              <p:nextCondLst>
+                <p:cond evt="onNext" delay="0">
+                  <p:tgtEl>
+                    <p:sldTgt/>
+                  </p:tgtEl>
+                </p:cond>
+              </p:nextCondLst>
+            </p:seq>
+          </p:childTnLst>
+        </p:cTn>
+      </p:par>
+    </p:tnLst>
+  </p:timing>
+</p:sld>
+</file>
+
 <file path=ppt/slides/slide2.xml><?xml version="1.0" encoding="utf-8"?>
 <p:sld xmlns:a="http://schemas.openxmlformats.org/drawingml/2006/main" xmlns:r="http://schemas.openxmlformats.org/officeDocument/2006/relationships" xmlns:p="http://schemas.openxmlformats.org/presentationml/2006/main">
   <p:cSld>
@@ -14524,7 +15519,7 @@
           <p:cNvPr id="2" name="Title 1">
             <a:extLst>
               <a:ext uri="{FF2B5EF4-FFF2-40B4-BE49-F238E27FC236}">
-                <a16:creationId xmlns="" xmlns:a16="http://schemas.microsoft.com/office/drawing/2014/main" id="{D2B0F909-E5CE-4CB4-8C58-BC8C430B76D1}"/>
+                <a16:creationId xmlns:a16="http://schemas.microsoft.com/office/drawing/2014/main" id="{D2B0F909-E5CE-4CB4-8C58-BC8C430B76D1}"/>
               </a:ext>
             </a:extLst>
           </p:cNvPr>
@@ -14552,7 +15547,7 @@
           <p:cNvPr id="3" name="Content Placeholder 2">
             <a:extLst>
               <a:ext uri="{FF2B5EF4-FFF2-40B4-BE49-F238E27FC236}">
-                <a16:creationId xmlns="" xmlns:a16="http://schemas.microsoft.com/office/drawing/2014/main" id="{0300719D-D58F-4A74-8619-1C8960E52570}"/>
+                <a16:creationId xmlns:a16="http://schemas.microsoft.com/office/drawing/2014/main" id="{0300719D-D58F-4A74-8619-1C8960E52570}"/>
               </a:ext>
             </a:extLst>
           </p:cNvPr>
@@ -14596,21 +15591,8 @@
           <a:p>
             <a:r>
               <a:rPr lang="en-US" dirty="0"/>
-              <a:t>Each map </a:t>
+              <a:t>Each map will have different environment behavior and hazards</a:t>
             </a:r>
-            <a:r>
-              <a:rPr lang="en-US" dirty="0" smtClean="0"/>
-              <a:t>will have different </a:t>
-            </a:r>
-            <a:r>
-              <a:rPr lang="en-US" dirty="0"/>
-              <a:t>environment </a:t>
-            </a:r>
-            <a:r>
-              <a:rPr lang="en-US" dirty="0" smtClean="0"/>
-              <a:t>behavior and hazards</a:t>
-            </a:r>
-            <a:endParaRPr lang="en-US" dirty="0"/>
           </a:p>
           <a:p>
             <a:r>
@@ -14804,13 +15786,6 @@
   <p:clrMapOvr>
     <a:masterClrMapping/>
   </p:clrMapOvr>
-  <p:timing>
-    <p:tnLst>
-      <p:par>
-        <p:cTn id="1" dur="indefinite" restart="never" nodeType="tmRoot"/>
-      </p:par>
-    </p:tnLst>
-  </p:timing>
 </p:sld>
 </file>
 
@@ -14836,7 +15811,7 @@
           <p:cNvPr id="2" name="Title 1">
             <a:extLst>
               <a:ext uri="{FF2B5EF4-FFF2-40B4-BE49-F238E27FC236}">
-                <a16:creationId xmlns="" xmlns:a16="http://schemas.microsoft.com/office/drawing/2014/main" id="{E9D18468-CB11-4B2D-9D6D-1B642E1694B4}"/>
+                <a16:creationId xmlns:a16="http://schemas.microsoft.com/office/drawing/2014/main" id="{B3FB76F5-A542-4FD9-A455-A6D2AFD4C0CE}"/>
               </a:ext>
             </a:extLst>
           </p:cNvPr>
@@ -14854,7 +15829,7 @@
           <a:p>
             <a:r>
               <a:rPr lang="en-US" dirty="0"/>
-              <a:t>Game Decisions</a:t>
+              <a:t>Game Explanation</a:t>
             </a:r>
           </a:p>
         </p:txBody>
@@ -14864,7 +15839,165 @@
           <p:cNvPr id="3" name="Content Placeholder 2">
             <a:extLst>
               <a:ext uri="{FF2B5EF4-FFF2-40B4-BE49-F238E27FC236}">
-                <a16:creationId xmlns="" xmlns:a16="http://schemas.microsoft.com/office/drawing/2014/main" id="{D59B887A-DC95-4BCC-9350-FB77637E1024}"/>
+                <a16:creationId xmlns:a16="http://schemas.microsoft.com/office/drawing/2014/main" id="{C43523E0-1A1C-4FF1-8FD2-2D3D4203E3E5}"/>
+              </a:ext>
+            </a:extLst>
+          </p:cNvPr>
+          <p:cNvSpPr>
+            <a:spLocks noGrp="1"/>
+          </p:cNvSpPr>
+          <p:nvPr>
+            <p:ph idx="1"/>
+          </p:nvPr>
+        </p:nvSpPr>
+        <p:spPr/>
+        <p:txBody>
+          <a:bodyPr>
+            <a:normAutofit fontScale="85000" lnSpcReduction="20000"/>
+          </a:bodyPr>
+          <a:lstStyle/>
+          <a:p>
+            <a:r>
+              <a:rPr lang="en-US" dirty="0"/>
+              <a:t>2D turn-based tactical shooter, inspired by Worms</a:t>
+            </a:r>
+          </a:p>
+          <a:p>
+            <a:r>
+              <a:rPr lang="en-US" dirty="0"/>
+              <a:t>Environment</a:t>
+            </a:r>
+          </a:p>
+          <a:p>
+            <a:pPr lvl="1"/>
+            <a:r>
+              <a:rPr lang="en-US" dirty="0"/>
+              <a:t>Tile-based destroyable map</a:t>
+            </a:r>
+          </a:p>
+          <a:p>
+            <a:pPr lvl="1"/>
+            <a:r>
+              <a:rPr lang="en-US" dirty="0"/>
+              <a:t>Environment adversaries such as the sun attacking you or water rising</a:t>
+            </a:r>
+          </a:p>
+          <a:p>
+            <a:r>
+              <a:rPr lang="en-US" dirty="0"/>
+              <a:t>Weapons and Tools</a:t>
+            </a:r>
+          </a:p>
+          <a:p>
+            <a:pPr lvl="1"/>
+            <a:r>
+              <a:rPr lang="en-US" dirty="0"/>
+              <a:t>Arsenal of weapons shared by each team</a:t>
+            </a:r>
+          </a:p>
+          <a:p>
+            <a:pPr lvl="1"/>
+            <a:r>
+              <a:rPr lang="en-US" dirty="0"/>
+              <a:t>Weapon Types: Gun, Launcher, Melee, Grenades</a:t>
+            </a:r>
+          </a:p>
+          <a:p>
+            <a:pPr lvl="1"/>
+            <a:r>
+              <a:rPr lang="en-US" dirty="0"/>
+              <a:t>Tools: Teleporter, Tile Creator/Remover</a:t>
+            </a:r>
+          </a:p>
+          <a:p>
+            <a:r>
+              <a:rPr lang="en-US" dirty="0"/>
+              <a:t>Player Controls</a:t>
+            </a:r>
+          </a:p>
+          <a:p>
+            <a:pPr lvl="1"/>
+            <a:r>
+              <a:rPr lang="en-US" dirty="0"/>
+              <a:t>WASD or Arrows for movement</a:t>
+            </a:r>
+          </a:p>
+          <a:p>
+            <a:pPr lvl="1"/>
+            <a:r>
+              <a:rPr lang="en-US" dirty="0"/>
+              <a:t>Mouse for aiming</a:t>
+            </a:r>
+          </a:p>
+          <a:p>
+            <a:endParaRPr lang="en-US" dirty="0"/>
+          </a:p>
+        </p:txBody>
+      </p:sp>
+    </p:spTree>
+    <p:extLst>
+      <p:ext uri="{BB962C8B-B14F-4D97-AF65-F5344CB8AC3E}">
+        <p14:creationId xmlns:p14="http://schemas.microsoft.com/office/powerpoint/2010/main" val="1950281806"/>
+      </p:ext>
+    </p:extLst>
+  </p:cSld>
+  <p:clrMapOvr>
+    <a:masterClrMapping/>
+  </p:clrMapOvr>
+</p:sld>
+</file>
+
+<file path=ppt/slides/slide4.xml><?xml version="1.0" encoding="utf-8"?>
+<p:sld xmlns:a="http://schemas.openxmlformats.org/drawingml/2006/main" xmlns:r="http://schemas.openxmlformats.org/officeDocument/2006/relationships" xmlns:p="http://schemas.openxmlformats.org/presentationml/2006/main">
+  <p:cSld>
+    <p:spTree>
+      <p:nvGrpSpPr>
+        <p:cNvPr id="1" name=""/>
+        <p:cNvGrpSpPr/>
+        <p:nvPr/>
+      </p:nvGrpSpPr>
+      <p:grpSpPr>
+        <a:xfrm>
+          <a:off x="0" y="0"/>
+          <a:ext cx="0" cy="0"/>
+          <a:chOff x="0" y="0"/>
+          <a:chExt cx="0" cy="0"/>
+        </a:xfrm>
+      </p:grpSpPr>
+      <p:sp>
+        <p:nvSpPr>
+          <p:cNvPr id="2" name="Title 1">
+            <a:extLst>
+              <a:ext uri="{FF2B5EF4-FFF2-40B4-BE49-F238E27FC236}">
+                <a16:creationId xmlns:a16="http://schemas.microsoft.com/office/drawing/2014/main" id="{E9D18468-CB11-4B2D-9D6D-1B642E1694B4}"/>
+              </a:ext>
+            </a:extLst>
+          </p:cNvPr>
+          <p:cNvSpPr>
+            <a:spLocks noGrp="1"/>
+          </p:cNvSpPr>
+          <p:nvPr>
+            <p:ph type="title"/>
+          </p:nvPr>
+        </p:nvSpPr>
+        <p:spPr/>
+        <p:txBody>
+          <a:bodyPr/>
+          <a:lstStyle/>
+          <a:p>
+            <a:r>
+              <a:rPr lang="en-US" dirty="0"/>
+              <a:t>Game Decisions</a:t>
+            </a:r>
+          </a:p>
+        </p:txBody>
+      </p:sp>
+      <p:sp>
+        <p:nvSpPr>
+          <p:cNvPr id="3" name="Content Placeholder 2">
+            <a:extLst>
+              <a:ext uri="{FF2B5EF4-FFF2-40B4-BE49-F238E27FC236}">
+                <a16:creationId xmlns:a16="http://schemas.microsoft.com/office/drawing/2014/main" id="{D59B887A-DC95-4BCC-9350-FB77637E1024}"/>
               </a:ext>
             </a:extLst>
           </p:cNvPr>
@@ -14895,27 +16028,15 @@
           <a:p>
             <a:pPr lvl="1"/>
             <a:r>
-              <a:rPr lang="en-US" dirty="0" smtClean="0"/>
-              <a:t>Better than Game Maker </a:t>
+              <a:rPr lang="en-US" dirty="0"/>
+              <a:t>Better than Game Maker and Unreal for 2D games (From what we know)</a:t>
             </a:r>
+          </a:p>
+          <a:p>
+            <a:pPr lvl="1"/>
             <a:r>
               <a:rPr lang="en-US" dirty="0"/>
-              <a:t>and </a:t>
-            </a:r>
-            <a:r>
-              <a:rPr lang="en-US" dirty="0" smtClean="0"/>
-              <a:t>Unreal for 2D games (From what we know)</a:t>
-            </a:r>
-          </a:p>
-          <a:p>
-            <a:pPr lvl="1"/>
-            <a:r>
-              <a:rPr lang="en-US" dirty="0" smtClean="0"/>
-              <a:t>Prior </a:t>
-            </a:r>
-            <a:r>
-              <a:rPr lang="en-US" dirty="0"/>
-              <a:t>experience</a:t>
+              <a:t>Prior experience</a:t>
             </a:r>
           </a:p>
           <a:p>
@@ -14935,15 +16056,7 @@
             <a:pPr lvl="1"/>
             <a:r>
               <a:rPr lang="en-US" dirty="0"/>
-              <a:t>Turn-based system allows </a:t>
-            </a:r>
-            <a:r>
-              <a:rPr lang="en-US" dirty="0" smtClean="0"/>
-              <a:t>multiplayer </a:t>
-            </a:r>
-            <a:r>
-              <a:rPr lang="en-US" dirty="0"/>
-              <a:t>with one computer</a:t>
+              <a:t>Turn-based system allows multiplayer with one computer</a:t>
             </a:r>
           </a:p>
         </p:txBody>
@@ -15122,17 +16235,10 @@
   <p:clrMapOvr>
     <a:masterClrMapping/>
   </p:clrMapOvr>
-  <p:timing>
-    <p:tnLst>
-      <p:par>
-        <p:cTn id="1" dur="indefinite" restart="never" nodeType="tmRoot"/>
-      </p:par>
-    </p:tnLst>
-  </p:timing>
 </p:sld>
 </file>
 
-<file path=ppt/slides/slide4.xml><?xml version="1.0" encoding="utf-8"?>
+<file path=ppt/slides/slide5.xml><?xml version="1.0" encoding="utf-8"?>
 <p:sld xmlns:a="http://schemas.openxmlformats.org/drawingml/2006/main" xmlns:r="http://schemas.openxmlformats.org/officeDocument/2006/relationships" xmlns:p="http://schemas.openxmlformats.org/presentationml/2006/main">
   <p:cSld>
     <p:spTree>
@@ -15154,7 +16260,7 @@
           <p:cNvPr id="2" name="Title 1">
             <a:extLst>
               <a:ext uri="{FF2B5EF4-FFF2-40B4-BE49-F238E27FC236}">
-                <a16:creationId xmlns="" xmlns:a16="http://schemas.microsoft.com/office/drawing/2014/main" id="{3DE13417-B8E6-422F-8639-04E2769F8A6D}"/>
+                <a16:creationId xmlns:a16="http://schemas.microsoft.com/office/drawing/2014/main" id="{3DE13417-B8E6-422F-8639-04E2769F8A6D}"/>
               </a:ext>
             </a:extLst>
           </p:cNvPr>
@@ -15182,7 +16288,7 @@
           <p:cNvPr id="5" name="Picture 4">
             <a:extLst>
               <a:ext uri="{FF2B5EF4-FFF2-40B4-BE49-F238E27FC236}">
-                <a16:creationId xmlns="" xmlns:a16="http://schemas.microsoft.com/office/drawing/2014/main" id="{8067D712-B97B-489F-93C0-EFC22B0553A6}"/>
+                <a16:creationId xmlns:a16="http://schemas.microsoft.com/office/drawing/2014/main" id="{8067D712-B97B-489F-93C0-EFC22B0553A6}"/>
               </a:ext>
             </a:extLst>
           </p:cNvPr>
@@ -15212,7 +16318,7 @@
           <p:cNvPr id="7" name="Picture 6">
             <a:extLst>
               <a:ext uri="{FF2B5EF4-FFF2-40B4-BE49-F238E27FC236}">
-                <a16:creationId xmlns="" xmlns:a16="http://schemas.microsoft.com/office/drawing/2014/main" id="{026A2582-6A77-4153-BB9B-3EC74BB93E7D}"/>
+                <a16:creationId xmlns:a16="http://schemas.microsoft.com/office/drawing/2014/main" id="{026A2582-6A77-4153-BB9B-3EC74BB93E7D}"/>
               </a:ext>
             </a:extLst>
           </p:cNvPr>
@@ -15242,7 +16348,7 @@
           <p:cNvPr id="9" name="Picture 8">
             <a:extLst>
               <a:ext uri="{FF2B5EF4-FFF2-40B4-BE49-F238E27FC236}">
-                <a16:creationId xmlns="" xmlns:a16="http://schemas.microsoft.com/office/drawing/2014/main" id="{33F112C0-14E2-4CD6-8449-BB2951BED5BF}"/>
+                <a16:creationId xmlns:a16="http://schemas.microsoft.com/office/drawing/2014/main" id="{33F112C0-14E2-4CD6-8449-BB2951BED5BF}"/>
               </a:ext>
             </a:extLst>
           </p:cNvPr>
@@ -15272,7 +16378,7 @@
           <p:cNvPr id="11" name="Picture 10">
             <a:extLst>
               <a:ext uri="{FF2B5EF4-FFF2-40B4-BE49-F238E27FC236}">
-                <a16:creationId xmlns="" xmlns:a16="http://schemas.microsoft.com/office/drawing/2014/main" id="{CEACD9B8-E7FB-46B8-A18E-7F721410B1E9}"/>
+                <a16:creationId xmlns:a16="http://schemas.microsoft.com/office/drawing/2014/main" id="{CEACD9B8-E7FB-46B8-A18E-7F721410B1E9}"/>
               </a:ext>
             </a:extLst>
           </p:cNvPr>
@@ -15302,7 +16408,7 @@
           <p:cNvPr id="13" name="Picture 12">
             <a:extLst>
               <a:ext uri="{FF2B5EF4-FFF2-40B4-BE49-F238E27FC236}">
-                <a16:creationId xmlns="" xmlns:a16="http://schemas.microsoft.com/office/drawing/2014/main" id="{45CC8908-9D73-4461-822C-F0C115BBE235}"/>
+                <a16:creationId xmlns:a16="http://schemas.microsoft.com/office/drawing/2014/main" id="{45CC8908-9D73-4461-822C-F0C115BBE235}"/>
               </a:ext>
             </a:extLst>
           </p:cNvPr>
@@ -15332,7 +16438,7 @@
           <p:cNvPr id="15" name="Picture 14">
             <a:extLst>
               <a:ext uri="{FF2B5EF4-FFF2-40B4-BE49-F238E27FC236}">
-                <a16:creationId xmlns="" xmlns:a16="http://schemas.microsoft.com/office/drawing/2014/main" id="{589681FA-DEB7-4C04-BAB4-02F56E0F277F}"/>
+                <a16:creationId xmlns:a16="http://schemas.microsoft.com/office/drawing/2014/main" id="{589681FA-DEB7-4C04-BAB4-02F56E0F277F}"/>
               </a:ext>
             </a:extLst>
           </p:cNvPr>
@@ -15362,7 +16468,7 @@
           <p:cNvPr id="17" name="Picture 16">
             <a:extLst>
               <a:ext uri="{FF2B5EF4-FFF2-40B4-BE49-F238E27FC236}">
-                <a16:creationId xmlns="" xmlns:a16="http://schemas.microsoft.com/office/drawing/2014/main" id="{E94E230E-F199-41EF-B507-DC115AC422AE}"/>
+                <a16:creationId xmlns:a16="http://schemas.microsoft.com/office/drawing/2014/main" id="{E94E230E-F199-41EF-B507-DC115AC422AE}"/>
               </a:ext>
             </a:extLst>
           </p:cNvPr>
@@ -15392,7 +16498,7 @@
           <p:cNvPr id="19" name="Picture 18">
             <a:extLst>
               <a:ext uri="{FF2B5EF4-FFF2-40B4-BE49-F238E27FC236}">
-                <a16:creationId xmlns="" xmlns:a16="http://schemas.microsoft.com/office/drawing/2014/main" id="{C66040D3-C438-44CE-864A-169281B5AFD2}"/>
+                <a16:creationId xmlns:a16="http://schemas.microsoft.com/office/drawing/2014/main" id="{C66040D3-C438-44CE-864A-169281B5AFD2}"/>
               </a:ext>
             </a:extLst>
           </p:cNvPr>
@@ -15422,7 +16528,7 @@
           <p:cNvPr id="21" name="Picture 20">
             <a:extLst>
               <a:ext uri="{FF2B5EF4-FFF2-40B4-BE49-F238E27FC236}">
-                <a16:creationId xmlns="" xmlns:a16="http://schemas.microsoft.com/office/drawing/2014/main" id="{60567597-D747-4B34-946B-760B67E3D2FF}"/>
+                <a16:creationId xmlns:a16="http://schemas.microsoft.com/office/drawing/2014/main" id="{60567597-D747-4B34-946B-760B67E3D2FF}"/>
               </a:ext>
             </a:extLst>
           </p:cNvPr>
@@ -15452,7 +16558,7 @@
           <p:cNvPr id="23" name="Picture 22">
             <a:extLst>
               <a:ext uri="{FF2B5EF4-FFF2-40B4-BE49-F238E27FC236}">
-                <a16:creationId xmlns="" xmlns:a16="http://schemas.microsoft.com/office/drawing/2014/main" id="{1B7C9E95-71B4-43EE-B83D-5F7E9E73714C}"/>
+                <a16:creationId xmlns:a16="http://schemas.microsoft.com/office/drawing/2014/main" id="{1B7C9E95-71B4-43EE-B83D-5F7E9E73714C}"/>
               </a:ext>
             </a:extLst>
           </p:cNvPr>
@@ -15482,7 +16588,7 @@
           <p:cNvPr id="25" name="Picture 24">
             <a:extLst>
               <a:ext uri="{FF2B5EF4-FFF2-40B4-BE49-F238E27FC236}">
-                <a16:creationId xmlns="" xmlns:a16="http://schemas.microsoft.com/office/drawing/2014/main" id="{ADF1F428-F2EE-46F4-AF5A-6A0195A20E4D}"/>
+                <a16:creationId xmlns:a16="http://schemas.microsoft.com/office/drawing/2014/main" id="{ADF1F428-F2EE-46F4-AF5A-6A0195A20E4D}"/>
               </a:ext>
             </a:extLst>
           </p:cNvPr>
@@ -15512,7 +16618,7 @@
           <p:cNvPr id="27" name="Picture 26">
             <a:extLst>
               <a:ext uri="{FF2B5EF4-FFF2-40B4-BE49-F238E27FC236}">
-                <a16:creationId xmlns="" xmlns:a16="http://schemas.microsoft.com/office/drawing/2014/main" id="{8F64133C-CE9A-481C-95C2-139E708B9B72}"/>
+                <a16:creationId xmlns:a16="http://schemas.microsoft.com/office/drawing/2014/main" id="{8F64133C-CE9A-481C-95C2-139E708B9B72}"/>
               </a:ext>
             </a:extLst>
           </p:cNvPr>
@@ -15757,7 +16863,7 @@
             <p:cNvPr id="26" name="Picture 25">
               <a:extLst>
                 <a:ext uri="{FF2B5EF4-FFF2-40B4-BE49-F238E27FC236}">
-                  <a16:creationId xmlns="" xmlns:a16="http://schemas.microsoft.com/office/drawing/2014/main" id="{8067D712-B97B-489F-93C0-EFC22B0553A6}"/>
+                  <a16:creationId xmlns:a16="http://schemas.microsoft.com/office/drawing/2014/main" id="{8067D712-B97B-489F-93C0-EFC22B0553A6}"/>
                 </a:ext>
               </a:extLst>
             </p:cNvPr>
@@ -15786,7 +16892,7 @@
             <p:cNvPr id="28" name="Picture 27">
               <a:extLst>
                 <a:ext uri="{FF2B5EF4-FFF2-40B4-BE49-F238E27FC236}">
-                  <a16:creationId xmlns="" xmlns:a16="http://schemas.microsoft.com/office/drawing/2014/main" id="{8067D712-B97B-489F-93C0-EFC22B0553A6}"/>
+                  <a16:creationId xmlns:a16="http://schemas.microsoft.com/office/drawing/2014/main" id="{8067D712-B97B-489F-93C0-EFC22B0553A6}"/>
                 </a:ext>
               </a:extLst>
             </p:cNvPr>
@@ -16033,7 +17139,7 @@
 </p:sld>
 </file>
 
-<file path=ppt/slides/slide5.xml><?xml version="1.0" encoding="utf-8"?>
+<file path=ppt/slides/slide6.xml><?xml version="1.0" encoding="utf-8"?>
 <p:sld xmlns:a="http://schemas.openxmlformats.org/drawingml/2006/main" xmlns:r="http://schemas.openxmlformats.org/officeDocument/2006/relationships" xmlns:p="http://schemas.openxmlformats.org/presentationml/2006/main">
   <p:cSld>
     <p:spTree>
@@ -16055,7 +17161,7 @@
           <p:cNvPr id="2" name="Title 1">
             <a:extLst>
               <a:ext uri="{FF2B5EF4-FFF2-40B4-BE49-F238E27FC236}">
-                <a16:creationId xmlns="" xmlns:a16="http://schemas.microsoft.com/office/drawing/2014/main" id="{12D1FF5C-A6EC-43C4-888C-1C82EB251BCE}"/>
+                <a16:creationId xmlns:a16="http://schemas.microsoft.com/office/drawing/2014/main" id="{12D1FF5C-A6EC-43C4-888C-1C82EB251BCE}"/>
               </a:ext>
             </a:extLst>
           </p:cNvPr>
@@ -16083,7 +17189,7 @@
           <p:cNvPr id="3" name="Content Placeholder 2">
             <a:extLst>
               <a:ext uri="{FF2B5EF4-FFF2-40B4-BE49-F238E27FC236}">
-                <a16:creationId xmlns="" xmlns:a16="http://schemas.microsoft.com/office/drawing/2014/main" id="{0FFCC8F6-6F9B-479C-87E8-54647A608F93}"/>
+                <a16:creationId xmlns:a16="http://schemas.microsoft.com/office/drawing/2014/main" id="{0FFCC8F6-6F9B-479C-87E8-54647A608F93}"/>
               </a:ext>
             </a:extLst>
           </p:cNvPr>
@@ -16100,155 +17206,39 @@
           <a:lstStyle/>
           <a:p>
             <a:r>
-              <a:rPr lang="en-US" dirty="0" smtClean="0"/>
-              <a:t>We plan on finding fitting audio for </a:t>
+              <a:rPr lang="en-US" dirty="0"/>
+              <a:t>We plan on finding fitting audio for ambient sounds, shooting, movement, the main menu, explosions, etc. from</a:t>
             </a:r>
+          </a:p>
+          <a:p>
+            <a:pPr lvl="1"/>
             <a:r>
-              <a:rPr lang="en-US" dirty="0" smtClean="0"/>
-              <a:t>ambient sounds, </a:t>
+              <a:rPr lang="en-US" dirty="0"/>
+              <a:t>Unity Asset Store</a:t>
             </a:r>
+          </a:p>
+          <a:p>
+            <a:pPr lvl="1"/>
             <a:r>
-              <a:rPr lang="en-US" dirty="0" smtClean="0"/>
-              <a:t>shooting, movement, </a:t>
+              <a:rPr lang="en-US" dirty="0"/>
+              <a:t>Itch.io</a:t>
             </a:r>
+          </a:p>
+          <a:p>
+            <a:pPr lvl="1"/>
             <a:r>
-              <a:rPr lang="en-US" dirty="0" smtClean="0"/>
-              <a:t>the main menu</a:t>
+              <a:rPr lang="en-US" dirty="0"/>
+              <a:t>Freesound.org</a:t>
             </a:r>
+          </a:p>
+          <a:p>
             <a:r>
-              <a:rPr lang="en-US" dirty="0" smtClean="0"/>
-              <a:t>, explosions, etc.</a:t>
+              <a:rPr lang="en-US" dirty="0"/>
+              <a:t>If we can’t find existing sound FX we will make our own.</a:t>
             </a:r>
-          </a:p>
-          <a:p>
-            <a:r>
-              <a:rPr lang="en-US" dirty="0" smtClean="0"/>
-              <a:t>If we can’t find existing </a:t>
-            </a:r>
-            <a:r>
-              <a:rPr lang="en-US" dirty="0" smtClean="0"/>
-              <a:t>sound FX </a:t>
-            </a:r>
-            <a:r>
-              <a:rPr lang="en-US" dirty="0" smtClean="0"/>
-              <a:t>we will make </a:t>
-            </a:r>
-            <a:r>
-              <a:rPr lang="en-US" dirty="0" smtClean="0"/>
-              <a:t>our own</a:t>
-            </a:r>
-            <a:r>
-              <a:rPr lang="en-US" dirty="0" smtClean="0"/>
-              <a:t>.</a:t>
-            </a:r>
-            <a:endParaRPr lang="en-US" dirty="0" smtClean="0"/>
-          </a:p>
-          <a:p>
-            <a:r>
-              <a:rPr lang="en-US" dirty="0" smtClean="0"/>
-              <a:t>But we currently have no plans </a:t>
-            </a:r>
-            <a:r>
-              <a:rPr lang="en-US" dirty="0" smtClean="0"/>
-              <a:t>on making our own music.</a:t>
-            </a:r>
-            <a:endParaRPr lang="en-US" dirty="0"/>
           </a:p>
         </p:txBody>
       </p:sp>
-      <p:pic>
-        <p:nvPicPr>
-          <p:cNvPr id="4098" name="Picture 2" descr="Related image"/>
-          <p:cNvPicPr>
-            <a:picLocks noChangeAspect="1" noChangeArrowheads="1"/>
-          </p:cNvPicPr>
-          <p:nvPr/>
-        </p:nvPicPr>
-        <p:blipFill>
-          <a:blip r:embed="rId2">
-            <a:extLst>
-              <a:ext uri="{28A0092B-C50C-407E-A947-70E740481C1C}">
-                <a14:useLocalDpi xmlns:a14="http://schemas.microsoft.com/office/drawing/2010/main" val="0"/>
-              </a:ext>
-            </a:extLst>
-          </a:blip>
-          <a:srcRect/>
-          <a:stretch>
-            <a:fillRect/>
-          </a:stretch>
-        </p:blipFill>
-        <p:spPr bwMode="auto">
-          <a:xfrm>
-            <a:off x="8595359" y="3254376"/>
-            <a:ext cx="3344091" cy="3344091"/>
-          </a:xfrm>
-          <a:prstGeom prst="rect">
-            <a:avLst/>
-          </a:prstGeom>
-          <a:ln w="228600" cap="sq" cmpd="thickThin">
-            <a:solidFill>
-              <a:srgbClr val="000000"/>
-            </a:solidFill>
-            <a:prstDash val="solid"/>
-            <a:miter lim="800000"/>
-          </a:ln>
-          <a:effectLst>
-            <a:innerShdw blurRad="76200">
-              <a:srgbClr val="000000"/>
-            </a:innerShdw>
-          </a:effectLst>
-          <a:extLst>
-            <a:ext uri="{909E8E84-426E-40DD-AFC4-6F175D3DCCD1}">
-              <a14:hiddenFill xmlns:a14="http://schemas.microsoft.com/office/drawing/2010/main">
-                <a:solidFill>
-                  <a:srgbClr val="FFFFFF"/>
-                </a:solidFill>
-              </a14:hiddenFill>
-            </a:ext>
-          </a:extLst>
-        </p:spPr>
-      </p:pic>
-      <p:pic>
-        <p:nvPicPr>
-          <p:cNvPr id="4100" name="Picture 4" descr="Image result for pew pew"/>
-          <p:cNvPicPr>
-            <a:picLocks noChangeAspect="1" noChangeArrowheads="1"/>
-          </p:cNvPicPr>
-          <p:nvPr/>
-        </p:nvPicPr>
-        <p:blipFill>
-          <a:blip r:embed="rId3">
-            <a:extLst>
-              <a:ext uri="{28A0092B-C50C-407E-A947-70E740481C1C}">
-                <a14:useLocalDpi xmlns:a14="http://schemas.microsoft.com/office/drawing/2010/main" val="0"/>
-              </a:ext>
-            </a:extLst>
-          </a:blip>
-          <a:srcRect/>
-          <a:stretch>
-            <a:fillRect/>
-          </a:stretch>
-        </p:blipFill>
-        <p:spPr bwMode="auto">
-          <a:xfrm>
-            <a:off x="1022431" y="4140925"/>
-            <a:ext cx="2568484" cy="2568484"/>
-          </a:xfrm>
-          <a:prstGeom prst="rect">
-            <a:avLst/>
-          </a:prstGeom>
-          <a:noFill/>
-          <a:extLst>
-            <a:ext uri="{909E8E84-426E-40DD-AFC4-6F175D3DCCD1}">
-              <a14:hiddenFill xmlns:a14="http://schemas.microsoft.com/office/drawing/2010/main">
-                <a:solidFill>
-                  <a:srgbClr val="FFFFFF"/>
-                </a:solidFill>
-              </a14:hiddenFill>
-            </a:ext>
-          </a:extLst>
-        </p:spPr>
-      </p:pic>
       <p:pic>
         <p:nvPicPr>
           <p:cNvPr id="4102" name="Picture 6" descr="Image result for sound effects"/>
@@ -16258,7 +17248,7 @@
           <p:nvPr/>
         </p:nvPicPr>
         <p:blipFill>
-          <a:blip r:embed="rId4">
+          <a:blip r:embed="rId2">
             <a:extLst>
               <a:ext uri="{28A0092B-C50C-407E-A947-70E740481C1C}">
                 <a14:useLocalDpi xmlns:a14="http://schemas.microsoft.com/office/drawing/2010/main" val="0"/>
@@ -16300,17 +17290,10 @@
   <p:clrMapOvr>
     <a:masterClrMapping/>
   </p:clrMapOvr>
-  <p:timing>
-    <p:tnLst>
-      <p:par>
-        <p:cTn id="1" dur="indefinite" restart="never" nodeType="tmRoot"/>
-      </p:par>
-    </p:tnLst>
-  </p:timing>
 </p:sld>
 </file>
 
-<file path=ppt/slides/slide6.xml><?xml version="1.0" encoding="utf-8"?>
+<file path=ppt/slides/slide7.xml><?xml version="1.0" encoding="utf-8"?>
 <p:sld xmlns:a="http://schemas.openxmlformats.org/drawingml/2006/main" xmlns:r="http://schemas.openxmlformats.org/officeDocument/2006/relationships" xmlns:p="http://schemas.openxmlformats.org/presentationml/2006/main">
   <p:cSld>
     <p:spTree>
@@ -16332,7 +17315,7 @@
           <p:cNvPr id="2" name="Title 1">
             <a:extLst>
               <a:ext uri="{FF2B5EF4-FFF2-40B4-BE49-F238E27FC236}">
-                <a16:creationId xmlns="" xmlns:a16="http://schemas.microsoft.com/office/drawing/2014/main" id="{CC5FB789-2D70-40C1-BDF8-68823F6E859F}"/>
+                <a16:creationId xmlns:a16="http://schemas.microsoft.com/office/drawing/2014/main" id="{CC5FB789-2D70-40C1-BDF8-68823F6E859F}"/>
               </a:ext>
             </a:extLst>
           </p:cNvPr>
@@ -16360,7 +17343,7 @@
           <p:cNvPr id="3" name="Content Placeholder 2">
             <a:extLst>
               <a:ext uri="{FF2B5EF4-FFF2-40B4-BE49-F238E27FC236}">
-                <a16:creationId xmlns="" xmlns:a16="http://schemas.microsoft.com/office/drawing/2014/main" id="{626AE229-CC6B-48A7-87D8-C810B532D9F3}"/>
+                <a16:creationId xmlns:a16="http://schemas.microsoft.com/office/drawing/2014/main" id="{626AE229-CC6B-48A7-87D8-C810B532D9F3}"/>
               </a:ext>
             </a:extLst>
           </p:cNvPr>
@@ -16391,10 +17374,9 @@
           <a:p>
             <a:pPr lvl="1"/>
             <a:r>
-              <a:rPr lang="en-US" dirty="0" smtClean="0"/>
-              <a:t>AI movement decisions, Menus like main menu, arsenal, pause, settings, etc. </a:t>
+              <a:rPr lang="en-US" dirty="0"/>
+              <a:t>AI movement decisions, Menu screens, Weapon UI, Implementing weapon animations</a:t>
             </a:r>
-            <a:endParaRPr lang="en-US" dirty="0"/>
           </a:p>
           <a:p>
             <a:r>
@@ -16405,18 +17387,9 @@
           <a:p>
             <a:pPr lvl="1"/>
             <a:r>
-              <a:rPr lang="en-US" dirty="0" smtClean="0"/>
-              <a:t>AI shooting calculations, Weapons, </a:t>
+              <a:rPr lang="en-US" dirty="0"/>
+              <a:t>AI shooting decisions, Destructible terrain, Player controls, Physics mechanics, Collisions</a:t>
             </a:r>
-            <a:r>
-              <a:rPr lang="en-US" dirty="0" smtClean="0"/>
-              <a:t>Gameplay, Destructible </a:t>
-            </a:r>
-            <a:r>
-              <a:rPr lang="en-US" dirty="0" smtClean="0"/>
-              <a:t>terrain, Player controllers.</a:t>
-            </a:r>
-            <a:endParaRPr lang="en-US" dirty="0"/>
           </a:p>
           <a:p>
             <a:r>
@@ -16427,48 +17400,9 @@
           <a:p>
             <a:pPr lvl="1"/>
             <a:r>
-              <a:rPr lang="en-US" dirty="0" smtClean="0"/>
-              <a:t>AI target decisions and weapon selection, Map </a:t>
+              <a:rPr lang="en-US" dirty="0"/>
+              <a:t>AI target decisions and weapon selection, Map Creation, Environment Interaction, Hazards and Sounds, WordPress Website</a:t>
             </a:r>
-            <a:r>
-              <a:rPr lang="en-US" dirty="0"/>
-              <a:t>Creation, Environment </a:t>
-            </a:r>
-            <a:r>
-              <a:rPr lang="en-US" dirty="0" smtClean="0"/>
-              <a:t>Interaction and hazards, </a:t>
-            </a:r>
-            <a:r>
-              <a:rPr lang="en-US" dirty="0" smtClean="0"/>
-              <a:t>Sounds</a:t>
-            </a:r>
-            <a:endParaRPr lang="en-US" dirty="0"/>
-          </a:p>
-          <a:p>
-            <a:r>
-              <a:rPr lang="en-US" dirty="0" smtClean="0"/>
-              <a:t>All</a:t>
-            </a:r>
-          </a:p>
-          <a:p>
-            <a:pPr lvl="1"/>
-            <a:r>
-              <a:rPr lang="en-US" dirty="0" smtClean="0"/>
-              <a:t>Implementing Guns, AI, Game Manager, Art, </a:t>
-            </a:r>
-            <a:r>
-              <a:rPr lang="en-US" dirty="0" smtClean="0"/>
-              <a:t>Testing </a:t>
-            </a:r>
-            <a:r>
-              <a:rPr lang="en-US" dirty="0" smtClean="0"/>
-              <a:t>and </a:t>
-            </a:r>
-            <a:r>
-              <a:rPr lang="en-US" dirty="0" smtClean="0"/>
-              <a:t>Documentation.</a:t>
-            </a:r>
-            <a:endParaRPr lang="en-US" dirty="0"/>
           </a:p>
         </p:txBody>
       </p:sp>
@@ -16477,7 +17411,7 @@
           <p:cNvPr id="4" name="Picture 3">
             <a:extLst>
               <a:ext uri="{FF2B5EF4-FFF2-40B4-BE49-F238E27FC236}">
-                <a16:creationId xmlns="" xmlns:a16="http://schemas.microsoft.com/office/drawing/2014/main" id="{8067D712-B97B-489F-93C0-EFC22B0553A6}"/>
+                <a16:creationId xmlns:a16="http://schemas.microsoft.com/office/drawing/2014/main" id="{8067D712-B97B-489F-93C0-EFC22B0553A6}"/>
               </a:ext>
             </a:extLst>
           </p:cNvPr>
@@ -16571,7 +17505,7 @@
             <p:cNvPr id="7" name="Picture 6">
               <a:extLst>
                 <a:ext uri="{FF2B5EF4-FFF2-40B4-BE49-F238E27FC236}">
-                  <a16:creationId xmlns="" xmlns:a16="http://schemas.microsoft.com/office/drawing/2014/main" id="{8067D712-B97B-489F-93C0-EFC22B0553A6}"/>
+                  <a16:creationId xmlns:a16="http://schemas.microsoft.com/office/drawing/2014/main" id="{8067D712-B97B-489F-93C0-EFC22B0553A6}"/>
                 </a:ext>
               </a:extLst>
             </p:cNvPr>
@@ -16600,7 +17534,7 @@
             <p:cNvPr id="8" name="Picture 7">
               <a:extLst>
                 <a:ext uri="{FF2B5EF4-FFF2-40B4-BE49-F238E27FC236}">
-                  <a16:creationId xmlns="" xmlns:a16="http://schemas.microsoft.com/office/drawing/2014/main" id="{8067D712-B97B-489F-93C0-EFC22B0553A6}"/>
+                  <a16:creationId xmlns:a16="http://schemas.microsoft.com/office/drawing/2014/main" id="{8067D712-B97B-489F-93C0-EFC22B0553A6}"/>
                 </a:ext>
               </a:extLst>
             </p:cNvPr>
@@ -16762,314 +17696,6 @@
 </p:sld>
 </file>
 
-<file path=ppt/slides/slide7.xml><?xml version="1.0" encoding="utf-8"?>
-<p:sld xmlns:a="http://schemas.openxmlformats.org/drawingml/2006/main" xmlns:r="http://schemas.openxmlformats.org/officeDocument/2006/relationships" xmlns:p="http://schemas.openxmlformats.org/presentationml/2006/main">
-  <p:cSld>
-    <p:spTree>
-      <p:nvGrpSpPr>
-        <p:cNvPr id="1" name=""/>
-        <p:cNvGrpSpPr/>
-        <p:nvPr/>
-      </p:nvGrpSpPr>
-      <p:grpSpPr>
-        <a:xfrm>
-          <a:off x="0" y="0"/>
-          <a:ext cx="0" cy="0"/>
-          <a:chOff x="0" y="0"/>
-          <a:chExt cx="0" cy="0"/>
-        </a:xfrm>
-      </p:grpSpPr>
-      <p:sp>
-        <p:nvSpPr>
-          <p:cNvPr id="2" name="Title 1">
-            <a:extLst>
-              <a:ext uri="{FF2B5EF4-FFF2-40B4-BE49-F238E27FC236}">
-                <a16:creationId xmlns="" xmlns:a16="http://schemas.microsoft.com/office/drawing/2014/main" id="{C035621B-C4F5-4759-8AC5-9B89D5BC90B4}"/>
-              </a:ext>
-            </a:extLst>
-          </p:cNvPr>
-          <p:cNvSpPr>
-            <a:spLocks noGrp="1"/>
-          </p:cNvSpPr>
-          <p:nvPr>
-            <p:ph type="title"/>
-          </p:nvPr>
-        </p:nvSpPr>
-        <p:spPr/>
-        <p:txBody>
-          <a:bodyPr/>
-          <a:lstStyle/>
-          <a:p>
-            <a:r>
-              <a:rPr lang="en-US" dirty="0"/>
-              <a:t>Schedule</a:t>
-            </a:r>
-          </a:p>
-        </p:txBody>
-      </p:sp>
-      <p:sp>
-        <p:nvSpPr>
-          <p:cNvPr id="3" name="Content Placeholder 2">
-            <a:extLst>
-              <a:ext uri="{FF2B5EF4-FFF2-40B4-BE49-F238E27FC236}">
-                <a16:creationId xmlns="" xmlns:a16="http://schemas.microsoft.com/office/drawing/2014/main" id="{C8BAD863-10CE-4457-937D-830D6E8EBA72}"/>
-              </a:ext>
-            </a:extLst>
-          </p:cNvPr>
-          <p:cNvSpPr>
-            <a:spLocks noGrp="1"/>
-          </p:cNvSpPr>
-          <p:nvPr>
-            <p:ph idx="1"/>
-          </p:nvPr>
-        </p:nvSpPr>
-        <p:spPr/>
-        <p:txBody>
-          <a:bodyPr>
-            <a:normAutofit fontScale="92500" lnSpcReduction="20000"/>
-          </a:bodyPr>
-          <a:lstStyle/>
-          <a:p>
-            <a:r>
-              <a:rPr lang="en-US" dirty="0"/>
-              <a:t>Create some weapons, characters, map</a:t>
-            </a:r>
-          </a:p>
-          <a:p>
-            <a:r>
-              <a:rPr lang="en-US" dirty="0"/>
-              <a:t>Write game logic for player interaction with weapons </a:t>
-            </a:r>
-          </a:p>
-          <a:p>
-            <a:r>
-              <a:rPr lang="en-US" dirty="0"/>
-              <a:t>Create menu to control game settings</a:t>
-            </a:r>
-          </a:p>
-          <a:p>
-            <a:r>
-              <a:rPr lang="en-US" dirty="0"/>
-              <a:t>After game is playable with less features, add:</a:t>
-            </a:r>
-          </a:p>
-          <a:p>
-            <a:pPr lvl="1"/>
-            <a:r>
-              <a:rPr lang="en-US" dirty="0"/>
-              <a:t>Basic AI</a:t>
-            </a:r>
-          </a:p>
-          <a:p>
-            <a:pPr lvl="1"/>
-            <a:r>
-              <a:rPr lang="en-US" dirty="0"/>
-              <a:t>Destroyable, dynamically generated map/environment</a:t>
-            </a:r>
-          </a:p>
-          <a:p>
-            <a:pPr lvl="1"/>
-            <a:r>
-              <a:rPr lang="en-US" dirty="0"/>
-              <a:t>Weapon/Tool Drops</a:t>
-            </a:r>
-          </a:p>
-          <a:p>
-            <a:pPr marL="457200" lvl="1" indent="0">
-              <a:buNone/>
-            </a:pPr>
-            <a:endParaRPr lang="en-US" dirty="0"/>
-          </a:p>
-          <a:p>
-            <a:r>
-              <a:rPr lang="en-US" dirty="0"/>
-              <a:t>Implement environment interaction</a:t>
-            </a:r>
-          </a:p>
-          <a:p>
-            <a:r>
-              <a:rPr lang="en-US" dirty="0"/>
-              <a:t>Add more weapons, players, more complex AI</a:t>
-            </a:r>
-          </a:p>
-          <a:p>
-            <a:endParaRPr lang="en-US" dirty="0"/>
-          </a:p>
-        </p:txBody>
-      </p:sp>
-      <p:pic>
-        <p:nvPicPr>
-          <p:cNvPr id="5" name="Picture 4">
-            <a:extLst>
-              <a:ext uri="{FF2B5EF4-FFF2-40B4-BE49-F238E27FC236}">
-                <a16:creationId xmlns="" xmlns:a16="http://schemas.microsoft.com/office/drawing/2014/main" id="{8067D712-B97B-489F-93C0-EFC22B0553A6}"/>
-              </a:ext>
-            </a:extLst>
-          </p:cNvPr>
-          <p:cNvPicPr>
-            <a:picLocks noChangeAspect="1"/>
-          </p:cNvPicPr>
-          <p:nvPr/>
-        </p:nvPicPr>
-        <p:blipFill rotWithShape="1">
-          <a:blip r:embed="rId2"/>
-          <a:srcRect r="32041"/>
-          <a:stretch/>
-        </p:blipFill>
-        <p:spPr>
-          <a:xfrm flipH="1">
-            <a:off x="8895805" y="763649"/>
-            <a:ext cx="1548871" cy="1127002"/>
-          </a:xfrm>
-          <a:prstGeom prst="rect">
-            <a:avLst/>
-          </a:prstGeom>
-        </p:spPr>
-      </p:pic>
-      <p:pic>
-        <p:nvPicPr>
-          <p:cNvPr id="6" name="Picture 5" descr="Related image"/>
-          <p:cNvPicPr>
-            <a:picLocks noChangeAspect="1" noChangeArrowheads="1"/>
-          </p:cNvPicPr>
-          <p:nvPr/>
-        </p:nvPicPr>
-        <p:blipFill>
-          <a:blip r:embed="rId3">
-            <a:clrChange>
-              <a:clrFrom>
-                <a:srgbClr val="F7F7FF"/>
-              </a:clrFrom>
-              <a:clrTo>
-                <a:srgbClr val="F7F7FF">
-                  <a:alpha val="0"/>
-                </a:srgbClr>
-              </a:clrTo>
-            </a:clrChange>
-            <a:extLst>
-              <a:ext uri="{28A0092B-C50C-407E-A947-70E740481C1C}">
-                <a14:useLocalDpi xmlns:a14="http://schemas.microsoft.com/office/drawing/2010/main" val="0"/>
-              </a:ext>
-            </a:extLst>
-          </a:blip>
-          <a:srcRect/>
-          <a:stretch>
-            <a:fillRect/>
-          </a:stretch>
-        </p:blipFill>
-        <p:spPr bwMode="auto">
-          <a:xfrm>
-            <a:off x="8283623" y="2393481"/>
-            <a:ext cx="3393979" cy="1586267"/>
-          </a:xfrm>
-          <a:prstGeom prst="rect">
-            <a:avLst/>
-          </a:prstGeom>
-          <a:noFill/>
-          <a:extLst>
-            <a:ext uri="{909E8E84-426E-40DD-AFC4-6F175D3DCCD1}">
-              <a14:hiddenFill xmlns:a14="http://schemas.microsoft.com/office/drawing/2010/main">
-                <a:solidFill>
-                  <a:srgbClr val="FFFFFF"/>
-                </a:solidFill>
-              </a14:hiddenFill>
-            </a:ext>
-          </a:extLst>
-        </p:spPr>
-      </p:pic>
-      <p:grpSp>
-        <p:nvGrpSpPr>
-          <p:cNvPr id="7" name="Group 6"/>
-          <p:cNvGrpSpPr/>
-          <p:nvPr/>
-        </p:nvGrpSpPr>
-        <p:grpSpPr>
-          <a:xfrm>
-            <a:off x="8623075" y="2228381"/>
-            <a:ext cx="2844915" cy="1231184"/>
-            <a:chOff x="8242300" y="4237083"/>
-            <a:chExt cx="2844915" cy="1231184"/>
-          </a:xfrm>
-        </p:grpSpPr>
-        <p:pic>
-          <p:nvPicPr>
-            <p:cNvPr id="8" name="Picture 7">
-              <a:extLst>
-                <a:ext uri="{FF2B5EF4-FFF2-40B4-BE49-F238E27FC236}">
-                  <a16:creationId xmlns="" xmlns:a16="http://schemas.microsoft.com/office/drawing/2014/main" id="{8067D712-B97B-489F-93C0-EFC22B0553A6}"/>
-                </a:ext>
-              </a:extLst>
-            </p:cNvPr>
-            <p:cNvPicPr>
-              <a:picLocks noChangeAspect="1"/>
-            </p:cNvPicPr>
-            <p:nvPr/>
-          </p:nvPicPr>
-          <p:blipFill rotWithShape="1">
-            <a:blip r:embed="rId2"/>
-            <a:srcRect r="32041"/>
-            <a:stretch/>
-          </p:blipFill>
-          <p:spPr>
-            <a:xfrm rot="1676086" flipH="1">
-              <a:off x="9538344" y="4341265"/>
-              <a:ext cx="1548871" cy="1127002"/>
-            </a:xfrm>
-            <a:prstGeom prst="rect">
-              <a:avLst/>
-            </a:prstGeom>
-          </p:spPr>
-        </p:pic>
-        <p:pic>
-          <p:nvPicPr>
-            <p:cNvPr id="9" name="Picture 8">
-              <a:extLst>
-                <a:ext uri="{FF2B5EF4-FFF2-40B4-BE49-F238E27FC236}">
-                  <a16:creationId xmlns="" xmlns:a16="http://schemas.microsoft.com/office/drawing/2014/main" id="{8067D712-B97B-489F-93C0-EFC22B0553A6}"/>
-                </a:ext>
-              </a:extLst>
-            </p:cNvPr>
-            <p:cNvPicPr>
-              <a:picLocks noChangeAspect="1"/>
-            </p:cNvPicPr>
-            <p:nvPr/>
-          </p:nvPicPr>
-          <p:blipFill rotWithShape="1">
-            <a:blip r:embed="rId2"/>
-            <a:srcRect r="32041"/>
-            <a:stretch/>
-          </p:blipFill>
-          <p:spPr>
-            <a:xfrm flipH="1">
-              <a:off x="8242300" y="4237083"/>
-              <a:ext cx="1675036" cy="1218803"/>
-            </a:xfrm>
-            <a:prstGeom prst="rect">
-              <a:avLst/>
-            </a:prstGeom>
-          </p:spPr>
-        </p:pic>
-      </p:grpSp>
-    </p:spTree>
-    <p:extLst>
-      <p:ext uri="{BB962C8B-B14F-4D97-AF65-F5344CB8AC3E}">
-        <p14:creationId xmlns:p14="http://schemas.microsoft.com/office/powerpoint/2010/main" val="4020166539"/>
-      </p:ext>
-    </p:extLst>
-  </p:cSld>
-  <p:clrMapOvr>
-    <a:masterClrMapping/>
-  </p:clrMapOvr>
-  <p:timing>
-    <p:tnLst>
-      <p:par>
-        <p:cTn id="1" dur="indefinite" restart="never" nodeType="tmRoot"/>
-      </p:par>
-    </p:tnLst>
-  </p:timing>
-</p:sld>
-</file>
-
 <file path=ppt/slides/slide8.xml><?xml version="1.0" encoding="utf-8"?>
 <p:sld xmlns:a="http://schemas.openxmlformats.org/drawingml/2006/main" xmlns:r="http://schemas.openxmlformats.org/officeDocument/2006/relationships" xmlns:p="http://schemas.openxmlformats.org/presentationml/2006/main">
   <p:cSld>
@@ -17092,7 +17718,7 @@
           <p:cNvPr id="2" name="Title 1">
             <a:extLst>
               <a:ext uri="{FF2B5EF4-FFF2-40B4-BE49-F238E27FC236}">
-                <a16:creationId xmlns="" xmlns:a16="http://schemas.microsoft.com/office/drawing/2014/main" id="{67752EBC-73CC-4169-B45A-8A02252D2F3F}"/>
+                <a16:creationId xmlns:a16="http://schemas.microsoft.com/office/drawing/2014/main" id="{0DF73DF9-A108-4F3F-9EF3-98162FE07C46}"/>
               </a:ext>
             </a:extLst>
           </p:cNvPr>
@@ -17110,7 +17736,7 @@
           <a:p>
             <a:r>
               <a:rPr lang="en-US" dirty="0"/>
-              <a:t>First Playable</a:t>
+              <a:t>High-Level Schedule</a:t>
             </a:r>
           </a:p>
         </p:txBody>
@@ -17120,7 +17746,7 @@
           <p:cNvPr id="3" name="Content Placeholder 2">
             <a:extLst>
               <a:ext uri="{FF2B5EF4-FFF2-40B4-BE49-F238E27FC236}">
-                <a16:creationId xmlns="" xmlns:a16="http://schemas.microsoft.com/office/drawing/2014/main" id="{DBC01853-D3C1-4CA3-AAF7-4DFE1BC9C83E}"/>
+                <a16:creationId xmlns:a16="http://schemas.microsoft.com/office/drawing/2014/main" id="{EF777EC1-4029-4952-B840-0A0E6CDB5285}"/>
               </a:ext>
             </a:extLst>
           </p:cNvPr>
@@ -17134,283 +17760,95 @@
         <p:spPr>
           <a:xfrm>
             <a:off x="1154954" y="2603500"/>
-            <a:ext cx="6813389" cy="3914866"/>
+            <a:ext cx="8825659" cy="3644900"/>
           </a:xfrm>
         </p:spPr>
         <p:txBody>
-          <a:bodyPr/>
+          <a:bodyPr>
+            <a:normAutofit lnSpcReduction="10000"/>
+          </a:bodyPr>
           <a:lstStyle/>
           <a:p>
             <a:r>
               <a:rPr lang="en-US" dirty="0"/>
-              <a:t>One complete map, with audio</a:t>
-            </a:r>
-          </a:p>
-          <a:p>
-            <a:r>
-              <a:rPr lang="en-US" dirty="0"/>
-              <a:t>Basic menu (enough to set up a game)</a:t>
-            </a:r>
-          </a:p>
-          <a:p>
-            <a:r>
-              <a:rPr lang="en-US" dirty="0"/>
-              <a:t>Game flow</a:t>
+              <a:t>9/18 Presentation Day</a:t>
             </a:r>
           </a:p>
           <a:p>
             <a:pPr lvl="1"/>
             <a:r>
               <a:rPr lang="en-US" dirty="0"/>
-              <a:t>Can go through a full game</a:t>
+              <a:t>Site, GitHub, Art Style and Some Assets, Player movement</a:t>
             </a:r>
           </a:p>
           <a:p>
             <a:r>
               <a:rPr lang="en-US" dirty="0"/>
-              <a:t>One weapon of each type, with audio</a:t>
+              <a:t>10/9 First Playable</a:t>
             </a:r>
           </a:p>
           <a:p>
             <a:pPr lvl="1"/>
             <a:r>
               <a:rPr lang="en-US" dirty="0"/>
-              <a:t>Gun, launcher, close </a:t>
+              <a:t>One complete map, Core weapons implemented, </a:t>
             </a:r>
             <a:r>
-              <a:rPr lang="en-US" dirty="0" smtClean="0"/>
-              <a:t>range</a:t>
+              <a:rPr lang="en-US" dirty="0" err="1"/>
+              <a:t>PvP</a:t>
             </a:r>
-          </a:p>
-          <a:p>
             <a:r>
-              <a:rPr lang="en-US" dirty="0" smtClean="0"/>
-              <a:t>Destructible terrain</a:t>
+              <a:rPr lang="en-US" dirty="0"/>
+              <a:t> only, Player movement, Destructible terrain</a:t>
             </a:r>
           </a:p>
           <a:p>
             <a:r>
-              <a:rPr lang="en-US" dirty="0" smtClean="0"/>
-              <a:t>Player Movement animations</a:t>
+              <a:rPr lang="en-US" dirty="0"/>
+              <a:t>11/18 Testing Day</a:t>
             </a:r>
           </a:p>
           <a:p>
+            <a:pPr lvl="1"/>
             <a:r>
-              <a:rPr lang="en-US" dirty="0" smtClean="0"/>
-              <a:t>Explosion effects</a:t>
+              <a:rPr lang="en-US" dirty="0"/>
+              <a:t>Player AI implemented, procedural map generation, full menu, 10 weapons implemented, adversarial environment mechanics, Powerup spawning</a:t>
             </a:r>
-            <a:endParaRPr lang="en-US" dirty="0"/>
+          </a:p>
+          <a:p>
+            <a:r>
+              <a:rPr lang="en-US" dirty="0"/>
+              <a:t>12/11 Game Day</a:t>
+            </a:r>
           </a:p>
           <a:p>
             <a:pPr lvl="1"/>
-            <a:endParaRPr lang="en-US" dirty="0"/>
-          </a:p>
-          <a:p>
-            <a:pPr lvl="1"/>
+            <a:r>
+              <a:rPr lang="en-US" dirty="0"/>
+              <a:t>Adjust for player feedback, full weapon arsenal, AI difficulty levels, Settings Persistence</a:t>
+            </a:r>
+          </a:p>
+          <a:p>
             <a:endParaRPr lang="en-US" dirty="0"/>
           </a:p>
         </p:txBody>
       </p:sp>
-      <p:pic>
-        <p:nvPicPr>
-          <p:cNvPr id="4" name="Picture 3">
-            <a:extLst>
-              <a:ext uri="{FF2B5EF4-FFF2-40B4-BE49-F238E27FC236}">
-                <a16:creationId xmlns="" xmlns:a16="http://schemas.microsoft.com/office/drawing/2014/main" id="{8067D712-B97B-489F-93C0-EFC22B0553A6}"/>
-              </a:ext>
-            </a:extLst>
-          </p:cNvPr>
-          <p:cNvPicPr>
-            <a:picLocks noChangeAspect="1"/>
-          </p:cNvPicPr>
-          <p:nvPr/>
-        </p:nvPicPr>
-        <p:blipFill rotWithShape="1">
-          <a:blip r:embed="rId2"/>
-          <a:srcRect r="32041"/>
-          <a:stretch/>
-        </p:blipFill>
-        <p:spPr>
-          <a:xfrm flipH="1">
-            <a:off x="8895805" y="763649"/>
-            <a:ext cx="1548871" cy="1127002"/>
-          </a:xfrm>
-          <a:prstGeom prst="rect">
-            <a:avLst/>
-          </a:prstGeom>
-        </p:spPr>
-      </p:pic>
-      <p:pic>
-        <p:nvPicPr>
-          <p:cNvPr id="5" name="Picture 4" descr="Related image"/>
-          <p:cNvPicPr>
-            <a:picLocks noChangeAspect="1" noChangeArrowheads="1"/>
-          </p:cNvPicPr>
-          <p:nvPr/>
-        </p:nvPicPr>
-        <p:blipFill>
-          <a:blip r:embed="rId3">
-            <a:clrChange>
-              <a:clrFrom>
-                <a:srgbClr val="F7F7FF"/>
-              </a:clrFrom>
-              <a:clrTo>
-                <a:srgbClr val="F7F7FF">
-                  <a:alpha val="0"/>
-                </a:srgbClr>
-              </a:clrTo>
-            </a:clrChange>
-            <a:extLst>
-              <a:ext uri="{28A0092B-C50C-407E-A947-70E740481C1C}">
-                <a14:useLocalDpi xmlns:a14="http://schemas.microsoft.com/office/drawing/2010/main" val="0"/>
-              </a:ext>
-            </a:extLst>
-          </a:blip>
-          <a:srcRect/>
-          <a:stretch>
-            <a:fillRect/>
-          </a:stretch>
-        </p:blipFill>
-        <p:spPr bwMode="auto">
-          <a:xfrm>
-            <a:off x="8283623" y="2393481"/>
-            <a:ext cx="3393979" cy="1586267"/>
-          </a:xfrm>
-          <a:prstGeom prst="rect">
-            <a:avLst/>
-          </a:prstGeom>
-          <a:noFill/>
-          <a:extLst>
-            <a:ext uri="{909E8E84-426E-40DD-AFC4-6F175D3DCCD1}">
-              <a14:hiddenFill xmlns:a14="http://schemas.microsoft.com/office/drawing/2010/main">
-                <a:solidFill>
-                  <a:srgbClr val="FFFFFF"/>
-                </a:solidFill>
-              </a14:hiddenFill>
-            </a:ext>
-          </a:extLst>
-        </p:spPr>
-      </p:pic>
-      <p:grpSp>
-        <p:nvGrpSpPr>
-          <p:cNvPr id="6" name="Group 5"/>
-          <p:cNvGrpSpPr/>
-          <p:nvPr/>
-        </p:nvGrpSpPr>
-        <p:grpSpPr>
-          <a:xfrm>
-            <a:off x="8623075" y="2228381"/>
-            <a:ext cx="2844915" cy="1231184"/>
-            <a:chOff x="8242300" y="4237083"/>
-            <a:chExt cx="2844915" cy="1231184"/>
-          </a:xfrm>
-        </p:grpSpPr>
-        <p:pic>
-          <p:nvPicPr>
-            <p:cNvPr id="7" name="Picture 6">
-              <a:extLst>
-                <a:ext uri="{FF2B5EF4-FFF2-40B4-BE49-F238E27FC236}">
-                  <a16:creationId xmlns="" xmlns:a16="http://schemas.microsoft.com/office/drawing/2014/main" id="{8067D712-B97B-489F-93C0-EFC22B0553A6}"/>
-                </a:ext>
-              </a:extLst>
-            </p:cNvPr>
-            <p:cNvPicPr>
-              <a:picLocks noChangeAspect="1"/>
-            </p:cNvPicPr>
-            <p:nvPr/>
-          </p:nvPicPr>
-          <p:blipFill rotWithShape="1">
-            <a:blip r:embed="rId2"/>
-            <a:srcRect r="32041"/>
-            <a:stretch/>
-          </p:blipFill>
-          <p:spPr>
-            <a:xfrm rot="1676086" flipH="1">
-              <a:off x="9538344" y="4341265"/>
-              <a:ext cx="1548871" cy="1127002"/>
-            </a:xfrm>
-            <a:prstGeom prst="rect">
-              <a:avLst/>
-            </a:prstGeom>
-          </p:spPr>
-        </p:pic>
-        <p:pic>
-          <p:nvPicPr>
-            <p:cNvPr id="8" name="Picture 7">
-              <a:extLst>
-                <a:ext uri="{FF2B5EF4-FFF2-40B4-BE49-F238E27FC236}">
-                  <a16:creationId xmlns="" xmlns:a16="http://schemas.microsoft.com/office/drawing/2014/main" id="{8067D712-B97B-489F-93C0-EFC22B0553A6}"/>
-                </a:ext>
-              </a:extLst>
-            </p:cNvPr>
-            <p:cNvPicPr>
-              <a:picLocks noChangeAspect="1"/>
-            </p:cNvPicPr>
-            <p:nvPr/>
-          </p:nvPicPr>
-          <p:blipFill rotWithShape="1">
-            <a:blip r:embed="rId2"/>
-            <a:srcRect r="32041"/>
-            <a:stretch/>
-          </p:blipFill>
-          <p:spPr>
-            <a:xfrm flipH="1">
-              <a:off x="8242300" y="4237083"/>
-              <a:ext cx="1675036" cy="1218803"/>
-            </a:xfrm>
-            <a:prstGeom prst="rect">
-              <a:avLst/>
-            </a:prstGeom>
-          </p:spPr>
-        </p:pic>
-      </p:grpSp>
     </p:spTree>
     <p:extLst>
       <p:ext uri="{BB962C8B-B14F-4D97-AF65-F5344CB8AC3E}">
-        <p14:creationId xmlns:p14="http://schemas.microsoft.com/office/powerpoint/2010/main" val="2435483982"/>
+        <p14:creationId xmlns:p14="http://schemas.microsoft.com/office/powerpoint/2010/main" val="2768019404"/>
       </p:ext>
     </p:extLst>
   </p:cSld>
   <p:clrMapOvr>
     <a:masterClrMapping/>
   </p:clrMapOvr>
-  <p:timing>
-    <p:tnLst>
-      <p:par>
-        <p:cTn id="1" dur="indefinite" restart="never" nodeType="tmRoot"/>
-      </p:par>
-    </p:tnLst>
-  </p:timing>
 </p:sld>
 </file>
 
 <file path=ppt/slides/slide9.xml><?xml version="1.0" encoding="utf-8"?>
 <p:sld xmlns:a="http://schemas.openxmlformats.org/drawingml/2006/main" xmlns:r="http://schemas.openxmlformats.org/officeDocument/2006/relationships" xmlns:p="http://schemas.openxmlformats.org/presentationml/2006/main">
   <p:cSld>
-    <p:bg>
-      <p:bgPr>
-        <a:blipFill rotWithShape="1">
-          <a:blip r:embed="rId2">
-            <a:duotone>
-              <a:schemeClr val="bg2">
-                <a:shade val="69000"/>
-                <a:hueMod val="91000"/>
-                <a:satMod val="164000"/>
-                <a:lumMod val="74000"/>
-              </a:schemeClr>
-              <a:schemeClr val="bg2">
-                <a:hueMod val="124000"/>
-                <a:satMod val="140000"/>
-                <a:lumMod val="142000"/>
-              </a:schemeClr>
-            </a:duotone>
-            <a:extLst/>
-          </a:blip>
-          <a:stretch/>
-        </a:blipFill>
-        <a:effectLst/>
-      </p:bgPr>
-    </p:bg>
     <p:spTree>
       <p:nvGrpSpPr>
         <p:cNvPr id="1" name=""/>
@@ -17425,407 +17863,12 @@
           <a:chExt cx="0" cy="0"/>
         </a:xfrm>
       </p:grpSpPr>
-      <p:grpSp>
-        <p:nvGrpSpPr>
-          <p:cNvPr id="8" name="Group 7">
-            <a:extLst>
-              <a:ext uri="{FF2B5EF4-FFF2-40B4-BE49-F238E27FC236}">
-                <a16:creationId xmlns="" xmlns:a16="http://schemas.microsoft.com/office/drawing/2014/main" id="{93E10248-AF0E-477D-B4D2-47C02CE4E353}"/>
-              </a:ext>
-              <a:ext uri="{C183D7F6-B498-43B3-948B-1728B52AA6E4}">
-                <adec:decorative xmlns="" xmlns:adec="http://schemas.microsoft.com/office/drawing/2017/decorative" val="1"/>
-              </a:ext>
-            </a:extLst>
-          </p:cNvPr>
-          <p:cNvGrpSpPr>
-            <a:grpSpLocks noGrp="1" noUngrp="1" noRot="1" noChangeAspect="1" noMove="1" noResize="1"/>
-          </p:cNvGrpSpPr>
-          <p:nvPr>
-            <p:extLst>
-              <p:ext uri="{386F3935-93C4-4BCD-93E2-E3B085C9AB24}">
-                <p16:designElem xmlns="" xmlns:p16="http://schemas.microsoft.com/office/powerpoint/2015/main" val="1"/>
-              </p:ext>
-            </p:extLst>
-          </p:nvPr>
-        </p:nvGrpSpPr>
-        <p:grpSpPr>
-          <a:xfrm>
-            <a:off x="0" y="0"/>
-            <a:ext cx="12192000" cy="6858000"/>
-            <a:chOff x="0" y="0"/>
-            <a:chExt cx="12192000" cy="6858000"/>
-          </a:xfrm>
-        </p:grpSpPr>
-        <p:sp>
-          <p:nvSpPr>
-            <p:cNvPr id="9" name="Rectangle 8">
-              <a:extLst>
-                <a:ext uri="{FF2B5EF4-FFF2-40B4-BE49-F238E27FC236}">
-                  <a16:creationId xmlns="" xmlns:a16="http://schemas.microsoft.com/office/drawing/2014/main" id="{533010C2-2DA5-460F-A40C-5317F567A03E}"/>
-                </a:ext>
-                <a:ext uri="{C183D7F6-B498-43B3-948B-1728B52AA6E4}">
-                  <adec:decorative xmlns="" xmlns:adec="http://schemas.microsoft.com/office/drawing/2017/decorative" val="1"/>
-                </a:ext>
-              </a:extLst>
-            </p:cNvPr>
-            <p:cNvSpPr/>
-            <p:nvPr>
-              <p:extLst>
-                <p:ext uri="{386F3935-93C4-4BCD-93E2-E3B085C9AB24}">
-                  <p16:designElem xmlns="" xmlns:p16="http://schemas.microsoft.com/office/powerpoint/2015/main" val="1"/>
-                </p:ext>
-              </p:extLst>
-            </p:nvPr>
-          </p:nvSpPr>
-          <p:spPr>
-            <a:xfrm>
-              <a:off x="0" y="0"/>
-              <a:ext cx="12192000" cy="6858000"/>
-            </a:xfrm>
-            <a:prstGeom prst="rect">
-              <a:avLst/>
-            </a:prstGeom>
-            <a:blipFill>
-              <a:blip r:embed="rId2">
-                <a:duotone>
-                  <a:schemeClr val="dk2">
-                    <a:shade val="69000"/>
-                    <a:hueMod val="91000"/>
-                    <a:satMod val="164000"/>
-                    <a:lumMod val="74000"/>
-                  </a:schemeClr>
-                  <a:schemeClr val="dk2">
-                    <a:hueMod val="124000"/>
-                    <a:satMod val="140000"/>
-                    <a:lumMod val="142000"/>
-                  </a:schemeClr>
-                </a:duotone>
-              </a:blip>
-              <a:stretch>
-                <a:fillRect/>
-              </a:stretch>
-            </a:blipFill>
-            <a:ln>
-              <a:noFill/>
-            </a:ln>
-          </p:spPr>
-          <p:style>
-            <a:lnRef idx="2">
-              <a:schemeClr val="accent1">
-                <a:shade val="50000"/>
-              </a:schemeClr>
-            </a:lnRef>
-            <a:fillRef idx="1">
-              <a:schemeClr val="accent1"/>
-            </a:fillRef>
-            <a:effectRef idx="0">
-              <a:schemeClr val="accent1"/>
-            </a:effectRef>
-            <a:fontRef idx="minor">
-              <a:schemeClr val="lt1"/>
-            </a:fontRef>
-          </p:style>
-        </p:sp>
-        <p:sp>
-          <p:nvSpPr>
-            <p:cNvPr id="10" name="Freeform 5">
-              <a:extLst>
-                <a:ext uri="{FF2B5EF4-FFF2-40B4-BE49-F238E27FC236}">
-                  <a16:creationId xmlns="" xmlns:a16="http://schemas.microsoft.com/office/drawing/2014/main" id="{17CB0634-F963-4EC9-A6F6-8EA46BD1F103}"/>
-                </a:ext>
-                <a:ext uri="{C183D7F6-B498-43B3-948B-1728B52AA6E4}">
-                  <adec:decorative xmlns="" xmlns:adec="http://schemas.microsoft.com/office/drawing/2017/decorative" val="1"/>
-                </a:ext>
-              </a:extLst>
-            </p:cNvPr>
-            <p:cNvSpPr>
-              <a:spLocks noEditPoints="1"/>
-            </p:cNvSpPr>
-            <p:nvPr>
-              <p:extLst>
-                <p:ext uri="{386F3935-93C4-4BCD-93E2-E3B085C9AB24}">
-                  <p16:designElem xmlns="" xmlns:p16="http://schemas.microsoft.com/office/powerpoint/2015/main" val="1"/>
-                </p:ext>
-              </p:extLst>
-            </p:nvPr>
-          </p:nvSpPr>
-          <p:spPr bwMode="gray">
-            <a:xfrm>
-              <a:off x="0" y="1587"/>
-              <a:ext cx="12192000" cy="6856413"/>
-            </a:xfrm>
-            <a:custGeom>
-              <a:avLst/>
-              <a:gdLst/>
-              <a:ahLst/>
-              <a:cxnLst/>
-              <a:rect l="0" t="0" r="r" b="b"/>
-              <a:pathLst>
-                <a:path w="15356" h="8638">
-                  <a:moveTo>
-                    <a:pt x="0" y="0"/>
-                  </a:moveTo>
-                  <a:lnTo>
-                    <a:pt x="0" y="8638"/>
-                  </a:lnTo>
-                  <a:lnTo>
-                    <a:pt x="15356" y="8638"/>
-                  </a:lnTo>
-                  <a:lnTo>
-                    <a:pt x="15356" y="0"/>
-                  </a:lnTo>
-                  <a:lnTo>
-                    <a:pt x="0" y="0"/>
-                  </a:lnTo>
-                  <a:close/>
-                  <a:moveTo>
-                    <a:pt x="14748" y="8038"/>
-                  </a:moveTo>
-                  <a:lnTo>
-                    <a:pt x="600" y="8038"/>
-                  </a:lnTo>
-                  <a:lnTo>
-                    <a:pt x="600" y="592"/>
-                  </a:lnTo>
-                  <a:lnTo>
-                    <a:pt x="14748" y="592"/>
-                  </a:lnTo>
-                  <a:lnTo>
-                    <a:pt x="14748" y="8038"/>
-                  </a:lnTo>
-                  <a:close/>
-                </a:path>
-              </a:pathLst>
-            </a:custGeom>
-            <a:solidFill>
-              <a:schemeClr val="bg1"/>
-            </a:solidFill>
-            <a:ln>
-              <a:noFill/>
-            </a:ln>
-          </p:spPr>
-        </p:sp>
-      </p:grpSp>
-      <p:sp>
-        <p:nvSpPr>
-          <p:cNvPr id="12" name="Rectangle 11">
-            <a:extLst>
-              <a:ext uri="{FF2B5EF4-FFF2-40B4-BE49-F238E27FC236}">
-                <a16:creationId xmlns="" xmlns:a16="http://schemas.microsoft.com/office/drawing/2014/main" id="{73C0A186-7444-4460-9C37-532E7671E99E}"/>
-              </a:ext>
-              <a:ext uri="{C183D7F6-B498-43B3-948B-1728B52AA6E4}">
-                <adec:decorative xmlns="" xmlns:adec="http://schemas.microsoft.com/office/drawing/2017/decorative" val="1"/>
-              </a:ext>
-            </a:extLst>
-          </p:cNvPr>
-          <p:cNvSpPr>
-            <a:spLocks noGrp="1" noRot="1" noChangeAspect="1" noMove="1" noResize="1" noEditPoints="1" noAdjustHandles="1" noChangeArrowheads="1" noChangeShapeType="1" noTextEdit="1"/>
-          </p:cNvSpPr>
-          <p:nvPr>
-            <p:extLst>
-              <p:ext uri="{386F3935-93C4-4BCD-93E2-E3B085C9AB24}">
-                <p16:designElem xmlns="" xmlns:p16="http://schemas.microsoft.com/office/powerpoint/2015/main" val="1"/>
-              </p:ext>
-            </p:extLst>
-          </p:nvPr>
-        </p:nvSpPr>
-        <p:spPr>
-          <a:xfrm>
-            <a:off x="10437812" y="0"/>
-            <a:ext cx="685800" cy="1143000"/>
-          </a:xfrm>
-          <a:prstGeom prst="rect">
-            <a:avLst/>
-          </a:prstGeom>
-          <a:solidFill>
-            <a:schemeClr val="accent1"/>
-          </a:solidFill>
-          <a:ln>
-            <a:noFill/>
-          </a:ln>
-        </p:spPr>
-        <p:style>
-          <a:lnRef idx="1">
-            <a:schemeClr val="accent1"/>
-          </a:lnRef>
-          <a:fillRef idx="3">
-            <a:schemeClr val="accent1"/>
-          </a:fillRef>
-          <a:effectRef idx="2">
-            <a:schemeClr val="accent1"/>
-          </a:effectRef>
-          <a:fontRef idx="minor">
-            <a:schemeClr val="lt1"/>
-          </a:fontRef>
-        </p:style>
-      </p:sp>
-      <p:grpSp>
-        <p:nvGrpSpPr>
-          <p:cNvPr id="14" name="Group 13">
-            <a:extLst>
-              <a:ext uri="{FF2B5EF4-FFF2-40B4-BE49-F238E27FC236}">
-                <a16:creationId xmlns="" xmlns:a16="http://schemas.microsoft.com/office/drawing/2014/main" id="{F1ECA4FE-7D2F-4576-B767-3A5F5ABFE90F}"/>
-              </a:ext>
-              <a:ext uri="{C183D7F6-B498-43B3-948B-1728B52AA6E4}">
-                <adec:decorative xmlns="" xmlns:adec="http://schemas.microsoft.com/office/drawing/2017/decorative" val="1"/>
-              </a:ext>
-            </a:extLst>
-          </p:cNvPr>
-          <p:cNvGrpSpPr>
-            <a:grpSpLocks noGrp="1" noUngrp="1" noRot="1" noChangeAspect="1" noMove="1" noResize="1"/>
-          </p:cNvGrpSpPr>
-          <p:nvPr>
-            <p:extLst>
-              <p:ext uri="{386F3935-93C4-4BCD-93E2-E3B085C9AB24}">
-                <p16:designElem xmlns="" xmlns:p16="http://schemas.microsoft.com/office/powerpoint/2015/main" val="1"/>
-              </p:ext>
-            </p:extLst>
-          </p:nvPr>
-        </p:nvGrpSpPr>
-        <p:grpSpPr>
-          <a:xfrm>
-            <a:off x="0" y="-26126"/>
-            <a:ext cx="12192000" cy="6884126"/>
-            <a:chOff x="0" y="-26126"/>
-            <a:chExt cx="12192000" cy="6884126"/>
-          </a:xfrm>
-        </p:grpSpPr>
-        <p:sp useBgFill="1">
-          <p:nvSpPr>
-            <p:cNvPr id="15" name="Rectangle 14">
-              <a:extLst>
-                <a:ext uri="{FF2B5EF4-FFF2-40B4-BE49-F238E27FC236}">
-                  <a16:creationId xmlns="" xmlns:a16="http://schemas.microsoft.com/office/drawing/2014/main" id="{5969441E-5462-4859-86CD-1737FDE36046}"/>
-                </a:ext>
-                <a:ext uri="{C183D7F6-B498-43B3-948B-1728B52AA6E4}">
-                  <adec:decorative xmlns="" xmlns:adec="http://schemas.microsoft.com/office/drawing/2017/decorative" val="1"/>
-                </a:ext>
-              </a:extLst>
-            </p:cNvPr>
-            <p:cNvSpPr/>
-            <p:nvPr>
-              <p:extLst>
-                <p:ext uri="{386F3935-93C4-4BCD-93E2-E3B085C9AB24}">
-                  <p16:designElem xmlns="" xmlns:p16="http://schemas.microsoft.com/office/powerpoint/2015/main" val="1"/>
-                </p:ext>
-              </p:extLst>
-            </p:nvPr>
-          </p:nvSpPr>
-          <p:spPr>
-            <a:xfrm>
-              <a:off x="0" y="-26126"/>
-              <a:ext cx="12192000" cy="6858000"/>
-            </a:xfrm>
-            <a:prstGeom prst="rect">
-              <a:avLst/>
-            </a:prstGeom>
-            <a:ln>
-              <a:noFill/>
-            </a:ln>
-          </p:spPr>
-          <p:style>
-            <a:lnRef idx="2">
-              <a:schemeClr val="accent1">
-                <a:shade val="50000"/>
-              </a:schemeClr>
-            </a:lnRef>
-            <a:fillRef idx="1">
-              <a:schemeClr val="accent1"/>
-            </a:fillRef>
-            <a:effectRef idx="0">
-              <a:schemeClr val="accent1"/>
-            </a:effectRef>
-            <a:fontRef idx="minor">
-              <a:schemeClr val="lt1"/>
-            </a:fontRef>
-          </p:style>
-        </p:sp>
-        <p:sp>
-          <p:nvSpPr>
-            <p:cNvPr id="16" name="Freeform 5">
-              <a:extLst>
-                <a:ext uri="{FF2B5EF4-FFF2-40B4-BE49-F238E27FC236}">
-                  <a16:creationId xmlns="" xmlns:a16="http://schemas.microsoft.com/office/drawing/2014/main" id="{596BD4B5-6833-40CC-96FE-EDC675634264}"/>
-                </a:ext>
-                <a:ext uri="{C183D7F6-B498-43B3-948B-1728B52AA6E4}">
-                  <adec:decorative xmlns="" xmlns:adec="http://schemas.microsoft.com/office/drawing/2017/decorative" val="1"/>
-                </a:ext>
-              </a:extLst>
-            </p:cNvPr>
-            <p:cNvSpPr>
-              <a:spLocks noEditPoints="1"/>
-            </p:cNvSpPr>
-            <p:nvPr>
-              <p:extLst>
-                <p:ext uri="{386F3935-93C4-4BCD-93E2-E3B085C9AB24}">
-                  <p16:designElem xmlns="" xmlns:p16="http://schemas.microsoft.com/office/powerpoint/2015/main" val="1"/>
-                </p:ext>
-              </p:extLst>
-            </p:nvPr>
-          </p:nvSpPr>
-          <p:spPr bwMode="gray">
-            <a:xfrm>
-              <a:off x="0" y="1587"/>
-              <a:ext cx="12192000" cy="6856413"/>
-            </a:xfrm>
-            <a:custGeom>
-              <a:avLst/>
-              <a:gdLst/>
-              <a:ahLst/>
-              <a:cxnLst/>
-              <a:rect l="0" t="0" r="r" b="b"/>
-              <a:pathLst>
-                <a:path w="15356" h="8638">
-                  <a:moveTo>
-                    <a:pt x="0" y="0"/>
-                  </a:moveTo>
-                  <a:lnTo>
-                    <a:pt x="0" y="8638"/>
-                  </a:lnTo>
-                  <a:lnTo>
-                    <a:pt x="15356" y="8638"/>
-                  </a:lnTo>
-                  <a:lnTo>
-                    <a:pt x="15356" y="0"/>
-                  </a:lnTo>
-                  <a:lnTo>
-                    <a:pt x="0" y="0"/>
-                  </a:lnTo>
-                  <a:close/>
-                  <a:moveTo>
-                    <a:pt x="14748" y="8038"/>
-                  </a:moveTo>
-                  <a:lnTo>
-                    <a:pt x="600" y="8038"/>
-                  </a:lnTo>
-                  <a:lnTo>
-                    <a:pt x="600" y="592"/>
-                  </a:lnTo>
-                  <a:lnTo>
-                    <a:pt x="14748" y="592"/>
-                  </a:lnTo>
-                  <a:lnTo>
-                    <a:pt x="14748" y="8038"/>
-                  </a:lnTo>
-                  <a:close/>
-                </a:path>
-              </a:pathLst>
-            </a:custGeom>
-            <a:solidFill>
-              <a:srgbClr val="FFFFFF"/>
-            </a:solidFill>
-            <a:ln>
-              <a:noFill/>
-            </a:ln>
-          </p:spPr>
-        </p:sp>
-      </p:grpSp>
       <p:sp>
         <p:nvSpPr>
           <p:cNvPr id="2" name="Title 1">
             <a:extLst>
               <a:ext uri="{FF2B5EF4-FFF2-40B4-BE49-F238E27FC236}">
-                <a16:creationId xmlns="" xmlns:a16="http://schemas.microsoft.com/office/drawing/2014/main" id="{D0DEBAF0-9320-4AAA-ACC8-9C26D550CA87}"/>
+                <a16:creationId xmlns:a16="http://schemas.microsoft.com/office/drawing/2014/main" id="{9E0866F1-7C0A-4C71-8F40-6D85BD494C67}"/>
               </a:ext>
             </a:extLst>
           </p:cNvPr>
@@ -17836,595 +17879,87 @@
             <p:ph type="title"/>
           </p:nvPr>
         </p:nvSpPr>
-        <p:spPr>
-          <a:xfrm>
-            <a:off x="1683171" y="1169773"/>
-            <a:ext cx="8825658" cy="2870161"/>
-          </a:xfrm>
-        </p:spPr>
+        <p:spPr/>
         <p:txBody>
-          <a:bodyPr vert="horz" lIns="91440" tIns="45720" rIns="91440" bIns="45720" rtlCol="0" anchor="b">
-            <a:normAutofit/>
-          </a:bodyPr>
+          <a:bodyPr/>
           <a:lstStyle/>
           <a:p>
-            <a:pPr algn="ctr"/>
             <a:r>
-              <a:rPr lang="en-US" sz="5400">
-                <a:solidFill>
-                  <a:schemeClr val="tx1"/>
-                </a:solidFill>
-              </a:rPr>
-              <a:t>Questions?</a:t>
+              <a:rPr lang="en-US" dirty="0"/>
+              <a:t>First Playable</a:t>
             </a:r>
           </a:p>
         </p:txBody>
       </p:sp>
-      <p:cxnSp>
-        <p:nvCxnSpPr>
-          <p:cNvPr id="18" name="Straight Connector 17">
+      <p:sp>
+        <p:nvSpPr>
+          <p:cNvPr id="3" name="Content Placeholder 2">
             <a:extLst>
               <a:ext uri="{FF2B5EF4-FFF2-40B4-BE49-F238E27FC236}">
-                <a16:creationId xmlns="" xmlns:a16="http://schemas.microsoft.com/office/drawing/2014/main" id="{E81F53E2-F556-42FA-8D24-113839EE19F8}"/>
-              </a:ext>
-              <a:ext uri="{C183D7F6-B498-43B3-948B-1728B52AA6E4}">
-                <adec:decorative xmlns="" xmlns:adec="http://schemas.microsoft.com/office/drawing/2017/decorative" val="1"/>
+                <a16:creationId xmlns:a16="http://schemas.microsoft.com/office/drawing/2014/main" id="{F0B230EC-A96D-4B3E-BDA7-A4040A3EFED6}"/>
               </a:ext>
             </a:extLst>
           </p:cNvPr>
-          <p:cNvCxnSpPr>
-            <a:cxnSpLocks noGrp="1" noRot="1" noChangeAspect="1" noMove="1" noResize="1" noEditPoints="1" noAdjustHandles="1" noChangeArrowheads="1" noChangeShapeType="1"/>
-          </p:cNvCxnSpPr>
+          <p:cNvSpPr>
+            <a:spLocks noGrp="1"/>
+          </p:cNvSpPr>
           <p:nvPr>
-            <p:extLst>
-              <p:ext uri="{386F3935-93C4-4BCD-93E2-E3B085C9AB24}">
-                <p16:designElem xmlns="" xmlns:p16="http://schemas.microsoft.com/office/powerpoint/2015/main" val="1"/>
-              </p:ext>
-            </p:extLst>
+            <p:ph idx="1"/>
           </p:nvPr>
-        </p:nvCxnSpPr>
-        <p:spPr>
-          <a:xfrm>
-            <a:off x="5758249" y="4166888"/>
-            <a:ext cx="675502" cy="0"/>
-          </a:xfrm>
-          <a:prstGeom prst="line">
-            <a:avLst/>
-          </a:prstGeom>
-          <a:ln w="19050">
-            <a:solidFill>
-              <a:srgbClr val="FFFFFF"/>
-            </a:solidFill>
-          </a:ln>
-        </p:spPr>
-        <p:style>
-          <a:lnRef idx="1">
-            <a:schemeClr val="accent1"/>
-          </a:lnRef>
-          <a:fillRef idx="0">
-            <a:schemeClr val="accent1"/>
-          </a:fillRef>
-          <a:effectRef idx="0">
-            <a:schemeClr val="accent1"/>
-          </a:effectRef>
-          <a:fontRef idx="minor">
-            <a:schemeClr val="tx1"/>
-          </a:fontRef>
-        </p:style>
-      </p:cxnSp>
-      <p:pic>
-        <p:nvPicPr>
-          <p:cNvPr id="11" name="Picture 10">
-            <a:extLst>
-              <a:ext uri="{FF2B5EF4-FFF2-40B4-BE49-F238E27FC236}">
-                <a16:creationId xmlns="" xmlns:a16="http://schemas.microsoft.com/office/drawing/2014/main" id="{8067D712-B97B-489F-93C0-EFC22B0553A6}"/>
-              </a:ext>
-            </a:extLst>
-          </p:cNvPr>
-          <p:cNvPicPr>
-            <a:picLocks noChangeAspect="1"/>
-          </p:cNvPicPr>
-          <p:nvPr/>
-        </p:nvPicPr>
-        <p:blipFill rotWithShape="1">
-          <a:blip r:embed="rId3"/>
-          <a:srcRect r="32041"/>
-          <a:stretch/>
-        </p:blipFill>
-        <p:spPr>
-          <a:xfrm>
-            <a:off x="8334103" y="2945150"/>
-            <a:ext cx="1548871" cy="1127002"/>
-          </a:xfrm>
-          <a:prstGeom prst="rect">
-            <a:avLst/>
-          </a:prstGeom>
-        </p:spPr>
-      </p:pic>
-      <p:pic>
-        <p:nvPicPr>
-          <p:cNvPr id="13" name="Picture 12">
-            <a:extLst>
-              <a:ext uri="{FF2B5EF4-FFF2-40B4-BE49-F238E27FC236}">
-                <a16:creationId xmlns="" xmlns:a16="http://schemas.microsoft.com/office/drawing/2014/main" id="{8067D712-B97B-489F-93C0-EFC22B0553A6}"/>
-              </a:ext>
-            </a:extLst>
-          </p:cNvPr>
-          <p:cNvPicPr>
-            <a:picLocks noChangeAspect="1"/>
-          </p:cNvPicPr>
-          <p:nvPr/>
-        </p:nvPicPr>
-        <p:blipFill rotWithShape="1">
-          <a:blip r:embed="rId3"/>
-          <a:srcRect r="32041"/>
-          <a:stretch/>
-        </p:blipFill>
-        <p:spPr>
-          <a:xfrm flipH="1">
-            <a:off x="2281350" y="2945150"/>
-            <a:ext cx="1548871" cy="1127002"/>
-          </a:xfrm>
-          <a:prstGeom prst="rect">
-            <a:avLst/>
-          </a:prstGeom>
-        </p:spPr>
-      </p:pic>
-      <p:pic>
-        <p:nvPicPr>
-          <p:cNvPr id="17" name="Picture 16" descr="Related image"/>
-          <p:cNvPicPr>
-            <a:picLocks noChangeAspect="1" noChangeArrowheads="1"/>
-          </p:cNvPicPr>
-          <p:nvPr/>
-        </p:nvPicPr>
-        <p:blipFill>
-          <a:blip r:embed="rId4">
-            <a:clrChange>
-              <a:clrFrom>
-                <a:srgbClr val="F7F7FF"/>
-              </a:clrFrom>
-              <a:clrTo>
-                <a:srgbClr val="F7F7FF">
-                  <a:alpha val="0"/>
-                </a:srgbClr>
-              </a:clrTo>
-            </a:clrChange>
-            <a:extLst>
-              <a:ext uri="{28A0092B-C50C-407E-A947-70E740481C1C}">
-                <a14:useLocalDpi xmlns:a14="http://schemas.microsoft.com/office/drawing/2010/main" val="0"/>
-              </a:ext>
-            </a:extLst>
-          </a:blip>
-          <a:srcRect/>
-          <a:stretch>
-            <a:fillRect/>
-          </a:stretch>
-        </p:blipFill>
-        <p:spPr bwMode="auto">
-          <a:xfrm>
-            <a:off x="6661223" y="4485219"/>
-            <a:ext cx="3393979" cy="1586267"/>
-          </a:xfrm>
-          <a:prstGeom prst="rect">
-            <a:avLst/>
-          </a:prstGeom>
-          <a:noFill/>
-          <a:extLst>
-            <a:ext uri="{909E8E84-426E-40DD-AFC4-6F175D3DCCD1}">
-              <a14:hiddenFill xmlns:a14="http://schemas.microsoft.com/office/drawing/2010/main">
-                <a:solidFill>
-                  <a:srgbClr val="FFFFFF"/>
-                </a:solidFill>
-              </a14:hiddenFill>
-            </a:ext>
-          </a:extLst>
-        </p:spPr>
-      </p:pic>
-      <p:grpSp>
-        <p:nvGrpSpPr>
-          <p:cNvPr id="19" name="Group 18"/>
-          <p:cNvGrpSpPr/>
-          <p:nvPr/>
-        </p:nvGrpSpPr>
-        <p:grpSpPr>
-          <a:xfrm>
-            <a:off x="7000675" y="4320119"/>
-            <a:ext cx="2844915" cy="1231184"/>
-            <a:chOff x="8242300" y="4237083"/>
-            <a:chExt cx="2844915" cy="1231184"/>
-          </a:xfrm>
-        </p:grpSpPr>
-        <p:pic>
-          <p:nvPicPr>
-            <p:cNvPr id="20" name="Picture 19">
-              <a:extLst>
-                <a:ext uri="{FF2B5EF4-FFF2-40B4-BE49-F238E27FC236}">
-                  <a16:creationId xmlns="" xmlns:a16="http://schemas.microsoft.com/office/drawing/2014/main" id="{8067D712-B97B-489F-93C0-EFC22B0553A6}"/>
-                </a:ext>
-              </a:extLst>
-            </p:cNvPr>
-            <p:cNvPicPr>
-              <a:picLocks noChangeAspect="1"/>
-            </p:cNvPicPr>
-            <p:nvPr/>
-          </p:nvPicPr>
-          <p:blipFill rotWithShape="1">
-            <a:blip r:embed="rId3"/>
-            <a:srcRect r="32041"/>
-            <a:stretch/>
-          </p:blipFill>
-          <p:spPr>
-            <a:xfrm rot="1676086" flipH="1">
-              <a:off x="9538344" y="4341265"/>
-              <a:ext cx="1548871" cy="1127002"/>
-            </a:xfrm>
-            <a:prstGeom prst="rect">
-              <a:avLst/>
-            </a:prstGeom>
-          </p:spPr>
-        </p:pic>
-        <p:pic>
-          <p:nvPicPr>
-            <p:cNvPr id="21" name="Picture 20">
-              <a:extLst>
-                <a:ext uri="{FF2B5EF4-FFF2-40B4-BE49-F238E27FC236}">
-                  <a16:creationId xmlns="" xmlns:a16="http://schemas.microsoft.com/office/drawing/2014/main" id="{8067D712-B97B-489F-93C0-EFC22B0553A6}"/>
-                </a:ext>
-              </a:extLst>
-            </p:cNvPr>
-            <p:cNvPicPr>
-              <a:picLocks noChangeAspect="1"/>
-            </p:cNvPicPr>
-            <p:nvPr/>
-          </p:nvPicPr>
-          <p:blipFill rotWithShape="1">
-            <a:blip r:embed="rId3"/>
-            <a:srcRect r="32041"/>
-            <a:stretch/>
-          </p:blipFill>
-          <p:spPr>
-            <a:xfrm flipH="1">
-              <a:off x="8242300" y="4237083"/>
-              <a:ext cx="1675036" cy="1218803"/>
-            </a:xfrm>
-            <a:prstGeom prst="rect">
-              <a:avLst/>
-            </a:prstGeom>
-          </p:spPr>
-        </p:pic>
-      </p:grpSp>
-      <p:pic>
-        <p:nvPicPr>
-          <p:cNvPr id="22" name="Picture 21" descr="Related image"/>
-          <p:cNvPicPr>
-            <a:picLocks noChangeAspect="1" noChangeArrowheads="1"/>
-          </p:cNvPicPr>
-          <p:nvPr/>
-        </p:nvPicPr>
-        <p:blipFill>
-          <a:blip r:embed="rId4">
-            <a:clrChange>
-              <a:clrFrom>
-                <a:srgbClr val="F7F7FF"/>
-              </a:clrFrom>
-              <a:clrTo>
-                <a:srgbClr val="F7F7FF">
-                  <a:alpha val="0"/>
-                </a:srgbClr>
-              </a:clrTo>
-            </a:clrChange>
-            <a:extLst>
-              <a:ext uri="{28A0092B-C50C-407E-A947-70E740481C1C}">
-                <a14:useLocalDpi xmlns:a14="http://schemas.microsoft.com/office/drawing/2010/main" val="0"/>
-              </a:ext>
-            </a:extLst>
-          </a:blip>
-          <a:srcRect/>
-          <a:stretch>
-            <a:fillRect/>
-          </a:stretch>
-        </p:blipFill>
-        <p:spPr bwMode="auto">
-          <a:xfrm flipH="1">
-            <a:off x="2133231" y="4576329"/>
-            <a:ext cx="3393979" cy="1586267"/>
-          </a:xfrm>
-          <a:prstGeom prst="rect">
-            <a:avLst/>
-          </a:prstGeom>
-          <a:noFill/>
-          <a:extLst>
-            <a:ext uri="{909E8E84-426E-40DD-AFC4-6F175D3DCCD1}">
-              <a14:hiddenFill xmlns:a14="http://schemas.microsoft.com/office/drawing/2010/main">
-                <a:solidFill>
-                  <a:srgbClr val="FFFFFF"/>
-                </a:solidFill>
-              </a14:hiddenFill>
-            </a:ext>
-          </a:extLst>
-        </p:spPr>
-      </p:pic>
-      <p:grpSp>
-        <p:nvGrpSpPr>
-          <p:cNvPr id="23" name="Group 22"/>
-          <p:cNvGrpSpPr/>
-          <p:nvPr/>
-        </p:nvGrpSpPr>
-        <p:grpSpPr>
-          <a:xfrm flipH="1">
-            <a:off x="2346170" y="4372210"/>
-            <a:ext cx="2844915" cy="1231184"/>
-            <a:chOff x="8242300" y="4237083"/>
-            <a:chExt cx="2844915" cy="1231184"/>
-          </a:xfrm>
-        </p:grpSpPr>
-        <p:pic>
-          <p:nvPicPr>
-            <p:cNvPr id="24" name="Picture 23">
-              <a:extLst>
-                <a:ext uri="{FF2B5EF4-FFF2-40B4-BE49-F238E27FC236}">
-                  <a16:creationId xmlns="" xmlns:a16="http://schemas.microsoft.com/office/drawing/2014/main" id="{8067D712-B97B-489F-93C0-EFC22B0553A6}"/>
-                </a:ext>
-              </a:extLst>
-            </p:cNvPr>
-            <p:cNvPicPr>
-              <a:picLocks noChangeAspect="1"/>
-            </p:cNvPicPr>
-            <p:nvPr/>
-          </p:nvPicPr>
-          <p:blipFill rotWithShape="1">
-            <a:blip r:embed="rId3"/>
-            <a:srcRect r="32041"/>
-            <a:stretch/>
-          </p:blipFill>
-          <p:spPr>
-            <a:xfrm rot="1676086" flipH="1">
-              <a:off x="9538344" y="4341265"/>
-              <a:ext cx="1548871" cy="1127002"/>
-            </a:xfrm>
-            <a:prstGeom prst="rect">
-              <a:avLst/>
-            </a:prstGeom>
-          </p:spPr>
-        </p:pic>
-        <p:pic>
-          <p:nvPicPr>
-            <p:cNvPr id="25" name="Picture 24">
-              <a:extLst>
-                <a:ext uri="{FF2B5EF4-FFF2-40B4-BE49-F238E27FC236}">
-                  <a16:creationId xmlns="" xmlns:a16="http://schemas.microsoft.com/office/drawing/2014/main" id="{8067D712-B97B-489F-93C0-EFC22B0553A6}"/>
-                </a:ext>
-              </a:extLst>
-            </p:cNvPr>
-            <p:cNvPicPr>
-              <a:picLocks noChangeAspect="1"/>
-            </p:cNvPicPr>
-            <p:nvPr/>
-          </p:nvPicPr>
-          <p:blipFill rotWithShape="1">
-            <a:blip r:embed="rId3"/>
-            <a:srcRect r="32041"/>
-            <a:stretch/>
-          </p:blipFill>
-          <p:spPr>
-            <a:xfrm flipH="1">
-              <a:off x="8242300" y="4237083"/>
-              <a:ext cx="1675036" cy="1218803"/>
-            </a:xfrm>
-            <a:prstGeom prst="rect">
-              <a:avLst/>
-            </a:prstGeom>
-          </p:spPr>
-        </p:pic>
-      </p:grpSp>
+        </p:nvSpPr>
+        <p:spPr/>
+        <p:txBody>
+          <a:bodyPr/>
+          <a:lstStyle/>
+          <a:p>
+            <a:r>
+              <a:rPr lang="en-US" dirty="0"/>
+              <a:t>One complete map</a:t>
+            </a:r>
+          </a:p>
+          <a:p>
+            <a:r>
+              <a:rPr lang="en-US" dirty="0"/>
+              <a:t>Core weapons implemented</a:t>
+            </a:r>
+          </a:p>
+          <a:p>
+            <a:r>
+              <a:rPr lang="en-US" dirty="0" err="1"/>
+              <a:t>PvP</a:t>
+            </a:r>
+            <a:r>
+              <a:rPr lang="en-US" dirty="0"/>
+              <a:t> only</a:t>
+            </a:r>
+          </a:p>
+          <a:p>
+            <a:r>
+              <a:rPr lang="en-US" dirty="0"/>
+              <a:t>Player movement</a:t>
+            </a:r>
+          </a:p>
+          <a:p>
+            <a:r>
+              <a:rPr lang="en-US" dirty="0"/>
+              <a:t>Destructible terrain</a:t>
+            </a:r>
+          </a:p>
+          <a:p>
+            <a:endParaRPr lang="en-US" dirty="0"/>
+          </a:p>
+        </p:txBody>
+      </p:sp>
     </p:spTree>
     <p:extLst>
       <p:ext uri="{BB962C8B-B14F-4D97-AF65-F5344CB8AC3E}">
-        <p14:creationId xmlns:p14="http://schemas.microsoft.com/office/powerpoint/2010/main" val="1618732212"/>
+        <p14:creationId xmlns:p14="http://schemas.microsoft.com/office/powerpoint/2010/main" val="2668110052"/>
       </p:ext>
     </p:extLst>
   </p:cSld>
   <p:clrMapOvr>
-    <a:overrideClrMapping bg1="dk1" tx1="lt1" bg2="dk2" tx2="lt2" accent1="accent1" accent2="accent2" accent3="accent3" accent4="accent4" accent5="accent5" accent6="accent6" hlink="hlink" folHlink="folHlink"/>
+    <a:masterClrMapping/>
   </p:clrMapOvr>
-  <p:timing>
-    <p:tnLst>
-      <p:par>
-        <p:cTn id="1" dur="indefinite" restart="never" nodeType="tmRoot">
-          <p:childTnLst>
-            <p:seq concurrent="1" nextAc="seek">
-              <p:cTn id="2" dur="indefinite" nodeType="mainSeq">
-                <p:childTnLst>
-                  <p:par>
-                    <p:cTn id="3" fill="hold">
-                      <p:stCondLst>
-                        <p:cond delay="indefinite"/>
-                        <p:cond evt="onBegin" delay="0">
-                          <p:tn val="2"/>
-                        </p:cond>
-                      </p:stCondLst>
-                      <p:childTnLst>
-                        <p:par>
-                          <p:cTn id="4" fill="hold">
-                            <p:stCondLst>
-                              <p:cond delay="0"/>
-                            </p:stCondLst>
-                            <p:childTnLst>
-                              <p:par>
-                                <p:cTn id="5" presetID="2" presetClass="entr" presetSubtype="4" fill="hold" nodeType="withEffect">
-                                  <p:stCondLst>
-                                    <p:cond delay="0"/>
-                                  </p:stCondLst>
-                                  <p:childTnLst>
-                                    <p:set>
-                                      <p:cBhvr>
-                                        <p:cTn id="6" dur="1" fill="hold">
-                                          <p:stCondLst>
-                                            <p:cond delay="0"/>
-                                          </p:stCondLst>
-                                        </p:cTn>
-                                        <p:tgtEl>
-                                          <p:spTgt spid="19"/>
-                                        </p:tgtEl>
-                                        <p:attrNameLst>
-                                          <p:attrName>style.visibility</p:attrName>
-                                        </p:attrNameLst>
-                                      </p:cBhvr>
-                                      <p:to>
-                                        <p:strVal val="visible"/>
-                                      </p:to>
-                                    </p:set>
-                                    <p:anim calcmode="lin" valueType="num">
-                                      <p:cBhvr additive="base">
-                                        <p:cTn id="7" dur="500" fill="hold"/>
-                                        <p:tgtEl>
-                                          <p:spTgt spid="19"/>
-                                        </p:tgtEl>
-                                        <p:attrNameLst>
-                                          <p:attrName>ppt_x</p:attrName>
-                                        </p:attrNameLst>
-                                      </p:cBhvr>
-                                      <p:tavLst>
-                                        <p:tav tm="0">
-                                          <p:val>
-                                            <p:strVal val="#ppt_x"/>
-                                          </p:val>
-                                        </p:tav>
-                                        <p:tav tm="100000">
-                                          <p:val>
-                                            <p:strVal val="#ppt_x"/>
-                                          </p:val>
-                                        </p:tav>
-                                      </p:tavLst>
-                                    </p:anim>
-                                    <p:anim calcmode="lin" valueType="num">
-                                      <p:cBhvr additive="base">
-                                        <p:cTn id="8" dur="500" fill="hold"/>
-                                        <p:tgtEl>
-                                          <p:spTgt spid="19"/>
-                                        </p:tgtEl>
-                                        <p:attrNameLst>
-                                          <p:attrName>ppt_y</p:attrName>
-                                        </p:attrNameLst>
-                                      </p:cBhvr>
-                                      <p:tavLst>
-                                        <p:tav tm="0">
-                                          <p:val>
-                                            <p:strVal val="1+#ppt_h/2"/>
-                                          </p:val>
-                                        </p:tav>
-                                        <p:tav tm="100000">
-                                          <p:val>
-                                            <p:strVal val="#ppt_y"/>
-                                          </p:val>
-                                        </p:tav>
-                                      </p:tavLst>
-                                    </p:anim>
-                                  </p:childTnLst>
-                                </p:cTn>
-                              </p:par>
-                              <p:par>
-                                <p:cTn id="9" presetID="2" presetClass="entr" presetSubtype="4" fill="hold" nodeType="withEffect">
-                                  <p:stCondLst>
-                                    <p:cond delay="0"/>
-                                  </p:stCondLst>
-                                  <p:childTnLst>
-                                    <p:set>
-                                      <p:cBhvr>
-                                        <p:cTn id="10" dur="1" fill="hold">
-                                          <p:stCondLst>
-                                            <p:cond delay="0"/>
-                                          </p:stCondLst>
-                                        </p:cTn>
-                                        <p:tgtEl>
-                                          <p:spTgt spid="23"/>
-                                        </p:tgtEl>
-                                        <p:attrNameLst>
-                                          <p:attrName>style.visibility</p:attrName>
-                                        </p:attrNameLst>
-                                      </p:cBhvr>
-                                      <p:to>
-                                        <p:strVal val="visible"/>
-                                      </p:to>
-                                    </p:set>
-                                    <p:anim calcmode="lin" valueType="num">
-                                      <p:cBhvr additive="base">
-                                        <p:cTn id="11" dur="500" fill="hold"/>
-                                        <p:tgtEl>
-                                          <p:spTgt spid="23"/>
-                                        </p:tgtEl>
-                                        <p:attrNameLst>
-                                          <p:attrName>ppt_x</p:attrName>
-                                        </p:attrNameLst>
-                                      </p:cBhvr>
-                                      <p:tavLst>
-                                        <p:tav tm="0">
-                                          <p:val>
-                                            <p:strVal val="#ppt_x"/>
-                                          </p:val>
-                                        </p:tav>
-                                        <p:tav tm="100000">
-                                          <p:val>
-                                            <p:strVal val="#ppt_x"/>
-                                          </p:val>
-                                        </p:tav>
-                                      </p:tavLst>
-                                    </p:anim>
-                                    <p:anim calcmode="lin" valueType="num">
-                                      <p:cBhvr additive="base">
-                                        <p:cTn id="12" dur="500" fill="hold"/>
-                                        <p:tgtEl>
-                                          <p:spTgt spid="23"/>
-                                        </p:tgtEl>
-                                        <p:attrNameLst>
-                                          <p:attrName>ppt_y</p:attrName>
-                                        </p:attrNameLst>
-                                      </p:cBhvr>
-                                      <p:tavLst>
-                                        <p:tav tm="0">
-                                          <p:val>
-                                            <p:strVal val="1+#ppt_h/2"/>
-                                          </p:val>
-                                        </p:tav>
-                                        <p:tav tm="100000">
-                                          <p:val>
-                                            <p:strVal val="#ppt_y"/>
-                                          </p:val>
-                                        </p:tav>
-                                      </p:tavLst>
-                                    </p:anim>
-                                  </p:childTnLst>
-                                </p:cTn>
-                              </p:par>
-                            </p:childTnLst>
-                          </p:cTn>
-                        </p:par>
-                      </p:childTnLst>
-                    </p:cTn>
-                  </p:par>
-                </p:childTnLst>
-              </p:cTn>
-              <p:prevCondLst>
-                <p:cond evt="onPrev" delay="0">
-                  <p:tgtEl>
-                    <p:sldTgt/>
-                  </p:tgtEl>
-                </p:cond>
-              </p:prevCondLst>
-              <p:nextCondLst>
-                <p:cond evt="onNext" delay="0">
-                  <p:tgtEl>
-                    <p:sldTgt/>
-                  </p:tgtEl>
-                </p:cond>
-              </p:nextCondLst>
-            </p:seq>
-          </p:childTnLst>
-        </p:cTn>
-      </p:par>
-    </p:tnLst>
-  </p:timing>
 </p:sld>
 </file>
 
@@ -18693,6 +18228,21 @@
 </file>
 
 <file path=customXml/item1.xml><?xml version="1.0" encoding="utf-8"?>
+<?mso-contentType ?>
+<FormTemplates xmlns="http://schemas.microsoft.com/sharepoint/v3/contenttype/forms">
+  <Display>DocumentLibraryForm</Display>
+  <Edit>DocumentLibraryForm</Edit>
+  <New>DocumentLibraryForm</New>
+</FormTemplates>
+</file>
+
+<file path=customXml/item2.xml><?xml version="1.0" encoding="utf-8"?>
+<p:properties xmlns:p="http://schemas.microsoft.com/office/2006/metadata/properties" xmlns:xsi="http://www.w3.org/2001/XMLSchema-instance" xmlns:pc="http://schemas.microsoft.com/office/infopath/2007/PartnerControls">
+  <documentManagement/>
+</p:properties>
+</file>
+
+<file path=customXml/item3.xml><?xml version="1.0" encoding="utf-8"?>
 <ct:contentTypeSchema xmlns:ct="http://schemas.microsoft.com/office/2006/metadata/contentType" xmlns:ma="http://schemas.microsoft.com/office/2006/metadata/properties/metaAttributes" ct:_="" ma:_="" ma:contentTypeName="Document" ma:contentTypeID="0x010100DEF4AC995E12C049A50ADA15ED46708B" ma:contentTypeVersion="10" ma:contentTypeDescription="Create a new document." ma:contentTypeScope="" ma:versionID="e1e50748af6b146b5d32526844560075">
   <xsd:schema xmlns:xsd="http://www.w3.org/2001/XMLSchema" xmlns:xs="http://www.w3.org/2001/XMLSchema" xmlns:p="http://schemas.microsoft.com/office/2006/metadata/properties" xmlns:ns3="dfe49bc2-e275-45b8-b1dd-d32901820c2b" targetNamespace="http://schemas.microsoft.com/office/2006/metadata/properties" ma:root="true" ma:fieldsID="f62390b4dc920914b866ec1225863cbc" ns3:_="">
     <xsd:import namespace="dfe49bc2-e275-45b8-b1dd-d32901820c2b"/>
@@ -18876,35 +18426,10 @@
 </ct:contentTypeSchema>
 </file>
 
-<file path=customXml/item2.xml><?xml version="1.0" encoding="utf-8"?>
-<p:properties xmlns:p="http://schemas.microsoft.com/office/2006/metadata/properties" xmlns:xsi="http://www.w3.org/2001/XMLSchema-instance" xmlns:pc="http://schemas.microsoft.com/office/infopath/2007/PartnerControls">
-  <documentManagement/>
-</p:properties>
-</file>
-
-<file path=customXml/item3.xml><?xml version="1.0" encoding="utf-8"?>
-<?mso-contentType ?>
-<FormTemplates xmlns="http://schemas.microsoft.com/sharepoint/v3/contenttype/forms">
-  <Display>DocumentLibraryForm</Display>
-  <Edit>DocumentLibraryForm</Edit>
-  <New>DocumentLibraryForm</New>
-</FormTemplates>
-</file>
-
 <file path=customXml/itemProps1.xml><?xml version="1.0" encoding="utf-8"?>
-<ds:datastoreItem xmlns:ds="http://schemas.openxmlformats.org/officeDocument/2006/customXml" ds:itemID="{08A5B023-9490-4F16-A587-A9EC60F27C16}">
+<ds:datastoreItem xmlns:ds="http://schemas.openxmlformats.org/officeDocument/2006/customXml" ds:itemID="{C7893EDB-12D9-41BB-AE21-8BFDCB986999}">
   <ds:schemaRefs>
-    <ds:schemaRef ds:uri="http://schemas.microsoft.com/office/2006/metadata/contentType"/>
-    <ds:schemaRef ds:uri="http://schemas.microsoft.com/office/2006/metadata/properties/metaAttributes"/>
-    <ds:schemaRef ds:uri="http://www.w3.org/2001/XMLSchema"/>
-    <ds:schemaRef ds:uri="http://schemas.microsoft.com/office/2006/metadata/properties"/>
-    <ds:schemaRef ds:uri="dfe49bc2-e275-45b8-b1dd-d32901820c2b"/>
-    <ds:schemaRef ds:uri="http://schemas.microsoft.com/office/2006/documentManagement/types"/>
-    <ds:schemaRef ds:uri="http://schemas.microsoft.com/office/infopath/2007/PartnerControls"/>
-    <ds:schemaRef ds:uri="http://schemas.openxmlformats.org/package/2006/metadata/core-properties"/>
-    <ds:schemaRef ds:uri="http://purl.org/dc/elements/1.1/"/>
-    <ds:schemaRef ds:uri="http://purl.org/dc/terms/"/>
-    <ds:schemaRef ds:uri="http://schemas.microsoft.com/internal/obd"/>
+    <ds:schemaRef ds:uri="http://schemas.microsoft.com/sharepoint/v3/contenttype/forms"/>
   </ds:schemaRefs>
 </ds:datastoreItem>
 </file>
@@ -18926,9 +18451,19 @@
 </file>
 
 <file path=customXml/itemProps3.xml><?xml version="1.0" encoding="utf-8"?>
-<ds:datastoreItem xmlns:ds="http://schemas.openxmlformats.org/officeDocument/2006/customXml" ds:itemID="{C7893EDB-12D9-41BB-AE21-8BFDCB986999}">
+<ds:datastoreItem xmlns:ds="http://schemas.openxmlformats.org/officeDocument/2006/customXml" ds:itemID="{08A5B023-9490-4F16-A587-A9EC60F27C16}">
   <ds:schemaRefs>
-    <ds:schemaRef ds:uri="http://schemas.microsoft.com/sharepoint/v3/contenttype/forms"/>
+    <ds:schemaRef ds:uri="http://schemas.microsoft.com/office/2006/metadata/contentType"/>
+    <ds:schemaRef ds:uri="http://schemas.microsoft.com/office/2006/metadata/properties/metaAttributes"/>
+    <ds:schemaRef ds:uri="http://www.w3.org/2001/XMLSchema"/>
+    <ds:schemaRef ds:uri="http://schemas.microsoft.com/office/2006/metadata/properties"/>
+    <ds:schemaRef ds:uri="dfe49bc2-e275-45b8-b1dd-d32901820c2b"/>
+    <ds:schemaRef ds:uri="http://schemas.microsoft.com/office/2006/documentManagement/types"/>
+    <ds:schemaRef ds:uri="http://schemas.microsoft.com/office/infopath/2007/PartnerControls"/>
+    <ds:schemaRef ds:uri="http://schemas.openxmlformats.org/package/2006/metadata/core-properties"/>
+    <ds:schemaRef ds:uri="http://purl.org/dc/elements/1.1/"/>
+    <ds:schemaRef ds:uri="http://purl.org/dc/terms/"/>
+    <ds:schemaRef ds:uri="http://schemas.microsoft.com/internal/obd"/>
   </ds:schemaRefs>
 </ds:datastoreItem>
 </file>
</xml_diff>

<commit_message>
Updated alex's slides on ppt
</commit_message>
<xml_diff>
--- a/Game Proposal.pptx
+++ b/Game Proposal.pptx
@@ -674,7 +674,7 @@
             <a:fld id="{5923F103-BC34-4FE4-A40E-EDDEECFDA5D0}" type="datetimeFigureOut">
               <a:rPr lang="en-US" dirty="0"/>
               <a:pPr/>
-              <a:t>9/16/2019</a:t>
+              <a:t>9/17/2019</a:t>
             </a:fld>
             <a:endParaRPr lang="en-US" dirty="0"/>
           </a:p>
@@ -1758,7 +1758,7 @@
           <a:p>
             <a:fld id="{923A1CC3-2375-41D4-9E03-427CAF2A4C1A}" type="datetimeFigureOut">
               <a:rPr lang="en-US" dirty="0"/>
-              <a:t>9/16/2019</a:t>
+              <a:t>9/17/2019</a:t>
             </a:fld>
             <a:endParaRPr lang="en-US" dirty="0"/>
           </a:p>
@@ -2734,7 +2734,7 @@
           <a:p>
             <a:fld id="{AFF16868-8199-4C2C-A5B1-63AEE139F88E}" type="datetimeFigureOut">
               <a:rPr lang="en-US" dirty="0"/>
-              <a:t>9/16/2019</a:t>
+              <a:t>9/17/2019</a:t>
             </a:fld>
             <a:endParaRPr lang="en-US" dirty="0"/>
           </a:p>
@@ -3864,7 +3864,7 @@
           <a:p>
             <a:fld id="{AAD9FF7F-6988-44CC-821B-644E70CD2F73}" type="datetimeFigureOut">
               <a:rPr lang="en-US" dirty="0"/>
-              <a:t>9/16/2019</a:t>
+              <a:t>9/17/2019</a:t>
             </a:fld>
             <a:endParaRPr lang="en-US" dirty="0"/>
           </a:p>
@@ -4893,7 +4893,7 @@
           <a:p>
             <a:fld id="{5C12C299-16B2-4475-990D-751901EACC14}" type="datetimeFigureOut">
               <a:rPr lang="en-US" dirty="0"/>
-              <a:t>9/16/2019</a:t>
+              <a:t>9/17/2019</a:t>
             </a:fld>
             <a:endParaRPr lang="en-US" dirty="0"/>
           </a:p>
@@ -5549,7 +5549,7 @@
           <a:p>
             <a:fld id="{9FE86839-B9D8-4651-8783-F325ECE74E65}" type="datetimeFigureOut">
               <a:rPr lang="en-US" dirty="0"/>
-              <a:t>9/16/2019</a:t>
+              <a:t>9/17/2019</a:t>
             </a:fld>
             <a:endParaRPr lang="en-US" dirty="0"/>
           </a:p>
@@ -6406,7 +6406,7 @@
           <a:p>
             <a:fld id="{FD484F64-32F6-45C5-931F-ADC1662401D0}" type="datetimeFigureOut">
               <a:rPr lang="en-US" dirty="0"/>
-              <a:t>9/16/2019</a:t>
+              <a:t>9/17/2019</a:t>
             </a:fld>
             <a:endParaRPr lang="en-US" dirty="0"/>
           </a:p>
@@ -6592,7 +6592,7 @@
           <a:p>
             <a:fld id="{53086D93-FCAC-47E0-A2EE-787E62CA814C}" type="datetimeFigureOut">
               <a:rPr lang="en-US" dirty="0"/>
-              <a:t>9/16/2019</a:t>
+              <a:t>9/17/2019</a:t>
             </a:fld>
             <a:endParaRPr lang="en-US" dirty="0"/>
           </a:p>
@@ -7560,7 +7560,7 @@
           <a:p>
             <a:fld id="{CDA879A6-0FD0-4734-A311-86BFCA472E6E}" type="datetimeFigureOut">
               <a:rPr lang="en-US" dirty="0"/>
-              <a:t>9/16/2019</a:t>
+              <a:t>9/17/2019</a:t>
             </a:fld>
             <a:endParaRPr lang="en-US" dirty="0"/>
           </a:p>
@@ -7767,7 +7767,7 @@
           <a:p>
             <a:fld id="{19C9CA7B-DFD4-44B5-8C60-D14B8CD1FB59}" type="datetimeFigureOut">
               <a:rPr lang="en-US" dirty="0"/>
-              <a:t>9/16/2019</a:t>
+              <a:t>9/17/2019</a:t>
             </a:fld>
             <a:endParaRPr lang="en-US" dirty="0"/>
           </a:p>
@@ -8797,7 +8797,7 @@
           <a:p>
             <a:fld id="{F34E6425-0181-43F2-84FC-787E803FD2F8}" type="datetimeFigureOut">
               <a:rPr lang="en-US" dirty="0"/>
-              <a:t>9/16/2019</a:t>
+              <a:t>9/17/2019</a:t>
             </a:fld>
             <a:endParaRPr lang="en-US" dirty="0"/>
           </a:p>
@@ -9065,7 +9065,7 @@
           <a:p>
             <a:fld id="{3BDB8791-F1B0-41E7-B7FD-A781E65C4266}" type="datetimeFigureOut">
               <a:rPr lang="en-US" dirty="0"/>
-              <a:t>9/16/2019</a:t>
+              <a:t>9/17/2019</a:t>
             </a:fld>
             <a:endParaRPr lang="en-US" dirty="0"/>
           </a:p>
@@ -9471,7 +9471,7 @@
           <a:p>
             <a:fld id="{5FDD63B2-E120-4ED8-B27B-C685F510A5FE}" type="datetimeFigureOut">
               <a:rPr lang="en-US" dirty="0"/>
-              <a:t>9/16/2019</a:t>
+              <a:t>9/17/2019</a:t>
             </a:fld>
             <a:endParaRPr lang="en-US" dirty="0"/>
           </a:p>
@@ -9594,7 +9594,7 @@
           <a:p>
             <a:fld id="{7AA18ACC-A947-437B-A130-35BD54FDF1E9}" type="datetimeFigureOut">
               <a:rPr lang="en-US" dirty="0"/>
-              <a:t>9/16/2019</a:t>
+              <a:t>9/17/2019</a:t>
             </a:fld>
             <a:endParaRPr lang="en-US" dirty="0"/>
           </a:p>
@@ -9685,7 +9685,7 @@
           <a:p>
             <a:fld id="{7C8D7E02-BCB8-4D50-A234-369438C08659}" type="datetimeFigureOut">
               <a:rPr lang="en-US" dirty="0"/>
-              <a:t>9/16/2019</a:t>
+              <a:t>9/17/2019</a:t>
             </a:fld>
             <a:endParaRPr lang="en-US" dirty="0"/>
           </a:p>
@@ -10762,7 +10762,7 @@
           <a:p>
             <a:fld id="{76E86A4C-8E40-4F87-A4F0-01A0687C5742}" type="datetimeFigureOut">
               <a:rPr lang="en-US" dirty="0"/>
-              <a:t>9/16/2019</a:t>
+              <a:t>9/17/2019</a:t>
             </a:fld>
             <a:endParaRPr lang="en-US" dirty="0"/>
           </a:p>
@@ -11866,7 +11866,7 @@
           <a:p>
             <a:fld id="{35E72C73-2D91-4E12-BA25-F0AA0C03599B}" type="datetimeFigureOut">
               <a:rPr lang="en-US" dirty="0"/>
-              <a:t>9/16/2019</a:t>
+              <a:t>9/17/2019</a:t>
             </a:fld>
             <a:endParaRPr lang="en-US" dirty="0"/>
           </a:p>
@@ -12859,7 +12859,7 @@
           <a:p>
             <a:fld id="{2BE451C3-0FF4-47C4-B829-773ADF60F88C}" type="datetimeFigureOut">
               <a:rPr lang="en-US" dirty="0"/>
-              <a:t>9/16/2019</a:t>
+              <a:t>9/17/2019</a:t>
             </a:fld>
             <a:endParaRPr lang="en-US" dirty="0"/>
           </a:p>
@@ -17356,7 +17356,7 @@
         </p:nvSpPr>
         <p:spPr>
           <a:xfrm>
-            <a:off x="1154954" y="2603500"/>
+            <a:off x="370324" y="3004753"/>
             <a:ext cx="9817845" cy="4114800"/>
           </a:xfrm>
         </p:spPr>
@@ -17367,41 +17367,36 @@
           <a:lstStyle/>
           <a:p>
             <a:r>
-              <a:rPr lang="en-US" dirty="0"/>
+              <a:rPr lang="en-US" sz="2400" dirty="0"/>
               <a:t>Alex</a:t>
             </a:r>
           </a:p>
           <a:p>
             <a:pPr lvl="1"/>
             <a:r>
-              <a:rPr lang="en-US" dirty="0"/>
-              <a:t>AI movement decisions, Menu screens, Weapon UI, Implementing weapon animations</a:t>
-            </a:r>
-          </a:p>
-          <a:p>
-            <a:r>
-              <a:rPr lang="en-US" dirty="0"/>
-              <a:t>Fernando</a:t>
+              <a:rPr lang="en-US" sz="2000" dirty="0"/>
+              <a:t>Menu Screens</a:t>
             </a:r>
           </a:p>
           <a:p>
             <a:pPr lvl="1"/>
             <a:r>
-              <a:rPr lang="en-US" dirty="0"/>
-              <a:t>AI shooting decisions, Destructible terrain, Player controls, Physics mechanics, Collisions</a:t>
-            </a:r>
-          </a:p>
-          <a:p>
-            <a:r>
-              <a:rPr lang="en-US" dirty="0"/>
-              <a:t>Joseph</a:t>
+              <a:rPr lang="en-US" sz="2000" dirty="0"/>
+              <a:t>Weapon UI</a:t>
             </a:r>
           </a:p>
           <a:p>
             <a:pPr lvl="1"/>
             <a:r>
-              <a:rPr lang="en-US" dirty="0"/>
-              <a:t>AI target decisions and weapon selection, Map Creation, Environment Interaction, Hazards and Sounds, WordPress Website</a:t>
+              <a:rPr lang="en-US" sz="2000" dirty="0"/>
+              <a:t>Weapon Implementation</a:t>
+            </a:r>
+          </a:p>
+          <a:p>
+            <a:pPr lvl="1"/>
+            <a:r>
+              <a:rPr lang="en-US" sz="2000" dirty="0"/>
+              <a:t>AI movement</a:t>
             </a:r>
           </a:p>
         </p:txBody>
@@ -17559,6 +17554,586 @@
           </p:spPr>
         </p:pic>
       </p:grpSp>
+      <p:sp>
+        <p:nvSpPr>
+          <p:cNvPr id="10" name="Content Placeholder 2">
+            <a:extLst>
+              <a:ext uri="{FF2B5EF4-FFF2-40B4-BE49-F238E27FC236}">
+                <a16:creationId xmlns:a16="http://schemas.microsoft.com/office/drawing/2014/main" id="{A86B5078-B840-4618-9DB1-D96B4DCDC406}"/>
+              </a:ext>
+            </a:extLst>
+          </p:cNvPr>
+          <p:cNvSpPr txBox="1">
+            <a:spLocks/>
+          </p:cNvSpPr>
+          <p:nvPr/>
+        </p:nvSpPr>
+        <p:spPr>
+          <a:xfrm>
+            <a:off x="4098760" y="3040589"/>
+            <a:ext cx="4428285" cy="4114800"/>
+          </a:xfrm>
+          <a:prstGeom prst="rect">
+            <a:avLst/>
+          </a:prstGeom>
+        </p:spPr>
+        <p:txBody>
+          <a:bodyPr vert="horz" lIns="91440" tIns="45720" rIns="91440" bIns="45720" rtlCol="0">
+            <a:normAutofit/>
+          </a:bodyPr>
+          <a:lstStyle>
+            <a:lvl1pPr marL="342900" indent="-342900" algn="l" defTabSz="457200" rtl="0" eaLnBrk="1" latinLnBrk="0" hangingPunct="1">
+              <a:spcBef>
+                <a:spcPts val="1000"/>
+              </a:spcBef>
+              <a:spcAft>
+                <a:spcPts val="0"/>
+              </a:spcAft>
+              <a:buClr>
+                <a:schemeClr val="accent1"/>
+              </a:buClr>
+              <a:buSzPct val="80000"/>
+              <a:buFont typeface="Wingdings 3" charset="2"/>
+              <a:buChar char=""/>
+              <a:defRPr sz="1800" b="0" i="0" kern="1200">
+                <a:solidFill>
+                  <a:schemeClr val="tx1">
+                    <a:lumMod val="75000"/>
+                    <a:lumOff val="25000"/>
+                  </a:schemeClr>
+                </a:solidFill>
+                <a:latin typeface="+mn-lt"/>
+                <a:ea typeface="+mn-ea"/>
+                <a:cs typeface="+mn-cs"/>
+              </a:defRPr>
+            </a:lvl1pPr>
+            <a:lvl2pPr marL="742950" indent="-285750" algn="l" defTabSz="457200" rtl="0" eaLnBrk="1" latinLnBrk="0" hangingPunct="1">
+              <a:spcBef>
+                <a:spcPts val="1000"/>
+              </a:spcBef>
+              <a:spcAft>
+                <a:spcPts val="0"/>
+              </a:spcAft>
+              <a:buClr>
+                <a:schemeClr val="accent1"/>
+              </a:buClr>
+              <a:buSzPct val="80000"/>
+              <a:buFont typeface="Wingdings 3" charset="2"/>
+              <a:buChar char=""/>
+              <a:defRPr sz="1600" b="0" i="0" kern="1200">
+                <a:solidFill>
+                  <a:schemeClr val="tx1">
+                    <a:lumMod val="75000"/>
+                    <a:lumOff val="25000"/>
+                  </a:schemeClr>
+                </a:solidFill>
+                <a:latin typeface="+mn-lt"/>
+                <a:ea typeface="+mn-ea"/>
+                <a:cs typeface="+mn-cs"/>
+              </a:defRPr>
+            </a:lvl2pPr>
+            <a:lvl3pPr marL="1143000" indent="-228600" algn="l" defTabSz="457200" rtl="0" eaLnBrk="1" latinLnBrk="0" hangingPunct="1">
+              <a:spcBef>
+                <a:spcPts val="1000"/>
+              </a:spcBef>
+              <a:spcAft>
+                <a:spcPts val="0"/>
+              </a:spcAft>
+              <a:buClr>
+                <a:schemeClr val="accent1"/>
+              </a:buClr>
+              <a:buSzPct val="80000"/>
+              <a:buFont typeface="Wingdings 3" charset="2"/>
+              <a:buChar char=""/>
+              <a:defRPr sz="1400" b="0" i="0" kern="1200">
+                <a:solidFill>
+                  <a:schemeClr val="tx1">
+                    <a:lumMod val="75000"/>
+                    <a:lumOff val="25000"/>
+                  </a:schemeClr>
+                </a:solidFill>
+                <a:latin typeface="+mn-lt"/>
+                <a:ea typeface="+mn-ea"/>
+                <a:cs typeface="+mn-cs"/>
+              </a:defRPr>
+            </a:lvl3pPr>
+            <a:lvl4pPr marL="1600200" indent="-228600" algn="l" defTabSz="457200" rtl="0" eaLnBrk="1" latinLnBrk="0" hangingPunct="1">
+              <a:spcBef>
+                <a:spcPts val="1000"/>
+              </a:spcBef>
+              <a:spcAft>
+                <a:spcPts val="0"/>
+              </a:spcAft>
+              <a:buClr>
+                <a:schemeClr val="accent1"/>
+              </a:buClr>
+              <a:buSzPct val="80000"/>
+              <a:buFont typeface="Wingdings 3" charset="2"/>
+              <a:buChar char=""/>
+              <a:defRPr sz="1200" b="0" i="0" kern="1200">
+                <a:solidFill>
+                  <a:schemeClr val="tx1">
+                    <a:lumMod val="75000"/>
+                    <a:lumOff val="25000"/>
+                  </a:schemeClr>
+                </a:solidFill>
+                <a:latin typeface="+mn-lt"/>
+                <a:ea typeface="+mn-ea"/>
+                <a:cs typeface="+mn-cs"/>
+              </a:defRPr>
+            </a:lvl4pPr>
+            <a:lvl5pPr marL="2057400" indent="-228600" algn="l" defTabSz="457200" rtl="0" eaLnBrk="1" latinLnBrk="0" hangingPunct="1">
+              <a:spcBef>
+                <a:spcPts val="1000"/>
+              </a:spcBef>
+              <a:spcAft>
+                <a:spcPts val="0"/>
+              </a:spcAft>
+              <a:buClr>
+                <a:schemeClr val="accent1"/>
+              </a:buClr>
+              <a:buSzPct val="80000"/>
+              <a:buFont typeface="Wingdings 3" charset="2"/>
+              <a:buChar char=""/>
+              <a:defRPr sz="1200" b="0" i="0" kern="1200">
+                <a:solidFill>
+                  <a:schemeClr val="tx1">
+                    <a:lumMod val="75000"/>
+                    <a:lumOff val="25000"/>
+                  </a:schemeClr>
+                </a:solidFill>
+                <a:latin typeface="+mn-lt"/>
+                <a:ea typeface="+mn-ea"/>
+                <a:cs typeface="+mn-cs"/>
+              </a:defRPr>
+            </a:lvl5pPr>
+            <a:lvl6pPr marL="2514600" indent="-228600" algn="l" defTabSz="457200" rtl="0" eaLnBrk="1" latinLnBrk="0" hangingPunct="1">
+              <a:spcBef>
+                <a:spcPts val="1000"/>
+              </a:spcBef>
+              <a:spcAft>
+                <a:spcPts val="0"/>
+              </a:spcAft>
+              <a:buClr>
+                <a:schemeClr val="accent1"/>
+              </a:buClr>
+              <a:buSzPct val="80000"/>
+              <a:buFont typeface="Wingdings 3" charset="2"/>
+              <a:buChar char=""/>
+              <a:defRPr sz="1200" b="0" i="0" kern="1200">
+                <a:solidFill>
+                  <a:schemeClr val="tx1">
+                    <a:lumMod val="75000"/>
+                    <a:lumOff val="25000"/>
+                  </a:schemeClr>
+                </a:solidFill>
+                <a:latin typeface="+mn-lt"/>
+                <a:ea typeface="+mn-ea"/>
+                <a:cs typeface="+mn-cs"/>
+              </a:defRPr>
+            </a:lvl6pPr>
+            <a:lvl7pPr marL="2971800" indent="-228600" algn="l" defTabSz="457200" rtl="0" eaLnBrk="1" latinLnBrk="0" hangingPunct="1">
+              <a:spcBef>
+                <a:spcPts val="1000"/>
+              </a:spcBef>
+              <a:spcAft>
+                <a:spcPts val="0"/>
+              </a:spcAft>
+              <a:buClr>
+                <a:schemeClr val="accent1"/>
+              </a:buClr>
+              <a:buSzPct val="80000"/>
+              <a:buFont typeface="Wingdings 3" charset="2"/>
+              <a:buChar char=""/>
+              <a:defRPr sz="1200" b="0" i="0" kern="1200">
+                <a:solidFill>
+                  <a:schemeClr val="tx1">
+                    <a:lumMod val="75000"/>
+                    <a:lumOff val="25000"/>
+                  </a:schemeClr>
+                </a:solidFill>
+                <a:latin typeface="+mn-lt"/>
+                <a:ea typeface="+mn-ea"/>
+                <a:cs typeface="+mn-cs"/>
+              </a:defRPr>
+            </a:lvl7pPr>
+            <a:lvl8pPr marL="3429000" indent="-228600" algn="l" defTabSz="457200" rtl="0" eaLnBrk="1" latinLnBrk="0" hangingPunct="1">
+              <a:spcBef>
+                <a:spcPts val="1000"/>
+              </a:spcBef>
+              <a:spcAft>
+                <a:spcPts val="0"/>
+              </a:spcAft>
+              <a:buClr>
+                <a:schemeClr val="accent1"/>
+              </a:buClr>
+              <a:buSzPct val="80000"/>
+              <a:buFont typeface="Wingdings 3" charset="2"/>
+              <a:buChar char=""/>
+              <a:defRPr sz="1200" b="0" i="0" kern="1200">
+                <a:solidFill>
+                  <a:schemeClr val="tx1">
+                    <a:lumMod val="75000"/>
+                    <a:lumOff val="25000"/>
+                  </a:schemeClr>
+                </a:solidFill>
+                <a:latin typeface="+mn-lt"/>
+                <a:ea typeface="+mn-ea"/>
+                <a:cs typeface="+mn-cs"/>
+              </a:defRPr>
+            </a:lvl8pPr>
+            <a:lvl9pPr marL="3886200" indent="-228600" algn="l" defTabSz="457200" rtl="0" eaLnBrk="1" latinLnBrk="0" hangingPunct="1">
+              <a:spcBef>
+                <a:spcPts val="1000"/>
+              </a:spcBef>
+              <a:spcAft>
+                <a:spcPts val="0"/>
+              </a:spcAft>
+              <a:buClr>
+                <a:schemeClr val="accent1"/>
+              </a:buClr>
+              <a:buSzPct val="80000"/>
+              <a:buFont typeface="Wingdings 3" charset="2"/>
+              <a:buChar char=""/>
+              <a:defRPr sz="1200" b="0" i="0" kern="1200">
+                <a:solidFill>
+                  <a:schemeClr val="tx1">
+                    <a:lumMod val="75000"/>
+                    <a:lumOff val="25000"/>
+                  </a:schemeClr>
+                </a:solidFill>
+                <a:latin typeface="+mn-lt"/>
+                <a:ea typeface="+mn-ea"/>
+                <a:cs typeface="+mn-cs"/>
+              </a:defRPr>
+            </a:lvl9pPr>
+          </a:lstStyle>
+          <a:p>
+            <a:r>
+              <a:rPr lang="en-US" sz="2400" dirty="0"/>
+              <a:t>Fernando</a:t>
+            </a:r>
+          </a:p>
+          <a:p>
+            <a:pPr lvl="1"/>
+            <a:r>
+              <a:rPr lang="en-US" sz="2000" dirty="0"/>
+              <a:t>Player Movement/Controls</a:t>
+            </a:r>
+          </a:p>
+          <a:p>
+            <a:pPr lvl="1"/>
+            <a:r>
+              <a:rPr lang="en-US" sz="2000" dirty="0"/>
+              <a:t>Projectile Pathing</a:t>
+            </a:r>
+          </a:p>
+          <a:p>
+            <a:pPr lvl="1"/>
+            <a:r>
+              <a:rPr lang="en-US" sz="2000" dirty="0"/>
+              <a:t>Collisions</a:t>
+            </a:r>
+          </a:p>
+          <a:p>
+            <a:pPr lvl="1"/>
+            <a:r>
+              <a:rPr lang="en-US" sz="2000" dirty="0"/>
+              <a:t>AI targeting</a:t>
+            </a:r>
+          </a:p>
+        </p:txBody>
+      </p:sp>
+      <p:sp>
+        <p:nvSpPr>
+          <p:cNvPr id="11" name="Content Placeholder 2">
+            <a:extLst>
+              <a:ext uri="{FF2B5EF4-FFF2-40B4-BE49-F238E27FC236}">
+                <a16:creationId xmlns:a16="http://schemas.microsoft.com/office/drawing/2014/main" id="{832CFD92-9411-4076-BEFD-AD62632D5295}"/>
+              </a:ext>
+            </a:extLst>
+          </p:cNvPr>
+          <p:cNvSpPr txBox="1">
+            <a:spLocks/>
+          </p:cNvSpPr>
+          <p:nvPr/>
+        </p:nvSpPr>
+        <p:spPr>
+          <a:xfrm>
+            <a:off x="8158494" y="3007308"/>
+            <a:ext cx="4137740" cy="4114800"/>
+          </a:xfrm>
+          <a:prstGeom prst="rect">
+            <a:avLst/>
+          </a:prstGeom>
+        </p:spPr>
+        <p:txBody>
+          <a:bodyPr vert="horz" lIns="91440" tIns="45720" rIns="91440" bIns="45720" rtlCol="0">
+            <a:normAutofit/>
+          </a:bodyPr>
+          <a:lstStyle>
+            <a:lvl1pPr marL="342900" indent="-342900" algn="l" defTabSz="457200" rtl="0" eaLnBrk="1" latinLnBrk="0" hangingPunct="1">
+              <a:spcBef>
+                <a:spcPts val="1000"/>
+              </a:spcBef>
+              <a:spcAft>
+                <a:spcPts val="0"/>
+              </a:spcAft>
+              <a:buClr>
+                <a:schemeClr val="accent1"/>
+              </a:buClr>
+              <a:buSzPct val="80000"/>
+              <a:buFont typeface="Wingdings 3" charset="2"/>
+              <a:buChar char=""/>
+              <a:defRPr sz="1800" b="0" i="0" kern="1200">
+                <a:solidFill>
+                  <a:schemeClr val="tx1">
+                    <a:lumMod val="75000"/>
+                    <a:lumOff val="25000"/>
+                  </a:schemeClr>
+                </a:solidFill>
+                <a:latin typeface="+mn-lt"/>
+                <a:ea typeface="+mn-ea"/>
+                <a:cs typeface="+mn-cs"/>
+              </a:defRPr>
+            </a:lvl1pPr>
+            <a:lvl2pPr marL="742950" indent="-285750" algn="l" defTabSz="457200" rtl="0" eaLnBrk="1" latinLnBrk="0" hangingPunct="1">
+              <a:spcBef>
+                <a:spcPts val="1000"/>
+              </a:spcBef>
+              <a:spcAft>
+                <a:spcPts val="0"/>
+              </a:spcAft>
+              <a:buClr>
+                <a:schemeClr val="accent1"/>
+              </a:buClr>
+              <a:buSzPct val="80000"/>
+              <a:buFont typeface="Wingdings 3" charset="2"/>
+              <a:buChar char=""/>
+              <a:defRPr sz="1600" b="0" i="0" kern="1200">
+                <a:solidFill>
+                  <a:schemeClr val="tx1">
+                    <a:lumMod val="75000"/>
+                    <a:lumOff val="25000"/>
+                  </a:schemeClr>
+                </a:solidFill>
+                <a:latin typeface="+mn-lt"/>
+                <a:ea typeface="+mn-ea"/>
+                <a:cs typeface="+mn-cs"/>
+              </a:defRPr>
+            </a:lvl2pPr>
+            <a:lvl3pPr marL="1143000" indent="-228600" algn="l" defTabSz="457200" rtl="0" eaLnBrk="1" latinLnBrk="0" hangingPunct="1">
+              <a:spcBef>
+                <a:spcPts val="1000"/>
+              </a:spcBef>
+              <a:spcAft>
+                <a:spcPts val="0"/>
+              </a:spcAft>
+              <a:buClr>
+                <a:schemeClr val="accent1"/>
+              </a:buClr>
+              <a:buSzPct val="80000"/>
+              <a:buFont typeface="Wingdings 3" charset="2"/>
+              <a:buChar char=""/>
+              <a:defRPr sz="1400" b="0" i="0" kern="1200">
+                <a:solidFill>
+                  <a:schemeClr val="tx1">
+                    <a:lumMod val="75000"/>
+                    <a:lumOff val="25000"/>
+                  </a:schemeClr>
+                </a:solidFill>
+                <a:latin typeface="+mn-lt"/>
+                <a:ea typeface="+mn-ea"/>
+                <a:cs typeface="+mn-cs"/>
+              </a:defRPr>
+            </a:lvl3pPr>
+            <a:lvl4pPr marL="1600200" indent="-228600" algn="l" defTabSz="457200" rtl="0" eaLnBrk="1" latinLnBrk="0" hangingPunct="1">
+              <a:spcBef>
+                <a:spcPts val="1000"/>
+              </a:spcBef>
+              <a:spcAft>
+                <a:spcPts val="0"/>
+              </a:spcAft>
+              <a:buClr>
+                <a:schemeClr val="accent1"/>
+              </a:buClr>
+              <a:buSzPct val="80000"/>
+              <a:buFont typeface="Wingdings 3" charset="2"/>
+              <a:buChar char=""/>
+              <a:defRPr sz="1200" b="0" i="0" kern="1200">
+                <a:solidFill>
+                  <a:schemeClr val="tx1">
+                    <a:lumMod val="75000"/>
+                    <a:lumOff val="25000"/>
+                  </a:schemeClr>
+                </a:solidFill>
+                <a:latin typeface="+mn-lt"/>
+                <a:ea typeface="+mn-ea"/>
+                <a:cs typeface="+mn-cs"/>
+              </a:defRPr>
+            </a:lvl4pPr>
+            <a:lvl5pPr marL="2057400" indent="-228600" algn="l" defTabSz="457200" rtl="0" eaLnBrk="1" latinLnBrk="0" hangingPunct="1">
+              <a:spcBef>
+                <a:spcPts val="1000"/>
+              </a:spcBef>
+              <a:spcAft>
+                <a:spcPts val="0"/>
+              </a:spcAft>
+              <a:buClr>
+                <a:schemeClr val="accent1"/>
+              </a:buClr>
+              <a:buSzPct val="80000"/>
+              <a:buFont typeface="Wingdings 3" charset="2"/>
+              <a:buChar char=""/>
+              <a:defRPr sz="1200" b="0" i="0" kern="1200">
+                <a:solidFill>
+                  <a:schemeClr val="tx1">
+                    <a:lumMod val="75000"/>
+                    <a:lumOff val="25000"/>
+                  </a:schemeClr>
+                </a:solidFill>
+                <a:latin typeface="+mn-lt"/>
+                <a:ea typeface="+mn-ea"/>
+                <a:cs typeface="+mn-cs"/>
+              </a:defRPr>
+            </a:lvl5pPr>
+            <a:lvl6pPr marL="2514600" indent="-228600" algn="l" defTabSz="457200" rtl="0" eaLnBrk="1" latinLnBrk="0" hangingPunct="1">
+              <a:spcBef>
+                <a:spcPts val="1000"/>
+              </a:spcBef>
+              <a:spcAft>
+                <a:spcPts val="0"/>
+              </a:spcAft>
+              <a:buClr>
+                <a:schemeClr val="accent1"/>
+              </a:buClr>
+              <a:buSzPct val="80000"/>
+              <a:buFont typeface="Wingdings 3" charset="2"/>
+              <a:buChar char=""/>
+              <a:defRPr sz="1200" b="0" i="0" kern="1200">
+                <a:solidFill>
+                  <a:schemeClr val="tx1">
+                    <a:lumMod val="75000"/>
+                    <a:lumOff val="25000"/>
+                  </a:schemeClr>
+                </a:solidFill>
+                <a:latin typeface="+mn-lt"/>
+                <a:ea typeface="+mn-ea"/>
+                <a:cs typeface="+mn-cs"/>
+              </a:defRPr>
+            </a:lvl6pPr>
+            <a:lvl7pPr marL="2971800" indent="-228600" algn="l" defTabSz="457200" rtl="0" eaLnBrk="1" latinLnBrk="0" hangingPunct="1">
+              <a:spcBef>
+                <a:spcPts val="1000"/>
+              </a:spcBef>
+              <a:spcAft>
+                <a:spcPts val="0"/>
+              </a:spcAft>
+              <a:buClr>
+                <a:schemeClr val="accent1"/>
+              </a:buClr>
+              <a:buSzPct val="80000"/>
+              <a:buFont typeface="Wingdings 3" charset="2"/>
+              <a:buChar char=""/>
+              <a:defRPr sz="1200" b="0" i="0" kern="1200">
+                <a:solidFill>
+                  <a:schemeClr val="tx1">
+                    <a:lumMod val="75000"/>
+                    <a:lumOff val="25000"/>
+                  </a:schemeClr>
+                </a:solidFill>
+                <a:latin typeface="+mn-lt"/>
+                <a:ea typeface="+mn-ea"/>
+                <a:cs typeface="+mn-cs"/>
+              </a:defRPr>
+            </a:lvl7pPr>
+            <a:lvl8pPr marL="3429000" indent="-228600" algn="l" defTabSz="457200" rtl="0" eaLnBrk="1" latinLnBrk="0" hangingPunct="1">
+              <a:spcBef>
+                <a:spcPts val="1000"/>
+              </a:spcBef>
+              <a:spcAft>
+                <a:spcPts val="0"/>
+              </a:spcAft>
+              <a:buClr>
+                <a:schemeClr val="accent1"/>
+              </a:buClr>
+              <a:buSzPct val="80000"/>
+              <a:buFont typeface="Wingdings 3" charset="2"/>
+              <a:buChar char=""/>
+              <a:defRPr sz="1200" b="0" i="0" kern="1200">
+                <a:solidFill>
+                  <a:schemeClr val="tx1">
+                    <a:lumMod val="75000"/>
+                    <a:lumOff val="25000"/>
+                  </a:schemeClr>
+                </a:solidFill>
+                <a:latin typeface="+mn-lt"/>
+                <a:ea typeface="+mn-ea"/>
+                <a:cs typeface="+mn-cs"/>
+              </a:defRPr>
+            </a:lvl8pPr>
+            <a:lvl9pPr marL="3886200" indent="-228600" algn="l" defTabSz="457200" rtl="0" eaLnBrk="1" latinLnBrk="0" hangingPunct="1">
+              <a:spcBef>
+                <a:spcPts val="1000"/>
+              </a:spcBef>
+              <a:spcAft>
+                <a:spcPts val="0"/>
+              </a:spcAft>
+              <a:buClr>
+                <a:schemeClr val="accent1"/>
+              </a:buClr>
+              <a:buSzPct val="80000"/>
+              <a:buFont typeface="Wingdings 3" charset="2"/>
+              <a:buChar char=""/>
+              <a:defRPr sz="1200" b="0" i="0" kern="1200">
+                <a:solidFill>
+                  <a:schemeClr val="tx1">
+                    <a:lumMod val="75000"/>
+                    <a:lumOff val="25000"/>
+                  </a:schemeClr>
+                </a:solidFill>
+                <a:latin typeface="+mn-lt"/>
+                <a:ea typeface="+mn-ea"/>
+                <a:cs typeface="+mn-cs"/>
+              </a:defRPr>
+            </a:lvl9pPr>
+          </a:lstStyle>
+          <a:p>
+            <a:r>
+              <a:rPr lang="en-US" sz="2400" dirty="0"/>
+              <a:t>Joseph</a:t>
+            </a:r>
+          </a:p>
+          <a:p>
+            <a:pPr lvl="1"/>
+            <a:r>
+              <a:rPr lang="en-US" sz="2000" dirty="0"/>
+              <a:t>Destructible Terrain</a:t>
+            </a:r>
+          </a:p>
+          <a:p>
+            <a:pPr lvl="1"/>
+            <a:r>
+              <a:rPr lang="en-US" sz="2000" dirty="0"/>
+              <a:t>Map Generation</a:t>
+            </a:r>
+          </a:p>
+          <a:p>
+            <a:pPr lvl="1"/>
+            <a:r>
+              <a:rPr lang="en-US" sz="2000" dirty="0"/>
+              <a:t>Environmental Hazards</a:t>
+            </a:r>
+          </a:p>
+          <a:p>
+            <a:pPr lvl="1"/>
+            <a:r>
+              <a:rPr lang="en-US" sz="2000" dirty="0"/>
+              <a:t>WordPress</a:t>
+            </a:r>
+          </a:p>
+        </p:txBody>
+      </p:sp>
     </p:spTree>
     <p:extLst>
       <p:ext uri="{BB962C8B-B14F-4D97-AF65-F5344CB8AC3E}">
@@ -17778,7 +18353,7 @@
             <a:pPr lvl="1"/>
             <a:r>
               <a:rPr lang="en-US" dirty="0"/>
-              <a:t>Site, GitHub, Art Style and Some Assets, Player movement</a:t>
+              <a:t>Website, GitHub, Art Style and Some Assets, Player movement</a:t>
             </a:r>
           </a:p>
           <a:p>
@@ -17791,15 +18366,7 @@
             <a:pPr lvl="1"/>
             <a:r>
               <a:rPr lang="en-US" dirty="0"/>
-              <a:t>One complete map, Core weapons implemented, </a:t>
-            </a:r>
-            <a:r>
-              <a:rPr lang="en-US" dirty="0" err="1"/>
-              <a:t>PvP</a:t>
-            </a:r>
-            <a:r>
-              <a:rPr lang="en-US" dirty="0"/>
-              <a:t> only, Player movement, Destructible terrain</a:t>
+              <a:t>One premade map, Core weapons, Destructible terrain, Ability to start/finish match</a:t>
             </a:r>
           </a:p>
           <a:p>
@@ -17812,7 +18379,7 @@
             <a:pPr lvl="1"/>
             <a:r>
               <a:rPr lang="en-US" dirty="0"/>
-              <a:t>Player AI implemented, procedural map generation, full menu, 10 weapons implemented, adversarial environment mechanics, Powerup spawning</a:t>
+              <a:t>Player AI, Procedural map generation, Full menu, More weapons, Environmental Hazards, Supply Crate Spawn</a:t>
             </a:r>
           </a:p>
           <a:p>
@@ -17825,7 +18392,7 @@
             <a:pPr lvl="1"/>
             <a:r>
               <a:rPr lang="en-US" dirty="0"/>
-              <a:t>Adjust for player feedback, full weapon arsenal, AI difficulty levels, Settings Persistence</a:t>
+              <a:t>Adjust for player feedback, Full weapon arsenal, AI difficulty levels, Settings Persistence</a:t>
             </a:r>
           </a:p>
           <a:p>
@@ -17909,44 +18476,332 @@
         </p:nvSpPr>
         <p:spPr/>
         <p:txBody>
-          <a:bodyPr/>
+          <a:bodyPr>
+            <a:normAutofit/>
+          </a:bodyPr>
           <a:lstStyle/>
           <a:p>
             <a:r>
-              <a:rPr lang="en-US" dirty="0"/>
-              <a:t>One complete map</a:t>
+              <a:rPr lang="en-US" sz="2400" dirty="0"/>
+              <a:t>One Complete Map</a:t>
             </a:r>
           </a:p>
           <a:p>
+            <a:pPr lvl="1"/>
             <a:r>
-              <a:rPr lang="en-US" dirty="0"/>
-              <a:t>Core weapons implemented</a:t>
+              <a:rPr lang="en-US" sz="2000" dirty="0"/>
+              <a:t>Premade, NOT generated</a:t>
             </a:r>
           </a:p>
           <a:p>
             <a:r>
-              <a:rPr lang="en-US" dirty="0" err="1"/>
-              <a:t>PvP</a:t>
+              <a:rPr lang="en-US" sz="2400" dirty="0"/>
+              <a:t>Core Weapons Implemented</a:t>
             </a:r>
+          </a:p>
+          <a:p>
+            <a:pPr lvl="1"/>
             <a:r>
-              <a:rPr lang="en-US" dirty="0"/>
-              <a:t> only</a:t>
+              <a:rPr lang="en-US" sz="2000" dirty="0"/>
+              <a:t>Missile, Rifle, Grenade, Melee</a:t>
             </a:r>
           </a:p>
           <a:p>
             <a:r>
-              <a:rPr lang="en-US" dirty="0"/>
-              <a:t>Player movement</a:t>
+              <a:rPr lang="en-US" sz="2400" dirty="0"/>
+              <a:t>Fully Player Controlled</a:t>
             </a:r>
           </a:p>
           <a:p>
+            <a:pPr lvl="1"/>
             <a:r>
-              <a:rPr lang="en-US" dirty="0"/>
-              <a:t>Destructible terrain</a:t>
+              <a:rPr lang="en-US" sz="2000" dirty="0"/>
+              <a:t>No AI, only Player vs. Player</a:t>
             </a:r>
           </a:p>
-          <a:p>
-            <a:endParaRPr lang="en-US" dirty="0"/>
+        </p:txBody>
+      </p:sp>
+      <p:sp>
+        <p:nvSpPr>
+          <p:cNvPr id="4" name="Content Placeholder 2">
+            <a:extLst>
+              <a:ext uri="{FF2B5EF4-FFF2-40B4-BE49-F238E27FC236}">
+                <a16:creationId xmlns:a16="http://schemas.microsoft.com/office/drawing/2014/main" id="{32C971BB-A35B-4DEE-AD4C-B0E88705E748}"/>
+              </a:ext>
+            </a:extLst>
+          </p:cNvPr>
+          <p:cNvSpPr txBox="1">
+            <a:spLocks/>
+          </p:cNvSpPr>
+          <p:nvPr/>
+        </p:nvSpPr>
+        <p:spPr>
+          <a:xfrm>
+            <a:off x="6273637" y="2603500"/>
+            <a:ext cx="5311560" cy="3416300"/>
+          </a:xfrm>
+          <a:prstGeom prst="rect">
+            <a:avLst/>
+          </a:prstGeom>
+        </p:spPr>
+        <p:txBody>
+          <a:bodyPr vert="horz" lIns="91440" tIns="45720" rIns="91440" bIns="45720" rtlCol="0">
+            <a:normAutofit/>
+          </a:bodyPr>
+          <a:lstStyle>
+            <a:lvl1pPr marL="342900" indent="-342900" algn="l" defTabSz="457200" rtl="0" eaLnBrk="1" latinLnBrk="0" hangingPunct="1">
+              <a:spcBef>
+                <a:spcPts val="1000"/>
+              </a:spcBef>
+              <a:spcAft>
+                <a:spcPts val="0"/>
+              </a:spcAft>
+              <a:buClr>
+                <a:schemeClr val="accent1"/>
+              </a:buClr>
+              <a:buSzPct val="80000"/>
+              <a:buFont typeface="Wingdings 3" charset="2"/>
+              <a:buChar char=""/>
+              <a:defRPr sz="1800" b="0" i="0" kern="1200">
+                <a:solidFill>
+                  <a:schemeClr val="tx1">
+                    <a:lumMod val="75000"/>
+                    <a:lumOff val="25000"/>
+                  </a:schemeClr>
+                </a:solidFill>
+                <a:latin typeface="+mn-lt"/>
+                <a:ea typeface="+mn-ea"/>
+                <a:cs typeface="+mn-cs"/>
+              </a:defRPr>
+            </a:lvl1pPr>
+            <a:lvl2pPr marL="742950" indent="-285750" algn="l" defTabSz="457200" rtl="0" eaLnBrk="1" latinLnBrk="0" hangingPunct="1">
+              <a:spcBef>
+                <a:spcPts val="1000"/>
+              </a:spcBef>
+              <a:spcAft>
+                <a:spcPts val="0"/>
+              </a:spcAft>
+              <a:buClr>
+                <a:schemeClr val="accent1"/>
+              </a:buClr>
+              <a:buSzPct val="80000"/>
+              <a:buFont typeface="Wingdings 3" charset="2"/>
+              <a:buChar char=""/>
+              <a:defRPr sz="1600" b="0" i="0" kern="1200">
+                <a:solidFill>
+                  <a:schemeClr val="tx1">
+                    <a:lumMod val="75000"/>
+                    <a:lumOff val="25000"/>
+                  </a:schemeClr>
+                </a:solidFill>
+                <a:latin typeface="+mn-lt"/>
+                <a:ea typeface="+mn-ea"/>
+                <a:cs typeface="+mn-cs"/>
+              </a:defRPr>
+            </a:lvl2pPr>
+            <a:lvl3pPr marL="1143000" indent="-228600" algn="l" defTabSz="457200" rtl="0" eaLnBrk="1" latinLnBrk="0" hangingPunct="1">
+              <a:spcBef>
+                <a:spcPts val="1000"/>
+              </a:spcBef>
+              <a:spcAft>
+                <a:spcPts val="0"/>
+              </a:spcAft>
+              <a:buClr>
+                <a:schemeClr val="accent1"/>
+              </a:buClr>
+              <a:buSzPct val="80000"/>
+              <a:buFont typeface="Wingdings 3" charset="2"/>
+              <a:buChar char=""/>
+              <a:defRPr sz="1400" b="0" i="0" kern="1200">
+                <a:solidFill>
+                  <a:schemeClr val="tx1">
+                    <a:lumMod val="75000"/>
+                    <a:lumOff val="25000"/>
+                  </a:schemeClr>
+                </a:solidFill>
+                <a:latin typeface="+mn-lt"/>
+                <a:ea typeface="+mn-ea"/>
+                <a:cs typeface="+mn-cs"/>
+              </a:defRPr>
+            </a:lvl3pPr>
+            <a:lvl4pPr marL="1600200" indent="-228600" algn="l" defTabSz="457200" rtl="0" eaLnBrk="1" latinLnBrk="0" hangingPunct="1">
+              <a:spcBef>
+                <a:spcPts val="1000"/>
+              </a:spcBef>
+              <a:spcAft>
+                <a:spcPts val="0"/>
+              </a:spcAft>
+              <a:buClr>
+                <a:schemeClr val="accent1"/>
+              </a:buClr>
+              <a:buSzPct val="80000"/>
+              <a:buFont typeface="Wingdings 3" charset="2"/>
+              <a:buChar char=""/>
+              <a:defRPr sz="1200" b="0" i="0" kern="1200">
+                <a:solidFill>
+                  <a:schemeClr val="tx1">
+                    <a:lumMod val="75000"/>
+                    <a:lumOff val="25000"/>
+                  </a:schemeClr>
+                </a:solidFill>
+                <a:latin typeface="+mn-lt"/>
+                <a:ea typeface="+mn-ea"/>
+                <a:cs typeface="+mn-cs"/>
+              </a:defRPr>
+            </a:lvl4pPr>
+            <a:lvl5pPr marL="2057400" indent="-228600" algn="l" defTabSz="457200" rtl="0" eaLnBrk="1" latinLnBrk="0" hangingPunct="1">
+              <a:spcBef>
+                <a:spcPts val="1000"/>
+              </a:spcBef>
+              <a:spcAft>
+                <a:spcPts val="0"/>
+              </a:spcAft>
+              <a:buClr>
+                <a:schemeClr val="accent1"/>
+              </a:buClr>
+              <a:buSzPct val="80000"/>
+              <a:buFont typeface="Wingdings 3" charset="2"/>
+              <a:buChar char=""/>
+              <a:defRPr sz="1200" b="0" i="0" kern="1200">
+                <a:solidFill>
+                  <a:schemeClr val="tx1">
+                    <a:lumMod val="75000"/>
+                    <a:lumOff val="25000"/>
+                  </a:schemeClr>
+                </a:solidFill>
+                <a:latin typeface="+mn-lt"/>
+                <a:ea typeface="+mn-ea"/>
+                <a:cs typeface="+mn-cs"/>
+              </a:defRPr>
+            </a:lvl5pPr>
+            <a:lvl6pPr marL="2514600" indent="-228600" algn="l" defTabSz="457200" rtl="0" eaLnBrk="1" latinLnBrk="0" hangingPunct="1">
+              <a:spcBef>
+                <a:spcPts val="1000"/>
+              </a:spcBef>
+              <a:spcAft>
+                <a:spcPts val="0"/>
+              </a:spcAft>
+              <a:buClr>
+                <a:schemeClr val="accent1"/>
+              </a:buClr>
+              <a:buSzPct val="80000"/>
+              <a:buFont typeface="Wingdings 3" charset="2"/>
+              <a:buChar char=""/>
+              <a:defRPr sz="1200" b="0" i="0" kern="1200">
+                <a:solidFill>
+                  <a:schemeClr val="tx1">
+                    <a:lumMod val="75000"/>
+                    <a:lumOff val="25000"/>
+                  </a:schemeClr>
+                </a:solidFill>
+                <a:latin typeface="+mn-lt"/>
+                <a:ea typeface="+mn-ea"/>
+                <a:cs typeface="+mn-cs"/>
+              </a:defRPr>
+            </a:lvl6pPr>
+            <a:lvl7pPr marL="2971800" indent="-228600" algn="l" defTabSz="457200" rtl="0" eaLnBrk="1" latinLnBrk="0" hangingPunct="1">
+              <a:spcBef>
+                <a:spcPts val="1000"/>
+              </a:spcBef>
+              <a:spcAft>
+                <a:spcPts val="0"/>
+              </a:spcAft>
+              <a:buClr>
+                <a:schemeClr val="accent1"/>
+              </a:buClr>
+              <a:buSzPct val="80000"/>
+              <a:buFont typeface="Wingdings 3" charset="2"/>
+              <a:buChar char=""/>
+              <a:defRPr sz="1200" b="0" i="0" kern="1200">
+                <a:solidFill>
+                  <a:schemeClr val="tx1">
+                    <a:lumMod val="75000"/>
+                    <a:lumOff val="25000"/>
+                  </a:schemeClr>
+                </a:solidFill>
+                <a:latin typeface="+mn-lt"/>
+                <a:ea typeface="+mn-ea"/>
+                <a:cs typeface="+mn-cs"/>
+              </a:defRPr>
+            </a:lvl7pPr>
+            <a:lvl8pPr marL="3429000" indent="-228600" algn="l" defTabSz="457200" rtl="0" eaLnBrk="1" latinLnBrk="0" hangingPunct="1">
+              <a:spcBef>
+                <a:spcPts val="1000"/>
+              </a:spcBef>
+              <a:spcAft>
+                <a:spcPts val="0"/>
+              </a:spcAft>
+              <a:buClr>
+                <a:schemeClr val="accent1"/>
+              </a:buClr>
+              <a:buSzPct val="80000"/>
+              <a:buFont typeface="Wingdings 3" charset="2"/>
+              <a:buChar char=""/>
+              <a:defRPr sz="1200" b="0" i="0" kern="1200">
+                <a:solidFill>
+                  <a:schemeClr val="tx1">
+                    <a:lumMod val="75000"/>
+                    <a:lumOff val="25000"/>
+                  </a:schemeClr>
+                </a:solidFill>
+                <a:latin typeface="+mn-lt"/>
+                <a:ea typeface="+mn-ea"/>
+                <a:cs typeface="+mn-cs"/>
+              </a:defRPr>
+            </a:lvl8pPr>
+            <a:lvl9pPr marL="3886200" indent="-228600" algn="l" defTabSz="457200" rtl="0" eaLnBrk="1" latinLnBrk="0" hangingPunct="1">
+              <a:spcBef>
+                <a:spcPts val="1000"/>
+              </a:spcBef>
+              <a:spcAft>
+                <a:spcPts val="0"/>
+              </a:spcAft>
+              <a:buClr>
+                <a:schemeClr val="accent1"/>
+              </a:buClr>
+              <a:buSzPct val="80000"/>
+              <a:buFont typeface="Wingdings 3" charset="2"/>
+              <a:buChar char=""/>
+              <a:defRPr sz="1200" b="0" i="0" kern="1200">
+                <a:solidFill>
+                  <a:schemeClr val="tx1">
+                    <a:lumMod val="75000"/>
+                    <a:lumOff val="25000"/>
+                  </a:schemeClr>
+                </a:solidFill>
+                <a:latin typeface="+mn-lt"/>
+                <a:ea typeface="+mn-ea"/>
+                <a:cs typeface="+mn-cs"/>
+              </a:defRPr>
+            </a:lvl9pPr>
+          </a:lstStyle>
+          <a:p>
+            <a:r>
+              <a:rPr lang="en-US" sz="2400" dirty="0"/>
+              <a:t>Working Game State</a:t>
+            </a:r>
+          </a:p>
+          <a:p>
+            <a:pPr lvl="1"/>
+            <a:r>
+              <a:rPr lang="en-US" sz="2000" dirty="0"/>
+              <a:t>Match will play from start to finish</a:t>
+            </a:r>
+          </a:p>
+          <a:p>
+            <a:r>
+              <a:rPr lang="en-US" sz="2400" dirty="0"/>
+              <a:t>Rudimentary Weapon Swap</a:t>
+            </a:r>
+          </a:p>
+          <a:p>
+            <a:r>
+              <a:rPr lang="en-US" sz="2400" dirty="0"/>
+              <a:t>Destructible Terrain</a:t>
+            </a:r>
+          </a:p>
+          <a:p>
+            <a:endParaRPr lang="en-US" sz="2400" dirty="0"/>
           </a:p>
         </p:txBody>
       </p:sp>
@@ -18237,12 +19092,6 @@
 </file>
 
 <file path=customXml/item2.xml><?xml version="1.0" encoding="utf-8"?>
-<p:properties xmlns:p="http://schemas.microsoft.com/office/2006/metadata/properties" xmlns:xsi="http://www.w3.org/2001/XMLSchema-instance" xmlns:pc="http://schemas.microsoft.com/office/infopath/2007/PartnerControls">
-  <documentManagement/>
-</p:properties>
-</file>
-
-<file path=customXml/item3.xml><?xml version="1.0" encoding="utf-8"?>
 <ct:contentTypeSchema xmlns:ct="http://schemas.microsoft.com/office/2006/metadata/contentType" xmlns:ma="http://schemas.microsoft.com/office/2006/metadata/properties/metaAttributes" ct:_="" ma:_="" ma:contentTypeName="Document" ma:contentTypeID="0x010100DEF4AC995E12C049A50ADA15ED46708B" ma:contentTypeVersion="10" ma:contentTypeDescription="Create a new document." ma:contentTypeScope="" ma:versionID="e1e50748af6b146b5d32526844560075">
   <xsd:schema xmlns:xsd="http://www.w3.org/2001/XMLSchema" xmlns:xs="http://www.w3.org/2001/XMLSchema" xmlns:p="http://schemas.microsoft.com/office/2006/metadata/properties" xmlns:ns3="dfe49bc2-e275-45b8-b1dd-d32901820c2b" targetNamespace="http://schemas.microsoft.com/office/2006/metadata/properties" ma:root="true" ma:fieldsID="f62390b4dc920914b866ec1225863cbc" ns3:_="">
     <xsd:import namespace="dfe49bc2-e275-45b8-b1dd-d32901820c2b"/>
@@ -18426,6 +19275,12 @@
 </ct:contentTypeSchema>
 </file>
 
+<file path=customXml/item3.xml><?xml version="1.0" encoding="utf-8"?>
+<p:properties xmlns:p="http://schemas.microsoft.com/office/2006/metadata/properties" xmlns:xsi="http://www.w3.org/2001/XMLSchema-instance" xmlns:pc="http://schemas.microsoft.com/office/infopath/2007/PartnerControls">
+  <documentManagement/>
+</p:properties>
+</file>
+
 <file path=customXml/itemProps1.xml><?xml version="1.0" encoding="utf-8"?>
 <ds:datastoreItem xmlns:ds="http://schemas.openxmlformats.org/officeDocument/2006/customXml" ds:itemID="{C7893EDB-12D9-41BB-AE21-8BFDCB986999}">
   <ds:schemaRefs>
@@ -18435,22 +19290,6 @@
 </file>
 
 <file path=customXml/itemProps2.xml><?xml version="1.0" encoding="utf-8"?>
-<ds:datastoreItem xmlns:ds="http://schemas.openxmlformats.org/officeDocument/2006/customXml" ds:itemID="{4EE20F03-7AA1-4C1B-8D33-0687331B4F14}">
-  <ds:schemaRefs>
-    <ds:schemaRef ds:uri="http://schemas.microsoft.com/office/infopath/2007/PartnerControls"/>
-    <ds:schemaRef ds:uri="dfe49bc2-e275-45b8-b1dd-d32901820c2b"/>
-    <ds:schemaRef ds:uri="http://purl.org/dc/elements/1.1/"/>
-    <ds:schemaRef ds:uri="http://schemas.microsoft.com/office/2006/documentManagement/types"/>
-    <ds:schemaRef ds:uri="http://purl.org/dc/terms/"/>
-    <ds:schemaRef ds:uri="http://schemas.openxmlformats.org/package/2006/metadata/core-properties"/>
-    <ds:schemaRef ds:uri="http://purl.org/dc/dcmitype/"/>
-    <ds:schemaRef ds:uri="http://schemas.microsoft.com/office/2006/metadata/properties"/>
-    <ds:schemaRef ds:uri="http://www.w3.org/XML/1998/namespace"/>
-  </ds:schemaRefs>
-</ds:datastoreItem>
-</file>
-
-<file path=customXml/itemProps3.xml><?xml version="1.0" encoding="utf-8"?>
 <ds:datastoreItem xmlns:ds="http://schemas.openxmlformats.org/officeDocument/2006/customXml" ds:itemID="{08A5B023-9490-4F16-A587-A9EC60F27C16}">
   <ds:schemaRefs>
     <ds:schemaRef ds:uri="http://schemas.microsoft.com/office/2006/metadata/contentType"/>
@@ -18466,4 +19305,20 @@
     <ds:schemaRef ds:uri="http://schemas.microsoft.com/internal/obd"/>
   </ds:schemaRefs>
 </ds:datastoreItem>
+</file>
+
+<file path=customXml/itemProps3.xml><?xml version="1.0" encoding="utf-8"?>
+<ds:datastoreItem xmlns:ds="http://schemas.openxmlformats.org/officeDocument/2006/customXml" ds:itemID="{4EE20F03-7AA1-4C1B-8D33-0687331B4F14}">
+  <ds:schemaRefs>
+    <ds:schemaRef ds:uri="http://schemas.microsoft.com/office/infopath/2007/PartnerControls"/>
+    <ds:schemaRef ds:uri="dfe49bc2-e275-45b8-b1dd-d32901820c2b"/>
+    <ds:schemaRef ds:uri="http://purl.org/dc/elements/1.1/"/>
+    <ds:schemaRef ds:uri="http://schemas.microsoft.com/office/2006/documentManagement/types"/>
+    <ds:schemaRef ds:uri="http://purl.org/dc/terms/"/>
+    <ds:schemaRef ds:uri="http://schemas.openxmlformats.org/package/2006/metadata/core-properties"/>
+    <ds:schemaRef ds:uri="http://purl.org/dc/dcmitype/"/>
+    <ds:schemaRef ds:uri="http://schemas.microsoft.com/office/2006/metadata/properties"/>
+    <ds:schemaRef ds:uri="http://www.w3.org/XML/1998/namespace"/>
+  </ds:schemaRefs>
+</ds:datastoreItem>
 </file>
</xml_diff>